<commit_message>
Milestones for Manuel Schmitt
</commit_message>
<xml_diff>
--- a/Präsentationen/Projektpräsentation/Project proposal Rift Wingsuit V2.pptx
+++ b/Präsentationen/Projektpräsentation/Project proposal Rift Wingsuit V2.pptx
@@ -5,7 +5,7 @@
     <p:sldMasterId id="2147483660" r:id="rId1"/>
   </p:sldMasterIdLst>
   <p:notesMasterIdLst>
-    <p:notesMasterId r:id="rId22"/>
+    <p:notesMasterId r:id="rId25"/>
   </p:notesMasterIdLst>
   <p:sldIdLst>
     <p:sldId id="272" r:id="rId2"/>
@@ -20,14 +20,17 @@
     <p:sldId id="308" r:id="rId11"/>
     <p:sldId id="286" r:id="rId12"/>
     <p:sldId id="317" r:id="rId13"/>
-    <p:sldId id="314" r:id="rId14"/>
-    <p:sldId id="318" r:id="rId15"/>
-    <p:sldId id="310" r:id="rId16"/>
-    <p:sldId id="315" r:id="rId17"/>
-    <p:sldId id="319" r:id="rId18"/>
-    <p:sldId id="270" r:id="rId19"/>
-    <p:sldId id="280" r:id="rId20"/>
-    <p:sldId id="279" r:id="rId21"/>
+    <p:sldId id="321" r:id="rId14"/>
+    <p:sldId id="314" r:id="rId15"/>
+    <p:sldId id="318" r:id="rId16"/>
+    <p:sldId id="322" r:id="rId17"/>
+    <p:sldId id="310" r:id="rId18"/>
+    <p:sldId id="315" r:id="rId19"/>
+    <p:sldId id="319" r:id="rId20"/>
+    <p:sldId id="320" r:id="rId21"/>
+    <p:sldId id="270" r:id="rId22"/>
+    <p:sldId id="280" r:id="rId23"/>
+    <p:sldId id="279" r:id="rId24"/>
   </p:sldIdLst>
   <p:sldSz cx="9144000" cy="5715000" type="screen16x10"/>
   <p:notesSz cx="6858000" cy="9144000"/>
@@ -128,7 +131,7 @@
   </p:defaultTextStyle>
   <p:extLst>
     <p:ext uri="{EFAFB233-063F-42B5-8137-9DF3F51BA10A}">
-      <p15:sldGuideLst xmlns:p15="http://schemas.microsoft.com/office/powerpoint/2012/main">
+      <p15:sldGuideLst xmlns:p15="http://schemas.microsoft.com/office/powerpoint/2012/main" xmlns="">
         <p15:guide id="1" orient="horz" pos="1800">
           <p15:clr>
             <a:srgbClr val="A4A3A4"/>
@@ -228,7 +231,7 @@
             <a:fld id="{243825A9-FBEC-4183-9E10-7EA49C7B85FB}" type="datetimeFigureOut">
               <a:rPr lang="de-DE" smtClean="0"/>
               <a:pPr/>
-              <a:t>16.05.2016</a:t>
+              <a:t>17.05.2016</a:t>
             </a:fld>
             <a:endParaRPr lang="de-DE"/>
           </a:p>
@@ -757,7 +760,7 @@
             <a:fld id="{E3D2E8C1-5FD7-4691-AB68-D6297B4D5F43}" type="datetime1">
               <a:rPr lang="de-DE" smtClean="0"/>
               <a:pPr/>
-              <a:t>16.05.2016</a:t>
+              <a:t>17.05.2016</a:t>
             </a:fld>
             <a:endParaRPr lang="de-DE"/>
           </a:p>
@@ -924,7 +927,7 @@
             <a:fld id="{6555916C-EC3E-4A59-A202-E3BDAC789789}" type="datetime1">
               <a:rPr lang="de-DE" smtClean="0"/>
               <a:pPr/>
-              <a:t>16.05.2016</a:t>
+              <a:t>17.05.2016</a:t>
             </a:fld>
             <a:endParaRPr lang="de-DE"/>
           </a:p>
@@ -1101,7 +1104,7 @@
             <a:fld id="{B0BAAC96-984A-4C42-A65C-1E30F77A26C5}" type="datetime1">
               <a:rPr lang="de-DE" smtClean="0"/>
               <a:pPr/>
-              <a:t>16.05.2016</a:t>
+              <a:t>17.05.2016</a:t>
             </a:fld>
             <a:endParaRPr lang="de-DE"/>
           </a:p>
@@ -1268,7 +1271,7 @@
             <a:fld id="{0AF80EA2-653E-48EB-A275-D811A53BA918}" type="datetime1">
               <a:rPr lang="de-DE" smtClean="0"/>
               <a:pPr/>
-              <a:t>16.05.2016</a:t>
+              <a:t>17.05.2016</a:t>
             </a:fld>
             <a:endParaRPr lang="de-DE"/>
           </a:p>
@@ -1512,7 +1515,7 @@
             <a:fld id="{E5BD76EC-8BFC-4DBC-81BC-788FF00AD01A}" type="datetime1">
               <a:rPr lang="de-DE" smtClean="0"/>
               <a:pPr/>
-              <a:t>16.05.2016</a:t>
+              <a:t>17.05.2016</a:t>
             </a:fld>
             <a:endParaRPr lang="de-DE"/>
           </a:p>
@@ -1778,7 +1781,7 @@
             <a:fld id="{42D10058-B0DA-4CAD-91DA-40F8A0FB6522}" type="datetime1">
               <a:rPr lang="de-DE" smtClean="0"/>
               <a:pPr/>
-              <a:t>16.05.2016</a:t>
+              <a:t>17.05.2016</a:t>
             </a:fld>
             <a:endParaRPr lang="de-DE"/>
           </a:p>
@@ -2158,7 +2161,7 @@
             <a:fld id="{30F2673F-3B0B-4E2B-A302-85F12C63CE58}" type="datetime1">
               <a:rPr lang="de-DE" smtClean="0"/>
               <a:pPr/>
-              <a:t>16.05.2016</a:t>
+              <a:t>17.05.2016</a:t>
             </a:fld>
             <a:endParaRPr lang="de-DE"/>
           </a:p>
@@ -2310,7 +2313,7 @@
             <a:fld id="{99C24A88-FE37-415B-BBD5-612EBB0081EA}" type="datetime1">
               <a:rPr lang="de-DE" smtClean="0"/>
               <a:pPr/>
-              <a:t>16.05.2016</a:t>
+              <a:t>17.05.2016</a:t>
             </a:fld>
             <a:endParaRPr lang="de-DE"/>
           </a:p>
@@ -2402,7 +2405,7 @@
             <a:fld id="{D4BBCC0C-5DC1-47B9-9437-A552677B599E}" type="datetime1">
               <a:rPr lang="de-DE" smtClean="0"/>
               <a:pPr/>
-              <a:t>16.05.2016</a:t>
+              <a:t>17.05.2016</a:t>
             </a:fld>
             <a:endParaRPr lang="de-DE"/>
           </a:p>
@@ -2665,7 +2668,7 @@
             <a:fld id="{5D8961AA-03AC-4A6B-AD4E-C8A3670A08F8}" type="datetime1">
               <a:rPr lang="de-DE" smtClean="0"/>
               <a:pPr/>
-              <a:t>16.05.2016</a:t>
+              <a:t>17.05.2016</a:t>
             </a:fld>
             <a:endParaRPr lang="de-DE"/>
           </a:p>
@@ -2955,7 +2958,7 @@
             <a:fld id="{9565BAF1-4771-44D7-80BB-E70855042F1C}" type="datetime1">
               <a:rPr lang="de-DE" smtClean="0"/>
               <a:pPr/>
-              <a:t>16.05.2016</a:t>
+              <a:t>17.05.2016</a:t>
             </a:fld>
             <a:endParaRPr lang="de-DE"/>
           </a:p>
@@ -3728,7 +3731,7 @@
             <a:fld id="{48B16CC1-F4AA-4BAA-A083-6C6353824805}" type="datetime1">
               <a:rPr lang="de-DE" smtClean="0"/>
               <a:pPr/>
-              <a:t>16.05.2016</a:t>
+              <a:t>17.05.2016</a:t>
             </a:fld>
             <a:endParaRPr lang="de-DE"/>
           </a:p>
@@ -5226,14 +5229,14 @@
                 <a:gridCol w="1584176">
                   <a:extLst>
                     <a:ext uri="{9D8B030D-6E8A-4147-A177-3AD203B41FA5}">
-                      <a16:colId xmlns:a16="http://schemas.microsoft.com/office/drawing/2014/main" val="20000"/>
+                      <a16:colId xmlns:a16="http://schemas.microsoft.com/office/drawing/2014/main" xmlns="" val="20000"/>
                     </a:ext>
                   </a:extLst>
                 </a:gridCol>
                 <a:gridCol w="6480721">
                   <a:extLst>
                     <a:ext uri="{9D8B030D-6E8A-4147-A177-3AD203B41FA5}">
-                      <a16:colId xmlns:a16="http://schemas.microsoft.com/office/drawing/2014/main" val="20001"/>
+                      <a16:colId xmlns:a16="http://schemas.microsoft.com/office/drawing/2014/main" xmlns="" val="20001"/>
                     </a:ext>
                   </a:extLst>
                 </a:gridCol>
@@ -5275,7 +5278,7 @@
                 </a:tc>
                 <a:extLst>
                   <a:ext uri="{0D108BD9-81ED-4DB2-BD59-A6C34878D82A}">
-                    <a16:rowId xmlns:a16="http://schemas.microsoft.com/office/drawing/2014/main" val="10000"/>
+                    <a16:rowId xmlns:a16="http://schemas.microsoft.com/office/drawing/2014/main" xmlns="" val="10000"/>
                   </a:ext>
                 </a:extLst>
               </a:tr>
@@ -5455,7 +5458,7 @@
                 </a:tc>
                 <a:extLst>
                   <a:ext uri="{0D108BD9-81ED-4DB2-BD59-A6C34878D82A}">
-                    <a16:rowId xmlns:a16="http://schemas.microsoft.com/office/drawing/2014/main" val="10001"/>
+                    <a16:rowId xmlns:a16="http://schemas.microsoft.com/office/drawing/2014/main" xmlns="" val="10001"/>
                   </a:ext>
                 </a:extLst>
               </a:tr>
@@ -5595,7 +5598,7 @@
                 </a:tc>
                 <a:extLst>
                   <a:ext uri="{0D108BD9-81ED-4DB2-BD59-A6C34878D82A}">
-                    <a16:rowId xmlns:a16="http://schemas.microsoft.com/office/drawing/2014/main" val="10002"/>
+                    <a16:rowId xmlns:a16="http://schemas.microsoft.com/office/drawing/2014/main" xmlns="" val="10002"/>
                   </a:ext>
                 </a:extLst>
               </a:tr>
@@ -5715,7 +5718,7 @@
                 </a:tc>
                 <a:extLst>
                   <a:ext uri="{0D108BD9-81ED-4DB2-BD59-A6C34878D82A}">
-                    <a16:rowId xmlns:a16="http://schemas.microsoft.com/office/drawing/2014/main" val="10003"/>
+                    <a16:rowId xmlns:a16="http://schemas.microsoft.com/office/drawing/2014/main" xmlns="" val="10003"/>
                   </a:ext>
                 </a:extLst>
               </a:tr>
@@ -5848,7 +5851,7 @@
           <p:nvPr>
             <p:extLst>
               <p:ext uri="{D42A27DB-BD31-4B8C-83A1-F6EECF244321}">
-                <p14:modId xmlns:p14="http://schemas.microsoft.com/office/powerpoint/2010/main" val="62862726"/>
+                <p14:modId xmlns:p14="http://schemas.microsoft.com/office/powerpoint/2010/main" xmlns="" val="62862726"/>
               </p:ext>
             </p:extLst>
           </p:nvPr>
@@ -5867,14 +5870,14 @@
                 <a:gridCol w="1584176">
                   <a:extLst>
                     <a:ext uri="{9D8B030D-6E8A-4147-A177-3AD203B41FA5}">
-                      <a16:colId xmlns:a16="http://schemas.microsoft.com/office/drawing/2014/main" val="20000"/>
+                      <a16:colId xmlns:a16="http://schemas.microsoft.com/office/drawing/2014/main" xmlns="" val="20000"/>
                     </a:ext>
                   </a:extLst>
                 </a:gridCol>
                 <a:gridCol w="6480721">
                   <a:extLst>
                     <a:ext uri="{9D8B030D-6E8A-4147-A177-3AD203B41FA5}">
-                      <a16:colId xmlns:a16="http://schemas.microsoft.com/office/drawing/2014/main" val="20001"/>
+                      <a16:colId xmlns:a16="http://schemas.microsoft.com/office/drawing/2014/main" xmlns="" val="20001"/>
                     </a:ext>
                   </a:extLst>
                 </a:gridCol>
@@ -5911,7 +5914,7 @@
                 </a:tc>
                 <a:extLst>
                   <a:ext uri="{0D108BD9-81ED-4DB2-BD59-A6C34878D82A}">
-                    <a16:rowId xmlns:a16="http://schemas.microsoft.com/office/drawing/2014/main" val="10000"/>
+                    <a16:rowId xmlns:a16="http://schemas.microsoft.com/office/drawing/2014/main" xmlns="" val="10000"/>
                   </a:ext>
                 </a:extLst>
               </a:tr>
@@ -5964,7 +5967,7 @@
                 </a:tc>
                 <a:extLst>
                   <a:ext uri="{0D108BD9-81ED-4DB2-BD59-A6C34878D82A}">
-                    <a16:rowId xmlns:a16="http://schemas.microsoft.com/office/drawing/2014/main" val="10001"/>
+                    <a16:rowId xmlns:a16="http://schemas.microsoft.com/office/drawing/2014/main" xmlns="" val="10001"/>
                   </a:ext>
                 </a:extLst>
               </a:tr>
@@ -6041,7 +6044,7 @@
                 </a:tc>
                 <a:extLst>
                   <a:ext uri="{0D108BD9-81ED-4DB2-BD59-A6C34878D82A}">
-                    <a16:rowId xmlns:a16="http://schemas.microsoft.com/office/drawing/2014/main" val="10002"/>
+                    <a16:rowId xmlns:a16="http://schemas.microsoft.com/office/drawing/2014/main" xmlns="" val="10002"/>
                   </a:ext>
                 </a:extLst>
               </a:tr>
@@ -6084,7 +6087,7 @@
                 </a:tc>
                 <a:extLst>
                   <a:ext uri="{0D108BD9-81ED-4DB2-BD59-A6C34878D82A}">
-                    <a16:rowId xmlns:a16="http://schemas.microsoft.com/office/drawing/2014/main" val="10003"/>
+                    <a16:rowId xmlns:a16="http://schemas.microsoft.com/office/drawing/2014/main" xmlns="" val="10003"/>
                   </a:ext>
                 </a:extLst>
               </a:tr>
@@ -6095,7 +6098,7 @@
     </p:spTree>
     <p:extLst>
       <p:ext uri="{BB962C8B-B14F-4D97-AF65-F5344CB8AC3E}">
-        <p14:creationId xmlns:p14="http://schemas.microsoft.com/office/powerpoint/2010/main" val="401768939"/>
+        <p14:creationId xmlns:p14="http://schemas.microsoft.com/office/powerpoint/2010/main" xmlns="" val="401768939"/>
       </p:ext>
     </p:extLst>
   </p:cSld>
@@ -6154,7 +6157,7 @@
                   <a:srgbClr val="FF0000"/>
                 </a:solidFill>
               </a:rPr>
-              <a:t> 2</a:t>
+              <a:t> 1</a:t>
             </a:r>
           </a:p>
         </p:txBody>
@@ -6208,6 +6211,396 @@
               <a:rPr lang="de-DE" smtClean="0"/>
               <a:pPr/>
               <a:t>13</a:t>
+            </a:fld>
+            <a:endParaRPr lang="de-DE"/>
+          </a:p>
+        </p:txBody>
+      </p:sp>
+      <p:graphicFrame>
+        <p:nvGraphicFramePr>
+          <p:cNvPr id="8" name="Tabelle 7"/>
+          <p:cNvGraphicFramePr>
+            <a:graphicFrameLocks noGrp="1"/>
+          </p:cNvGraphicFramePr>
+          <p:nvPr>
+            <p:extLst>
+              <p:ext uri="{D42A27DB-BD31-4B8C-83A1-F6EECF244321}">
+                <p14:modId xmlns:p14="http://schemas.microsoft.com/office/powerpoint/2010/main" xmlns="" val="62862726"/>
+              </p:ext>
+            </p:extLst>
+          </p:nvPr>
+        </p:nvGraphicFramePr>
+        <p:xfrm>
+          <a:off x="539552" y="1849388"/>
+          <a:ext cx="8064897" cy="1483360"/>
+        </p:xfrm>
+        <a:graphic>
+          <a:graphicData uri="http://schemas.openxmlformats.org/drawingml/2006/table">
+            <a:tbl>
+              <a:tblPr firstRow="1" bandRow="1">
+                <a:tableStyleId>{5C22544A-7EE6-4342-B048-85BDC9FD1C3A}</a:tableStyleId>
+              </a:tblPr>
+              <a:tblGrid>
+                <a:gridCol w="1584176">
+                  <a:extLst>
+                    <a:ext uri="{9D8B030D-6E8A-4147-A177-3AD203B41FA5}">
+                      <a16:colId xmlns:a16="http://schemas.microsoft.com/office/drawing/2014/main" xmlns="" val="20000"/>
+                    </a:ext>
+                  </a:extLst>
+                </a:gridCol>
+                <a:gridCol w="6480721">
+                  <a:extLst>
+                    <a:ext uri="{9D8B030D-6E8A-4147-A177-3AD203B41FA5}">
+                      <a16:colId xmlns:a16="http://schemas.microsoft.com/office/drawing/2014/main" xmlns="" val="20001"/>
+                    </a:ext>
+                  </a:extLst>
+                </a:gridCol>
+              </a:tblGrid>
+              <a:tr h="370840">
+                <a:tc>
+                  <a:txBody>
+                    <a:bodyPr/>
+                    <a:lstStyle/>
+                    <a:p>
+                      <a:pPr algn="ctr"/>
+                      <a:r>
+                        <a:rPr lang="de-DE" sz="1800" dirty="0" err="1"/>
+                        <a:t>Week</a:t>
+                      </a:r>
+                      <a:endParaRPr lang="de-DE" sz="1800" dirty="0"/>
+                    </a:p>
+                  </a:txBody>
+                  <a:tcPr/>
+                </a:tc>
+                <a:tc>
+                  <a:txBody>
+                    <a:bodyPr/>
+                    <a:lstStyle/>
+                    <a:p>
+                      <a:pPr algn="ctr"/>
+                      <a:r>
+                        <a:rPr lang="de-DE" sz="1800" dirty="0" smtClean="0"/>
+                        <a:t>Manuel Schmitt</a:t>
+                      </a:r>
+                    </a:p>
+                  </a:txBody>
+                  <a:tcPr/>
+                </a:tc>
+                <a:extLst>
+                  <a:ext uri="{0D108BD9-81ED-4DB2-BD59-A6C34878D82A}">
+                    <a16:rowId xmlns:a16="http://schemas.microsoft.com/office/drawing/2014/main" xmlns="" val="10000"/>
+                  </a:ext>
+                </a:extLst>
+              </a:tr>
+              <a:tr h="370840">
+                <a:tc>
+                  <a:txBody>
+                    <a:bodyPr/>
+                    <a:lstStyle/>
+                    <a:p>
+                      <a:pPr algn="l"/>
+                      <a:r>
+                        <a:rPr lang="de-DE" sz="1800" dirty="0"/>
+                        <a:t>05.12 – 05.19</a:t>
+                      </a:r>
+                    </a:p>
+                  </a:txBody>
+                  <a:tcPr/>
+                </a:tc>
+                <a:tc>
+                  <a:txBody>
+                    <a:bodyPr/>
+                    <a:lstStyle/>
+                    <a:p>
+                      <a:pPr lvl="0">
+                        <a:buFont typeface="Arial" pitchFamily="34" charset="0"/>
+                        <a:buChar char="•"/>
+                      </a:pPr>
+                      <a:r>
+                        <a:rPr lang="de-DE" sz="1800" dirty="0"/>
+                        <a:t> </a:t>
+                      </a:r>
+                      <a:r>
+                        <a:rPr lang="en-US" sz="1800" dirty="0" smtClean="0"/>
+                        <a:t>Working into the project and Unity Engine</a:t>
+                      </a:r>
+                      <a:endParaRPr lang="en-US" sz="1800" dirty="0"/>
+                    </a:p>
+                  </a:txBody>
+                  <a:tcPr/>
+                </a:tc>
+                <a:extLst>
+                  <a:ext uri="{0D108BD9-81ED-4DB2-BD59-A6C34878D82A}">
+                    <a16:rowId xmlns:a16="http://schemas.microsoft.com/office/drawing/2014/main" xmlns="" val="10001"/>
+                  </a:ext>
+                </a:extLst>
+              </a:tr>
+              <a:tr h="370840">
+                <a:tc>
+                  <a:txBody>
+                    <a:bodyPr/>
+                    <a:lstStyle/>
+                    <a:p>
+                      <a:pPr algn="l"/>
+                      <a:r>
+                        <a:rPr lang="de-DE" sz="1800" dirty="0"/>
+                        <a:t>05.19 – 05.26</a:t>
+                      </a:r>
+                    </a:p>
+                  </a:txBody>
+                  <a:tcPr/>
+                </a:tc>
+                <a:tc>
+                  <a:txBody>
+                    <a:bodyPr/>
+                    <a:lstStyle/>
+                    <a:p>
+                      <a:pPr lvl="0">
+                        <a:buFont typeface="Arial" pitchFamily="34" charset="0"/>
+                        <a:buChar char="•"/>
+                      </a:pPr>
+                      <a:r>
+                        <a:rPr lang="de-DE" sz="1800" dirty="0"/>
+                        <a:t> </a:t>
+                      </a:r>
+                      <a:r>
+                        <a:rPr lang="de-DE" sz="1800" dirty="0" err="1" smtClean="0"/>
+                        <a:t>Creation</a:t>
+                      </a:r>
+                      <a:r>
+                        <a:rPr lang="de-DE" sz="1800" baseline="0" dirty="0" smtClean="0"/>
+                        <a:t> </a:t>
+                      </a:r>
+                      <a:r>
+                        <a:rPr lang="de-DE" sz="1800" baseline="0" dirty="0" err="1" smtClean="0"/>
+                        <a:t>of</a:t>
+                      </a:r>
+                      <a:r>
+                        <a:rPr lang="de-DE" sz="1800" baseline="0" dirty="0" smtClean="0"/>
+                        <a:t> post-</a:t>
+                      </a:r>
+                      <a:r>
+                        <a:rPr lang="de-DE" sz="1800" baseline="0" dirty="0" err="1" smtClean="0"/>
+                        <a:t>processing</a:t>
+                      </a:r>
+                      <a:r>
+                        <a:rPr lang="de-DE" sz="1800" baseline="0" dirty="0" smtClean="0"/>
+                        <a:t> </a:t>
+                      </a:r>
+                      <a:r>
+                        <a:rPr lang="de-DE" sz="1800" baseline="0" dirty="0" err="1" smtClean="0"/>
+                        <a:t>effects</a:t>
+                      </a:r>
+                      <a:r>
+                        <a:rPr lang="de-DE" sz="1800" baseline="0" dirty="0" smtClean="0"/>
+                        <a:t> </a:t>
+                      </a:r>
+                      <a:r>
+                        <a:rPr lang="de-DE" sz="1800" baseline="0" dirty="0" err="1" smtClean="0"/>
+                        <a:t>like</a:t>
+                      </a:r>
+                      <a:r>
+                        <a:rPr lang="de-DE" sz="1800" baseline="0" dirty="0" smtClean="0"/>
+                        <a:t> </a:t>
+                      </a:r>
+                      <a:r>
+                        <a:rPr lang="de-DE" sz="1800" baseline="0" dirty="0" err="1" smtClean="0"/>
+                        <a:t>bloom</a:t>
+                      </a:r>
+                      <a:r>
+                        <a:rPr lang="de-DE" sz="1800" baseline="0" dirty="0" smtClean="0"/>
+                        <a:t> </a:t>
+                      </a:r>
+                      <a:r>
+                        <a:rPr lang="de-DE" sz="1800" baseline="0" dirty="0" err="1" smtClean="0"/>
+                        <a:t>and</a:t>
+                      </a:r>
+                      <a:r>
+                        <a:rPr lang="de-DE" sz="1800" baseline="0" dirty="0" smtClean="0"/>
+                        <a:t> </a:t>
+                      </a:r>
+                      <a:r>
+                        <a:rPr lang="de-DE" sz="1800" baseline="0" dirty="0" err="1" smtClean="0"/>
+                        <a:t>blur</a:t>
+                      </a:r>
+                      <a:endParaRPr lang="de-DE" sz="1800" dirty="0"/>
+                    </a:p>
+                  </a:txBody>
+                  <a:tcPr/>
+                </a:tc>
+                <a:extLst>
+                  <a:ext uri="{0D108BD9-81ED-4DB2-BD59-A6C34878D82A}">
+                    <a16:rowId xmlns:a16="http://schemas.microsoft.com/office/drawing/2014/main" xmlns="" val="10002"/>
+                  </a:ext>
+                </a:extLst>
+              </a:tr>
+              <a:tr h="370840">
+                <a:tc>
+                  <a:txBody>
+                    <a:bodyPr/>
+                    <a:lstStyle/>
+                    <a:p>
+                      <a:pPr algn="l"/>
+                      <a:r>
+                        <a:rPr lang="de-DE" sz="1800" dirty="0"/>
+                        <a:t>05.26 – 06.02</a:t>
+                      </a:r>
+                    </a:p>
+                  </a:txBody>
+                  <a:tcPr/>
+                </a:tc>
+                <a:tc>
+                  <a:txBody>
+                    <a:bodyPr/>
+                    <a:lstStyle/>
+                    <a:p>
+                      <a:pPr lvl="0">
+                        <a:buFont typeface="Arial" pitchFamily="34" charset="0"/>
+                        <a:buChar char="•"/>
+                      </a:pPr>
+                      <a:r>
+                        <a:rPr lang="de-DE" sz="1800" dirty="0"/>
+                        <a:t> </a:t>
+                      </a:r>
+                      <a:r>
+                        <a:rPr lang="en-US" sz="1800" dirty="0" smtClean="0"/>
+                        <a:t>Creation of ambient-occlusion-light</a:t>
+                      </a:r>
+                      <a:r>
+                        <a:rPr lang="en-US" sz="1800" baseline="0" dirty="0" smtClean="0"/>
+                        <a:t> -map</a:t>
+                      </a:r>
+                      <a:endParaRPr lang="de-DE" sz="1800" dirty="0"/>
+                    </a:p>
+                  </a:txBody>
+                  <a:tcPr/>
+                </a:tc>
+                <a:extLst>
+                  <a:ext uri="{0D108BD9-81ED-4DB2-BD59-A6C34878D82A}">
+                    <a16:rowId xmlns:a16="http://schemas.microsoft.com/office/drawing/2014/main" xmlns="" val="10003"/>
+                  </a:ext>
+                </a:extLst>
+              </a:tr>
+            </a:tbl>
+          </a:graphicData>
+        </a:graphic>
+      </p:graphicFrame>
+    </p:spTree>
+    <p:extLst>
+      <p:ext uri="{BB962C8B-B14F-4D97-AF65-F5344CB8AC3E}">
+        <p14:creationId xmlns:p14="http://schemas.microsoft.com/office/powerpoint/2010/main" xmlns="" val="401768939"/>
+      </p:ext>
+    </p:extLst>
+  </p:cSld>
+  <p:clrMapOvr>
+    <a:masterClrMapping/>
+  </p:clrMapOvr>
+</p:sld>
+</file>
+
+<file path=ppt/slides/slide14.xml><?xml version="1.0" encoding="utf-8"?>
+<p:sld xmlns:a="http://schemas.openxmlformats.org/drawingml/2006/main" xmlns:r="http://schemas.openxmlformats.org/officeDocument/2006/relationships" xmlns:p="http://schemas.openxmlformats.org/presentationml/2006/main">
+  <p:cSld>
+    <p:spTree>
+      <p:nvGrpSpPr>
+        <p:cNvPr id="1" name=""/>
+        <p:cNvGrpSpPr/>
+        <p:nvPr/>
+      </p:nvGrpSpPr>
+      <p:grpSpPr>
+        <a:xfrm>
+          <a:off x="0" y="0"/>
+          <a:ext cx="0" cy="0"/>
+          <a:chOff x="0" y="0"/>
+          <a:chExt cx="0" cy="0"/>
+        </a:xfrm>
+      </p:grpSpPr>
+      <p:sp>
+        <p:nvSpPr>
+          <p:cNvPr id="2" name="Titel 1"/>
+          <p:cNvSpPr>
+            <a:spLocks noGrp="1"/>
+          </p:cNvSpPr>
+          <p:nvPr>
+            <p:ph type="title"/>
+          </p:nvPr>
+        </p:nvSpPr>
+        <p:spPr/>
+        <p:txBody>
+          <a:bodyPr>
+            <a:normAutofit/>
+          </a:bodyPr>
+          <a:lstStyle/>
+          <a:p>
+            <a:pPr algn="ctr"/>
+            <a:r>
+              <a:rPr lang="de-DE" dirty="0" err="1">
+                <a:solidFill>
+                  <a:srgbClr val="FF0000"/>
+                </a:solidFill>
+              </a:rPr>
+              <a:t>Milestone</a:t>
+            </a:r>
+            <a:r>
+              <a:rPr lang="de-DE" dirty="0">
+                <a:solidFill>
+                  <a:srgbClr val="FF0000"/>
+                </a:solidFill>
+              </a:rPr>
+              <a:t> 2</a:t>
+            </a:r>
+          </a:p>
+        </p:txBody>
+      </p:sp>
+      <p:sp>
+        <p:nvSpPr>
+          <p:cNvPr id="9" name="Inhaltsplatzhalter 8"/>
+          <p:cNvSpPr>
+            <a:spLocks noGrp="1"/>
+          </p:cNvSpPr>
+          <p:nvPr>
+            <p:ph idx="1"/>
+          </p:nvPr>
+        </p:nvSpPr>
+        <p:spPr/>
+        <p:txBody>
+          <a:bodyPr>
+            <a:normAutofit/>
+          </a:bodyPr>
+          <a:lstStyle/>
+          <a:p>
+            <a:endParaRPr lang="de-DE" dirty="0"/>
+          </a:p>
+          <a:p>
+            <a:pPr>
+              <a:buNone/>
+            </a:pPr>
+            <a:endParaRPr lang="de-DE" dirty="0"/>
+          </a:p>
+          <a:p>
+            <a:endParaRPr lang="de-DE" dirty="0"/>
+          </a:p>
+        </p:txBody>
+      </p:sp>
+      <p:sp>
+        <p:nvSpPr>
+          <p:cNvPr id="11" name="Foliennummernplatzhalter 10"/>
+          <p:cNvSpPr>
+            <a:spLocks noGrp="1"/>
+          </p:cNvSpPr>
+          <p:nvPr>
+            <p:ph type="sldNum" sz="quarter" idx="12"/>
+          </p:nvPr>
+        </p:nvSpPr>
+        <p:spPr/>
+        <p:txBody>
+          <a:bodyPr/>
+          <a:lstStyle/>
+          <a:p>
+            <a:fld id="{6C6AE60A-B69C-4790-82F7-3882EDF23186}" type="slidenum">
+              <a:rPr lang="de-DE" smtClean="0"/>
+              <a:pPr/>
+              <a:t>14</a:t>
             </a:fld>
             <a:endParaRPr lang="de-DE"/>
           </a:p>
@@ -6235,14 +6628,14 @@
                 <a:gridCol w="1584176">
                   <a:extLst>
                     <a:ext uri="{9D8B030D-6E8A-4147-A177-3AD203B41FA5}">
-                      <a16:colId xmlns:a16="http://schemas.microsoft.com/office/drawing/2014/main" val="20000"/>
+                      <a16:colId xmlns:a16="http://schemas.microsoft.com/office/drawing/2014/main" xmlns="" val="20000"/>
                     </a:ext>
                   </a:extLst>
                 </a:gridCol>
                 <a:gridCol w="6480721">
                   <a:extLst>
                     <a:ext uri="{9D8B030D-6E8A-4147-A177-3AD203B41FA5}">
-                      <a16:colId xmlns:a16="http://schemas.microsoft.com/office/drawing/2014/main" val="20001"/>
+                      <a16:colId xmlns:a16="http://schemas.microsoft.com/office/drawing/2014/main" xmlns="" val="20001"/>
                     </a:ext>
                   </a:extLst>
                 </a:gridCol>
@@ -6284,7 +6677,7 @@
                 </a:tc>
                 <a:extLst>
                   <a:ext uri="{0D108BD9-81ED-4DB2-BD59-A6C34878D82A}">
-                    <a16:rowId xmlns:a16="http://schemas.microsoft.com/office/drawing/2014/main" val="10000"/>
+                    <a16:rowId xmlns:a16="http://schemas.microsoft.com/office/drawing/2014/main" xmlns="" val="10000"/>
                   </a:ext>
                 </a:extLst>
               </a:tr>
@@ -6456,7 +6849,7 @@
                 </a:tc>
                 <a:extLst>
                   <a:ext uri="{0D108BD9-81ED-4DB2-BD59-A6C34878D82A}">
-                    <a16:rowId xmlns:a16="http://schemas.microsoft.com/office/drawing/2014/main" val="10001"/>
+                    <a16:rowId xmlns:a16="http://schemas.microsoft.com/office/drawing/2014/main" xmlns="" val="10001"/>
                   </a:ext>
                 </a:extLst>
               </a:tr>
@@ -6577,7 +6970,7 @@
                 </a:tc>
                 <a:extLst>
                   <a:ext uri="{0D108BD9-81ED-4DB2-BD59-A6C34878D82A}">
-                    <a16:rowId xmlns:a16="http://schemas.microsoft.com/office/drawing/2014/main" val="10002"/>
+                    <a16:rowId xmlns:a16="http://schemas.microsoft.com/office/drawing/2014/main" xmlns="" val="10002"/>
                   </a:ext>
                 </a:extLst>
               </a:tr>
@@ -6666,7 +7059,7 @@
                 </a:tc>
                 <a:extLst>
                   <a:ext uri="{0D108BD9-81ED-4DB2-BD59-A6C34878D82A}">
-                    <a16:rowId xmlns:a16="http://schemas.microsoft.com/office/drawing/2014/main" val="10003"/>
+                    <a16:rowId xmlns:a16="http://schemas.microsoft.com/office/drawing/2014/main" xmlns="" val="10003"/>
                   </a:ext>
                 </a:extLst>
               </a:tr>
@@ -6682,7 +7075,7 @@
 </p:sld>
 </file>
 
-<file path=ppt/slides/slide14.xml><?xml version="1.0" encoding="utf-8"?>
+<file path=ppt/slides/slide15.xml><?xml version="1.0" encoding="utf-8"?>
 <p:sld xmlns:a="http://schemas.openxmlformats.org/drawingml/2006/main" xmlns:r="http://schemas.openxmlformats.org/officeDocument/2006/relationships" xmlns:p="http://schemas.openxmlformats.org/presentationml/2006/main">
   <p:cSld>
     <p:spTree>
@@ -6784,7 +7177,7 @@
             <a:fld id="{6C6AE60A-B69C-4790-82F7-3882EDF23186}" type="slidenum">
               <a:rPr lang="de-DE" smtClean="0"/>
               <a:pPr/>
-              <a:t>14</a:t>
+              <a:t>15</a:t>
             </a:fld>
             <a:endParaRPr lang="de-DE"/>
           </a:p>
@@ -6799,7 +7192,7 @@
           <p:nvPr>
             <p:extLst>
               <p:ext uri="{D42A27DB-BD31-4B8C-83A1-F6EECF244321}">
-                <p14:modId xmlns:p14="http://schemas.microsoft.com/office/powerpoint/2010/main" val="3528518649"/>
+                <p14:modId xmlns:p14="http://schemas.microsoft.com/office/powerpoint/2010/main" xmlns="" val="3528518649"/>
               </p:ext>
             </p:extLst>
           </p:nvPr>
@@ -6818,14 +7211,14 @@
                 <a:gridCol w="1584176">
                   <a:extLst>
                     <a:ext uri="{9D8B030D-6E8A-4147-A177-3AD203B41FA5}">
-                      <a16:colId xmlns:a16="http://schemas.microsoft.com/office/drawing/2014/main" val="20000"/>
+                      <a16:colId xmlns:a16="http://schemas.microsoft.com/office/drawing/2014/main" xmlns="" val="20000"/>
                     </a:ext>
                   </a:extLst>
                 </a:gridCol>
                 <a:gridCol w="6480721">
                   <a:extLst>
                     <a:ext uri="{9D8B030D-6E8A-4147-A177-3AD203B41FA5}">
-                      <a16:colId xmlns:a16="http://schemas.microsoft.com/office/drawing/2014/main" val="20001"/>
+                      <a16:colId xmlns:a16="http://schemas.microsoft.com/office/drawing/2014/main" xmlns="" val="20001"/>
                     </a:ext>
                   </a:extLst>
                 </a:gridCol>
@@ -6862,7 +7255,7 @@
                 </a:tc>
                 <a:extLst>
                   <a:ext uri="{0D108BD9-81ED-4DB2-BD59-A6C34878D82A}">
-                    <a16:rowId xmlns:a16="http://schemas.microsoft.com/office/drawing/2014/main" val="10000"/>
+                    <a16:rowId xmlns:a16="http://schemas.microsoft.com/office/drawing/2014/main" xmlns="" val="10000"/>
                   </a:ext>
                 </a:extLst>
               </a:tr>
@@ -6942,7 +7335,7 @@
                 </a:tc>
                 <a:extLst>
                   <a:ext uri="{0D108BD9-81ED-4DB2-BD59-A6C34878D82A}">
-                    <a16:rowId xmlns:a16="http://schemas.microsoft.com/office/drawing/2014/main" val="10001"/>
+                    <a16:rowId xmlns:a16="http://schemas.microsoft.com/office/drawing/2014/main" xmlns="" val="10001"/>
                   </a:ext>
                 </a:extLst>
               </a:tr>
@@ -7057,7 +7450,7 @@
                 </a:tc>
                 <a:extLst>
                   <a:ext uri="{0D108BD9-81ED-4DB2-BD59-A6C34878D82A}">
-                    <a16:rowId xmlns:a16="http://schemas.microsoft.com/office/drawing/2014/main" val="10002"/>
+                    <a16:rowId xmlns:a16="http://schemas.microsoft.com/office/drawing/2014/main" xmlns="" val="10002"/>
                   </a:ext>
                 </a:extLst>
               </a:tr>
@@ -7121,7 +7514,7 @@
                 </a:tc>
                 <a:extLst>
                   <a:ext uri="{0D108BD9-81ED-4DB2-BD59-A6C34878D82A}">
-                    <a16:rowId xmlns:a16="http://schemas.microsoft.com/office/drawing/2014/main" val="10003"/>
+                    <a16:rowId xmlns:a16="http://schemas.microsoft.com/office/drawing/2014/main" xmlns="" val="10003"/>
                   </a:ext>
                 </a:extLst>
               </a:tr>
@@ -7132,193 +7525,9 @@
     </p:spTree>
     <p:extLst>
       <p:ext uri="{BB962C8B-B14F-4D97-AF65-F5344CB8AC3E}">
-        <p14:creationId xmlns:p14="http://schemas.microsoft.com/office/powerpoint/2010/main" val="4058254611"/>
+        <p14:creationId xmlns:p14="http://schemas.microsoft.com/office/powerpoint/2010/main" xmlns="" val="4058254611"/>
       </p:ext>
     </p:extLst>
-  </p:cSld>
-  <p:clrMapOvr>
-    <a:masterClrMapping/>
-  </p:clrMapOvr>
-</p:sld>
-</file>
-
-<file path=ppt/slides/slide15.xml><?xml version="1.0" encoding="utf-8"?>
-<p:sld xmlns:a="http://schemas.openxmlformats.org/drawingml/2006/main" xmlns:r="http://schemas.openxmlformats.org/officeDocument/2006/relationships" xmlns:p="http://schemas.openxmlformats.org/presentationml/2006/main">
-  <p:cSld>
-    <p:spTree>
-      <p:nvGrpSpPr>
-        <p:cNvPr id="1" name=""/>
-        <p:cNvGrpSpPr/>
-        <p:nvPr/>
-      </p:nvGrpSpPr>
-      <p:grpSpPr>
-        <a:xfrm>
-          <a:off x="0" y="0"/>
-          <a:ext cx="0" cy="0"/>
-          <a:chOff x="0" y="0"/>
-          <a:chExt cx="0" cy="0"/>
-        </a:xfrm>
-      </p:grpSpPr>
-      <p:sp>
-        <p:nvSpPr>
-          <p:cNvPr id="2" name="Titel 1"/>
-          <p:cNvSpPr>
-            <a:spLocks noGrp="1"/>
-          </p:cNvSpPr>
-          <p:nvPr>
-            <p:ph type="title"/>
-          </p:nvPr>
-        </p:nvSpPr>
-        <p:spPr/>
-        <p:txBody>
-          <a:bodyPr/>
-          <a:lstStyle/>
-          <a:p>
-            <a:pPr algn="ctr"/>
-            <a:r>
-              <a:rPr lang="de-DE" dirty="0" err="1">
-                <a:solidFill>
-                  <a:srgbClr val="FF0000"/>
-                </a:solidFill>
-              </a:rPr>
-              <a:t>Exams</a:t>
-            </a:r>
-            <a:endParaRPr lang="de-DE" dirty="0"/>
-          </a:p>
-        </p:txBody>
-      </p:sp>
-      <p:sp>
-        <p:nvSpPr>
-          <p:cNvPr id="3" name="Inhaltsplatzhalter 2"/>
-          <p:cNvSpPr>
-            <a:spLocks noGrp="1"/>
-          </p:cNvSpPr>
-          <p:nvPr>
-            <p:ph idx="1"/>
-          </p:nvPr>
-        </p:nvSpPr>
-        <p:spPr/>
-        <p:txBody>
-          <a:bodyPr>
-            <a:normAutofit/>
-          </a:bodyPr>
-          <a:lstStyle/>
-          <a:p>
-            <a:r>
-              <a:rPr lang="de-DE" sz="2400" dirty="0"/>
-              <a:t>16.07.2016 - 30.07.2016 </a:t>
-            </a:r>
-            <a:r>
-              <a:rPr lang="de-DE" sz="2400" dirty="0" err="1"/>
-              <a:t>and</a:t>
-            </a:r>
-            <a:r>
-              <a:rPr lang="de-DE" sz="2400" dirty="0"/>
-              <a:t> 12.09.2016 - 24.09.2016</a:t>
-            </a:r>
-          </a:p>
-          <a:p>
-            <a:pPr lvl="1"/>
-            <a:r>
-              <a:rPr lang="de-DE" dirty="0" err="1"/>
-              <a:t>Exam</a:t>
-            </a:r>
-            <a:r>
-              <a:rPr lang="de-DE" dirty="0"/>
-              <a:t> </a:t>
-            </a:r>
-            <a:r>
-              <a:rPr lang="de-DE" dirty="0" err="1"/>
-              <a:t>and</a:t>
-            </a:r>
-            <a:r>
-              <a:rPr lang="de-DE" dirty="0"/>
-              <a:t> </a:t>
-            </a:r>
-            <a:r>
-              <a:rPr lang="de-DE" dirty="0" err="1"/>
-              <a:t>preperation</a:t>
-            </a:r>
-            <a:r>
-              <a:rPr lang="de-DE" dirty="0"/>
-              <a:t> 23.06 - 30.07 </a:t>
-            </a:r>
-          </a:p>
-          <a:p>
-            <a:pPr lvl="1"/>
-            <a:r>
-              <a:rPr lang="de-DE" dirty="0"/>
-              <a:t>Sec. </a:t>
-            </a:r>
-            <a:r>
-              <a:rPr lang="de-DE" dirty="0" err="1"/>
-              <a:t>exam</a:t>
-            </a:r>
-            <a:r>
-              <a:rPr lang="de-DE" dirty="0"/>
-              <a:t> </a:t>
-            </a:r>
-            <a:r>
-              <a:rPr lang="de-DE" dirty="0" err="1"/>
-              <a:t>phase</a:t>
-            </a:r>
-            <a:r>
-              <a:rPr lang="de-DE" dirty="0"/>
-              <a:t> -&gt; individual </a:t>
-            </a:r>
-            <a:r>
-              <a:rPr lang="de-DE" dirty="0" err="1"/>
-              <a:t>schedule</a:t>
-            </a:r>
-            <a:endParaRPr lang="de-DE" dirty="0"/>
-          </a:p>
-          <a:p>
-            <a:endParaRPr lang="de-DE" dirty="0"/>
-          </a:p>
-          <a:p>
-            <a:pPr lvl="1"/>
-            <a:endParaRPr lang="de-DE" dirty="0"/>
-          </a:p>
-          <a:p>
-            <a:pPr lvl="1"/>
-            <a:endParaRPr lang="de-DE" sz="2200" dirty="0"/>
-          </a:p>
-          <a:p>
-            <a:endParaRPr lang="de-DE" sz="2400" dirty="0"/>
-          </a:p>
-          <a:p>
-            <a:endParaRPr lang="de-DE" sz="2400" dirty="0"/>
-          </a:p>
-          <a:p>
-            <a:endParaRPr lang="de-DE" dirty="0"/>
-          </a:p>
-        </p:txBody>
-      </p:sp>
-      <p:sp>
-        <p:nvSpPr>
-          <p:cNvPr id="4" name="Foliennummernplatzhalter 3"/>
-          <p:cNvSpPr>
-            <a:spLocks noGrp="1"/>
-          </p:cNvSpPr>
-          <p:nvPr>
-            <p:ph type="sldNum" sz="quarter" idx="12"/>
-          </p:nvPr>
-        </p:nvSpPr>
-        <p:spPr/>
-        <p:txBody>
-          <a:bodyPr/>
-          <a:lstStyle/>
-          <a:p>
-            <a:fld id="{6C6AE60A-B69C-4790-82F7-3882EDF23186}" type="slidenum">
-              <a:rPr lang="de-DE" smtClean="0"/>
-              <a:pPr/>
-              <a:t>15</a:t>
-            </a:fld>
-            <a:endParaRPr lang="de-DE"/>
-          </a:p>
-        </p:txBody>
-      </p:sp>
-    </p:spTree>
   </p:cSld>
   <p:clrMapOvr>
     <a:masterClrMapping/>
@@ -7375,7 +7584,7 @@
                   <a:srgbClr val="FF0000"/>
                 </a:solidFill>
               </a:rPr>
-              <a:t> 3</a:t>
+              <a:t> 2</a:t>
             </a:r>
           </a:p>
         </p:txBody>
@@ -7429,6 +7638,689 @@
               <a:rPr lang="de-DE" smtClean="0"/>
               <a:pPr/>
               <a:t>16</a:t>
+            </a:fld>
+            <a:endParaRPr lang="de-DE"/>
+          </a:p>
+        </p:txBody>
+      </p:sp>
+      <p:graphicFrame>
+        <p:nvGraphicFramePr>
+          <p:cNvPr id="8" name="Tabelle 7"/>
+          <p:cNvGraphicFramePr>
+            <a:graphicFrameLocks noGrp="1"/>
+          </p:cNvGraphicFramePr>
+          <p:nvPr>
+            <p:extLst>
+              <p:ext uri="{D42A27DB-BD31-4B8C-83A1-F6EECF244321}">
+                <p14:modId xmlns:p14="http://schemas.microsoft.com/office/powerpoint/2010/main" xmlns="" val="3528518649"/>
+              </p:ext>
+            </p:extLst>
+          </p:nvPr>
+        </p:nvGraphicFramePr>
+        <p:xfrm>
+          <a:off x="539552" y="1849388"/>
+          <a:ext cx="8064897" cy="2026920"/>
+        </p:xfrm>
+        <a:graphic>
+          <a:graphicData uri="http://schemas.openxmlformats.org/drawingml/2006/table">
+            <a:tbl>
+              <a:tblPr firstRow="1" bandRow="1">
+                <a:tableStyleId>{5C22544A-7EE6-4342-B048-85BDC9FD1C3A}</a:tableStyleId>
+              </a:tblPr>
+              <a:tblGrid>
+                <a:gridCol w="1584176">
+                  <a:extLst>
+                    <a:ext uri="{9D8B030D-6E8A-4147-A177-3AD203B41FA5}">
+                      <a16:colId xmlns:a16="http://schemas.microsoft.com/office/drawing/2014/main" xmlns="" val="20000"/>
+                    </a:ext>
+                  </a:extLst>
+                </a:gridCol>
+                <a:gridCol w="6480721">
+                  <a:extLst>
+                    <a:ext uri="{9D8B030D-6E8A-4147-A177-3AD203B41FA5}">
+                      <a16:colId xmlns:a16="http://schemas.microsoft.com/office/drawing/2014/main" xmlns="" val="20001"/>
+                    </a:ext>
+                  </a:extLst>
+                </a:gridCol>
+              </a:tblGrid>
+              <a:tr h="370840">
+                <a:tc>
+                  <a:txBody>
+                    <a:bodyPr/>
+                    <a:lstStyle/>
+                    <a:p>
+                      <a:pPr algn="ctr"/>
+                      <a:r>
+                        <a:rPr lang="de-DE" sz="1800" dirty="0" err="1"/>
+                        <a:t>Week</a:t>
+                      </a:r>
+                      <a:endParaRPr lang="de-DE" sz="1800" dirty="0"/>
+                    </a:p>
+                  </a:txBody>
+                  <a:tcPr/>
+                </a:tc>
+                <a:tc>
+                  <a:txBody>
+                    <a:bodyPr/>
+                    <a:lstStyle/>
+                    <a:p>
+                      <a:pPr algn="ctr"/>
+                      <a:r>
+                        <a:rPr lang="de-DE" sz="1800" dirty="0" smtClean="0"/>
+                        <a:t>Manuel Schmitt</a:t>
+                      </a:r>
+                      <a:endParaRPr lang="de-DE" sz="1800" dirty="0"/>
+                    </a:p>
+                  </a:txBody>
+                  <a:tcPr/>
+                </a:tc>
+                <a:extLst>
+                  <a:ext uri="{0D108BD9-81ED-4DB2-BD59-A6C34878D82A}">
+                    <a16:rowId xmlns:a16="http://schemas.microsoft.com/office/drawing/2014/main" xmlns="" val="10000"/>
+                  </a:ext>
+                </a:extLst>
+              </a:tr>
+              <a:tr h="370840">
+                <a:tc>
+                  <a:txBody>
+                    <a:bodyPr/>
+                    <a:lstStyle/>
+                    <a:p>
+                      <a:pPr marL="0" marR="0" indent="0" algn="l" defTabSz="914400" rtl="0" eaLnBrk="1" fontAlgn="auto" latinLnBrk="0" hangingPunct="1">
+                        <a:lnSpc>
+                          <a:spcPct val="100000"/>
+                        </a:lnSpc>
+                        <a:spcBef>
+                          <a:spcPts val="0"/>
+                        </a:spcBef>
+                        <a:spcAft>
+                          <a:spcPts val="0"/>
+                        </a:spcAft>
+                        <a:buClrTx/>
+                        <a:buSzTx/>
+                        <a:buFontTx/>
+                        <a:buNone/>
+                        <a:tabLst/>
+                        <a:defRPr/>
+                      </a:pPr>
+                      <a:r>
+                        <a:rPr lang="de-DE" sz="1800" dirty="0"/>
+                        <a:t>06.02 – 06.09</a:t>
+                      </a:r>
+                    </a:p>
+                  </a:txBody>
+                  <a:tcPr/>
+                </a:tc>
+                <a:tc>
+                  <a:txBody>
+                    <a:bodyPr/>
+                    <a:lstStyle/>
+                    <a:p>
+                      <a:pPr lvl="0">
+                        <a:buFont typeface="Arial" pitchFamily="34" charset="0"/>
+                        <a:buChar char="•"/>
+                      </a:pPr>
+                      <a:r>
+                        <a:rPr lang="de-DE" sz="1800" baseline="0" dirty="0"/>
+                        <a:t> </a:t>
+                      </a:r>
+                      <a:r>
+                        <a:rPr lang="de-DE" sz="1800" baseline="0" dirty="0" err="1" smtClean="0"/>
+                        <a:t>Buffer</a:t>
+                      </a:r>
+                      <a:r>
+                        <a:rPr lang="de-DE" sz="1800" baseline="0" dirty="0" smtClean="0"/>
+                        <a:t> </a:t>
+                      </a:r>
+                      <a:r>
+                        <a:rPr lang="de-DE" sz="1800" baseline="0" dirty="0" err="1" smtClean="0"/>
+                        <a:t>for</a:t>
+                      </a:r>
+                      <a:r>
+                        <a:rPr lang="de-DE" sz="1800" baseline="0" dirty="0" smtClean="0"/>
+                        <a:t> </a:t>
+                      </a:r>
+                      <a:r>
+                        <a:rPr lang="de-DE" sz="1800" baseline="0" dirty="0" err="1" smtClean="0"/>
+                        <a:t>ambient-occlusion</a:t>
+                      </a:r>
+                      <a:endParaRPr lang="de-DE" sz="1800" baseline="0" dirty="0"/>
+                    </a:p>
+                    <a:p>
+                      <a:pPr lvl="0">
+                        <a:buFont typeface="Arial" pitchFamily="34" charset="0"/>
+                        <a:buChar char="•"/>
+                      </a:pPr>
+                      <a:r>
+                        <a:rPr lang="de-DE" sz="1800" baseline="0" dirty="0" smtClean="0"/>
+                        <a:t> Alternative:  </a:t>
+                      </a:r>
+                      <a:r>
+                        <a:rPr lang="de-DE" sz="1800" baseline="0" dirty="0" err="1" smtClean="0"/>
+                        <a:t>Implementation</a:t>
+                      </a:r>
+                      <a:r>
+                        <a:rPr lang="de-DE" sz="1800" baseline="0" dirty="0" smtClean="0"/>
+                        <a:t> </a:t>
+                      </a:r>
+                      <a:r>
+                        <a:rPr lang="de-DE" sz="1800" baseline="0" dirty="0" err="1" smtClean="0"/>
+                        <a:t>of</a:t>
+                      </a:r>
+                      <a:r>
+                        <a:rPr lang="de-DE" sz="1800" baseline="0" dirty="0" smtClean="0"/>
+                        <a:t> </a:t>
+                      </a:r>
+                      <a:r>
+                        <a:rPr lang="de-DE" sz="1800" baseline="0" dirty="0" err="1" smtClean="0"/>
+                        <a:t>light</a:t>
+                      </a:r>
+                      <a:r>
+                        <a:rPr lang="de-DE" sz="1800" baseline="0" dirty="0" smtClean="0"/>
+                        <a:t> </a:t>
+                      </a:r>
+                      <a:r>
+                        <a:rPr lang="de-DE" sz="1800" baseline="0" dirty="0" err="1" smtClean="0"/>
+                        <a:t>effects</a:t>
+                      </a:r>
+                      <a:r>
+                        <a:rPr lang="de-DE" sz="1800" baseline="0" dirty="0" smtClean="0"/>
+                        <a:t> </a:t>
+                      </a:r>
+                      <a:r>
+                        <a:rPr lang="de-DE" sz="1800" baseline="0" dirty="0" err="1" smtClean="0"/>
+                        <a:t>like</a:t>
+                      </a:r>
+                      <a:r>
+                        <a:rPr lang="de-DE" sz="1800" baseline="0" dirty="0" smtClean="0"/>
+                        <a:t> </a:t>
+                      </a:r>
+                      <a:r>
+                        <a:rPr lang="de-DE" sz="1800" baseline="0" dirty="0" err="1" smtClean="0"/>
+                        <a:t>god-rays</a:t>
+                      </a:r>
+                      <a:r>
+                        <a:rPr lang="de-DE" sz="1800" baseline="0" dirty="0" smtClean="0"/>
+                        <a:t> </a:t>
+                      </a:r>
+                      <a:r>
+                        <a:rPr lang="de-DE" sz="1800" baseline="0" dirty="0" err="1" smtClean="0"/>
+                        <a:t>or</a:t>
+                      </a:r>
+                      <a:r>
+                        <a:rPr lang="de-DE" sz="1800" baseline="0" dirty="0" smtClean="0"/>
+                        <a:t>   </a:t>
+                      </a:r>
+                      <a:r>
+                        <a:rPr lang="de-DE" sz="1800" baseline="0" dirty="0" err="1" smtClean="0"/>
+                        <a:t>atmospheric</a:t>
+                      </a:r>
+                      <a:r>
+                        <a:rPr lang="de-DE" sz="1800" baseline="0" dirty="0" smtClean="0"/>
+                        <a:t> </a:t>
+                      </a:r>
+                      <a:r>
+                        <a:rPr lang="de-DE" sz="1800" baseline="0" dirty="0" err="1" smtClean="0"/>
+                        <a:t>scattering</a:t>
+                      </a:r>
+                      <a:endParaRPr lang="de-DE" sz="1800" baseline="0" dirty="0" smtClean="0"/>
+                    </a:p>
+                  </a:txBody>
+                  <a:tcPr/>
+                </a:tc>
+                <a:extLst>
+                  <a:ext uri="{0D108BD9-81ED-4DB2-BD59-A6C34878D82A}">
+                    <a16:rowId xmlns:a16="http://schemas.microsoft.com/office/drawing/2014/main" xmlns="" val="10001"/>
+                  </a:ext>
+                </a:extLst>
+              </a:tr>
+              <a:tr h="370840">
+                <a:tc>
+                  <a:txBody>
+                    <a:bodyPr/>
+                    <a:lstStyle/>
+                    <a:p>
+                      <a:pPr marL="0" marR="0" indent="0" algn="l" defTabSz="914400" rtl="0" eaLnBrk="1" fontAlgn="auto" latinLnBrk="0" hangingPunct="1">
+                        <a:lnSpc>
+                          <a:spcPct val="100000"/>
+                        </a:lnSpc>
+                        <a:spcBef>
+                          <a:spcPts val="0"/>
+                        </a:spcBef>
+                        <a:spcAft>
+                          <a:spcPts val="0"/>
+                        </a:spcAft>
+                        <a:buClrTx/>
+                        <a:buSzTx/>
+                        <a:buFontTx/>
+                        <a:buNone/>
+                        <a:tabLst/>
+                        <a:defRPr/>
+                      </a:pPr>
+                      <a:r>
+                        <a:rPr lang="de-DE" sz="1800" dirty="0"/>
+                        <a:t>06.09 – 06.16</a:t>
+                      </a:r>
+                    </a:p>
+                  </a:txBody>
+                  <a:tcPr/>
+                </a:tc>
+                <a:tc>
+                  <a:txBody>
+                    <a:bodyPr/>
+                    <a:lstStyle/>
+                    <a:p>
+                      <a:pPr lvl="0">
+                        <a:buFont typeface="Arial" pitchFamily="34" charset="0"/>
+                        <a:buChar char="•"/>
+                      </a:pPr>
+                      <a:r>
+                        <a:rPr lang="de-DE" sz="1800" baseline="0" dirty="0"/>
+                        <a:t> </a:t>
+                      </a:r>
+                      <a:r>
+                        <a:rPr lang="de-DE" sz="1800" baseline="0" dirty="0" err="1" smtClean="0"/>
+                        <a:t>Implementation</a:t>
+                      </a:r>
+                      <a:r>
+                        <a:rPr lang="de-DE" sz="1800" baseline="0" dirty="0" smtClean="0"/>
+                        <a:t> </a:t>
+                      </a:r>
+                      <a:r>
+                        <a:rPr lang="de-DE" sz="1800" baseline="0" dirty="0" err="1" smtClean="0"/>
+                        <a:t>of</a:t>
+                      </a:r>
+                      <a:r>
+                        <a:rPr lang="de-DE" sz="1800" baseline="0" dirty="0" smtClean="0"/>
+                        <a:t> </a:t>
+                      </a:r>
+                      <a:r>
+                        <a:rPr lang="de-DE" sz="1800" baseline="0" dirty="0" err="1" smtClean="0"/>
+                        <a:t>client-menu-structure</a:t>
+                      </a:r>
+                      <a:endParaRPr lang="de-DE" sz="1800" baseline="0" dirty="0" smtClean="0"/>
+                    </a:p>
+                  </a:txBody>
+                  <a:tcPr/>
+                </a:tc>
+                <a:extLst>
+                  <a:ext uri="{0D108BD9-81ED-4DB2-BD59-A6C34878D82A}">
+                    <a16:rowId xmlns:a16="http://schemas.microsoft.com/office/drawing/2014/main" xmlns="" val="10002"/>
+                  </a:ext>
+                </a:extLst>
+              </a:tr>
+              <a:tr h="370840">
+                <a:tc>
+                  <a:txBody>
+                    <a:bodyPr/>
+                    <a:lstStyle/>
+                    <a:p>
+                      <a:pPr marL="0" marR="0" indent="0" algn="l" defTabSz="914400" rtl="0" eaLnBrk="1" fontAlgn="auto" latinLnBrk="0" hangingPunct="1">
+                        <a:lnSpc>
+                          <a:spcPct val="100000"/>
+                        </a:lnSpc>
+                        <a:spcBef>
+                          <a:spcPts val="0"/>
+                        </a:spcBef>
+                        <a:spcAft>
+                          <a:spcPts val="0"/>
+                        </a:spcAft>
+                        <a:buClrTx/>
+                        <a:buSzTx/>
+                        <a:buFontTx/>
+                        <a:buNone/>
+                        <a:tabLst/>
+                        <a:defRPr/>
+                      </a:pPr>
+                      <a:r>
+                        <a:rPr lang="de-DE" sz="1800" dirty="0"/>
+                        <a:t>06.16</a:t>
+                      </a:r>
+                      <a:r>
+                        <a:rPr lang="de-DE" sz="1800" baseline="0" dirty="0"/>
+                        <a:t> – 06.23</a:t>
+                      </a:r>
+                      <a:endParaRPr lang="de-DE" sz="1800" dirty="0"/>
+                    </a:p>
+                  </a:txBody>
+                  <a:tcPr/>
+                </a:tc>
+                <a:tc>
+                  <a:txBody>
+                    <a:bodyPr/>
+                    <a:lstStyle/>
+                    <a:p>
+                      <a:pPr lvl="0">
+                        <a:buFont typeface="Arial" pitchFamily="34" charset="0"/>
+                        <a:buChar char="•"/>
+                      </a:pPr>
+                      <a:r>
+                        <a:rPr lang="de-DE" sz="1800" dirty="0"/>
+                        <a:t> </a:t>
+                      </a:r>
+                      <a:r>
+                        <a:rPr lang="en-US" sz="1800" dirty="0" smtClean="0"/>
+                        <a:t>Implementation</a:t>
+                      </a:r>
+                      <a:r>
+                        <a:rPr lang="en-US" sz="1800" baseline="0" dirty="0" smtClean="0"/>
+                        <a:t> of spectator-client-menu</a:t>
+                      </a:r>
+                      <a:endParaRPr lang="de-DE" sz="1800" dirty="0"/>
+                    </a:p>
+                  </a:txBody>
+                  <a:tcPr/>
+                </a:tc>
+                <a:extLst>
+                  <a:ext uri="{0D108BD9-81ED-4DB2-BD59-A6C34878D82A}">
+                    <a16:rowId xmlns:a16="http://schemas.microsoft.com/office/drawing/2014/main" xmlns="" val="10003"/>
+                  </a:ext>
+                </a:extLst>
+              </a:tr>
+            </a:tbl>
+          </a:graphicData>
+        </a:graphic>
+      </p:graphicFrame>
+    </p:spTree>
+    <p:extLst>
+      <p:ext uri="{BB962C8B-B14F-4D97-AF65-F5344CB8AC3E}">
+        <p14:creationId xmlns:p14="http://schemas.microsoft.com/office/powerpoint/2010/main" xmlns="" val="4058254611"/>
+      </p:ext>
+    </p:extLst>
+  </p:cSld>
+  <p:clrMapOvr>
+    <a:masterClrMapping/>
+  </p:clrMapOvr>
+</p:sld>
+</file>
+
+<file path=ppt/slides/slide17.xml><?xml version="1.0" encoding="utf-8"?>
+<p:sld xmlns:a="http://schemas.openxmlformats.org/drawingml/2006/main" xmlns:r="http://schemas.openxmlformats.org/officeDocument/2006/relationships" xmlns:p="http://schemas.openxmlformats.org/presentationml/2006/main">
+  <p:cSld>
+    <p:spTree>
+      <p:nvGrpSpPr>
+        <p:cNvPr id="1" name=""/>
+        <p:cNvGrpSpPr/>
+        <p:nvPr/>
+      </p:nvGrpSpPr>
+      <p:grpSpPr>
+        <a:xfrm>
+          <a:off x="0" y="0"/>
+          <a:ext cx="0" cy="0"/>
+          <a:chOff x="0" y="0"/>
+          <a:chExt cx="0" cy="0"/>
+        </a:xfrm>
+      </p:grpSpPr>
+      <p:sp>
+        <p:nvSpPr>
+          <p:cNvPr id="2" name="Titel 1"/>
+          <p:cNvSpPr>
+            <a:spLocks noGrp="1"/>
+          </p:cNvSpPr>
+          <p:nvPr>
+            <p:ph type="title"/>
+          </p:nvPr>
+        </p:nvSpPr>
+        <p:spPr/>
+        <p:txBody>
+          <a:bodyPr/>
+          <a:lstStyle/>
+          <a:p>
+            <a:pPr algn="ctr"/>
+            <a:r>
+              <a:rPr lang="de-DE" dirty="0" err="1">
+                <a:solidFill>
+                  <a:srgbClr val="FF0000"/>
+                </a:solidFill>
+              </a:rPr>
+              <a:t>Exams</a:t>
+            </a:r>
+            <a:endParaRPr lang="de-DE" dirty="0"/>
+          </a:p>
+        </p:txBody>
+      </p:sp>
+      <p:sp>
+        <p:nvSpPr>
+          <p:cNvPr id="3" name="Inhaltsplatzhalter 2"/>
+          <p:cNvSpPr>
+            <a:spLocks noGrp="1"/>
+          </p:cNvSpPr>
+          <p:nvPr>
+            <p:ph idx="1"/>
+          </p:nvPr>
+        </p:nvSpPr>
+        <p:spPr/>
+        <p:txBody>
+          <a:bodyPr>
+            <a:normAutofit/>
+          </a:bodyPr>
+          <a:lstStyle/>
+          <a:p>
+            <a:r>
+              <a:rPr lang="de-DE" sz="2400" dirty="0"/>
+              <a:t>16.07.2016 - 30.07.2016 </a:t>
+            </a:r>
+            <a:r>
+              <a:rPr lang="de-DE" sz="2400" dirty="0" err="1"/>
+              <a:t>and</a:t>
+            </a:r>
+            <a:r>
+              <a:rPr lang="de-DE" sz="2400" dirty="0"/>
+              <a:t> 12.09.2016 - 24.09.2016</a:t>
+            </a:r>
+          </a:p>
+          <a:p>
+            <a:pPr lvl="1"/>
+            <a:r>
+              <a:rPr lang="de-DE" dirty="0" err="1"/>
+              <a:t>Exam</a:t>
+            </a:r>
+            <a:r>
+              <a:rPr lang="de-DE" dirty="0"/>
+              <a:t> </a:t>
+            </a:r>
+            <a:r>
+              <a:rPr lang="de-DE" dirty="0" err="1"/>
+              <a:t>and</a:t>
+            </a:r>
+            <a:r>
+              <a:rPr lang="de-DE" dirty="0"/>
+              <a:t> </a:t>
+            </a:r>
+            <a:r>
+              <a:rPr lang="de-DE" dirty="0" err="1"/>
+              <a:t>preperation</a:t>
+            </a:r>
+            <a:r>
+              <a:rPr lang="de-DE" dirty="0"/>
+              <a:t> 23.06 - 30.07 </a:t>
+            </a:r>
+          </a:p>
+          <a:p>
+            <a:pPr lvl="1"/>
+            <a:r>
+              <a:rPr lang="de-DE" dirty="0"/>
+              <a:t>Sec. </a:t>
+            </a:r>
+            <a:r>
+              <a:rPr lang="de-DE" dirty="0" err="1"/>
+              <a:t>exam</a:t>
+            </a:r>
+            <a:r>
+              <a:rPr lang="de-DE" dirty="0"/>
+              <a:t> </a:t>
+            </a:r>
+            <a:r>
+              <a:rPr lang="de-DE" dirty="0" err="1"/>
+              <a:t>phase</a:t>
+            </a:r>
+            <a:r>
+              <a:rPr lang="de-DE" dirty="0"/>
+              <a:t> -&gt; individual </a:t>
+            </a:r>
+            <a:r>
+              <a:rPr lang="de-DE" dirty="0" err="1"/>
+              <a:t>schedule</a:t>
+            </a:r>
+            <a:endParaRPr lang="de-DE" dirty="0"/>
+          </a:p>
+          <a:p>
+            <a:endParaRPr lang="de-DE" dirty="0"/>
+          </a:p>
+          <a:p>
+            <a:pPr lvl="1"/>
+            <a:endParaRPr lang="de-DE" dirty="0"/>
+          </a:p>
+          <a:p>
+            <a:pPr lvl="1"/>
+            <a:endParaRPr lang="de-DE" sz="2200" dirty="0"/>
+          </a:p>
+          <a:p>
+            <a:endParaRPr lang="de-DE" sz="2400" dirty="0"/>
+          </a:p>
+          <a:p>
+            <a:endParaRPr lang="de-DE" sz="2400" dirty="0"/>
+          </a:p>
+          <a:p>
+            <a:endParaRPr lang="de-DE" dirty="0"/>
+          </a:p>
+        </p:txBody>
+      </p:sp>
+      <p:sp>
+        <p:nvSpPr>
+          <p:cNvPr id="4" name="Foliennummernplatzhalter 3"/>
+          <p:cNvSpPr>
+            <a:spLocks noGrp="1"/>
+          </p:cNvSpPr>
+          <p:nvPr>
+            <p:ph type="sldNum" sz="quarter" idx="12"/>
+          </p:nvPr>
+        </p:nvSpPr>
+        <p:spPr/>
+        <p:txBody>
+          <a:bodyPr/>
+          <a:lstStyle/>
+          <a:p>
+            <a:fld id="{6C6AE60A-B69C-4790-82F7-3882EDF23186}" type="slidenum">
+              <a:rPr lang="de-DE" smtClean="0"/>
+              <a:pPr/>
+              <a:t>17</a:t>
+            </a:fld>
+            <a:endParaRPr lang="de-DE"/>
+          </a:p>
+        </p:txBody>
+      </p:sp>
+    </p:spTree>
+  </p:cSld>
+  <p:clrMapOvr>
+    <a:masterClrMapping/>
+  </p:clrMapOvr>
+</p:sld>
+</file>
+
+<file path=ppt/slides/slide18.xml><?xml version="1.0" encoding="utf-8"?>
+<p:sld xmlns:a="http://schemas.openxmlformats.org/drawingml/2006/main" xmlns:r="http://schemas.openxmlformats.org/officeDocument/2006/relationships" xmlns:p="http://schemas.openxmlformats.org/presentationml/2006/main">
+  <p:cSld>
+    <p:spTree>
+      <p:nvGrpSpPr>
+        <p:cNvPr id="1" name=""/>
+        <p:cNvGrpSpPr/>
+        <p:nvPr/>
+      </p:nvGrpSpPr>
+      <p:grpSpPr>
+        <a:xfrm>
+          <a:off x="0" y="0"/>
+          <a:ext cx="0" cy="0"/>
+          <a:chOff x="0" y="0"/>
+          <a:chExt cx="0" cy="0"/>
+        </a:xfrm>
+      </p:grpSpPr>
+      <p:sp>
+        <p:nvSpPr>
+          <p:cNvPr id="2" name="Titel 1"/>
+          <p:cNvSpPr>
+            <a:spLocks noGrp="1"/>
+          </p:cNvSpPr>
+          <p:nvPr>
+            <p:ph type="title"/>
+          </p:nvPr>
+        </p:nvSpPr>
+        <p:spPr/>
+        <p:txBody>
+          <a:bodyPr>
+            <a:normAutofit/>
+          </a:bodyPr>
+          <a:lstStyle/>
+          <a:p>
+            <a:pPr algn="ctr"/>
+            <a:r>
+              <a:rPr lang="de-DE" dirty="0" err="1">
+                <a:solidFill>
+                  <a:srgbClr val="FF0000"/>
+                </a:solidFill>
+              </a:rPr>
+              <a:t>Milestone</a:t>
+            </a:r>
+            <a:r>
+              <a:rPr lang="de-DE" dirty="0">
+                <a:solidFill>
+                  <a:srgbClr val="FF0000"/>
+                </a:solidFill>
+              </a:rPr>
+              <a:t> 3</a:t>
+            </a:r>
+          </a:p>
+        </p:txBody>
+      </p:sp>
+      <p:sp>
+        <p:nvSpPr>
+          <p:cNvPr id="9" name="Inhaltsplatzhalter 8"/>
+          <p:cNvSpPr>
+            <a:spLocks noGrp="1"/>
+          </p:cNvSpPr>
+          <p:nvPr>
+            <p:ph idx="1"/>
+          </p:nvPr>
+        </p:nvSpPr>
+        <p:spPr/>
+        <p:txBody>
+          <a:bodyPr>
+            <a:normAutofit/>
+          </a:bodyPr>
+          <a:lstStyle/>
+          <a:p>
+            <a:endParaRPr lang="de-DE" dirty="0"/>
+          </a:p>
+          <a:p>
+            <a:pPr>
+              <a:buNone/>
+            </a:pPr>
+            <a:endParaRPr lang="de-DE" dirty="0"/>
+          </a:p>
+          <a:p>
+            <a:endParaRPr lang="de-DE" dirty="0"/>
+          </a:p>
+        </p:txBody>
+      </p:sp>
+      <p:sp>
+        <p:nvSpPr>
+          <p:cNvPr id="11" name="Foliennummernplatzhalter 10"/>
+          <p:cNvSpPr>
+            <a:spLocks noGrp="1"/>
+          </p:cNvSpPr>
+          <p:nvPr>
+            <p:ph type="sldNum" sz="quarter" idx="12"/>
+          </p:nvPr>
+        </p:nvSpPr>
+        <p:spPr/>
+        <p:txBody>
+          <a:bodyPr/>
+          <a:lstStyle/>
+          <a:p>
+            <a:fld id="{6C6AE60A-B69C-4790-82F7-3882EDF23186}" type="slidenum">
+              <a:rPr lang="de-DE" smtClean="0"/>
+              <a:pPr/>
+              <a:t>18</a:t>
             </a:fld>
             <a:endParaRPr lang="de-DE"/>
           </a:p>
@@ -7456,14 +8348,14 @@
                 <a:gridCol w="1584176">
                   <a:extLst>
                     <a:ext uri="{9D8B030D-6E8A-4147-A177-3AD203B41FA5}">
-                      <a16:colId xmlns:a16="http://schemas.microsoft.com/office/drawing/2014/main" val="20000"/>
+                      <a16:colId xmlns:a16="http://schemas.microsoft.com/office/drawing/2014/main" xmlns="" val="20000"/>
                     </a:ext>
                   </a:extLst>
                 </a:gridCol>
                 <a:gridCol w="6480721">
                   <a:extLst>
                     <a:ext uri="{9D8B030D-6E8A-4147-A177-3AD203B41FA5}">
-                      <a16:colId xmlns:a16="http://schemas.microsoft.com/office/drawing/2014/main" val="20001"/>
+                      <a16:colId xmlns:a16="http://schemas.microsoft.com/office/drawing/2014/main" xmlns="" val="20001"/>
                     </a:ext>
                   </a:extLst>
                 </a:gridCol>
@@ -7505,7 +8397,7 @@
                 </a:tc>
                 <a:extLst>
                   <a:ext uri="{0D108BD9-81ED-4DB2-BD59-A6C34878D82A}">
-                    <a16:rowId xmlns:a16="http://schemas.microsoft.com/office/drawing/2014/main" val="10000"/>
+                    <a16:rowId xmlns:a16="http://schemas.microsoft.com/office/drawing/2014/main" xmlns="" val="10000"/>
                   </a:ext>
                 </a:extLst>
               </a:tr>
@@ -7563,7 +8455,7 @@
                 </a:tc>
                 <a:extLst>
                   <a:ext uri="{0D108BD9-81ED-4DB2-BD59-A6C34878D82A}">
-                    <a16:rowId xmlns:a16="http://schemas.microsoft.com/office/drawing/2014/main" val="10001"/>
+                    <a16:rowId xmlns:a16="http://schemas.microsoft.com/office/drawing/2014/main" xmlns="" val="10001"/>
                   </a:ext>
                 </a:extLst>
               </a:tr>
@@ -7710,7 +8602,7 @@
                 </a:tc>
                 <a:extLst>
                   <a:ext uri="{0D108BD9-81ED-4DB2-BD59-A6C34878D82A}">
-                    <a16:rowId xmlns:a16="http://schemas.microsoft.com/office/drawing/2014/main" val="10002"/>
+                    <a16:rowId xmlns:a16="http://schemas.microsoft.com/office/drawing/2014/main" xmlns="" val="10002"/>
                   </a:ext>
                 </a:extLst>
               </a:tr>
@@ -7761,7 +8653,7 @@
                 </a:tc>
                 <a:extLst>
                   <a:ext uri="{0D108BD9-81ED-4DB2-BD59-A6C34878D82A}">
-                    <a16:rowId xmlns:a16="http://schemas.microsoft.com/office/drawing/2014/main" val="10003"/>
+                    <a16:rowId xmlns:a16="http://schemas.microsoft.com/office/drawing/2014/main" xmlns="" val="10003"/>
                   </a:ext>
                 </a:extLst>
               </a:tr>
@@ -7856,7 +8748,7 @@
                 </a:tc>
                 <a:extLst>
                   <a:ext uri="{0D108BD9-81ED-4DB2-BD59-A6C34878D82A}">
-                    <a16:rowId xmlns:a16="http://schemas.microsoft.com/office/drawing/2014/main" val="10004"/>
+                    <a16:rowId xmlns:a16="http://schemas.microsoft.com/office/drawing/2014/main" xmlns="" val="10004"/>
                   </a:ext>
                 </a:extLst>
               </a:tr>
@@ -7872,7 +8764,7 @@
 </p:sld>
 </file>
 
-<file path=ppt/slides/slide17.xml><?xml version="1.0" encoding="utf-8"?>
+<file path=ppt/slides/slide19.xml><?xml version="1.0" encoding="utf-8"?>
 <p:sld xmlns:a="http://schemas.openxmlformats.org/drawingml/2006/main" xmlns:r="http://schemas.openxmlformats.org/officeDocument/2006/relationships" xmlns:p="http://schemas.openxmlformats.org/presentationml/2006/main">
   <p:cSld>
     <p:spTree>
@@ -7974,7 +8866,7 @@
             <a:fld id="{6C6AE60A-B69C-4790-82F7-3882EDF23186}" type="slidenum">
               <a:rPr lang="de-DE" smtClean="0"/>
               <a:pPr/>
-              <a:t>17</a:t>
+              <a:t>19</a:t>
             </a:fld>
             <a:endParaRPr lang="de-DE"/>
           </a:p>
@@ -7989,7 +8881,7 @@
           <p:nvPr>
             <p:extLst>
               <p:ext uri="{D42A27DB-BD31-4B8C-83A1-F6EECF244321}">
-                <p14:modId xmlns:p14="http://schemas.microsoft.com/office/powerpoint/2010/main" val="1031210796"/>
+                <p14:modId xmlns:p14="http://schemas.microsoft.com/office/powerpoint/2010/main" xmlns="" val="1031210796"/>
               </p:ext>
             </p:extLst>
           </p:nvPr>
@@ -8008,14 +8900,14 @@
                 <a:gridCol w="1584176">
                   <a:extLst>
                     <a:ext uri="{9D8B030D-6E8A-4147-A177-3AD203B41FA5}">
-                      <a16:colId xmlns:a16="http://schemas.microsoft.com/office/drawing/2014/main" val="20000"/>
+                      <a16:colId xmlns:a16="http://schemas.microsoft.com/office/drawing/2014/main" xmlns="" val="20000"/>
                     </a:ext>
                   </a:extLst>
                 </a:gridCol>
                 <a:gridCol w="6480721">
                   <a:extLst>
                     <a:ext uri="{9D8B030D-6E8A-4147-A177-3AD203B41FA5}">
-                      <a16:colId xmlns:a16="http://schemas.microsoft.com/office/drawing/2014/main" val="20001"/>
+                      <a16:colId xmlns:a16="http://schemas.microsoft.com/office/drawing/2014/main" xmlns="" val="20001"/>
                     </a:ext>
                   </a:extLst>
                 </a:gridCol>
@@ -8052,7 +8944,7 @@
                 </a:tc>
                 <a:extLst>
                   <a:ext uri="{0D108BD9-81ED-4DB2-BD59-A6C34878D82A}">
-                    <a16:rowId xmlns:a16="http://schemas.microsoft.com/office/drawing/2014/main" val="10000"/>
+                    <a16:rowId xmlns:a16="http://schemas.microsoft.com/office/drawing/2014/main" xmlns="" val="10000"/>
                   </a:ext>
                 </a:extLst>
               </a:tr>
@@ -8100,7 +8992,7 @@
                 </a:tc>
                 <a:extLst>
                   <a:ext uri="{0D108BD9-81ED-4DB2-BD59-A6C34878D82A}">
-                    <a16:rowId xmlns:a16="http://schemas.microsoft.com/office/drawing/2014/main" val="10001"/>
+                    <a16:rowId xmlns:a16="http://schemas.microsoft.com/office/drawing/2014/main" xmlns="" val="10001"/>
                   </a:ext>
                 </a:extLst>
               </a:tr>
@@ -8156,7 +9048,7 @@
                 </a:tc>
                 <a:extLst>
                   <a:ext uri="{0D108BD9-81ED-4DB2-BD59-A6C34878D82A}">
-                    <a16:rowId xmlns:a16="http://schemas.microsoft.com/office/drawing/2014/main" val="10002"/>
+                    <a16:rowId xmlns:a16="http://schemas.microsoft.com/office/drawing/2014/main" xmlns="" val="10002"/>
                   </a:ext>
                 </a:extLst>
               </a:tr>
@@ -8215,7 +9107,7 @@
                 </a:tc>
                 <a:extLst>
                   <a:ext uri="{0D108BD9-81ED-4DB2-BD59-A6C34878D82A}">
-                    <a16:rowId xmlns:a16="http://schemas.microsoft.com/office/drawing/2014/main" val="10003"/>
+                    <a16:rowId xmlns:a16="http://schemas.microsoft.com/office/drawing/2014/main" xmlns="" val="10003"/>
                   </a:ext>
                 </a:extLst>
               </a:tr>
@@ -8310,7 +9202,7 @@
                 </a:tc>
                 <a:extLst>
                   <a:ext uri="{0D108BD9-81ED-4DB2-BD59-A6C34878D82A}">
-                    <a16:rowId xmlns:a16="http://schemas.microsoft.com/office/drawing/2014/main" val="10004"/>
+                    <a16:rowId xmlns:a16="http://schemas.microsoft.com/office/drawing/2014/main" xmlns="" val="10004"/>
                   </a:ext>
                 </a:extLst>
               </a:tr>
@@ -8321,632 +9213,9 @@
     </p:spTree>
     <p:extLst>
       <p:ext uri="{BB962C8B-B14F-4D97-AF65-F5344CB8AC3E}">
-        <p14:creationId xmlns:p14="http://schemas.microsoft.com/office/powerpoint/2010/main" val="3532623066"/>
+        <p14:creationId xmlns:p14="http://schemas.microsoft.com/office/powerpoint/2010/main" xmlns="" val="3532623066"/>
       </p:ext>
     </p:extLst>
-  </p:cSld>
-  <p:clrMapOvr>
-    <a:masterClrMapping/>
-  </p:clrMapOvr>
-</p:sld>
-</file>
-
-<file path=ppt/slides/slide18.xml><?xml version="1.0" encoding="utf-8"?>
-<p:sld xmlns:a="http://schemas.openxmlformats.org/drawingml/2006/main" xmlns:r="http://schemas.openxmlformats.org/officeDocument/2006/relationships" xmlns:p="http://schemas.openxmlformats.org/presentationml/2006/main">
-  <p:cSld>
-    <p:spTree>
-      <p:nvGrpSpPr>
-        <p:cNvPr id="1" name=""/>
-        <p:cNvGrpSpPr/>
-        <p:nvPr/>
-      </p:nvGrpSpPr>
-      <p:grpSpPr>
-        <a:xfrm>
-          <a:off x="0" y="0"/>
-          <a:ext cx="0" cy="0"/>
-          <a:chOff x="0" y="0"/>
-          <a:chExt cx="0" cy="0"/>
-        </a:xfrm>
-      </p:grpSpPr>
-      <p:sp>
-        <p:nvSpPr>
-          <p:cNvPr id="2" name="Titel 1"/>
-          <p:cNvSpPr>
-            <a:spLocks noGrp="1"/>
-          </p:cNvSpPr>
-          <p:nvPr>
-            <p:ph type="title"/>
-          </p:nvPr>
-        </p:nvSpPr>
-        <p:spPr/>
-        <p:txBody>
-          <a:bodyPr>
-            <a:normAutofit/>
-          </a:bodyPr>
-          <a:lstStyle/>
-          <a:p>
-            <a:pPr algn="ctr"/>
-            <a:r>
-              <a:rPr lang="de-DE" dirty="0" err="1"/>
-              <a:t>Risks</a:t>
-            </a:r>
-            <a:endParaRPr lang="de-DE" dirty="0"/>
-          </a:p>
-        </p:txBody>
-      </p:sp>
-      <p:sp>
-        <p:nvSpPr>
-          <p:cNvPr id="9" name="Inhaltsplatzhalter 8"/>
-          <p:cNvSpPr>
-            <a:spLocks noGrp="1"/>
-          </p:cNvSpPr>
-          <p:nvPr>
-            <p:ph sz="half" idx="1"/>
-          </p:nvPr>
-        </p:nvSpPr>
-        <p:spPr/>
-        <p:txBody>
-          <a:bodyPr>
-            <a:normAutofit lnSpcReduction="10000"/>
-          </a:bodyPr>
-          <a:lstStyle/>
-          <a:p>
-            <a:r>
-              <a:rPr lang="de-DE" sz="2400" dirty="0"/>
-              <a:t>Fly </a:t>
-            </a:r>
-            <a:r>
-              <a:rPr lang="de-DE" sz="2400" dirty="0" err="1"/>
-              <a:t>physics</a:t>
-            </a:r>
-            <a:r>
-              <a:rPr lang="de-DE" sz="2400" dirty="0"/>
-              <a:t> - </a:t>
-            </a:r>
-            <a:r>
-              <a:rPr lang="de-DE" sz="2400" dirty="0" err="1"/>
-              <a:t>maths</a:t>
-            </a:r>
-            <a:r>
-              <a:rPr lang="de-DE" sz="2400" dirty="0"/>
-              <a:t> </a:t>
-            </a:r>
-            <a:r>
-              <a:rPr lang="de-DE" sz="2400" dirty="0" err="1"/>
-              <a:t>too</a:t>
-            </a:r>
-            <a:r>
-              <a:rPr lang="de-DE" sz="2400" dirty="0"/>
-              <a:t> </a:t>
-            </a:r>
-            <a:r>
-              <a:rPr lang="de-DE" sz="2400" dirty="0" err="1"/>
-              <a:t>complicated</a:t>
-            </a:r>
-            <a:r>
-              <a:rPr lang="de-DE" sz="2400" dirty="0"/>
-              <a:t>?</a:t>
-            </a:r>
-            <a:endParaRPr lang="de-DE" dirty="0"/>
-          </a:p>
-          <a:p>
-            <a:r>
-              <a:rPr lang="de-DE" sz="2400" dirty="0"/>
-              <a:t>Arm </a:t>
-            </a:r>
-            <a:r>
-              <a:rPr lang="de-DE" sz="2400" dirty="0" err="1"/>
-              <a:t>network</a:t>
-            </a:r>
-            <a:r>
-              <a:rPr lang="de-DE" sz="2400" dirty="0"/>
-              <a:t> </a:t>
-            </a:r>
-            <a:r>
-              <a:rPr lang="de-DE" sz="2400" dirty="0" err="1"/>
-              <a:t>transmission</a:t>
-            </a:r>
-            <a:endParaRPr lang="de-DE" sz="2400" dirty="0"/>
-          </a:p>
-          <a:p>
-            <a:r>
-              <a:rPr lang="de-DE" sz="2400" dirty="0"/>
-              <a:t>Post-</a:t>
-            </a:r>
-            <a:r>
-              <a:rPr lang="de-DE" sz="2400" dirty="0" err="1"/>
-              <a:t>effects</a:t>
-            </a:r>
-            <a:r>
-              <a:rPr lang="de-DE" sz="2400" dirty="0"/>
-              <a:t> (</a:t>
-            </a:r>
-            <a:r>
-              <a:rPr lang="de-DE" sz="2400" dirty="0" err="1"/>
-              <a:t>scattering</a:t>
-            </a:r>
-            <a:r>
-              <a:rPr lang="de-DE" sz="2400" dirty="0"/>
-              <a:t>, </a:t>
-            </a:r>
-            <a:r>
-              <a:rPr lang="de-DE" sz="2400" dirty="0" err="1"/>
-              <a:t>ambient</a:t>
-            </a:r>
-            <a:r>
-              <a:rPr lang="de-DE" sz="2400" dirty="0"/>
-              <a:t> </a:t>
-            </a:r>
-            <a:r>
-              <a:rPr lang="de-DE" sz="2400" dirty="0" err="1"/>
-              <a:t>occlusion</a:t>
-            </a:r>
-            <a:r>
-              <a:rPr lang="de-DE" sz="2400" dirty="0"/>
-              <a:t>)</a:t>
-            </a:r>
-          </a:p>
-          <a:p>
-            <a:r>
-              <a:rPr lang="de-DE" sz="2400" dirty="0"/>
-              <a:t>Realtime Performance </a:t>
-            </a:r>
-            <a:r>
-              <a:rPr lang="de-DE" sz="2400" dirty="0" err="1"/>
-              <a:t>Issues</a:t>
-            </a:r>
-            <a:r>
-              <a:rPr lang="de-DE" sz="2400" dirty="0"/>
-              <a:t> </a:t>
-            </a:r>
-            <a:r>
-              <a:rPr lang="de-DE" sz="2400" dirty="0" err="1"/>
-              <a:t>for</a:t>
-            </a:r>
-            <a:r>
-              <a:rPr lang="de-DE" sz="2400" dirty="0"/>
-              <a:t> </a:t>
-            </a:r>
-            <a:r>
-              <a:rPr lang="de-DE" sz="2400" dirty="0" err="1"/>
-              <a:t>slower</a:t>
-            </a:r>
-            <a:r>
-              <a:rPr lang="de-DE" sz="2400" dirty="0"/>
-              <a:t> PCs (Graphics Settings?)</a:t>
-            </a:r>
-          </a:p>
-          <a:p>
-            <a:r>
-              <a:rPr lang="de-DE" sz="2400" dirty="0"/>
-              <a:t>AR Performance Problems</a:t>
-            </a:r>
-            <a:endParaRPr lang="de-DE" dirty="0"/>
-          </a:p>
-          <a:p>
-            <a:pPr>
-              <a:buNone/>
-            </a:pPr>
-            <a:endParaRPr lang="de-DE" dirty="0"/>
-          </a:p>
-          <a:p>
-            <a:pPr>
-              <a:buNone/>
-            </a:pPr>
-            <a:endParaRPr lang="de-DE" dirty="0"/>
-          </a:p>
-          <a:p>
-            <a:pPr>
-              <a:buNone/>
-            </a:pPr>
-            <a:endParaRPr lang="de-DE" dirty="0"/>
-          </a:p>
-          <a:p>
-            <a:endParaRPr lang="de-DE" dirty="0"/>
-          </a:p>
-        </p:txBody>
-      </p:sp>
-      <p:sp>
-        <p:nvSpPr>
-          <p:cNvPr id="7" name="Inhaltsplatzhalter 6"/>
-          <p:cNvSpPr>
-            <a:spLocks noGrp="1"/>
-          </p:cNvSpPr>
-          <p:nvPr>
-            <p:ph sz="half" idx="2"/>
-          </p:nvPr>
-        </p:nvSpPr>
-        <p:spPr/>
-        <p:txBody>
-          <a:bodyPr>
-            <a:normAutofit lnSpcReduction="10000"/>
-          </a:bodyPr>
-          <a:lstStyle/>
-          <a:p>
-            <a:r>
-              <a:rPr lang="de-DE" sz="2400" dirty="0" err="1"/>
-              <a:t>Menues</a:t>
-            </a:r>
-            <a:r>
-              <a:rPr lang="de-DE" sz="2400" dirty="0"/>
-              <a:t> (</a:t>
-            </a:r>
-            <a:r>
-              <a:rPr lang="de-DE" sz="2400" dirty="0" err="1"/>
-              <a:t>Oculus</a:t>
-            </a:r>
-            <a:r>
-              <a:rPr lang="de-DE" sz="2400" dirty="0"/>
-              <a:t>)</a:t>
-            </a:r>
-          </a:p>
-          <a:p>
-            <a:r>
-              <a:rPr lang="de-DE" sz="2400" dirty="0" err="1"/>
-              <a:t>Guesture</a:t>
-            </a:r>
-            <a:r>
-              <a:rPr lang="de-DE" sz="2400" dirty="0"/>
-              <a:t> </a:t>
-            </a:r>
-            <a:r>
-              <a:rPr lang="de-DE" sz="2400" dirty="0" err="1"/>
-              <a:t>control</a:t>
-            </a:r>
-            <a:r>
-              <a:rPr lang="de-DE" sz="2400" dirty="0"/>
-              <a:t> </a:t>
-            </a:r>
-            <a:r>
-              <a:rPr lang="de-DE" sz="2400" dirty="0" err="1"/>
-              <a:t>problems</a:t>
-            </a:r>
-            <a:r>
-              <a:rPr lang="de-DE" sz="2400" dirty="0"/>
-              <a:t> (APIs </a:t>
-            </a:r>
-            <a:r>
-              <a:rPr lang="de-DE" sz="2400" dirty="0" err="1"/>
-              <a:t>for</a:t>
-            </a:r>
-            <a:r>
-              <a:rPr lang="de-DE" sz="2400" dirty="0"/>
-              <a:t> Vive not </a:t>
-            </a:r>
-            <a:r>
-              <a:rPr lang="de-DE" sz="2400" dirty="0" err="1"/>
-              <a:t>tested</a:t>
-            </a:r>
-            <a:r>
-              <a:rPr lang="de-DE" sz="2400" dirty="0"/>
-              <a:t> </a:t>
-            </a:r>
-            <a:r>
-              <a:rPr lang="de-DE" sz="2400" dirty="0" err="1"/>
-              <a:t>yet</a:t>
-            </a:r>
-            <a:r>
-              <a:rPr lang="de-DE" sz="2400" dirty="0"/>
-              <a:t>, </a:t>
-            </a:r>
-            <a:r>
-              <a:rPr lang="de-DE" sz="2400" dirty="0" err="1"/>
-              <a:t>currently</a:t>
-            </a:r>
-            <a:r>
-              <a:rPr lang="de-DE" sz="2400" dirty="0"/>
-              <a:t> </a:t>
-            </a:r>
-            <a:r>
-              <a:rPr lang="de-DE" sz="2400" dirty="0" err="1"/>
-              <a:t>unstable</a:t>
-            </a:r>
-            <a:r>
-              <a:rPr lang="de-DE" sz="2400" dirty="0"/>
-              <a:t> APIs </a:t>
-            </a:r>
-            <a:r>
-              <a:rPr lang="de-DE" sz="2400" dirty="0" err="1"/>
-              <a:t>for</a:t>
-            </a:r>
-            <a:r>
-              <a:rPr lang="de-DE" sz="2400" dirty="0"/>
-              <a:t> Kinect?)</a:t>
-            </a:r>
-          </a:p>
-          <a:p>
-            <a:r>
-              <a:rPr lang="de-DE" sz="2400" dirty="0" err="1"/>
-              <a:t>Suitable</a:t>
-            </a:r>
-            <a:r>
-              <a:rPr lang="de-DE" sz="2400" dirty="0"/>
-              <a:t> </a:t>
-            </a:r>
-            <a:r>
-              <a:rPr lang="de-DE" sz="2400" dirty="0" err="1"/>
-              <a:t>for</a:t>
-            </a:r>
-            <a:r>
-              <a:rPr lang="de-DE" sz="2400" dirty="0"/>
-              <a:t> HS-</a:t>
-            </a:r>
-            <a:r>
-              <a:rPr lang="de-DE" sz="2400" dirty="0" err="1"/>
-              <a:t>Lan</a:t>
-            </a:r>
-            <a:r>
-              <a:rPr lang="de-DE" sz="2400" dirty="0"/>
-              <a:t> </a:t>
-            </a:r>
-            <a:r>
-              <a:rPr lang="de-DE" sz="2400" dirty="0" err="1"/>
-              <a:t>and</a:t>
-            </a:r>
-            <a:r>
-              <a:rPr lang="de-DE" sz="2400" dirty="0"/>
-              <a:t> Open-Lab</a:t>
-            </a:r>
-          </a:p>
-          <a:p>
-            <a:r>
-              <a:rPr lang="de-DE" sz="2400" dirty="0" err="1"/>
-              <a:t>Ofc</a:t>
-            </a:r>
-            <a:r>
-              <a:rPr lang="de-DE" sz="2400" dirty="0"/>
-              <a:t>: </a:t>
-            </a:r>
-            <a:r>
-              <a:rPr lang="de-DE" sz="2400" dirty="0" err="1"/>
-              <a:t>Illness</a:t>
-            </a:r>
-            <a:r>
-              <a:rPr lang="de-DE" sz="2400" dirty="0"/>
-              <a:t> </a:t>
-            </a:r>
-            <a:r>
-              <a:rPr lang="de-DE" sz="2400" dirty="0" err="1"/>
-              <a:t>of</a:t>
-            </a:r>
-            <a:r>
-              <a:rPr lang="de-DE" sz="2400" dirty="0"/>
-              <a:t> Project Members (</a:t>
-            </a:r>
-            <a:r>
-              <a:rPr lang="de-DE" sz="2400" dirty="0" err="1"/>
-              <a:t>workload</a:t>
-            </a:r>
-            <a:r>
-              <a:rPr lang="de-DE" sz="2400" dirty="0"/>
-              <a:t> </a:t>
-            </a:r>
-            <a:r>
-              <a:rPr lang="de-DE" sz="2400" dirty="0" err="1"/>
-              <a:t>balancing</a:t>
-            </a:r>
-            <a:r>
-              <a:rPr lang="de-DE" sz="2400" dirty="0"/>
-              <a:t>)</a:t>
-            </a:r>
-          </a:p>
-          <a:p>
-            <a:pPr>
-              <a:buNone/>
-            </a:pPr>
-            <a:endParaRPr lang="de-DE" sz="2400" dirty="0"/>
-          </a:p>
-        </p:txBody>
-      </p:sp>
-      <p:sp>
-        <p:nvSpPr>
-          <p:cNvPr id="11" name="Foliennummernplatzhalter 10"/>
-          <p:cNvSpPr>
-            <a:spLocks noGrp="1"/>
-          </p:cNvSpPr>
-          <p:nvPr>
-            <p:ph type="sldNum" sz="quarter" idx="12"/>
-          </p:nvPr>
-        </p:nvSpPr>
-        <p:spPr/>
-        <p:txBody>
-          <a:bodyPr/>
-          <a:lstStyle/>
-          <a:p>
-            <a:fld id="{6C6AE60A-B69C-4790-82F7-3882EDF23186}" type="slidenum">
-              <a:rPr lang="de-DE" smtClean="0"/>
-              <a:pPr/>
-              <a:t>18</a:t>
-            </a:fld>
-            <a:endParaRPr lang="de-DE"/>
-          </a:p>
-        </p:txBody>
-      </p:sp>
-    </p:spTree>
-  </p:cSld>
-  <p:clrMapOvr>
-    <a:masterClrMapping/>
-  </p:clrMapOvr>
-</p:sld>
-</file>
-
-<file path=ppt/slides/slide19.xml><?xml version="1.0" encoding="utf-8"?>
-<p:sld xmlns:a="http://schemas.openxmlformats.org/drawingml/2006/main" xmlns:r="http://schemas.openxmlformats.org/officeDocument/2006/relationships" xmlns:p="http://schemas.openxmlformats.org/presentationml/2006/main">
-  <p:cSld>
-    <p:spTree>
-      <p:nvGrpSpPr>
-        <p:cNvPr id="1" name=""/>
-        <p:cNvGrpSpPr/>
-        <p:nvPr/>
-      </p:nvGrpSpPr>
-      <p:grpSpPr>
-        <a:xfrm>
-          <a:off x="0" y="0"/>
-          <a:ext cx="0" cy="0"/>
-          <a:chOff x="0" y="0"/>
-          <a:chExt cx="0" cy="0"/>
-        </a:xfrm>
-      </p:grpSpPr>
-      <p:sp>
-        <p:nvSpPr>
-          <p:cNvPr id="2" name="Titel 1"/>
-          <p:cNvSpPr>
-            <a:spLocks noGrp="1"/>
-          </p:cNvSpPr>
-          <p:nvPr>
-            <p:ph type="title"/>
-          </p:nvPr>
-        </p:nvSpPr>
-        <p:spPr/>
-        <p:txBody>
-          <a:bodyPr>
-            <a:normAutofit/>
-          </a:bodyPr>
-          <a:lstStyle/>
-          <a:p>
-            <a:pPr algn="ctr"/>
-            <a:r>
-              <a:rPr lang="de-DE" dirty="0" err="1"/>
-              <a:t>Github</a:t>
-            </a:r>
-            <a:r>
-              <a:rPr lang="de-DE" dirty="0"/>
-              <a:t> Version </a:t>
-            </a:r>
-            <a:r>
-              <a:rPr lang="de-DE" dirty="0" err="1"/>
-              <a:t>Control</a:t>
-            </a:r>
-            <a:endParaRPr lang="de-DE" dirty="0"/>
-          </a:p>
-        </p:txBody>
-      </p:sp>
-      <p:sp>
-        <p:nvSpPr>
-          <p:cNvPr id="9" name="Inhaltsplatzhalter 8"/>
-          <p:cNvSpPr>
-            <a:spLocks noGrp="1"/>
-          </p:cNvSpPr>
-          <p:nvPr>
-            <p:ph sz="half" idx="1"/>
-          </p:nvPr>
-        </p:nvSpPr>
-        <p:spPr>
-          <a:xfrm>
-            <a:off x="457200" y="1600071"/>
-            <a:ext cx="8219256" cy="3695700"/>
-          </a:xfrm>
-        </p:spPr>
-        <p:txBody>
-          <a:bodyPr>
-            <a:normAutofit/>
-          </a:bodyPr>
-          <a:lstStyle/>
-          <a:p>
-            <a:endParaRPr lang="de-DE" dirty="0">
-              <a:hlinkClick r:id="rId2"/>
-            </a:endParaRPr>
-          </a:p>
-          <a:p>
-            <a:r>
-              <a:rPr lang="de-DE" dirty="0"/>
-              <a:t>Old </a:t>
-            </a:r>
-            <a:r>
-              <a:rPr lang="de-DE" dirty="0" err="1"/>
-              <a:t>project</a:t>
-            </a:r>
-            <a:r>
-              <a:rPr lang="de-DE" dirty="0"/>
-              <a:t> </a:t>
-            </a:r>
-            <a:r>
-              <a:rPr lang="de-DE" dirty="0" err="1"/>
-              <a:t>source</a:t>
-            </a:r>
-            <a:endParaRPr lang="de-DE" dirty="0">
-              <a:hlinkClick r:id="rId2"/>
-            </a:endParaRPr>
-          </a:p>
-          <a:p>
-            <a:pPr algn="ctr">
-              <a:buNone/>
-            </a:pPr>
-            <a:r>
-              <a:rPr lang="de-DE" dirty="0">
-                <a:hlinkClick r:id="rId3"/>
-              </a:rPr>
-              <a:t>https://github.com/andreasdietze/Rift-Wingsuit.git</a:t>
-            </a:r>
-            <a:endParaRPr lang="de-DE" dirty="0"/>
-          </a:p>
-          <a:p>
-            <a:pPr algn="ctr">
-              <a:buNone/>
-            </a:pPr>
-            <a:endParaRPr lang="de-DE" dirty="0"/>
-          </a:p>
-          <a:p>
-            <a:r>
-              <a:rPr lang="de-DE" dirty="0"/>
-              <a:t>New </a:t>
-            </a:r>
-            <a:r>
-              <a:rPr lang="de-DE" dirty="0" err="1"/>
-              <a:t>project</a:t>
-            </a:r>
-            <a:r>
-              <a:rPr lang="de-DE" dirty="0"/>
-              <a:t> </a:t>
-            </a:r>
-            <a:r>
-              <a:rPr lang="de-DE" dirty="0" err="1"/>
-              <a:t>source</a:t>
-            </a:r>
-            <a:endParaRPr lang="de-DE" dirty="0"/>
-          </a:p>
-          <a:p>
-            <a:pPr algn="ctr">
-              <a:buNone/>
-            </a:pPr>
-            <a:r>
-              <a:rPr lang="de-DE" dirty="0">
-                <a:hlinkClick r:id="rId4"/>
-              </a:rPr>
-              <a:t>https://github.com/andreasdietze/Rift-WingsuitV2.git</a:t>
-            </a:r>
-            <a:endParaRPr lang="de-DE" dirty="0"/>
-          </a:p>
-          <a:p>
-            <a:endParaRPr lang="de-DE" dirty="0"/>
-          </a:p>
-        </p:txBody>
-      </p:sp>
-      <p:sp>
-        <p:nvSpPr>
-          <p:cNvPr id="11" name="Foliennummernplatzhalter 10"/>
-          <p:cNvSpPr>
-            <a:spLocks noGrp="1"/>
-          </p:cNvSpPr>
-          <p:nvPr>
-            <p:ph type="sldNum" sz="quarter" idx="12"/>
-          </p:nvPr>
-        </p:nvSpPr>
-        <p:spPr/>
-        <p:txBody>
-          <a:bodyPr/>
-          <a:lstStyle/>
-          <a:p>
-            <a:fld id="{6C6AE60A-B69C-4790-82F7-3882EDF23186}" type="slidenum">
-              <a:rPr lang="de-DE" smtClean="0"/>
-              <a:pPr/>
-              <a:t>19</a:t>
-            </a:fld>
-            <a:endParaRPr lang="de-DE"/>
-          </a:p>
-        </p:txBody>
-      </p:sp>
-    </p:spTree>
   </p:cSld>
   <p:clrMapOvr>
     <a:masterClrMapping/>
@@ -9132,6 +9401,1117 @@
       </p:grpSpPr>
       <p:sp>
         <p:nvSpPr>
+          <p:cNvPr id="2" name="Titel 1"/>
+          <p:cNvSpPr>
+            <a:spLocks noGrp="1"/>
+          </p:cNvSpPr>
+          <p:nvPr>
+            <p:ph type="title"/>
+          </p:nvPr>
+        </p:nvSpPr>
+        <p:spPr/>
+        <p:txBody>
+          <a:bodyPr>
+            <a:normAutofit/>
+          </a:bodyPr>
+          <a:lstStyle/>
+          <a:p>
+            <a:pPr algn="ctr"/>
+            <a:r>
+              <a:rPr lang="de-DE" dirty="0" err="1">
+                <a:solidFill>
+                  <a:srgbClr val="FF0000"/>
+                </a:solidFill>
+              </a:rPr>
+              <a:t>Milestone</a:t>
+            </a:r>
+            <a:r>
+              <a:rPr lang="de-DE" dirty="0">
+                <a:solidFill>
+                  <a:srgbClr val="FF0000"/>
+                </a:solidFill>
+              </a:rPr>
+              <a:t> 3</a:t>
+            </a:r>
+          </a:p>
+        </p:txBody>
+      </p:sp>
+      <p:sp>
+        <p:nvSpPr>
+          <p:cNvPr id="9" name="Inhaltsplatzhalter 8"/>
+          <p:cNvSpPr>
+            <a:spLocks noGrp="1"/>
+          </p:cNvSpPr>
+          <p:nvPr>
+            <p:ph idx="1"/>
+          </p:nvPr>
+        </p:nvSpPr>
+        <p:spPr/>
+        <p:txBody>
+          <a:bodyPr>
+            <a:normAutofit/>
+          </a:bodyPr>
+          <a:lstStyle/>
+          <a:p>
+            <a:endParaRPr lang="de-DE" dirty="0"/>
+          </a:p>
+          <a:p>
+            <a:pPr>
+              <a:buNone/>
+            </a:pPr>
+            <a:endParaRPr lang="de-DE" dirty="0"/>
+          </a:p>
+          <a:p>
+            <a:endParaRPr lang="de-DE" dirty="0"/>
+          </a:p>
+        </p:txBody>
+      </p:sp>
+      <p:sp>
+        <p:nvSpPr>
+          <p:cNvPr id="11" name="Foliennummernplatzhalter 10"/>
+          <p:cNvSpPr>
+            <a:spLocks noGrp="1"/>
+          </p:cNvSpPr>
+          <p:nvPr>
+            <p:ph type="sldNum" sz="quarter" idx="12"/>
+          </p:nvPr>
+        </p:nvSpPr>
+        <p:spPr/>
+        <p:txBody>
+          <a:bodyPr/>
+          <a:lstStyle/>
+          <a:p>
+            <a:fld id="{6C6AE60A-B69C-4790-82F7-3882EDF23186}" type="slidenum">
+              <a:rPr lang="de-DE" smtClean="0"/>
+              <a:pPr/>
+              <a:t>20</a:t>
+            </a:fld>
+            <a:endParaRPr lang="de-DE"/>
+          </a:p>
+        </p:txBody>
+      </p:sp>
+      <p:graphicFrame>
+        <p:nvGraphicFramePr>
+          <p:cNvPr id="8" name="Tabelle 7"/>
+          <p:cNvGraphicFramePr>
+            <a:graphicFrameLocks noGrp="1"/>
+          </p:cNvGraphicFramePr>
+          <p:nvPr>
+            <p:extLst>
+              <p:ext uri="{D42A27DB-BD31-4B8C-83A1-F6EECF244321}">
+                <p14:modId xmlns:p14="http://schemas.microsoft.com/office/powerpoint/2010/main" xmlns="" val="1031210796"/>
+              </p:ext>
+            </p:extLst>
+          </p:nvPr>
+        </p:nvGraphicFramePr>
+        <p:xfrm>
+          <a:off x="539552" y="1849388"/>
+          <a:ext cx="8064897" cy="1854200"/>
+        </p:xfrm>
+        <a:graphic>
+          <a:graphicData uri="http://schemas.openxmlformats.org/drawingml/2006/table">
+            <a:tbl>
+              <a:tblPr firstRow="1" bandRow="1">
+                <a:tableStyleId>{5C22544A-7EE6-4342-B048-85BDC9FD1C3A}</a:tableStyleId>
+              </a:tblPr>
+              <a:tblGrid>
+                <a:gridCol w="1584176">
+                  <a:extLst>
+                    <a:ext uri="{9D8B030D-6E8A-4147-A177-3AD203B41FA5}">
+                      <a16:colId xmlns:a16="http://schemas.microsoft.com/office/drawing/2014/main" xmlns="" val="20000"/>
+                    </a:ext>
+                  </a:extLst>
+                </a:gridCol>
+                <a:gridCol w="6480721">
+                  <a:extLst>
+                    <a:ext uri="{9D8B030D-6E8A-4147-A177-3AD203B41FA5}">
+                      <a16:colId xmlns:a16="http://schemas.microsoft.com/office/drawing/2014/main" xmlns="" val="20001"/>
+                    </a:ext>
+                  </a:extLst>
+                </a:gridCol>
+              </a:tblGrid>
+              <a:tr h="370840">
+                <a:tc>
+                  <a:txBody>
+                    <a:bodyPr/>
+                    <a:lstStyle/>
+                    <a:p>
+                      <a:pPr algn="ctr"/>
+                      <a:r>
+                        <a:rPr lang="de-DE" sz="1800" dirty="0" err="1"/>
+                        <a:t>Week</a:t>
+                      </a:r>
+                      <a:endParaRPr lang="de-DE" sz="1800" dirty="0"/>
+                    </a:p>
+                  </a:txBody>
+                  <a:tcPr/>
+                </a:tc>
+                <a:tc>
+                  <a:txBody>
+                    <a:bodyPr/>
+                    <a:lstStyle/>
+                    <a:p>
+                      <a:pPr algn="ctr"/>
+                      <a:r>
+                        <a:rPr lang="de-DE" sz="1800" dirty="0" smtClean="0"/>
+                        <a:t>Manuel Schmitt</a:t>
+                      </a:r>
+                      <a:endParaRPr lang="de-DE" sz="1800" dirty="0"/>
+                    </a:p>
+                  </a:txBody>
+                  <a:tcPr/>
+                </a:tc>
+                <a:extLst>
+                  <a:ext uri="{0D108BD9-81ED-4DB2-BD59-A6C34878D82A}">
+                    <a16:rowId xmlns:a16="http://schemas.microsoft.com/office/drawing/2014/main" xmlns="" val="10000"/>
+                  </a:ext>
+                </a:extLst>
+              </a:tr>
+              <a:tr h="370840">
+                <a:tc>
+                  <a:txBody>
+                    <a:bodyPr/>
+                    <a:lstStyle/>
+                    <a:p>
+                      <a:pPr algn="l"/>
+                      <a:r>
+                        <a:rPr lang="de-DE" sz="1800" dirty="0"/>
+                        <a:t>08.01</a:t>
+                      </a:r>
+                      <a:r>
+                        <a:rPr lang="de-DE" sz="1800" baseline="0" dirty="0"/>
+                        <a:t> – 08.08</a:t>
+                      </a:r>
+                      <a:endParaRPr lang="de-DE" sz="1800" dirty="0"/>
+                    </a:p>
+                  </a:txBody>
+                  <a:tcPr/>
+                </a:tc>
+                <a:tc>
+                  <a:txBody>
+                    <a:bodyPr/>
+                    <a:lstStyle/>
+                    <a:p>
+                      <a:pPr lvl="0">
+                        <a:buFont typeface="Arial" pitchFamily="34" charset="0"/>
+                        <a:buChar char="•"/>
+                      </a:pPr>
+                      <a:r>
+                        <a:rPr lang="de-DE" sz="1800" dirty="0"/>
+                        <a:t> </a:t>
+                      </a:r>
+                      <a:r>
+                        <a:rPr lang="de-DE" sz="1800" dirty="0" err="1" smtClean="0"/>
+                        <a:t>Creation</a:t>
+                      </a:r>
+                      <a:r>
+                        <a:rPr lang="de-DE" sz="1800" dirty="0" smtClean="0"/>
+                        <a:t> </a:t>
+                      </a:r>
+                      <a:r>
+                        <a:rPr lang="de-DE" sz="1800" dirty="0" err="1" smtClean="0"/>
+                        <a:t>of</a:t>
+                      </a:r>
+                      <a:r>
+                        <a:rPr lang="de-DE" sz="1800" dirty="0" smtClean="0"/>
+                        <a:t> a </a:t>
+                      </a:r>
+                      <a:r>
+                        <a:rPr lang="de-DE" sz="1800" dirty="0" err="1" smtClean="0"/>
+                        <a:t>users</a:t>
+                      </a:r>
+                      <a:r>
+                        <a:rPr lang="de-DE" sz="1800" baseline="0" dirty="0" smtClean="0"/>
+                        <a:t> </a:t>
+                      </a:r>
+                      <a:r>
+                        <a:rPr lang="de-DE" sz="1800" baseline="0" dirty="0" err="1" smtClean="0"/>
+                        <a:t>guide</a:t>
+                      </a:r>
+                      <a:r>
+                        <a:rPr lang="de-DE" sz="1800" baseline="0" dirty="0" smtClean="0"/>
+                        <a:t> </a:t>
+                      </a:r>
+                      <a:r>
+                        <a:rPr lang="de-DE" sz="1800" baseline="0" dirty="0" err="1" smtClean="0"/>
+                        <a:t>for</a:t>
+                      </a:r>
+                      <a:r>
+                        <a:rPr lang="de-DE" sz="1800" baseline="0" dirty="0" smtClean="0"/>
+                        <a:t> </a:t>
+                      </a:r>
+                      <a:r>
+                        <a:rPr lang="de-DE" sz="1800" baseline="0" dirty="0" err="1" smtClean="0"/>
+                        <a:t>the</a:t>
+                      </a:r>
+                      <a:r>
+                        <a:rPr lang="de-DE" sz="1800" baseline="0" dirty="0" smtClean="0"/>
+                        <a:t> </a:t>
+                      </a:r>
+                      <a:r>
+                        <a:rPr lang="de-DE" sz="1800" baseline="0" dirty="0" err="1" smtClean="0"/>
+                        <a:t>project</a:t>
+                      </a:r>
+                      <a:endParaRPr lang="de-DE" sz="1800" dirty="0"/>
+                    </a:p>
+                  </a:txBody>
+                  <a:tcPr/>
+                </a:tc>
+                <a:extLst>
+                  <a:ext uri="{0D108BD9-81ED-4DB2-BD59-A6C34878D82A}">
+                    <a16:rowId xmlns:a16="http://schemas.microsoft.com/office/drawing/2014/main" xmlns="" val="10001"/>
+                  </a:ext>
+                </a:extLst>
+              </a:tr>
+              <a:tr h="370840">
+                <a:tc>
+                  <a:txBody>
+                    <a:bodyPr/>
+                    <a:lstStyle/>
+                    <a:p>
+                      <a:pPr algn="l"/>
+                      <a:r>
+                        <a:rPr lang="de-DE" sz="1800" dirty="0"/>
+                        <a:t>08.08 – 08.16</a:t>
+                      </a:r>
+                    </a:p>
+                  </a:txBody>
+                  <a:tcPr/>
+                </a:tc>
+                <a:tc>
+                  <a:txBody>
+                    <a:bodyPr/>
+                    <a:lstStyle/>
+                    <a:p>
+                      <a:pPr marL="0" marR="0" lvl="1" indent="0" algn="l" defTabSz="914400" rtl="0" eaLnBrk="1" fontAlgn="auto" latinLnBrk="0" hangingPunct="1">
+                        <a:lnSpc>
+                          <a:spcPct val="100000"/>
+                        </a:lnSpc>
+                        <a:spcBef>
+                          <a:spcPts val="0"/>
+                        </a:spcBef>
+                        <a:spcAft>
+                          <a:spcPts val="0"/>
+                        </a:spcAft>
+                        <a:buClrTx/>
+                        <a:buSzTx/>
+                        <a:buFont typeface="Arial" pitchFamily="34" charset="0"/>
+                        <a:buChar char="•"/>
+                        <a:tabLst/>
+                        <a:defRPr/>
+                      </a:pPr>
+                      <a:r>
+                        <a:rPr lang="de-DE" sz="1800" dirty="0"/>
+                        <a:t> </a:t>
+                      </a:r>
+                      <a:r>
+                        <a:rPr lang="en-US" sz="1800" dirty="0" smtClean="0"/>
+                        <a:t>Creation of a project documentation</a:t>
+                      </a:r>
+                      <a:endParaRPr lang="de-DE" sz="1800" baseline="0" dirty="0"/>
+                    </a:p>
+                  </a:txBody>
+                  <a:tcPr/>
+                </a:tc>
+                <a:extLst>
+                  <a:ext uri="{0D108BD9-81ED-4DB2-BD59-A6C34878D82A}">
+                    <a16:rowId xmlns:a16="http://schemas.microsoft.com/office/drawing/2014/main" xmlns="" val="10002"/>
+                  </a:ext>
+                </a:extLst>
+              </a:tr>
+              <a:tr h="370840">
+                <a:tc>
+                  <a:txBody>
+                    <a:bodyPr/>
+                    <a:lstStyle/>
+                    <a:p>
+                      <a:pPr algn="l"/>
+                      <a:r>
+                        <a:rPr lang="de-DE" sz="1800" dirty="0"/>
+                        <a:t>08.16 – 24.08</a:t>
+                      </a:r>
+                    </a:p>
+                  </a:txBody>
+                  <a:tcPr/>
+                </a:tc>
+                <a:tc>
+                  <a:txBody>
+                    <a:bodyPr/>
+                    <a:lstStyle/>
+                    <a:p>
+                      <a:pPr>
+                        <a:buFont typeface="Arial" pitchFamily="34" charset="0"/>
+                        <a:buChar char="•"/>
+                      </a:pPr>
+                      <a:r>
+                        <a:rPr lang="de-DE" sz="1800" dirty="0"/>
+                        <a:t> </a:t>
+                      </a:r>
+                      <a:r>
+                        <a:rPr lang="de-DE" sz="1800" dirty="0" err="1" smtClean="0"/>
+                        <a:t>Buffer</a:t>
+                      </a:r>
+                      <a:r>
+                        <a:rPr lang="de-DE" sz="1800" baseline="0" dirty="0" smtClean="0"/>
+                        <a:t> </a:t>
+                      </a:r>
+                      <a:r>
+                        <a:rPr lang="de-DE" sz="1800" baseline="0" dirty="0" err="1" smtClean="0"/>
+                        <a:t>for</a:t>
+                      </a:r>
+                      <a:r>
+                        <a:rPr lang="de-DE" sz="1800" baseline="0" dirty="0" smtClean="0"/>
+                        <a:t> </a:t>
+                      </a:r>
+                      <a:r>
+                        <a:rPr lang="de-DE" sz="1800" baseline="0" dirty="0" err="1" smtClean="0"/>
+                        <a:t>any</a:t>
+                      </a:r>
+                      <a:r>
+                        <a:rPr lang="de-DE" sz="1800" baseline="0" dirty="0" smtClean="0"/>
+                        <a:t> relevant </a:t>
+                      </a:r>
+                      <a:r>
+                        <a:rPr lang="de-DE" sz="1800" baseline="0" dirty="0" err="1" smtClean="0"/>
+                        <a:t>work</a:t>
+                      </a:r>
+                      <a:endParaRPr lang="de-DE" sz="1800" dirty="0"/>
+                    </a:p>
+                  </a:txBody>
+                  <a:tcPr/>
+                </a:tc>
+                <a:extLst>
+                  <a:ext uri="{0D108BD9-81ED-4DB2-BD59-A6C34878D82A}">
+                    <a16:rowId xmlns:a16="http://schemas.microsoft.com/office/drawing/2014/main" xmlns="" val="10003"/>
+                  </a:ext>
+                </a:extLst>
+              </a:tr>
+              <a:tr h="370840">
+                <a:tc>
+                  <a:txBody>
+                    <a:bodyPr/>
+                    <a:lstStyle/>
+                    <a:p>
+                      <a:pPr algn="l"/>
+                      <a:r>
+                        <a:rPr lang="de-DE" sz="1800" dirty="0"/>
+                        <a:t>08.24 – 09.14</a:t>
+                      </a:r>
+                    </a:p>
+                  </a:txBody>
+                  <a:tcPr/>
+                </a:tc>
+                <a:tc>
+                  <a:txBody>
+                    <a:bodyPr/>
+                    <a:lstStyle/>
+                    <a:p>
+                      <a:pPr>
+                        <a:buFont typeface="Arial" pitchFamily="34" charset="0"/>
+                        <a:buChar char="•"/>
+                      </a:pPr>
+                      <a:r>
+                        <a:rPr lang="de-DE" sz="1800" dirty="0"/>
+                        <a:t> </a:t>
+                      </a:r>
+                      <a:r>
+                        <a:rPr lang="de-DE" sz="1800" dirty="0" err="1" smtClean="0"/>
+                        <a:t>Buffer</a:t>
+                      </a:r>
+                      <a:r>
+                        <a:rPr lang="de-DE" sz="1800" dirty="0" smtClean="0"/>
+                        <a:t> </a:t>
+                      </a:r>
+                      <a:r>
+                        <a:rPr lang="de-DE" sz="1800" dirty="0" err="1" smtClean="0"/>
+                        <a:t>for</a:t>
+                      </a:r>
+                      <a:r>
+                        <a:rPr lang="de-DE" sz="1800" dirty="0" smtClean="0"/>
+                        <a:t> </a:t>
+                      </a:r>
+                      <a:r>
+                        <a:rPr lang="de-DE" sz="1800" dirty="0" err="1" smtClean="0"/>
+                        <a:t>any</a:t>
+                      </a:r>
+                      <a:r>
+                        <a:rPr lang="de-DE" sz="1800" dirty="0" smtClean="0"/>
+                        <a:t> relevant </a:t>
+                      </a:r>
+                      <a:r>
+                        <a:rPr lang="de-DE" sz="1800" dirty="0" err="1" smtClean="0"/>
+                        <a:t>work</a:t>
+                      </a:r>
+                      <a:endParaRPr lang="de-DE" sz="1800" dirty="0"/>
+                    </a:p>
+                  </a:txBody>
+                  <a:tcPr/>
+                </a:tc>
+                <a:extLst>
+                  <a:ext uri="{0D108BD9-81ED-4DB2-BD59-A6C34878D82A}">
+                    <a16:rowId xmlns:a16="http://schemas.microsoft.com/office/drawing/2014/main" xmlns="" val="10004"/>
+                  </a:ext>
+                </a:extLst>
+              </a:tr>
+            </a:tbl>
+          </a:graphicData>
+        </a:graphic>
+      </p:graphicFrame>
+    </p:spTree>
+    <p:extLst>
+      <p:ext uri="{BB962C8B-B14F-4D97-AF65-F5344CB8AC3E}">
+        <p14:creationId xmlns:p14="http://schemas.microsoft.com/office/powerpoint/2010/main" xmlns="" val="3532623066"/>
+      </p:ext>
+    </p:extLst>
+  </p:cSld>
+  <p:clrMapOvr>
+    <a:masterClrMapping/>
+  </p:clrMapOvr>
+</p:sld>
+</file>
+
+<file path=ppt/slides/slide21.xml><?xml version="1.0" encoding="utf-8"?>
+<p:sld xmlns:a="http://schemas.openxmlformats.org/drawingml/2006/main" xmlns:r="http://schemas.openxmlformats.org/officeDocument/2006/relationships" xmlns:p="http://schemas.openxmlformats.org/presentationml/2006/main">
+  <p:cSld>
+    <p:spTree>
+      <p:nvGrpSpPr>
+        <p:cNvPr id="1" name=""/>
+        <p:cNvGrpSpPr/>
+        <p:nvPr/>
+      </p:nvGrpSpPr>
+      <p:grpSpPr>
+        <a:xfrm>
+          <a:off x="0" y="0"/>
+          <a:ext cx="0" cy="0"/>
+          <a:chOff x="0" y="0"/>
+          <a:chExt cx="0" cy="0"/>
+        </a:xfrm>
+      </p:grpSpPr>
+      <p:sp>
+        <p:nvSpPr>
+          <p:cNvPr id="2" name="Titel 1"/>
+          <p:cNvSpPr>
+            <a:spLocks noGrp="1"/>
+          </p:cNvSpPr>
+          <p:nvPr>
+            <p:ph type="title"/>
+          </p:nvPr>
+        </p:nvSpPr>
+        <p:spPr/>
+        <p:txBody>
+          <a:bodyPr>
+            <a:normAutofit/>
+          </a:bodyPr>
+          <a:lstStyle/>
+          <a:p>
+            <a:pPr algn="ctr"/>
+            <a:r>
+              <a:rPr lang="de-DE" dirty="0" err="1"/>
+              <a:t>Risks</a:t>
+            </a:r>
+            <a:endParaRPr lang="de-DE" dirty="0"/>
+          </a:p>
+        </p:txBody>
+      </p:sp>
+      <p:sp>
+        <p:nvSpPr>
+          <p:cNvPr id="9" name="Inhaltsplatzhalter 8"/>
+          <p:cNvSpPr>
+            <a:spLocks noGrp="1"/>
+          </p:cNvSpPr>
+          <p:nvPr>
+            <p:ph sz="half" idx="1"/>
+          </p:nvPr>
+        </p:nvSpPr>
+        <p:spPr/>
+        <p:txBody>
+          <a:bodyPr>
+            <a:normAutofit lnSpcReduction="10000"/>
+          </a:bodyPr>
+          <a:lstStyle/>
+          <a:p>
+            <a:r>
+              <a:rPr lang="de-DE" sz="2400" dirty="0"/>
+              <a:t>Fly </a:t>
+            </a:r>
+            <a:r>
+              <a:rPr lang="de-DE" sz="2400" dirty="0" err="1"/>
+              <a:t>physics</a:t>
+            </a:r>
+            <a:r>
+              <a:rPr lang="de-DE" sz="2400" dirty="0"/>
+              <a:t> - </a:t>
+            </a:r>
+            <a:r>
+              <a:rPr lang="de-DE" sz="2400" dirty="0" err="1"/>
+              <a:t>maths</a:t>
+            </a:r>
+            <a:r>
+              <a:rPr lang="de-DE" sz="2400" dirty="0"/>
+              <a:t> </a:t>
+            </a:r>
+            <a:r>
+              <a:rPr lang="de-DE" sz="2400" dirty="0" err="1"/>
+              <a:t>too</a:t>
+            </a:r>
+            <a:r>
+              <a:rPr lang="de-DE" sz="2400" dirty="0"/>
+              <a:t> </a:t>
+            </a:r>
+            <a:r>
+              <a:rPr lang="de-DE" sz="2400" dirty="0" err="1"/>
+              <a:t>complicated</a:t>
+            </a:r>
+            <a:r>
+              <a:rPr lang="de-DE" sz="2400" dirty="0"/>
+              <a:t>?</a:t>
+            </a:r>
+            <a:endParaRPr lang="de-DE" dirty="0"/>
+          </a:p>
+          <a:p>
+            <a:r>
+              <a:rPr lang="de-DE" sz="2400" dirty="0"/>
+              <a:t>Arm </a:t>
+            </a:r>
+            <a:r>
+              <a:rPr lang="de-DE" sz="2400" dirty="0" err="1"/>
+              <a:t>network</a:t>
+            </a:r>
+            <a:r>
+              <a:rPr lang="de-DE" sz="2400" dirty="0"/>
+              <a:t> </a:t>
+            </a:r>
+            <a:r>
+              <a:rPr lang="de-DE" sz="2400" dirty="0" err="1"/>
+              <a:t>transmission</a:t>
+            </a:r>
+            <a:endParaRPr lang="de-DE" sz="2400" dirty="0"/>
+          </a:p>
+          <a:p>
+            <a:r>
+              <a:rPr lang="de-DE" sz="2400" dirty="0"/>
+              <a:t>Post-</a:t>
+            </a:r>
+            <a:r>
+              <a:rPr lang="de-DE" sz="2400" dirty="0" err="1"/>
+              <a:t>effects</a:t>
+            </a:r>
+            <a:r>
+              <a:rPr lang="de-DE" sz="2400" dirty="0"/>
+              <a:t> (</a:t>
+            </a:r>
+            <a:r>
+              <a:rPr lang="de-DE" sz="2400" dirty="0" err="1"/>
+              <a:t>scattering</a:t>
+            </a:r>
+            <a:r>
+              <a:rPr lang="de-DE" sz="2400" dirty="0"/>
+              <a:t>, </a:t>
+            </a:r>
+            <a:r>
+              <a:rPr lang="de-DE" sz="2400" dirty="0" err="1"/>
+              <a:t>ambient</a:t>
+            </a:r>
+            <a:r>
+              <a:rPr lang="de-DE" sz="2400" dirty="0"/>
+              <a:t> </a:t>
+            </a:r>
+            <a:r>
+              <a:rPr lang="de-DE" sz="2400" dirty="0" err="1"/>
+              <a:t>occlusion</a:t>
+            </a:r>
+            <a:r>
+              <a:rPr lang="de-DE" sz="2400" dirty="0"/>
+              <a:t>)</a:t>
+            </a:r>
+          </a:p>
+          <a:p>
+            <a:r>
+              <a:rPr lang="de-DE" sz="2400" dirty="0"/>
+              <a:t>Realtime Performance </a:t>
+            </a:r>
+            <a:r>
+              <a:rPr lang="de-DE" sz="2400" dirty="0" err="1"/>
+              <a:t>Issues</a:t>
+            </a:r>
+            <a:r>
+              <a:rPr lang="de-DE" sz="2400" dirty="0"/>
+              <a:t> </a:t>
+            </a:r>
+            <a:r>
+              <a:rPr lang="de-DE" sz="2400" dirty="0" err="1"/>
+              <a:t>for</a:t>
+            </a:r>
+            <a:r>
+              <a:rPr lang="de-DE" sz="2400" dirty="0"/>
+              <a:t> </a:t>
+            </a:r>
+            <a:r>
+              <a:rPr lang="de-DE" sz="2400" dirty="0" err="1"/>
+              <a:t>slower</a:t>
+            </a:r>
+            <a:r>
+              <a:rPr lang="de-DE" sz="2400" dirty="0"/>
+              <a:t> PCs (Graphics Settings?)</a:t>
+            </a:r>
+          </a:p>
+          <a:p>
+            <a:r>
+              <a:rPr lang="de-DE" sz="2400" dirty="0"/>
+              <a:t>AR Performance Problems</a:t>
+            </a:r>
+            <a:endParaRPr lang="de-DE" dirty="0"/>
+          </a:p>
+          <a:p>
+            <a:pPr>
+              <a:buNone/>
+            </a:pPr>
+            <a:endParaRPr lang="de-DE" dirty="0"/>
+          </a:p>
+          <a:p>
+            <a:pPr>
+              <a:buNone/>
+            </a:pPr>
+            <a:endParaRPr lang="de-DE" dirty="0"/>
+          </a:p>
+          <a:p>
+            <a:pPr>
+              <a:buNone/>
+            </a:pPr>
+            <a:endParaRPr lang="de-DE" dirty="0"/>
+          </a:p>
+          <a:p>
+            <a:endParaRPr lang="de-DE" dirty="0"/>
+          </a:p>
+        </p:txBody>
+      </p:sp>
+      <p:sp>
+        <p:nvSpPr>
+          <p:cNvPr id="7" name="Inhaltsplatzhalter 6"/>
+          <p:cNvSpPr>
+            <a:spLocks noGrp="1"/>
+          </p:cNvSpPr>
+          <p:nvPr>
+            <p:ph sz="half" idx="2"/>
+          </p:nvPr>
+        </p:nvSpPr>
+        <p:spPr/>
+        <p:txBody>
+          <a:bodyPr>
+            <a:normAutofit lnSpcReduction="10000"/>
+          </a:bodyPr>
+          <a:lstStyle/>
+          <a:p>
+            <a:r>
+              <a:rPr lang="de-DE" sz="2400" dirty="0" err="1"/>
+              <a:t>Menues</a:t>
+            </a:r>
+            <a:r>
+              <a:rPr lang="de-DE" sz="2400" dirty="0"/>
+              <a:t> (</a:t>
+            </a:r>
+            <a:r>
+              <a:rPr lang="de-DE" sz="2400" dirty="0" err="1"/>
+              <a:t>Oculus</a:t>
+            </a:r>
+            <a:r>
+              <a:rPr lang="de-DE" sz="2400" dirty="0"/>
+              <a:t>)</a:t>
+            </a:r>
+          </a:p>
+          <a:p>
+            <a:r>
+              <a:rPr lang="de-DE" sz="2400" dirty="0" err="1"/>
+              <a:t>Guesture</a:t>
+            </a:r>
+            <a:r>
+              <a:rPr lang="de-DE" sz="2400" dirty="0"/>
+              <a:t> </a:t>
+            </a:r>
+            <a:r>
+              <a:rPr lang="de-DE" sz="2400" dirty="0" err="1"/>
+              <a:t>control</a:t>
+            </a:r>
+            <a:r>
+              <a:rPr lang="de-DE" sz="2400" dirty="0"/>
+              <a:t> </a:t>
+            </a:r>
+            <a:r>
+              <a:rPr lang="de-DE" sz="2400" dirty="0" err="1"/>
+              <a:t>problems</a:t>
+            </a:r>
+            <a:r>
+              <a:rPr lang="de-DE" sz="2400" dirty="0"/>
+              <a:t> (APIs </a:t>
+            </a:r>
+            <a:r>
+              <a:rPr lang="de-DE" sz="2400" dirty="0" err="1"/>
+              <a:t>for</a:t>
+            </a:r>
+            <a:r>
+              <a:rPr lang="de-DE" sz="2400" dirty="0"/>
+              <a:t> Vive not </a:t>
+            </a:r>
+            <a:r>
+              <a:rPr lang="de-DE" sz="2400" dirty="0" err="1"/>
+              <a:t>tested</a:t>
+            </a:r>
+            <a:r>
+              <a:rPr lang="de-DE" sz="2400" dirty="0"/>
+              <a:t> </a:t>
+            </a:r>
+            <a:r>
+              <a:rPr lang="de-DE" sz="2400" dirty="0" err="1"/>
+              <a:t>yet</a:t>
+            </a:r>
+            <a:r>
+              <a:rPr lang="de-DE" sz="2400" dirty="0"/>
+              <a:t>, </a:t>
+            </a:r>
+            <a:r>
+              <a:rPr lang="de-DE" sz="2400" dirty="0" err="1"/>
+              <a:t>currently</a:t>
+            </a:r>
+            <a:r>
+              <a:rPr lang="de-DE" sz="2400" dirty="0"/>
+              <a:t> </a:t>
+            </a:r>
+            <a:r>
+              <a:rPr lang="de-DE" sz="2400" dirty="0" err="1"/>
+              <a:t>unstable</a:t>
+            </a:r>
+            <a:r>
+              <a:rPr lang="de-DE" sz="2400" dirty="0"/>
+              <a:t> APIs </a:t>
+            </a:r>
+            <a:r>
+              <a:rPr lang="de-DE" sz="2400" dirty="0" err="1"/>
+              <a:t>for</a:t>
+            </a:r>
+            <a:r>
+              <a:rPr lang="de-DE" sz="2400" dirty="0"/>
+              <a:t> Kinect?)</a:t>
+            </a:r>
+          </a:p>
+          <a:p>
+            <a:r>
+              <a:rPr lang="de-DE" sz="2400" dirty="0" err="1"/>
+              <a:t>Suitable</a:t>
+            </a:r>
+            <a:r>
+              <a:rPr lang="de-DE" sz="2400" dirty="0"/>
+              <a:t> </a:t>
+            </a:r>
+            <a:r>
+              <a:rPr lang="de-DE" sz="2400" dirty="0" err="1"/>
+              <a:t>for</a:t>
+            </a:r>
+            <a:r>
+              <a:rPr lang="de-DE" sz="2400" dirty="0"/>
+              <a:t> HS-</a:t>
+            </a:r>
+            <a:r>
+              <a:rPr lang="de-DE" sz="2400" dirty="0" err="1"/>
+              <a:t>Lan</a:t>
+            </a:r>
+            <a:r>
+              <a:rPr lang="de-DE" sz="2400" dirty="0"/>
+              <a:t> </a:t>
+            </a:r>
+            <a:r>
+              <a:rPr lang="de-DE" sz="2400" dirty="0" err="1"/>
+              <a:t>and</a:t>
+            </a:r>
+            <a:r>
+              <a:rPr lang="de-DE" sz="2400" dirty="0"/>
+              <a:t> Open-Lab</a:t>
+            </a:r>
+          </a:p>
+          <a:p>
+            <a:r>
+              <a:rPr lang="de-DE" sz="2400" dirty="0" err="1"/>
+              <a:t>Ofc</a:t>
+            </a:r>
+            <a:r>
+              <a:rPr lang="de-DE" sz="2400" dirty="0"/>
+              <a:t>: </a:t>
+            </a:r>
+            <a:r>
+              <a:rPr lang="de-DE" sz="2400" dirty="0" err="1"/>
+              <a:t>Illness</a:t>
+            </a:r>
+            <a:r>
+              <a:rPr lang="de-DE" sz="2400" dirty="0"/>
+              <a:t> </a:t>
+            </a:r>
+            <a:r>
+              <a:rPr lang="de-DE" sz="2400" dirty="0" err="1"/>
+              <a:t>of</a:t>
+            </a:r>
+            <a:r>
+              <a:rPr lang="de-DE" sz="2400" dirty="0"/>
+              <a:t> Project Members (</a:t>
+            </a:r>
+            <a:r>
+              <a:rPr lang="de-DE" sz="2400" dirty="0" err="1"/>
+              <a:t>workload</a:t>
+            </a:r>
+            <a:r>
+              <a:rPr lang="de-DE" sz="2400" dirty="0"/>
+              <a:t> </a:t>
+            </a:r>
+            <a:r>
+              <a:rPr lang="de-DE" sz="2400" dirty="0" err="1"/>
+              <a:t>balancing</a:t>
+            </a:r>
+            <a:r>
+              <a:rPr lang="de-DE" sz="2400" dirty="0"/>
+              <a:t>)</a:t>
+            </a:r>
+          </a:p>
+          <a:p>
+            <a:pPr>
+              <a:buNone/>
+            </a:pPr>
+            <a:endParaRPr lang="de-DE" sz="2400" dirty="0"/>
+          </a:p>
+        </p:txBody>
+      </p:sp>
+      <p:sp>
+        <p:nvSpPr>
+          <p:cNvPr id="11" name="Foliennummernplatzhalter 10"/>
+          <p:cNvSpPr>
+            <a:spLocks noGrp="1"/>
+          </p:cNvSpPr>
+          <p:nvPr>
+            <p:ph type="sldNum" sz="quarter" idx="12"/>
+          </p:nvPr>
+        </p:nvSpPr>
+        <p:spPr/>
+        <p:txBody>
+          <a:bodyPr/>
+          <a:lstStyle/>
+          <a:p>
+            <a:fld id="{6C6AE60A-B69C-4790-82F7-3882EDF23186}" type="slidenum">
+              <a:rPr lang="de-DE" smtClean="0"/>
+              <a:pPr/>
+              <a:t>21</a:t>
+            </a:fld>
+            <a:endParaRPr lang="de-DE"/>
+          </a:p>
+        </p:txBody>
+      </p:sp>
+    </p:spTree>
+  </p:cSld>
+  <p:clrMapOvr>
+    <a:masterClrMapping/>
+  </p:clrMapOvr>
+</p:sld>
+</file>
+
+<file path=ppt/slides/slide22.xml><?xml version="1.0" encoding="utf-8"?>
+<p:sld xmlns:a="http://schemas.openxmlformats.org/drawingml/2006/main" xmlns:r="http://schemas.openxmlformats.org/officeDocument/2006/relationships" xmlns:p="http://schemas.openxmlformats.org/presentationml/2006/main">
+  <p:cSld>
+    <p:spTree>
+      <p:nvGrpSpPr>
+        <p:cNvPr id="1" name=""/>
+        <p:cNvGrpSpPr/>
+        <p:nvPr/>
+      </p:nvGrpSpPr>
+      <p:grpSpPr>
+        <a:xfrm>
+          <a:off x="0" y="0"/>
+          <a:ext cx="0" cy="0"/>
+          <a:chOff x="0" y="0"/>
+          <a:chExt cx="0" cy="0"/>
+        </a:xfrm>
+      </p:grpSpPr>
+      <p:sp>
+        <p:nvSpPr>
+          <p:cNvPr id="2" name="Titel 1"/>
+          <p:cNvSpPr>
+            <a:spLocks noGrp="1"/>
+          </p:cNvSpPr>
+          <p:nvPr>
+            <p:ph type="title"/>
+          </p:nvPr>
+        </p:nvSpPr>
+        <p:spPr/>
+        <p:txBody>
+          <a:bodyPr>
+            <a:normAutofit/>
+          </a:bodyPr>
+          <a:lstStyle/>
+          <a:p>
+            <a:pPr algn="ctr"/>
+            <a:r>
+              <a:rPr lang="de-DE" dirty="0" err="1"/>
+              <a:t>Github</a:t>
+            </a:r>
+            <a:r>
+              <a:rPr lang="de-DE" dirty="0"/>
+              <a:t> Version </a:t>
+            </a:r>
+            <a:r>
+              <a:rPr lang="de-DE" dirty="0" err="1"/>
+              <a:t>Control</a:t>
+            </a:r>
+            <a:endParaRPr lang="de-DE" dirty="0"/>
+          </a:p>
+        </p:txBody>
+      </p:sp>
+      <p:sp>
+        <p:nvSpPr>
+          <p:cNvPr id="9" name="Inhaltsplatzhalter 8"/>
+          <p:cNvSpPr>
+            <a:spLocks noGrp="1"/>
+          </p:cNvSpPr>
+          <p:nvPr>
+            <p:ph sz="half" idx="1"/>
+          </p:nvPr>
+        </p:nvSpPr>
+        <p:spPr>
+          <a:xfrm>
+            <a:off x="457200" y="1600071"/>
+            <a:ext cx="8219256" cy="3695700"/>
+          </a:xfrm>
+        </p:spPr>
+        <p:txBody>
+          <a:bodyPr>
+            <a:normAutofit/>
+          </a:bodyPr>
+          <a:lstStyle/>
+          <a:p>
+            <a:endParaRPr lang="de-DE" dirty="0">
+              <a:hlinkClick r:id="rId2"/>
+            </a:endParaRPr>
+          </a:p>
+          <a:p>
+            <a:r>
+              <a:rPr lang="de-DE" dirty="0"/>
+              <a:t>Old </a:t>
+            </a:r>
+            <a:r>
+              <a:rPr lang="de-DE" dirty="0" err="1"/>
+              <a:t>project</a:t>
+            </a:r>
+            <a:r>
+              <a:rPr lang="de-DE" dirty="0"/>
+              <a:t> </a:t>
+            </a:r>
+            <a:r>
+              <a:rPr lang="de-DE" dirty="0" err="1"/>
+              <a:t>source</a:t>
+            </a:r>
+            <a:endParaRPr lang="de-DE" dirty="0">
+              <a:hlinkClick r:id="rId2"/>
+            </a:endParaRPr>
+          </a:p>
+          <a:p>
+            <a:pPr algn="ctr">
+              <a:buNone/>
+            </a:pPr>
+            <a:r>
+              <a:rPr lang="de-DE" dirty="0">
+                <a:hlinkClick r:id="rId3"/>
+              </a:rPr>
+              <a:t>https://github.com/andreasdietze/Rift-Wingsuit.git</a:t>
+            </a:r>
+            <a:endParaRPr lang="de-DE" dirty="0"/>
+          </a:p>
+          <a:p>
+            <a:pPr algn="ctr">
+              <a:buNone/>
+            </a:pPr>
+            <a:endParaRPr lang="de-DE" dirty="0"/>
+          </a:p>
+          <a:p>
+            <a:r>
+              <a:rPr lang="de-DE" dirty="0"/>
+              <a:t>New </a:t>
+            </a:r>
+            <a:r>
+              <a:rPr lang="de-DE" dirty="0" err="1"/>
+              <a:t>project</a:t>
+            </a:r>
+            <a:r>
+              <a:rPr lang="de-DE" dirty="0"/>
+              <a:t> </a:t>
+            </a:r>
+            <a:r>
+              <a:rPr lang="de-DE" dirty="0" err="1"/>
+              <a:t>source</a:t>
+            </a:r>
+            <a:endParaRPr lang="de-DE" dirty="0"/>
+          </a:p>
+          <a:p>
+            <a:pPr algn="ctr">
+              <a:buNone/>
+            </a:pPr>
+            <a:r>
+              <a:rPr lang="de-DE" dirty="0">
+                <a:hlinkClick r:id="rId4"/>
+              </a:rPr>
+              <a:t>https://github.com/andreasdietze/Rift-WingsuitV2.git</a:t>
+            </a:r>
+            <a:endParaRPr lang="de-DE" dirty="0"/>
+          </a:p>
+          <a:p>
+            <a:endParaRPr lang="de-DE" dirty="0"/>
+          </a:p>
+        </p:txBody>
+      </p:sp>
+      <p:sp>
+        <p:nvSpPr>
+          <p:cNvPr id="11" name="Foliennummernplatzhalter 10"/>
+          <p:cNvSpPr>
+            <a:spLocks noGrp="1"/>
+          </p:cNvSpPr>
+          <p:nvPr>
+            <p:ph type="sldNum" sz="quarter" idx="12"/>
+          </p:nvPr>
+        </p:nvSpPr>
+        <p:spPr/>
+        <p:txBody>
+          <a:bodyPr/>
+          <a:lstStyle/>
+          <a:p>
+            <a:fld id="{6C6AE60A-B69C-4790-82F7-3882EDF23186}" type="slidenum">
+              <a:rPr lang="de-DE" smtClean="0"/>
+              <a:pPr/>
+              <a:t>22</a:t>
+            </a:fld>
+            <a:endParaRPr lang="de-DE"/>
+          </a:p>
+        </p:txBody>
+      </p:sp>
+    </p:spTree>
+  </p:cSld>
+  <p:clrMapOvr>
+    <a:masterClrMapping/>
+  </p:clrMapOvr>
+</p:sld>
+</file>
+
+<file path=ppt/slides/slide23.xml><?xml version="1.0" encoding="utf-8"?>
+<p:sld xmlns:a="http://schemas.openxmlformats.org/drawingml/2006/main" xmlns:r="http://schemas.openxmlformats.org/officeDocument/2006/relationships" xmlns:p="http://schemas.openxmlformats.org/presentationml/2006/main">
+  <p:cSld>
+    <p:spTree>
+      <p:nvGrpSpPr>
+        <p:cNvPr id="1" name=""/>
+        <p:cNvGrpSpPr/>
+        <p:nvPr/>
+      </p:nvGrpSpPr>
+      <p:grpSpPr>
+        <a:xfrm>
+          <a:off x="0" y="0"/>
+          <a:ext cx="0" cy="0"/>
+          <a:chOff x="0" y="0"/>
+          <a:chExt cx="0" cy="0"/>
+        </a:xfrm>
+      </p:grpSpPr>
+      <p:sp>
+        <p:nvSpPr>
           <p:cNvPr id="6" name="Titel 5"/>
           <p:cNvSpPr>
             <a:spLocks noGrp="1"/>
@@ -9213,7 +10593,7 @@
             <a:fld id="{6C6AE60A-B69C-4790-82F7-3882EDF23186}" type="slidenum">
               <a:rPr lang="de-DE" smtClean="0"/>
               <a:pPr/>
-              <a:t>20</a:t>
+              <a:t>23</a:t>
             </a:fld>
             <a:endParaRPr lang="de-DE"/>
           </a:p>
@@ -9832,7 +11212,7 @@
           <a:blip r:embed="rId2" cstate="print">
             <a:extLst>
               <a:ext uri="{28A0092B-C50C-407E-A947-70E740481C1C}">
-                <a14:useLocalDpi xmlns:a14="http://schemas.microsoft.com/office/drawing/2010/main" val="0"/>
+                <a14:useLocalDpi xmlns:a14="http://schemas.microsoft.com/office/drawing/2010/main" xmlns="" val="0"/>
               </a:ext>
             </a:extLst>
           </a:blip>
@@ -9850,7 +11230,7 @@
     </p:spTree>
     <p:extLst>
       <p:ext uri="{BB962C8B-B14F-4D97-AF65-F5344CB8AC3E}">
-        <p14:creationId xmlns:p14="http://schemas.microsoft.com/office/powerpoint/2010/main" val="3486165658"/>
+        <p14:creationId xmlns:p14="http://schemas.microsoft.com/office/powerpoint/2010/main" xmlns="" val="3486165658"/>
       </p:ext>
     </p:extLst>
   </p:cSld>

</xml_diff>

<commit_message>
Added proposals for the Milestones/work fields
</commit_message>
<xml_diff>
--- a/Präsentationen/Projektpräsentation/Project proposal Rift Wingsuit V2.pptx
+++ b/Präsentationen/Projektpräsentation/Project proposal Rift Wingsuit V2.pptx
@@ -5,7 +5,7 @@
     <p:sldMasterId id="2147483660" r:id="rId1"/>
   </p:sldMasterIdLst>
   <p:notesMasterIdLst>
-    <p:notesMasterId r:id="rId25"/>
+    <p:notesMasterId r:id="rId28"/>
   </p:notesMasterIdLst>
   <p:sldIdLst>
     <p:sldId id="272" r:id="rId2"/>
@@ -21,16 +21,19 @@
     <p:sldId id="286" r:id="rId12"/>
     <p:sldId id="317" r:id="rId13"/>
     <p:sldId id="321" r:id="rId14"/>
-    <p:sldId id="314" r:id="rId15"/>
-    <p:sldId id="318" r:id="rId16"/>
-    <p:sldId id="322" r:id="rId17"/>
-    <p:sldId id="310" r:id="rId18"/>
-    <p:sldId id="315" r:id="rId19"/>
-    <p:sldId id="319" r:id="rId20"/>
-    <p:sldId id="320" r:id="rId21"/>
-    <p:sldId id="270" r:id="rId22"/>
-    <p:sldId id="280" r:id="rId23"/>
-    <p:sldId id="279" r:id="rId24"/>
+    <p:sldId id="323" r:id="rId15"/>
+    <p:sldId id="314" r:id="rId16"/>
+    <p:sldId id="318" r:id="rId17"/>
+    <p:sldId id="322" r:id="rId18"/>
+    <p:sldId id="324" r:id="rId19"/>
+    <p:sldId id="310" r:id="rId20"/>
+    <p:sldId id="315" r:id="rId21"/>
+    <p:sldId id="319" r:id="rId22"/>
+    <p:sldId id="320" r:id="rId23"/>
+    <p:sldId id="325" r:id="rId24"/>
+    <p:sldId id="270" r:id="rId25"/>
+    <p:sldId id="280" r:id="rId26"/>
+    <p:sldId id="279" r:id="rId27"/>
   </p:sldIdLst>
   <p:sldSz cx="9144000" cy="5715000" type="screen16x10"/>
   <p:notesSz cx="6858000" cy="9144000"/>
@@ -131,7 +134,7 @@
   </p:defaultTextStyle>
   <p:extLst>
     <p:ext uri="{EFAFB233-063F-42B5-8137-9DF3F51BA10A}">
-      <p15:sldGuideLst xmlns:p15="http://schemas.microsoft.com/office/powerpoint/2012/main" xmlns="">
+      <p15:sldGuideLst xmlns:p15="http://schemas.microsoft.com/office/powerpoint/2012/main">
         <p15:guide id="1" orient="horz" pos="1800">
           <p15:clr>
             <a:srgbClr val="A4A3A4"/>
@@ -399,6 +402,11 @@
         </p:txBody>
       </p:sp>
     </p:spTree>
+    <p:extLst>
+      <p:ext uri="{BB962C8B-B14F-4D97-AF65-F5344CB8AC3E}">
+        <p14:creationId xmlns:p14="http://schemas.microsoft.com/office/powerpoint/2010/main" val="1727503161"/>
+      </p:ext>
+    </p:extLst>
   </p:cSld>
   <p:clrMap bg1="lt1" tx1="dk1" bg2="lt2" tx2="dk2" accent1="accent1" accent2="accent2" accent3="accent3" accent4="accent4" accent5="accent5" accent6="accent6" hlink="hlink" folHlink="folHlink"/>
   <p:notesStyle>
@@ -579,6 +587,96 @@
         </p:txBody>
       </p:sp>
     </p:spTree>
+    <p:extLst>
+      <p:ext uri="{BB962C8B-B14F-4D97-AF65-F5344CB8AC3E}">
+        <p14:creationId xmlns:p14="http://schemas.microsoft.com/office/powerpoint/2010/main" val="592270510"/>
+      </p:ext>
+    </p:extLst>
+  </p:cSld>
+  <p:clrMapOvr>
+    <a:masterClrMapping/>
+  </p:clrMapOvr>
+</p:notes>
+</file>
+
+<file path=ppt/notesSlides/notesSlide2.xml><?xml version="1.0" encoding="utf-8"?>
+<p:notes xmlns:a="http://schemas.openxmlformats.org/drawingml/2006/main" xmlns:r="http://schemas.openxmlformats.org/officeDocument/2006/relationships" xmlns:p="http://schemas.openxmlformats.org/presentationml/2006/main">
+  <p:cSld>
+    <p:spTree>
+      <p:nvGrpSpPr>
+        <p:cNvPr id="1" name=""/>
+        <p:cNvGrpSpPr/>
+        <p:nvPr/>
+      </p:nvGrpSpPr>
+      <p:grpSpPr>
+        <a:xfrm>
+          <a:off x="0" y="0"/>
+          <a:ext cx="0" cy="0"/>
+          <a:chOff x="0" y="0"/>
+          <a:chExt cx="0" cy="0"/>
+        </a:xfrm>
+      </p:grpSpPr>
+      <p:sp>
+        <p:nvSpPr>
+          <p:cNvPr id="2" name="Folienbildplatzhalter 1"/>
+          <p:cNvSpPr>
+            <a:spLocks noGrp="1" noRot="1" noChangeAspect="1"/>
+          </p:cNvSpPr>
+          <p:nvPr>
+            <p:ph type="sldImg"/>
+          </p:nvPr>
+        </p:nvSpPr>
+        <p:spPr/>
+      </p:sp>
+      <p:sp>
+        <p:nvSpPr>
+          <p:cNvPr id="3" name="Notizenplatzhalter 2"/>
+          <p:cNvSpPr>
+            <a:spLocks noGrp="1"/>
+          </p:cNvSpPr>
+          <p:nvPr>
+            <p:ph type="body" idx="1"/>
+          </p:nvPr>
+        </p:nvSpPr>
+        <p:spPr/>
+        <p:txBody>
+          <a:bodyPr/>
+          <a:lstStyle/>
+          <a:p>
+            <a:endParaRPr lang="de-DE" dirty="0"/>
+          </a:p>
+        </p:txBody>
+      </p:sp>
+      <p:sp>
+        <p:nvSpPr>
+          <p:cNvPr id="4" name="Foliennummernplatzhalter 3"/>
+          <p:cNvSpPr>
+            <a:spLocks noGrp="1"/>
+          </p:cNvSpPr>
+          <p:nvPr>
+            <p:ph type="sldNum" sz="quarter" idx="10"/>
+          </p:nvPr>
+        </p:nvSpPr>
+        <p:spPr/>
+        <p:txBody>
+          <a:bodyPr/>
+          <a:lstStyle/>
+          <a:p>
+            <a:fld id="{4908E361-B94C-4A25-AE9E-7E0532BAF813}" type="slidenum">
+              <a:rPr lang="de-DE" smtClean="0"/>
+              <a:pPr/>
+              <a:t>23</a:t>
+            </a:fld>
+            <a:endParaRPr lang="de-DE"/>
+          </a:p>
+        </p:txBody>
+      </p:sp>
+    </p:spTree>
+    <p:extLst>
+      <p:ext uri="{BB962C8B-B14F-4D97-AF65-F5344CB8AC3E}">
+        <p14:creationId xmlns:p14="http://schemas.microsoft.com/office/powerpoint/2010/main" val="2156963838"/>
+      </p:ext>
+    </p:extLst>
   </p:cSld>
   <p:clrMapOvr>
     <a:masterClrMapping/>
@@ -4833,8 +4931,13 @@
             <a:pPr lvl="1"/>
             <a:r>
               <a:rPr lang="de-DE" dirty="0"/>
-              <a:t>Andreas Dietze (wer?)</a:t>
-            </a:r>
+              <a:t>Andreas Dietze </a:t>
+            </a:r>
+            <a:r>
+              <a:rPr lang="de-DE" dirty="0" smtClean="0"/>
+              <a:t>(S. Nickel)</a:t>
+            </a:r>
+            <a:endParaRPr lang="de-DE" dirty="0"/>
           </a:p>
           <a:p>
             <a:r>
@@ -4846,9 +4949,10 @@
           <a:p>
             <a:pPr lvl="1"/>
             <a:r>
-              <a:rPr lang="de-DE" dirty="0"/>
-              <a:t>Andreas Dietze (S. Nickel)</a:t>
-            </a:r>
+              <a:rPr lang="de-DE" dirty="0" smtClean="0"/>
+              <a:t>Sebastian Nickel (A. Dietze)</a:t>
+            </a:r>
+            <a:endParaRPr lang="de-DE" dirty="0"/>
           </a:p>
           <a:p>
             <a:r>
@@ -4903,9 +5007,10 @@
           <a:p>
             <a:pPr lvl="1"/>
             <a:r>
-              <a:rPr lang="de-DE" dirty="0"/>
-              <a:t>Sebastian Nickel (J.K. ; M.S.)</a:t>
-            </a:r>
+              <a:rPr lang="de-DE" dirty="0" smtClean="0"/>
+              <a:t>Manuel Schmitt (J.K., S.N)</a:t>
+            </a:r>
+            <a:endParaRPr lang="de-DE" dirty="0"/>
           </a:p>
           <a:p>
             <a:pPr>
@@ -4978,8 +5083,13 @@
             <a:pPr lvl="1"/>
             <a:r>
               <a:rPr lang="de-DE" dirty="0"/>
-              <a:t>Manuel Schmitt (wer?)</a:t>
-            </a:r>
+              <a:t>Manuel Schmitt </a:t>
+            </a:r>
+            <a:r>
+              <a:rPr lang="de-DE" dirty="0" smtClean="0"/>
+              <a:t>(S. Nickel)</a:t>
+            </a:r>
+            <a:endParaRPr lang="de-DE" dirty="0"/>
           </a:p>
           <a:p>
             <a:r>
@@ -5229,14 +5339,14 @@
                 <a:gridCol w="1584176">
                   <a:extLst>
                     <a:ext uri="{9D8B030D-6E8A-4147-A177-3AD203B41FA5}">
-                      <a16:colId xmlns:a16="http://schemas.microsoft.com/office/drawing/2014/main" xmlns="" val="20000"/>
+                      <a16:colId xmlns="" xmlns:a16="http://schemas.microsoft.com/office/drawing/2014/main" val="20000"/>
                     </a:ext>
                   </a:extLst>
                 </a:gridCol>
                 <a:gridCol w="6480721">
                   <a:extLst>
                     <a:ext uri="{9D8B030D-6E8A-4147-A177-3AD203B41FA5}">
-                      <a16:colId xmlns:a16="http://schemas.microsoft.com/office/drawing/2014/main" xmlns="" val="20001"/>
+                      <a16:colId xmlns="" xmlns:a16="http://schemas.microsoft.com/office/drawing/2014/main" val="20001"/>
                     </a:ext>
                   </a:extLst>
                 </a:gridCol>
@@ -5278,7 +5388,7 @@
                 </a:tc>
                 <a:extLst>
                   <a:ext uri="{0D108BD9-81ED-4DB2-BD59-A6C34878D82A}">
-                    <a16:rowId xmlns:a16="http://schemas.microsoft.com/office/drawing/2014/main" xmlns="" val="10000"/>
+                    <a16:rowId xmlns="" xmlns:a16="http://schemas.microsoft.com/office/drawing/2014/main" val="10000"/>
                   </a:ext>
                 </a:extLst>
               </a:tr>
@@ -5458,7 +5568,7 @@
                 </a:tc>
                 <a:extLst>
                   <a:ext uri="{0D108BD9-81ED-4DB2-BD59-A6C34878D82A}">
-                    <a16:rowId xmlns:a16="http://schemas.microsoft.com/office/drawing/2014/main" xmlns="" val="10001"/>
+                    <a16:rowId xmlns="" xmlns:a16="http://schemas.microsoft.com/office/drawing/2014/main" val="10001"/>
                   </a:ext>
                 </a:extLst>
               </a:tr>
@@ -5598,7 +5708,7 @@
                 </a:tc>
                 <a:extLst>
                   <a:ext uri="{0D108BD9-81ED-4DB2-BD59-A6C34878D82A}">
-                    <a16:rowId xmlns:a16="http://schemas.microsoft.com/office/drawing/2014/main" xmlns="" val="10002"/>
+                    <a16:rowId xmlns="" xmlns:a16="http://schemas.microsoft.com/office/drawing/2014/main" val="10002"/>
                   </a:ext>
                 </a:extLst>
               </a:tr>
@@ -5718,7 +5828,7 @@
                 </a:tc>
                 <a:extLst>
                   <a:ext uri="{0D108BD9-81ED-4DB2-BD59-A6C34878D82A}">
-                    <a16:rowId xmlns:a16="http://schemas.microsoft.com/office/drawing/2014/main" xmlns="" val="10003"/>
+                    <a16:rowId xmlns="" xmlns:a16="http://schemas.microsoft.com/office/drawing/2014/main" val="10003"/>
                   </a:ext>
                 </a:extLst>
               </a:tr>
@@ -5851,7 +5961,7 @@
           <p:nvPr>
             <p:extLst>
               <p:ext uri="{D42A27DB-BD31-4B8C-83A1-F6EECF244321}">
-                <p14:modId xmlns:p14="http://schemas.microsoft.com/office/powerpoint/2010/main" xmlns="" val="62862726"/>
+                <p14:modId xmlns:p14="http://schemas.microsoft.com/office/powerpoint/2010/main" val="62862726"/>
               </p:ext>
             </p:extLst>
           </p:nvPr>
@@ -5870,14 +5980,14 @@
                 <a:gridCol w="1584176">
                   <a:extLst>
                     <a:ext uri="{9D8B030D-6E8A-4147-A177-3AD203B41FA5}">
-                      <a16:colId xmlns:a16="http://schemas.microsoft.com/office/drawing/2014/main" xmlns="" val="20000"/>
+                      <a16:colId xmlns="" xmlns:a16="http://schemas.microsoft.com/office/drawing/2014/main" val="20000"/>
                     </a:ext>
                   </a:extLst>
                 </a:gridCol>
                 <a:gridCol w="6480721">
                   <a:extLst>
                     <a:ext uri="{9D8B030D-6E8A-4147-A177-3AD203B41FA5}">
-                      <a16:colId xmlns:a16="http://schemas.microsoft.com/office/drawing/2014/main" xmlns="" val="20001"/>
+                      <a16:colId xmlns="" xmlns:a16="http://schemas.microsoft.com/office/drawing/2014/main" val="20001"/>
                     </a:ext>
                   </a:extLst>
                 </a:gridCol>
@@ -5914,7 +6024,7 @@
                 </a:tc>
                 <a:extLst>
                   <a:ext uri="{0D108BD9-81ED-4DB2-BD59-A6C34878D82A}">
-                    <a16:rowId xmlns:a16="http://schemas.microsoft.com/office/drawing/2014/main" xmlns="" val="10000"/>
+                    <a16:rowId xmlns="" xmlns:a16="http://schemas.microsoft.com/office/drawing/2014/main" val="10000"/>
                   </a:ext>
                 </a:extLst>
               </a:tr>
@@ -5967,7 +6077,7 @@
                 </a:tc>
                 <a:extLst>
                   <a:ext uri="{0D108BD9-81ED-4DB2-BD59-A6C34878D82A}">
-                    <a16:rowId xmlns:a16="http://schemas.microsoft.com/office/drawing/2014/main" xmlns="" val="10001"/>
+                    <a16:rowId xmlns="" xmlns:a16="http://schemas.microsoft.com/office/drawing/2014/main" val="10001"/>
                   </a:ext>
                 </a:extLst>
               </a:tr>
@@ -6044,7 +6154,7 @@
                 </a:tc>
                 <a:extLst>
                   <a:ext uri="{0D108BD9-81ED-4DB2-BD59-A6C34878D82A}">
-                    <a16:rowId xmlns:a16="http://schemas.microsoft.com/office/drawing/2014/main" xmlns="" val="10002"/>
+                    <a16:rowId xmlns="" xmlns:a16="http://schemas.microsoft.com/office/drawing/2014/main" val="10002"/>
                   </a:ext>
                 </a:extLst>
               </a:tr>
@@ -6087,7 +6197,7 @@
                 </a:tc>
                 <a:extLst>
                   <a:ext uri="{0D108BD9-81ED-4DB2-BD59-A6C34878D82A}">
-                    <a16:rowId xmlns:a16="http://schemas.microsoft.com/office/drawing/2014/main" xmlns="" val="10003"/>
+                    <a16:rowId xmlns="" xmlns:a16="http://schemas.microsoft.com/office/drawing/2014/main" val="10003"/>
                   </a:ext>
                 </a:extLst>
               </a:tr>
@@ -6098,7 +6208,7 @@
     </p:spTree>
     <p:extLst>
       <p:ext uri="{BB962C8B-B14F-4D97-AF65-F5344CB8AC3E}">
-        <p14:creationId xmlns:p14="http://schemas.microsoft.com/office/powerpoint/2010/main" xmlns="" val="401768939"/>
+        <p14:creationId xmlns:p14="http://schemas.microsoft.com/office/powerpoint/2010/main" val="401768939"/>
       </p:ext>
     </p:extLst>
   </p:cSld>
@@ -6225,7 +6335,7 @@
           <p:nvPr>
             <p:extLst>
               <p:ext uri="{D42A27DB-BD31-4B8C-83A1-F6EECF244321}">
-                <p14:modId xmlns:p14="http://schemas.microsoft.com/office/powerpoint/2010/main" xmlns="" val="62862726"/>
+                <p14:modId xmlns:p14="http://schemas.microsoft.com/office/powerpoint/2010/main" val="62862726"/>
               </p:ext>
             </p:extLst>
           </p:nvPr>
@@ -6244,14 +6354,14 @@
                 <a:gridCol w="1584176">
                   <a:extLst>
                     <a:ext uri="{9D8B030D-6E8A-4147-A177-3AD203B41FA5}">
-                      <a16:colId xmlns:a16="http://schemas.microsoft.com/office/drawing/2014/main" xmlns="" val="20000"/>
+                      <a16:colId xmlns="" xmlns:a16="http://schemas.microsoft.com/office/drawing/2014/main" val="20000"/>
                     </a:ext>
                   </a:extLst>
                 </a:gridCol>
                 <a:gridCol w="6480721">
                   <a:extLst>
                     <a:ext uri="{9D8B030D-6E8A-4147-A177-3AD203B41FA5}">
-                      <a16:colId xmlns:a16="http://schemas.microsoft.com/office/drawing/2014/main" xmlns="" val="20001"/>
+                      <a16:colId xmlns="" xmlns:a16="http://schemas.microsoft.com/office/drawing/2014/main" val="20001"/>
                     </a:ext>
                   </a:extLst>
                 </a:gridCol>
@@ -6288,7 +6398,7 @@
                 </a:tc>
                 <a:extLst>
                   <a:ext uri="{0D108BD9-81ED-4DB2-BD59-A6C34878D82A}">
-                    <a16:rowId xmlns:a16="http://schemas.microsoft.com/office/drawing/2014/main" xmlns="" val="10000"/>
+                    <a16:rowId xmlns="" xmlns:a16="http://schemas.microsoft.com/office/drawing/2014/main" val="10000"/>
                   </a:ext>
                 </a:extLst>
               </a:tr>
@@ -6331,7 +6441,7 @@
                 </a:tc>
                 <a:extLst>
                   <a:ext uri="{0D108BD9-81ED-4DB2-BD59-A6C34878D82A}">
-                    <a16:rowId xmlns:a16="http://schemas.microsoft.com/office/drawing/2014/main" xmlns="" val="10001"/>
+                    <a16:rowId xmlns="" xmlns:a16="http://schemas.microsoft.com/office/drawing/2014/main" val="10001"/>
                   </a:ext>
                 </a:extLst>
               </a:tr>
@@ -6430,7 +6540,7 @@
                 </a:tc>
                 <a:extLst>
                   <a:ext uri="{0D108BD9-81ED-4DB2-BD59-A6C34878D82A}">
-                    <a16:rowId xmlns:a16="http://schemas.microsoft.com/office/drawing/2014/main" xmlns="" val="10002"/>
+                    <a16:rowId xmlns="" xmlns:a16="http://schemas.microsoft.com/office/drawing/2014/main" val="10002"/>
                   </a:ext>
                 </a:extLst>
               </a:tr>
@@ -6477,7 +6587,7 @@
                 </a:tc>
                 <a:extLst>
                   <a:ext uri="{0D108BD9-81ED-4DB2-BD59-A6C34878D82A}">
-                    <a16:rowId xmlns:a16="http://schemas.microsoft.com/office/drawing/2014/main" xmlns="" val="10003"/>
+                    <a16:rowId xmlns="" xmlns:a16="http://schemas.microsoft.com/office/drawing/2014/main" val="10003"/>
                   </a:ext>
                 </a:extLst>
               </a:tr>
@@ -6488,7 +6598,7 @@
     </p:spTree>
     <p:extLst>
       <p:ext uri="{BB962C8B-B14F-4D97-AF65-F5344CB8AC3E}">
-        <p14:creationId xmlns:p14="http://schemas.microsoft.com/office/powerpoint/2010/main" xmlns="" val="401768939"/>
+        <p14:creationId xmlns:p14="http://schemas.microsoft.com/office/powerpoint/2010/main" val="401768939"/>
       </p:ext>
     </p:extLst>
   </p:cSld>
@@ -6547,7 +6657,7 @@
                   <a:srgbClr val="FF0000"/>
                 </a:solidFill>
               </a:rPr>
-              <a:t> 2</a:t>
+              <a:t> 1</a:t>
             </a:r>
           </a:p>
         </p:txBody>
@@ -6601,6 +6711,457 @@
               <a:rPr lang="de-DE" smtClean="0"/>
               <a:pPr/>
               <a:t>14</a:t>
+            </a:fld>
+            <a:endParaRPr lang="de-DE"/>
+          </a:p>
+        </p:txBody>
+      </p:sp>
+      <p:graphicFrame>
+        <p:nvGraphicFramePr>
+          <p:cNvPr id="8" name="Tabelle 7"/>
+          <p:cNvGraphicFramePr>
+            <a:graphicFrameLocks noGrp="1"/>
+          </p:cNvGraphicFramePr>
+          <p:nvPr>
+            <p:extLst>
+              <p:ext uri="{D42A27DB-BD31-4B8C-83A1-F6EECF244321}">
+                <p14:modId xmlns:p14="http://schemas.microsoft.com/office/powerpoint/2010/main" val="2500517179"/>
+              </p:ext>
+            </p:extLst>
+          </p:nvPr>
+        </p:nvGraphicFramePr>
+        <p:xfrm>
+          <a:off x="539552" y="1849388"/>
+          <a:ext cx="8064897" cy="1483360"/>
+        </p:xfrm>
+        <a:graphic>
+          <a:graphicData uri="http://schemas.openxmlformats.org/drawingml/2006/table">
+            <a:tbl>
+              <a:tblPr firstRow="1" bandRow="1">
+                <a:tableStyleId>{5C22544A-7EE6-4342-B048-85BDC9FD1C3A}</a:tableStyleId>
+              </a:tblPr>
+              <a:tblGrid>
+                <a:gridCol w="1584176">
+                  <a:extLst>
+                    <a:ext uri="{9D8B030D-6E8A-4147-A177-3AD203B41FA5}">
+                      <a16:colId xmlns="" xmlns:a16="http://schemas.microsoft.com/office/drawing/2014/main" val="20000"/>
+                    </a:ext>
+                  </a:extLst>
+                </a:gridCol>
+                <a:gridCol w="6480721">
+                  <a:extLst>
+                    <a:ext uri="{9D8B030D-6E8A-4147-A177-3AD203B41FA5}">
+                      <a16:colId xmlns="" xmlns:a16="http://schemas.microsoft.com/office/drawing/2014/main" val="20001"/>
+                    </a:ext>
+                  </a:extLst>
+                </a:gridCol>
+              </a:tblGrid>
+              <a:tr h="370840">
+                <a:tc>
+                  <a:txBody>
+                    <a:bodyPr/>
+                    <a:lstStyle/>
+                    <a:p>
+                      <a:pPr algn="ctr"/>
+                      <a:r>
+                        <a:rPr lang="de-DE" sz="1800" dirty="0" err="1"/>
+                        <a:t>Week</a:t>
+                      </a:r>
+                      <a:endParaRPr lang="de-DE" sz="1800" dirty="0"/>
+                    </a:p>
+                  </a:txBody>
+                  <a:tcPr/>
+                </a:tc>
+                <a:tc>
+                  <a:txBody>
+                    <a:bodyPr/>
+                    <a:lstStyle/>
+                    <a:p>
+                      <a:pPr algn="ctr"/>
+                      <a:r>
+                        <a:rPr lang="de-DE" sz="1800" dirty="0" smtClean="0"/>
+                        <a:t>Sebastian Nickel</a:t>
+                      </a:r>
+                      <a:endParaRPr lang="de-DE" sz="1800" dirty="0" smtClean="0"/>
+                    </a:p>
+                  </a:txBody>
+                  <a:tcPr/>
+                </a:tc>
+                <a:extLst>
+                  <a:ext uri="{0D108BD9-81ED-4DB2-BD59-A6C34878D82A}">
+                    <a16:rowId xmlns="" xmlns:a16="http://schemas.microsoft.com/office/drawing/2014/main" val="10000"/>
+                  </a:ext>
+                </a:extLst>
+              </a:tr>
+              <a:tr h="370840">
+                <a:tc>
+                  <a:txBody>
+                    <a:bodyPr/>
+                    <a:lstStyle/>
+                    <a:p>
+                      <a:pPr algn="l"/>
+                      <a:r>
+                        <a:rPr lang="de-DE" sz="1800" dirty="0"/>
+                        <a:t>05.12 – 05.19</a:t>
+                      </a:r>
+                    </a:p>
+                  </a:txBody>
+                  <a:tcPr/>
+                </a:tc>
+                <a:tc>
+                  <a:txBody>
+                    <a:bodyPr/>
+                    <a:lstStyle/>
+                    <a:p>
+                      <a:pPr lvl="0">
+                        <a:buFont typeface="Arial" pitchFamily="34" charset="0"/>
+                        <a:buChar char="•"/>
+                      </a:pPr>
+                      <a:r>
+                        <a:rPr lang="de-DE" sz="1800" dirty="0"/>
+                        <a:t> </a:t>
+                      </a:r>
+                      <a:r>
+                        <a:rPr lang="de-DE" sz="1800" dirty="0" err="1" smtClean="0"/>
+                        <a:t>Raw</a:t>
+                      </a:r>
+                      <a:r>
+                        <a:rPr lang="de-DE" sz="1800" dirty="0" smtClean="0"/>
+                        <a:t> </a:t>
+                      </a:r>
+                      <a:r>
+                        <a:rPr lang="de-DE" sz="1800" dirty="0" err="1" smtClean="0"/>
+                        <a:t>comprehension</a:t>
+                      </a:r>
+                      <a:r>
+                        <a:rPr lang="de-DE" sz="1800" baseline="0" dirty="0" smtClean="0"/>
+                        <a:t> </a:t>
+                      </a:r>
+                      <a:r>
+                        <a:rPr lang="de-DE" sz="1800" baseline="0" dirty="0" err="1" smtClean="0"/>
+                        <a:t>of</a:t>
+                      </a:r>
+                      <a:r>
+                        <a:rPr lang="de-DE" sz="1800" baseline="0" dirty="0" smtClean="0"/>
+                        <a:t> </a:t>
+                      </a:r>
+                      <a:r>
+                        <a:rPr lang="de-DE" sz="1800" baseline="0" dirty="0" err="1" smtClean="0"/>
+                        <a:t>the</a:t>
+                      </a:r>
+                      <a:r>
+                        <a:rPr lang="de-DE" sz="1800" baseline="0" dirty="0" smtClean="0"/>
+                        <a:t> </a:t>
+                      </a:r>
+                      <a:r>
+                        <a:rPr lang="de-DE" sz="1800" baseline="0" dirty="0" err="1" smtClean="0"/>
+                        <a:t>laws</a:t>
+                      </a:r>
+                      <a:r>
+                        <a:rPr lang="de-DE" sz="1800" baseline="0" dirty="0" smtClean="0"/>
+                        <a:t> </a:t>
+                      </a:r>
+                      <a:r>
+                        <a:rPr lang="de-DE" sz="1800" baseline="0" dirty="0" err="1" smtClean="0"/>
+                        <a:t>of</a:t>
+                      </a:r>
+                      <a:r>
+                        <a:rPr lang="de-DE" sz="1800" baseline="0" dirty="0" smtClean="0"/>
+                        <a:t> </a:t>
+                      </a:r>
+                      <a:r>
+                        <a:rPr lang="de-DE" sz="1800" baseline="0" dirty="0" err="1" smtClean="0"/>
+                        <a:t>aerodynamics</a:t>
+                      </a:r>
+                      <a:endParaRPr lang="en-US" sz="1800" dirty="0"/>
+                    </a:p>
+                  </a:txBody>
+                  <a:tcPr/>
+                </a:tc>
+                <a:extLst>
+                  <a:ext uri="{0D108BD9-81ED-4DB2-BD59-A6C34878D82A}">
+                    <a16:rowId xmlns="" xmlns:a16="http://schemas.microsoft.com/office/drawing/2014/main" val="10001"/>
+                  </a:ext>
+                </a:extLst>
+              </a:tr>
+              <a:tr h="370840">
+                <a:tc>
+                  <a:txBody>
+                    <a:bodyPr/>
+                    <a:lstStyle/>
+                    <a:p>
+                      <a:pPr algn="l"/>
+                      <a:r>
+                        <a:rPr lang="de-DE" sz="1800" dirty="0"/>
+                        <a:t>05.19 – 05.26</a:t>
+                      </a:r>
+                    </a:p>
+                  </a:txBody>
+                  <a:tcPr/>
+                </a:tc>
+                <a:tc>
+                  <a:txBody>
+                    <a:bodyPr/>
+                    <a:lstStyle/>
+                    <a:p>
+                      <a:pPr lvl="0">
+                        <a:buFont typeface="Arial" pitchFamily="34" charset="0"/>
+                        <a:buChar char="•"/>
+                      </a:pPr>
+                      <a:r>
+                        <a:rPr lang="de-DE" sz="1800" dirty="0"/>
+                        <a:t> </a:t>
+                      </a:r>
+                      <a:r>
+                        <a:rPr lang="de-DE" sz="1800" dirty="0" err="1" smtClean="0"/>
+                        <a:t>Prototyping</a:t>
+                      </a:r>
+                      <a:r>
+                        <a:rPr lang="de-DE" sz="1800" baseline="0" dirty="0" smtClean="0"/>
+                        <a:t> </a:t>
+                      </a:r>
+                      <a:r>
+                        <a:rPr lang="de-DE" sz="1800" baseline="0" dirty="0" err="1" smtClean="0"/>
+                        <a:t>first</a:t>
+                      </a:r>
+                      <a:r>
+                        <a:rPr lang="de-DE" sz="1800" baseline="0" dirty="0" smtClean="0"/>
+                        <a:t> </a:t>
+                      </a:r>
+                      <a:r>
+                        <a:rPr lang="de-DE" sz="1800" baseline="0" dirty="0" err="1" smtClean="0"/>
+                        <a:t>aerodynamic</a:t>
+                      </a:r>
+                      <a:r>
+                        <a:rPr lang="de-DE" sz="1800" baseline="0" dirty="0" smtClean="0"/>
+                        <a:t> </a:t>
+                      </a:r>
+                      <a:r>
+                        <a:rPr lang="de-DE" sz="1800" baseline="0" dirty="0" err="1" smtClean="0"/>
+                        <a:t>model</a:t>
+                      </a:r>
+                      <a:r>
+                        <a:rPr lang="de-DE" sz="1800" baseline="0" dirty="0" smtClean="0"/>
+                        <a:t> </a:t>
+                      </a:r>
+                      <a:r>
+                        <a:rPr lang="de-DE" sz="1800" baseline="0" dirty="0" err="1" smtClean="0"/>
+                        <a:t>for</a:t>
+                      </a:r>
+                      <a:r>
+                        <a:rPr lang="de-DE" sz="1800" baseline="0" dirty="0" smtClean="0"/>
+                        <a:t> </a:t>
+                      </a:r>
+                      <a:r>
+                        <a:rPr lang="de-DE" sz="1800" baseline="0" dirty="0" err="1" smtClean="0"/>
+                        <a:t>the</a:t>
+                      </a:r>
+                      <a:r>
+                        <a:rPr lang="de-DE" sz="1800" baseline="0" dirty="0" smtClean="0"/>
+                        <a:t> </a:t>
+                      </a:r>
+                      <a:r>
+                        <a:rPr lang="de-DE" sz="1800" baseline="0" dirty="0" err="1" smtClean="0"/>
+                        <a:t>game</a:t>
+                      </a:r>
+                      <a:endParaRPr lang="de-DE" sz="1800" baseline="0" dirty="0" smtClean="0"/>
+                    </a:p>
+                  </a:txBody>
+                  <a:tcPr/>
+                </a:tc>
+                <a:extLst>
+                  <a:ext uri="{0D108BD9-81ED-4DB2-BD59-A6C34878D82A}">
+                    <a16:rowId xmlns="" xmlns:a16="http://schemas.microsoft.com/office/drawing/2014/main" val="10002"/>
+                  </a:ext>
+                </a:extLst>
+              </a:tr>
+              <a:tr h="370840">
+                <a:tc>
+                  <a:txBody>
+                    <a:bodyPr/>
+                    <a:lstStyle/>
+                    <a:p>
+                      <a:pPr algn="l"/>
+                      <a:r>
+                        <a:rPr lang="de-DE" sz="1800" dirty="0"/>
+                        <a:t>05.26 – 06.02</a:t>
+                      </a:r>
+                    </a:p>
+                  </a:txBody>
+                  <a:tcPr/>
+                </a:tc>
+                <a:tc>
+                  <a:txBody>
+                    <a:bodyPr/>
+                    <a:lstStyle/>
+                    <a:p>
+                      <a:pPr lvl="0">
+                        <a:buFont typeface="Arial" pitchFamily="34" charset="0"/>
+                        <a:buChar char="•"/>
+                      </a:pPr>
+                      <a:r>
+                        <a:rPr lang="de-DE" sz="1800" dirty="0"/>
+                        <a:t> </a:t>
+                      </a:r>
+                      <a:r>
+                        <a:rPr lang="de-DE" sz="1800" dirty="0" err="1" smtClean="0"/>
+                        <a:t>Continue</a:t>
+                      </a:r>
+                      <a:r>
+                        <a:rPr lang="de-DE" sz="1800" dirty="0" smtClean="0"/>
+                        <a:t> </a:t>
+                      </a:r>
+                      <a:r>
+                        <a:rPr lang="de-DE" sz="1800" dirty="0" err="1" smtClean="0"/>
+                        <a:t>to</a:t>
+                      </a:r>
+                      <a:r>
+                        <a:rPr lang="de-DE" sz="1800" dirty="0" smtClean="0"/>
+                        <a:t> </a:t>
+                      </a:r>
+                      <a:r>
+                        <a:rPr lang="de-DE" sz="1800" dirty="0" err="1" smtClean="0"/>
+                        <a:t>work</a:t>
+                      </a:r>
+                      <a:r>
+                        <a:rPr lang="de-DE" sz="1800" dirty="0" smtClean="0"/>
+                        <a:t> on</a:t>
+                      </a:r>
+                      <a:r>
+                        <a:rPr lang="de-DE" sz="1800" baseline="0" dirty="0" smtClean="0"/>
+                        <a:t> prototype</a:t>
+                      </a:r>
+                      <a:endParaRPr lang="de-DE" sz="1800" dirty="0"/>
+                    </a:p>
+                  </a:txBody>
+                  <a:tcPr/>
+                </a:tc>
+                <a:extLst>
+                  <a:ext uri="{0D108BD9-81ED-4DB2-BD59-A6C34878D82A}">
+                    <a16:rowId xmlns="" xmlns:a16="http://schemas.microsoft.com/office/drawing/2014/main" val="10003"/>
+                  </a:ext>
+                </a:extLst>
+              </a:tr>
+            </a:tbl>
+          </a:graphicData>
+        </a:graphic>
+      </p:graphicFrame>
+    </p:spTree>
+    <p:extLst>
+      <p:ext uri="{BB962C8B-B14F-4D97-AF65-F5344CB8AC3E}">
+        <p14:creationId xmlns:p14="http://schemas.microsoft.com/office/powerpoint/2010/main" val="2898537935"/>
+      </p:ext>
+    </p:extLst>
+  </p:cSld>
+  <p:clrMapOvr>
+    <a:masterClrMapping/>
+  </p:clrMapOvr>
+</p:sld>
+</file>
+
+<file path=ppt/slides/slide15.xml><?xml version="1.0" encoding="utf-8"?>
+<p:sld xmlns:a="http://schemas.openxmlformats.org/drawingml/2006/main" xmlns:r="http://schemas.openxmlformats.org/officeDocument/2006/relationships" xmlns:p="http://schemas.openxmlformats.org/presentationml/2006/main">
+  <p:cSld>
+    <p:spTree>
+      <p:nvGrpSpPr>
+        <p:cNvPr id="1" name=""/>
+        <p:cNvGrpSpPr/>
+        <p:nvPr/>
+      </p:nvGrpSpPr>
+      <p:grpSpPr>
+        <a:xfrm>
+          <a:off x="0" y="0"/>
+          <a:ext cx="0" cy="0"/>
+          <a:chOff x="0" y="0"/>
+          <a:chExt cx="0" cy="0"/>
+        </a:xfrm>
+      </p:grpSpPr>
+      <p:sp>
+        <p:nvSpPr>
+          <p:cNvPr id="2" name="Titel 1"/>
+          <p:cNvSpPr>
+            <a:spLocks noGrp="1"/>
+          </p:cNvSpPr>
+          <p:nvPr>
+            <p:ph type="title"/>
+          </p:nvPr>
+        </p:nvSpPr>
+        <p:spPr/>
+        <p:txBody>
+          <a:bodyPr>
+            <a:normAutofit/>
+          </a:bodyPr>
+          <a:lstStyle/>
+          <a:p>
+            <a:pPr algn="ctr"/>
+            <a:r>
+              <a:rPr lang="de-DE" dirty="0" err="1">
+                <a:solidFill>
+                  <a:srgbClr val="FF0000"/>
+                </a:solidFill>
+              </a:rPr>
+              <a:t>Milestone</a:t>
+            </a:r>
+            <a:r>
+              <a:rPr lang="de-DE" dirty="0">
+                <a:solidFill>
+                  <a:srgbClr val="FF0000"/>
+                </a:solidFill>
+              </a:rPr>
+              <a:t> 2</a:t>
+            </a:r>
+          </a:p>
+        </p:txBody>
+      </p:sp>
+      <p:sp>
+        <p:nvSpPr>
+          <p:cNvPr id="9" name="Inhaltsplatzhalter 8"/>
+          <p:cNvSpPr>
+            <a:spLocks noGrp="1"/>
+          </p:cNvSpPr>
+          <p:nvPr>
+            <p:ph idx="1"/>
+          </p:nvPr>
+        </p:nvSpPr>
+        <p:spPr/>
+        <p:txBody>
+          <a:bodyPr>
+            <a:normAutofit/>
+          </a:bodyPr>
+          <a:lstStyle/>
+          <a:p>
+            <a:endParaRPr lang="de-DE" dirty="0"/>
+          </a:p>
+          <a:p>
+            <a:pPr>
+              <a:buNone/>
+            </a:pPr>
+            <a:endParaRPr lang="de-DE" dirty="0"/>
+          </a:p>
+          <a:p>
+            <a:endParaRPr lang="de-DE" dirty="0"/>
+          </a:p>
+        </p:txBody>
+      </p:sp>
+      <p:sp>
+        <p:nvSpPr>
+          <p:cNvPr id="11" name="Foliennummernplatzhalter 10"/>
+          <p:cNvSpPr>
+            <a:spLocks noGrp="1"/>
+          </p:cNvSpPr>
+          <p:nvPr>
+            <p:ph type="sldNum" sz="quarter" idx="12"/>
+          </p:nvPr>
+        </p:nvSpPr>
+        <p:spPr/>
+        <p:txBody>
+          <a:bodyPr/>
+          <a:lstStyle/>
+          <a:p>
+            <a:fld id="{6C6AE60A-B69C-4790-82F7-3882EDF23186}" type="slidenum">
+              <a:rPr lang="de-DE" smtClean="0"/>
+              <a:pPr/>
+              <a:t>15</a:t>
             </a:fld>
             <a:endParaRPr lang="de-DE"/>
           </a:p>
@@ -6628,14 +7189,14 @@
                 <a:gridCol w="1584176">
                   <a:extLst>
                     <a:ext uri="{9D8B030D-6E8A-4147-A177-3AD203B41FA5}">
-                      <a16:colId xmlns:a16="http://schemas.microsoft.com/office/drawing/2014/main" xmlns="" val="20000"/>
+                      <a16:colId xmlns="" xmlns:a16="http://schemas.microsoft.com/office/drawing/2014/main" val="20000"/>
                     </a:ext>
                   </a:extLst>
                 </a:gridCol>
                 <a:gridCol w="6480721">
                   <a:extLst>
                     <a:ext uri="{9D8B030D-6E8A-4147-A177-3AD203B41FA5}">
-                      <a16:colId xmlns:a16="http://schemas.microsoft.com/office/drawing/2014/main" xmlns="" val="20001"/>
+                      <a16:colId xmlns="" xmlns:a16="http://schemas.microsoft.com/office/drawing/2014/main" val="20001"/>
                     </a:ext>
                   </a:extLst>
                 </a:gridCol>
@@ -6677,7 +7238,7 @@
                 </a:tc>
                 <a:extLst>
                   <a:ext uri="{0D108BD9-81ED-4DB2-BD59-A6C34878D82A}">
-                    <a16:rowId xmlns:a16="http://schemas.microsoft.com/office/drawing/2014/main" xmlns="" val="10000"/>
+                    <a16:rowId xmlns="" xmlns:a16="http://schemas.microsoft.com/office/drawing/2014/main" val="10000"/>
                   </a:ext>
                 </a:extLst>
               </a:tr>
@@ -6849,7 +7410,7 @@
                 </a:tc>
                 <a:extLst>
                   <a:ext uri="{0D108BD9-81ED-4DB2-BD59-A6C34878D82A}">
-                    <a16:rowId xmlns:a16="http://schemas.microsoft.com/office/drawing/2014/main" xmlns="" val="10001"/>
+                    <a16:rowId xmlns="" xmlns:a16="http://schemas.microsoft.com/office/drawing/2014/main" val="10001"/>
                   </a:ext>
                 </a:extLst>
               </a:tr>
@@ -6970,7 +7531,7 @@
                 </a:tc>
                 <a:extLst>
                   <a:ext uri="{0D108BD9-81ED-4DB2-BD59-A6C34878D82A}">
-                    <a16:rowId xmlns:a16="http://schemas.microsoft.com/office/drawing/2014/main" xmlns="" val="10002"/>
+                    <a16:rowId xmlns="" xmlns:a16="http://schemas.microsoft.com/office/drawing/2014/main" val="10002"/>
                   </a:ext>
                 </a:extLst>
               </a:tr>
@@ -7059,7 +7620,7 @@
                 </a:tc>
                 <a:extLst>
                   <a:ext uri="{0D108BD9-81ED-4DB2-BD59-A6C34878D82A}">
-                    <a16:rowId xmlns:a16="http://schemas.microsoft.com/office/drawing/2014/main" xmlns="" val="10003"/>
+                    <a16:rowId xmlns="" xmlns:a16="http://schemas.microsoft.com/office/drawing/2014/main" val="10003"/>
                   </a:ext>
                 </a:extLst>
               </a:tr>
@@ -7075,7 +7636,7 @@
 </p:sld>
 </file>
 
-<file path=ppt/slides/slide15.xml><?xml version="1.0" encoding="utf-8"?>
+<file path=ppt/slides/slide16.xml><?xml version="1.0" encoding="utf-8"?>
 <p:sld xmlns:a="http://schemas.openxmlformats.org/drawingml/2006/main" xmlns:r="http://schemas.openxmlformats.org/officeDocument/2006/relationships" xmlns:p="http://schemas.openxmlformats.org/presentationml/2006/main">
   <p:cSld>
     <p:spTree>
@@ -7177,7 +7738,7 @@
             <a:fld id="{6C6AE60A-B69C-4790-82F7-3882EDF23186}" type="slidenum">
               <a:rPr lang="de-DE" smtClean="0"/>
               <a:pPr/>
-              <a:t>15</a:t>
+              <a:t>16</a:t>
             </a:fld>
             <a:endParaRPr lang="de-DE"/>
           </a:p>
@@ -7192,7 +7753,7 @@
           <p:nvPr>
             <p:extLst>
               <p:ext uri="{D42A27DB-BD31-4B8C-83A1-F6EECF244321}">
-                <p14:modId xmlns:p14="http://schemas.microsoft.com/office/powerpoint/2010/main" xmlns="" val="3528518649"/>
+                <p14:modId xmlns:p14="http://schemas.microsoft.com/office/powerpoint/2010/main" val="3528518649"/>
               </p:ext>
             </p:extLst>
           </p:nvPr>
@@ -7211,14 +7772,14 @@
                 <a:gridCol w="1584176">
                   <a:extLst>
                     <a:ext uri="{9D8B030D-6E8A-4147-A177-3AD203B41FA5}">
-                      <a16:colId xmlns:a16="http://schemas.microsoft.com/office/drawing/2014/main" xmlns="" val="20000"/>
+                      <a16:colId xmlns="" xmlns:a16="http://schemas.microsoft.com/office/drawing/2014/main" val="20000"/>
                     </a:ext>
                   </a:extLst>
                 </a:gridCol>
                 <a:gridCol w="6480721">
                   <a:extLst>
                     <a:ext uri="{9D8B030D-6E8A-4147-A177-3AD203B41FA5}">
-                      <a16:colId xmlns:a16="http://schemas.microsoft.com/office/drawing/2014/main" xmlns="" val="20001"/>
+                      <a16:colId xmlns="" xmlns:a16="http://schemas.microsoft.com/office/drawing/2014/main" val="20001"/>
                     </a:ext>
                   </a:extLst>
                 </a:gridCol>
@@ -7255,7 +7816,7 @@
                 </a:tc>
                 <a:extLst>
                   <a:ext uri="{0D108BD9-81ED-4DB2-BD59-A6C34878D82A}">
-                    <a16:rowId xmlns:a16="http://schemas.microsoft.com/office/drawing/2014/main" xmlns="" val="10000"/>
+                    <a16:rowId xmlns="" xmlns:a16="http://schemas.microsoft.com/office/drawing/2014/main" val="10000"/>
                   </a:ext>
                 </a:extLst>
               </a:tr>
@@ -7335,7 +7896,7 @@
                 </a:tc>
                 <a:extLst>
                   <a:ext uri="{0D108BD9-81ED-4DB2-BD59-A6C34878D82A}">
-                    <a16:rowId xmlns:a16="http://schemas.microsoft.com/office/drawing/2014/main" xmlns="" val="10001"/>
+                    <a16:rowId xmlns="" xmlns:a16="http://schemas.microsoft.com/office/drawing/2014/main" val="10001"/>
                   </a:ext>
                 </a:extLst>
               </a:tr>
@@ -7450,7 +8011,7 @@
                 </a:tc>
                 <a:extLst>
                   <a:ext uri="{0D108BD9-81ED-4DB2-BD59-A6C34878D82A}">
-                    <a16:rowId xmlns:a16="http://schemas.microsoft.com/office/drawing/2014/main" xmlns="" val="10002"/>
+                    <a16:rowId xmlns="" xmlns:a16="http://schemas.microsoft.com/office/drawing/2014/main" val="10002"/>
                   </a:ext>
                 </a:extLst>
               </a:tr>
@@ -7514,7 +8075,7 @@
                 </a:tc>
                 <a:extLst>
                   <a:ext uri="{0D108BD9-81ED-4DB2-BD59-A6C34878D82A}">
-                    <a16:rowId xmlns:a16="http://schemas.microsoft.com/office/drawing/2014/main" xmlns="" val="10003"/>
+                    <a16:rowId xmlns="" xmlns:a16="http://schemas.microsoft.com/office/drawing/2014/main" val="10003"/>
                   </a:ext>
                 </a:extLst>
               </a:tr>
@@ -7525,7 +8086,7 @@
     </p:spTree>
     <p:extLst>
       <p:ext uri="{BB962C8B-B14F-4D97-AF65-F5344CB8AC3E}">
-        <p14:creationId xmlns:p14="http://schemas.microsoft.com/office/powerpoint/2010/main" xmlns="" val="4058254611"/>
+        <p14:creationId xmlns:p14="http://schemas.microsoft.com/office/powerpoint/2010/main" val="4058254611"/>
       </p:ext>
     </p:extLst>
   </p:cSld>
@@ -7535,7 +8096,7 @@
 </p:sld>
 </file>
 
-<file path=ppt/slides/slide16.xml><?xml version="1.0" encoding="utf-8"?>
+<file path=ppt/slides/slide17.xml><?xml version="1.0" encoding="utf-8"?>
 <p:sld xmlns:a="http://schemas.openxmlformats.org/drawingml/2006/main" xmlns:r="http://schemas.openxmlformats.org/officeDocument/2006/relationships" xmlns:p="http://schemas.openxmlformats.org/presentationml/2006/main">
   <p:cSld>
     <p:spTree>
@@ -7637,7 +8198,7 @@
             <a:fld id="{6C6AE60A-B69C-4790-82F7-3882EDF23186}" type="slidenum">
               <a:rPr lang="de-DE" smtClean="0"/>
               <a:pPr/>
-              <a:t>16</a:t>
+              <a:t>17</a:t>
             </a:fld>
             <a:endParaRPr lang="de-DE"/>
           </a:p>
@@ -7652,7 +8213,7 @@
           <p:nvPr>
             <p:extLst>
               <p:ext uri="{D42A27DB-BD31-4B8C-83A1-F6EECF244321}">
-                <p14:modId xmlns:p14="http://schemas.microsoft.com/office/powerpoint/2010/main" xmlns="" val="3528518649"/>
+                <p14:modId xmlns:p14="http://schemas.microsoft.com/office/powerpoint/2010/main" val="3528518649"/>
               </p:ext>
             </p:extLst>
           </p:nvPr>
@@ -7671,14 +8232,14 @@
                 <a:gridCol w="1584176">
                   <a:extLst>
                     <a:ext uri="{9D8B030D-6E8A-4147-A177-3AD203B41FA5}">
-                      <a16:colId xmlns:a16="http://schemas.microsoft.com/office/drawing/2014/main" xmlns="" val="20000"/>
+                      <a16:colId xmlns="" xmlns:a16="http://schemas.microsoft.com/office/drawing/2014/main" val="20000"/>
                     </a:ext>
                   </a:extLst>
                 </a:gridCol>
                 <a:gridCol w="6480721">
                   <a:extLst>
                     <a:ext uri="{9D8B030D-6E8A-4147-A177-3AD203B41FA5}">
-                      <a16:colId xmlns:a16="http://schemas.microsoft.com/office/drawing/2014/main" xmlns="" val="20001"/>
+                      <a16:colId xmlns="" xmlns:a16="http://schemas.microsoft.com/office/drawing/2014/main" val="20001"/>
                     </a:ext>
                   </a:extLst>
                 </a:gridCol>
@@ -7716,7 +8277,7 @@
                 </a:tc>
                 <a:extLst>
                   <a:ext uri="{0D108BD9-81ED-4DB2-BD59-A6C34878D82A}">
-                    <a16:rowId xmlns:a16="http://schemas.microsoft.com/office/drawing/2014/main" xmlns="" val="10000"/>
+                    <a16:rowId xmlns="" xmlns:a16="http://schemas.microsoft.com/office/drawing/2014/main" val="10000"/>
                   </a:ext>
                 </a:extLst>
               </a:tr>
@@ -7870,7 +8431,7 @@
                 </a:tc>
                 <a:extLst>
                   <a:ext uri="{0D108BD9-81ED-4DB2-BD59-A6C34878D82A}">
-                    <a16:rowId xmlns:a16="http://schemas.microsoft.com/office/drawing/2014/main" xmlns="" val="10001"/>
+                    <a16:rowId xmlns="" xmlns:a16="http://schemas.microsoft.com/office/drawing/2014/main" val="10001"/>
                   </a:ext>
                 </a:extLst>
               </a:tr>
@@ -7945,7 +8506,7 @@
                 </a:tc>
                 <a:extLst>
                   <a:ext uri="{0D108BD9-81ED-4DB2-BD59-A6C34878D82A}">
-                    <a16:rowId xmlns:a16="http://schemas.microsoft.com/office/drawing/2014/main" xmlns="" val="10002"/>
+                    <a16:rowId xmlns="" xmlns:a16="http://schemas.microsoft.com/office/drawing/2014/main" val="10002"/>
                   </a:ext>
                 </a:extLst>
               </a:tr>
@@ -8013,7 +8574,7 @@
                 </a:tc>
                 <a:extLst>
                   <a:ext uri="{0D108BD9-81ED-4DB2-BD59-A6C34878D82A}">
-                    <a16:rowId xmlns:a16="http://schemas.microsoft.com/office/drawing/2014/main" xmlns="" val="10003"/>
+                    <a16:rowId xmlns="" xmlns:a16="http://schemas.microsoft.com/office/drawing/2014/main" val="10003"/>
                   </a:ext>
                 </a:extLst>
               </a:tr>
@@ -8024,193 +8585,9 @@
     </p:spTree>
     <p:extLst>
       <p:ext uri="{BB962C8B-B14F-4D97-AF65-F5344CB8AC3E}">
-        <p14:creationId xmlns:p14="http://schemas.microsoft.com/office/powerpoint/2010/main" xmlns="" val="4058254611"/>
+        <p14:creationId xmlns:p14="http://schemas.microsoft.com/office/powerpoint/2010/main" val="4058254611"/>
       </p:ext>
     </p:extLst>
-  </p:cSld>
-  <p:clrMapOvr>
-    <a:masterClrMapping/>
-  </p:clrMapOvr>
-</p:sld>
-</file>
-
-<file path=ppt/slides/slide17.xml><?xml version="1.0" encoding="utf-8"?>
-<p:sld xmlns:a="http://schemas.openxmlformats.org/drawingml/2006/main" xmlns:r="http://schemas.openxmlformats.org/officeDocument/2006/relationships" xmlns:p="http://schemas.openxmlformats.org/presentationml/2006/main">
-  <p:cSld>
-    <p:spTree>
-      <p:nvGrpSpPr>
-        <p:cNvPr id="1" name=""/>
-        <p:cNvGrpSpPr/>
-        <p:nvPr/>
-      </p:nvGrpSpPr>
-      <p:grpSpPr>
-        <a:xfrm>
-          <a:off x="0" y="0"/>
-          <a:ext cx="0" cy="0"/>
-          <a:chOff x="0" y="0"/>
-          <a:chExt cx="0" cy="0"/>
-        </a:xfrm>
-      </p:grpSpPr>
-      <p:sp>
-        <p:nvSpPr>
-          <p:cNvPr id="2" name="Titel 1"/>
-          <p:cNvSpPr>
-            <a:spLocks noGrp="1"/>
-          </p:cNvSpPr>
-          <p:nvPr>
-            <p:ph type="title"/>
-          </p:nvPr>
-        </p:nvSpPr>
-        <p:spPr/>
-        <p:txBody>
-          <a:bodyPr/>
-          <a:lstStyle/>
-          <a:p>
-            <a:pPr algn="ctr"/>
-            <a:r>
-              <a:rPr lang="de-DE" dirty="0" err="1">
-                <a:solidFill>
-                  <a:srgbClr val="FF0000"/>
-                </a:solidFill>
-              </a:rPr>
-              <a:t>Exams</a:t>
-            </a:r>
-            <a:endParaRPr lang="de-DE" dirty="0"/>
-          </a:p>
-        </p:txBody>
-      </p:sp>
-      <p:sp>
-        <p:nvSpPr>
-          <p:cNvPr id="3" name="Inhaltsplatzhalter 2"/>
-          <p:cNvSpPr>
-            <a:spLocks noGrp="1"/>
-          </p:cNvSpPr>
-          <p:nvPr>
-            <p:ph idx="1"/>
-          </p:nvPr>
-        </p:nvSpPr>
-        <p:spPr/>
-        <p:txBody>
-          <a:bodyPr>
-            <a:normAutofit/>
-          </a:bodyPr>
-          <a:lstStyle/>
-          <a:p>
-            <a:r>
-              <a:rPr lang="de-DE" sz="2400" dirty="0"/>
-              <a:t>16.07.2016 - 30.07.2016 </a:t>
-            </a:r>
-            <a:r>
-              <a:rPr lang="de-DE" sz="2400" dirty="0" err="1"/>
-              <a:t>and</a:t>
-            </a:r>
-            <a:r>
-              <a:rPr lang="de-DE" sz="2400" dirty="0"/>
-              <a:t> 12.09.2016 - 24.09.2016</a:t>
-            </a:r>
-          </a:p>
-          <a:p>
-            <a:pPr lvl="1"/>
-            <a:r>
-              <a:rPr lang="de-DE" dirty="0" err="1"/>
-              <a:t>Exam</a:t>
-            </a:r>
-            <a:r>
-              <a:rPr lang="de-DE" dirty="0"/>
-              <a:t> </a:t>
-            </a:r>
-            <a:r>
-              <a:rPr lang="de-DE" dirty="0" err="1"/>
-              <a:t>and</a:t>
-            </a:r>
-            <a:r>
-              <a:rPr lang="de-DE" dirty="0"/>
-              <a:t> </a:t>
-            </a:r>
-            <a:r>
-              <a:rPr lang="de-DE" dirty="0" err="1"/>
-              <a:t>preperation</a:t>
-            </a:r>
-            <a:r>
-              <a:rPr lang="de-DE" dirty="0"/>
-              <a:t> 23.06 - 30.07 </a:t>
-            </a:r>
-          </a:p>
-          <a:p>
-            <a:pPr lvl="1"/>
-            <a:r>
-              <a:rPr lang="de-DE" dirty="0"/>
-              <a:t>Sec. </a:t>
-            </a:r>
-            <a:r>
-              <a:rPr lang="de-DE" dirty="0" err="1"/>
-              <a:t>exam</a:t>
-            </a:r>
-            <a:r>
-              <a:rPr lang="de-DE" dirty="0"/>
-              <a:t> </a:t>
-            </a:r>
-            <a:r>
-              <a:rPr lang="de-DE" dirty="0" err="1"/>
-              <a:t>phase</a:t>
-            </a:r>
-            <a:r>
-              <a:rPr lang="de-DE" dirty="0"/>
-              <a:t> -&gt; individual </a:t>
-            </a:r>
-            <a:r>
-              <a:rPr lang="de-DE" dirty="0" err="1"/>
-              <a:t>schedule</a:t>
-            </a:r>
-            <a:endParaRPr lang="de-DE" dirty="0"/>
-          </a:p>
-          <a:p>
-            <a:endParaRPr lang="de-DE" dirty="0"/>
-          </a:p>
-          <a:p>
-            <a:pPr lvl="1"/>
-            <a:endParaRPr lang="de-DE" dirty="0"/>
-          </a:p>
-          <a:p>
-            <a:pPr lvl="1"/>
-            <a:endParaRPr lang="de-DE" sz="2200" dirty="0"/>
-          </a:p>
-          <a:p>
-            <a:endParaRPr lang="de-DE" sz="2400" dirty="0"/>
-          </a:p>
-          <a:p>
-            <a:endParaRPr lang="de-DE" sz="2400" dirty="0"/>
-          </a:p>
-          <a:p>
-            <a:endParaRPr lang="de-DE" dirty="0"/>
-          </a:p>
-        </p:txBody>
-      </p:sp>
-      <p:sp>
-        <p:nvSpPr>
-          <p:cNvPr id="4" name="Foliennummernplatzhalter 3"/>
-          <p:cNvSpPr>
-            <a:spLocks noGrp="1"/>
-          </p:cNvSpPr>
-          <p:nvPr>
-            <p:ph type="sldNum" sz="quarter" idx="12"/>
-          </p:nvPr>
-        </p:nvSpPr>
-        <p:spPr/>
-        <p:txBody>
-          <a:bodyPr/>
-          <a:lstStyle/>
-          <a:p>
-            <a:fld id="{6C6AE60A-B69C-4790-82F7-3882EDF23186}" type="slidenum">
-              <a:rPr lang="de-DE" smtClean="0"/>
-              <a:pPr/>
-              <a:t>17</a:t>
-            </a:fld>
-            <a:endParaRPr lang="de-DE"/>
-          </a:p>
-        </p:txBody>
-      </p:sp>
-    </p:spTree>
   </p:cSld>
   <p:clrMapOvr>
     <a:masterClrMapping/>
@@ -8267,7 +8644,7 @@
                   <a:srgbClr val="FF0000"/>
                 </a:solidFill>
               </a:rPr>
-              <a:t> 3</a:t>
+              <a:t> 2</a:t>
             </a:r>
           </a:p>
         </p:txBody>
@@ -8321,6 +8698,909 @@
               <a:rPr lang="de-DE" smtClean="0"/>
               <a:pPr/>
               <a:t>18</a:t>
+            </a:fld>
+            <a:endParaRPr lang="de-DE"/>
+          </a:p>
+        </p:txBody>
+      </p:sp>
+      <p:graphicFrame>
+        <p:nvGraphicFramePr>
+          <p:cNvPr id="8" name="Tabelle 7"/>
+          <p:cNvGraphicFramePr>
+            <a:graphicFrameLocks noGrp="1"/>
+          </p:cNvGraphicFramePr>
+          <p:nvPr>
+            <p:extLst>
+              <p:ext uri="{D42A27DB-BD31-4B8C-83A1-F6EECF244321}">
+                <p14:modId xmlns:p14="http://schemas.microsoft.com/office/powerpoint/2010/main" val="3728952247"/>
+              </p:ext>
+            </p:extLst>
+          </p:nvPr>
+        </p:nvGraphicFramePr>
+        <p:xfrm>
+          <a:off x="539552" y="1849388"/>
+          <a:ext cx="8064897" cy="2296160"/>
+        </p:xfrm>
+        <a:graphic>
+          <a:graphicData uri="http://schemas.openxmlformats.org/drawingml/2006/table">
+            <a:tbl>
+              <a:tblPr firstRow="1" bandRow="1">
+                <a:tableStyleId>{5C22544A-7EE6-4342-B048-85BDC9FD1C3A}</a:tableStyleId>
+              </a:tblPr>
+              <a:tblGrid>
+                <a:gridCol w="1584176">
+                  <a:extLst>
+                    <a:ext uri="{9D8B030D-6E8A-4147-A177-3AD203B41FA5}">
+                      <a16:colId xmlns="" xmlns:a16="http://schemas.microsoft.com/office/drawing/2014/main" val="20000"/>
+                    </a:ext>
+                  </a:extLst>
+                </a:gridCol>
+                <a:gridCol w="6480721">
+                  <a:extLst>
+                    <a:ext uri="{9D8B030D-6E8A-4147-A177-3AD203B41FA5}">
+                      <a16:colId xmlns="" xmlns:a16="http://schemas.microsoft.com/office/drawing/2014/main" val="20001"/>
+                    </a:ext>
+                  </a:extLst>
+                </a:gridCol>
+              </a:tblGrid>
+              <a:tr h="370840">
+                <a:tc>
+                  <a:txBody>
+                    <a:bodyPr/>
+                    <a:lstStyle/>
+                    <a:p>
+                      <a:pPr algn="ctr"/>
+                      <a:r>
+                        <a:rPr lang="de-DE" sz="1800" dirty="0" err="1"/>
+                        <a:t>Week</a:t>
+                      </a:r>
+                      <a:endParaRPr lang="de-DE" sz="1800" dirty="0"/>
+                    </a:p>
+                  </a:txBody>
+                  <a:tcPr/>
+                </a:tc>
+                <a:tc>
+                  <a:txBody>
+                    <a:bodyPr/>
+                    <a:lstStyle/>
+                    <a:p>
+                      <a:pPr algn="ctr"/>
+                      <a:r>
+                        <a:rPr lang="de-DE" sz="1800" dirty="0" smtClean="0"/>
+                        <a:t>Sebastian Nickel</a:t>
+                      </a:r>
+                      <a:endParaRPr lang="de-DE" sz="1800" dirty="0"/>
+                    </a:p>
+                  </a:txBody>
+                  <a:tcPr/>
+                </a:tc>
+                <a:extLst>
+                  <a:ext uri="{0D108BD9-81ED-4DB2-BD59-A6C34878D82A}">
+                    <a16:rowId xmlns="" xmlns:a16="http://schemas.microsoft.com/office/drawing/2014/main" val="10000"/>
+                  </a:ext>
+                </a:extLst>
+              </a:tr>
+              <a:tr h="370840">
+                <a:tc>
+                  <a:txBody>
+                    <a:bodyPr/>
+                    <a:lstStyle/>
+                    <a:p>
+                      <a:pPr marL="0" marR="0" indent="0" algn="l" defTabSz="914400" rtl="0" eaLnBrk="1" fontAlgn="auto" latinLnBrk="0" hangingPunct="1">
+                        <a:lnSpc>
+                          <a:spcPct val="100000"/>
+                        </a:lnSpc>
+                        <a:spcBef>
+                          <a:spcPts val="0"/>
+                        </a:spcBef>
+                        <a:spcAft>
+                          <a:spcPts val="0"/>
+                        </a:spcAft>
+                        <a:buClrTx/>
+                        <a:buSzTx/>
+                        <a:buFontTx/>
+                        <a:buNone/>
+                        <a:tabLst/>
+                        <a:defRPr/>
+                      </a:pPr>
+                      <a:r>
+                        <a:rPr lang="de-DE" sz="1800" dirty="0"/>
+                        <a:t>06.02 – 06.09</a:t>
+                      </a:r>
+                    </a:p>
+                  </a:txBody>
+                  <a:tcPr/>
+                </a:tc>
+                <a:tc>
+                  <a:txBody>
+                    <a:bodyPr/>
+                    <a:lstStyle/>
+                    <a:p>
+                      <a:pPr lvl="0">
+                        <a:buFont typeface="Arial" pitchFamily="34" charset="0"/>
+                        <a:buChar char="•"/>
+                      </a:pPr>
+                      <a:r>
+                        <a:rPr lang="de-DE" sz="1800" baseline="0" dirty="0"/>
+                        <a:t> </a:t>
+                      </a:r>
+                      <a:r>
+                        <a:rPr lang="de-DE" sz="1800" baseline="0" dirty="0" err="1" smtClean="0"/>
+                        <a:t>Increase</a:t>
+                      </a:r>
+                      <a:r>
+                        <a:rPr lang="de-DE" sz="1800" baseline="0" dirty="0" smtClean="0"/>
+                        <a:t> </a:t>
+                      </a:r>
+                      <a:r>
+                        <a:rPr lang="de-DE" sz="1800" baseline="0" dirty="0" err="1" smtClean="0"/>
+                        <a:t>flexibility</a:t>
+                      </a:r>
+                      <a:r>
+                        <a:rPr lang="de-DE" sz="1800" baseline="0" dirty="0" smtClean="0"/>
+                        <a:t> </a:t>
+                      </a:r>
+                      <a:r>
+                        <a:rPr lang="de-DE" sz="1800" baseline="0" dirty="0" err="1" smtClean="0"/>
+                        <a:t>of</a:t>
+                      </a:r>
+                      <a:r>
+                        <a:rPr lang="de-DE" sz="1800" baseline="0" dirty="0" smtClean="0"/>
+                        <a:t> </a:t>
+                      </a:r>
+                      <a:r>
+                        <a:rPr lang="de-DE" sz="1800" baseline="0" dirty="0" err="1" smtClean="0"/>
+                        <a:t>established</a:t>
+                      </a:r>
+                      <a:r>
+                        <a:rPr lang="de-DE" sz="1800" baseline="0" dirty="0" smtClean="0"/>
+                        <a:t> </a:t>
+                      </a:r>
+                      <a:r>
+                        <a:rPr lang="de-DE" sz="1800" baseline="0" dirty="0" err="1" smtClean="0"/>
+                        <a:t>fly-physics</a:t>
+                      </a:r>
+                      <a:r>
+                        <a:rPr lang="de-DE" sz="1800" baseline="0" dirty="0" smtClean="0"/>
+                        <a:t> prototype</a:t>
+                      </a:r>
+                    </a:p>
+                    <a:p>
+                      <a:pPr lvl="1">
+                        <a:buFont typeface="Arial" pitchFamily="34" charset="0"/>
+                        <a:buChar char="•"/>
+                      </a:pPr>
+                      <a:r>
+                        <a:rPr lang="de-DE" sz="1800" baseline="0" dirty="0" smtClean="0"/>
+                        <a:t> Error </a:t>
+                      </a:r>
+                      <a:r>
+                        <a:rPr lang="de-DE" sz="1800" baseline="0" dirty="0" err="1" smtClean="0"/>
+                        <a:t>tolerence</a:t>
+                      </a:r>
+                      <a:r>
+                        <a:rPr lang="de-DE" sz="1800" baseline="0" dirty="0" smtClean="0"/>
+                        <a:t>, …</a:t>
+                      </a:r>
+                      <a:endParaRPr lang="de-DE" sz="1800" baseline="0" dirty="0" smtClean="0"/>
+                    </a:p>
+                  </a:txBody>
+                  <a:tcPr/>
+                </a:tc>
+                <a:extLst>
+                  <a:ext uri="{0D108BD9-81ED-4DB2-BD59-A6C34878D82A}">
+                    <a16:rowId xmlns="" xmlns:a16="http://schemas.microsoft.com/office/drawing/2014/main" val="10001"/>
+                  </a:ext>
+                </a:extLst>
+              </a:tr>
+              <a:tr h="370840">
+                <a:tc>
+                  <a:txBody>
+                    <a:bodyPr/>
+                    <a:lstStyle/>
+                    <a:p>
+                      <a:pPr marL="0" marR="0" indent="0" algn="l" defTabSz="914400" rtl="0" eaLnBrk="1" fontAlgn="auto" latinLnBrk="0" hangingPunct="1">
+                        <a:lnSpc>
+                          <a:spcPct val="100000"/>
+                        </a:lnSpc>
+                        <a:spcBef>
+                          <a:spcPts val="0"/>
+                        </a:spcBef>
+                        <a:spcAft>
+                          <a:spcPts val="0"/>
+                        </a:spcAft>
+                        <a:buClrTx/>
+                        <a:buSzTx/>
+                        <a:buFontTx/>
+                        <a:buNone/>
+                        <a:tabLst/>
+                        <a:defRPr/>
+                      </a:pPr>
+                      <a:r>
+                        <a:rPr lang="de-DE" sz="1800" dirty="0"/>
+                        <a:t>06.09 – 06.16</a:t>
+                      </a:r>
+                    </a:p>
+                  </a:txBody>
+                  <a:tcPr/>
+                </a:tc>
+                <a:tc>
+                  <a:txBody>
+                    <a:bodyPr/>
+                    <a:lstStyle/>
+                    <a:p>
+                      <a:pPr lvl="0">
+                        <a:buFont typeface="Arial" pitchFamily="34" charset="0"/>
+                        <a:buChar char="•"/>
+                      </a:pPr>
+                      <a:r>
+                        <a:rPr lang="de-DE" sz="1800" baseline="0" dirty="0"/>
+                        <a:t> </a:t>
+                      </a:r>
+                      <a:r>
+                        <a:rPr lang="de-DE" sz="1800" baseline="0" dirty="0" smtClean="0"/>
+                        <a:t>Add </a:t>
+                      </a:r>
+                      <a:r>
+                        <a:rPr lang="de-DE" sz="1800" baseline="0" dirty="0" err="1" smtClean="0"/>
+                        <a:t>configuratable</a:t>
+                      </a:r>
+                      <a:r>
+                        <a:rPr lang="de-DE" sz="1800" baseline="0" dirty="0" smtClean="0"/>
+                        <a:t> </a:t>
+                      </a:r>
+                      <a:r>
+                        <a:rPr lang="de-DE" sz="1800" baseline="0" dirty="0" err="1" smtClean="0"/>
+                        <a:t>properties</a:t>
+                      </a:r>
+                      <a:r>
+                        <a:rPr lang="de-DE" sz="1800" baseline="0" dirty="0" smtClean="0"/>
+                        <a:t> </a:t>
+                      </a:r>
+                      <a:r>
+                        <a:rPr lang="de-DE" sz="1800" baseline="0" dirty="0" err="1" smtClean="0"/>
+                        <a:t>to</a:t>
+                      </a:r>
+                      <a:r>
+                        <a:rPr lang="de-DE" sz="1800" baseline="0" dirty="0" smtClean="0"/>
+                        <a:t> </a:t>
+                      </a:r>
+                      <a:r>
+                        <a:rPr lang="de-DE" sz="1800" baseline="0" dirty="0" err="1" smtClean="0"/>
+                        <a:t>flying</a:t>
+                      </a:r>
+                      <a:r>
+                        <a:rPr lang="de-DE" sz="1800" baseline="0" dirty="0" smtClean="0"/>
+                        <a:t>-model </a:t>
+                      </a:r>
+                      <a:r>
+                        <a:rPr lang="de-DE" sz="1800" baseline="0" dirty="0" err="1" smtClean="0"/>
+                        <a:t>for</a:t>
+                      </a:r>
+                      <a:r>
+                        <a:rPr lang="de-DE" sz="1800" baseline="0" dirty="0" smtClean="0"/>
+                        <a:t> an </a:t>
+                      </a:r>
+                      <a:r>
+                        <a:rPr lang="de-DE" sz="1800" baseline="0" dirty="0" err="1" smtClean="0"/>
+                        <a:t>even</a:t>
+                      </a:r>
+                      <a:r>
+                        <a:rPr lang="de-DE" sz="1800" baseline="0" dirty="0" smtClean="0"/>
+                        <a:t> </a:t>
+                      </a:r>
+                      <a:r>
+                        <a:rPr lang="de-DE" sz="1800" baseline="0" dirty="0" err="1" smtClean="0"/>
+                        <a:t>more</a:t>
+                      </a:r>
+                      <a:r>
+                        <a:rPr lang="de-DE" sz="1800" baseline="0" dirty="0" smtClean="0"/>
+                        <a:t> </a:t>
+                      </a:r>
+                      <a:r>
+                        <a:rPr lang="de-DE" sz="1800" baseline="0" dirty="0" err="1" smtClean="0"/>
+                        <a:t>realistic</a:t>
+                      </a:r>
+                      <a:r>
+                        <a:rPr lang="de-DE" sz="1800" baseline="0" dirty="0" smtClean="0"/>
+                        <a:t> </a:t>
+                      </a:r>
+                      <a:r>
+                        <a:rPr lang="de-DE" sz="1800" baseline="0" dirty="0" err="1" smtClean="0"/>
+                        <a:t>experience</a:t>
+                      </a:r>
+                      <a:endParaRPr lang="de-DE" sz="1800" baseline="0" dirty="0" smtClean="0"/>
+                    </a:p>
+                    <a:p>
+                      <a:pPr lvl="1">
+                        <a:buFont typeface="Arial" pitchFamily="34" charset="0"/>
+                        <a:buChar char="•"/>
+                      </a:pPr>
+                      <a:r>
+                        <a:rPr lang="de-DE" sz="1800" baseline="0" dirty="0" smtClean="0"/>
+                        <a:t> </a:t>
+                      </a:r>
+                      <a:r>
+                        <a:rPr lang="de-DE" sz="1800" baseline="0" dirty="0" err="1" smtClean="0"/>
+                        <a:t>Actual</a:t>
+                      </a:r>
+                      <a:r>
+                        <a:rPr lang="de-DE" sz="1800" baseline="0" dirty="0" smtClean="0"/>
+                        <a:t> </a:t>
+                      </a:r>
+                      <a:r>
+                        <a:rPr lang="de-DE" sz="1800" baseline="0" dirty="0" err="1" smtClean="0"/>
+                        <a:t>height</a:t>
+                      </a:r>
+                      <a:r>
+                        <a:rPr lang="de-DE" sz="1800" baseline="0" dirty="0" smtClean="0"/>
+                        <a:t> </a:t>
+                      </a:r>
+                      <a:r>
+                        <a:rPr lang="de-DE" sz="1800" baseline="0" dirty="0" err="1" smtClean="0"/>
+                        <a:t>of</a:t>
+                      </a:r>
+                      <a:r>
+                        <a:rPr lang="de-DE" sz="1800" baseline="0" dirty="0" smtClean="0"/>
+                        <a:t> </a:t>
+                      </a:r>
+                      <a:r>
+                        <a:rPr lang="de-DE" sz="1800" baseline="0" dirty="0" err="1" smtClean="0"/>
+                        <a:t>player</a:t>
+                      </a:r>
+                      <a:r>
+                        <a:rPr lang="de-DE" sz="1800" baseline="0" dirty="0" smtClean="0"/>
+                        <a:t>, </a:t>
+                      </a:r>
+                      <a:r>
+                        <a:rPr lang="de-DE" sz="1800" baseline="0" dirty="0" err="1" smtClean="0"/>
+                        <a:t>weight</a:t>
+                      </a:r>
+                      <a:r>
+                        <a:rPr lang="de-DE" sz="1800" baseline="0" dirty="0" smtClean="0"/>
+                        <a:t>, …</a:t>
+                      </a:r>
+                      <a:endParaRPr lang="de-DE" sz="1800" baseline="0" dirty="0" smtClean="0"/>
+                    </a:p>
+                  </a:txBody>
+                  <a:tcPr/>
+                </a:tc>
+                <a:extLst>
+                  <a:ext uri="{0D108BD9-81ED-4DB2-BD59-A6C34878D82A}">
+                    <a16:rowId xmlns="" xmlns:a16="http://schemas.microsoft.com/office/drawing/2014/main" val="10002"/>
+                  </a:ext>
+                </a:extLst>
+              </a:tr>
+              <a:tr h="370840">
+                <a:tc>
+                  <a:txBody>
+                    <a:bodyPr/>
+                    <a:lstStyle/>
+                    <a:p>
+                      <a:pPr marL="0" marR="0" indent="0" algn="l" defTabSz="914400" rtl="0" eaLnBrk="1" fontAlgn="auto" latinLnBrk="0" hangingPunct="1">
+                        <a:lnSpc>
+                          <a:spcPct val="100000"/>
+                        </a:lnSpc>
+                        <a:spcBef>
+                          <a:spcPts val="0"/>
+                        </a:spcBef>
+                        <a:spcAft>
+                          <a:spcPts val="0"/>
+                        </a:spcAft>
+                        <a:buClrTx/>
+                        <a:buSzTx/>
+                        <a:buFontTx/>
+                        <a:buNone/>
+                        <a:tabLst/>
+                        <a:defRPr/>
+                      </a:pPr>
+                      <a:r>
+                        <a:rPr lang="de-DE" sz="1800" dirty="0" smtClean="0"/>
+                        <a:t>06.16</a:t>
+                      </a:r>
+                      <a:r>
+                        <a:rPr lang="de-DE" sz="1800" baseline="0" dirty="0" smtClean="0"/>
+                        <a:t> – 06.23</a:t>
+                      </a:r>
+                      <a:endParaRPr lang="de-DE" sz="1800" dirty="0"/>
+                    </a:p>
+                  </a:txBody>
+                  <a:tcPr/>
+                </a:tc>
+                <a:tc>
+                  <a:txBody>
+                    <a:bodyPr/>
+                    <a:lstStyle/>
+                    <a:p>
+                      <a:pPr lvl="0">
+                        <a:buFont typeface="Arial" pitchFamily="34" charset="0"/>
+                        <a:buChar char="•"/>
+                      </a:pPr>
+                      <a:r>
+                        <a:rPr lang="de-DE" sz="1800" dirty="0"/>
+                        <a:t> </a:t>
+                      </a:r>
+                      <a:r>
+                        <a:rPr lang="en-US" sz="1800" dirty="0" smtClean="0"/>
+                        <a:t>Thorough testing of the flying</a:t>
+                      </a:r>
+                      <a:r>
+                        <a:rPr lang="en-US" sz="1800" baseline="0" dirty="0" smtClean="0"/>
+                        <a:t> physics</a:t>
+                      </a:r>
+                    </a:p>
+                  </a:txBody>
+                  <a:tcPr/>
+                </a:tc>
+                <a:extLst>
+                  <a:ext uri="{0D108BD9-81ED-4DB2-BD59-A6C34878D82A}">
+                    <a16:rowId xmlns="" xmlns:a16="http://schemas.microsoft.com/office/drawing/2014/main" val="10003"/>
+                  </a:ext>
+                </a:extLst>
+              </a:tr>
+            </a:tbl>
+          </a:graphicData>
+        </a:graphic>
+      </p:graphicFrame>
+    </p:spTree>
+    <p:extLst>
+      <p:ext uri="{BB962C8B-B14F-4D97-AF65-F5344CB8AC3E}">
+        <p14:creationId xmlns:p14="http://schemas.microsoft.com/office/powerpoint/2010/main" val="2726051080"/>
+      </p:ext>
+    </p:extLst>
+  </p:cSld>
+  <p:clrMapOvr>
+    <a:masterClrMapping/>
+  </p:clrMapOvr>
+</p:sld>
+</file>
+
+<file path=ppt/slides/slide19.xml><?xml version="1.0" encoding="utf-8"?>
+<p:sld xmlns:a="http://schemas.openxmlformats.org/drawingml/2006/main" xmlns:r="http://schemas.openxmlformats.org/officeDocument/2006/relationships" xmlns:p="http://schemas.openxmlformats.org/presentationml/2006/main">
+  <p:cSld>
+    <p:spTree>
+      <p:nvGrpSpPr>
+        <p:cNvPr id="1" name=""/>
+        <p:cNvGrpSpPr/>
+        <p:nvPr/>
+      </p:nvGrpSpPr>
+      <p:grpSpPr>
+        <a:xfrm>
+          <a:off x="0" y="0"/>
+          <a:ext cx="0" cy="0"/>
+          <a:chOff x="0" y="0"/>
+          <a:chExt cx="0" cy="0"/>
+        </a:xfrm>
+      </p:grpSpPr>
+      <p:sp>
+        <p:nvSpPr>
+          <p:cNvPr id="2" name="Titel 1"/>
+          <p:cNvSpPr>
+            <a:spLocks noGrp="1"/>
+          </p:cNvSpPr>
+          <p:nvPr>
+            <p:ph type="title"/>
+          </p:nvPr>
+        </p:nvSpPr>
+        <p:spPr/>
+        <p:txBody>
+          <a:bodyPr/>
+          <a:lstStyle/>
+          <a:p>
+            <a:pPr algn="ctr"/>
+            <a:r>
+              <a:rPr lang="de-DE" dirty="0" err="1">
+                <a:solidFill>
+                  <a:srgbClr val="FF0000"/>
+                </a:solidFill>
+              </a:rPr>
+              <a:t>Exams</a:t>
+            </a:r>
+            <a:endParaRPr lang="de-DE" dirty="0"/>
+          </a:p>
+        </p:txBody>
+      </p:sp>
+      <p:sp>
+        <p:nvSpPr>
+          <p:cNvPr id="3" name="Inhaltsplatzhalter 2"/>
+          <p:cNvSpPr>
+            <a:spLocks noGrp="1"/>
+          </p:cNvSpPr>
+          <p:nvPr>
+            <p:ph idx="1"/>
+          </p:nvPr>
+        </p:nvSpPr>
+        <p:spPr/>
+        <p:txBody>
+          <a:bodyPr>
+            <a:normAutofit/>
+          </a:bodyPr>
+          <a:lstStyle/>
+          <a:p>
+            <a:r>
+              <a:rPr lang="de-DE" sz="2400" dirty="0"/>
+              <a:t>16.07.2016 - 30.07.2016 </a:t>
+            </a:r>
+            <a:r>
+              <a:rPr lang="de-DE" sz="2400" dirty="0" err="1"/>
+              <a:t>and</a:t>
+            </a:r>
+            <a:r>
+              <a:rPr lang="de-DE" sz="2400" dirty="0"/>
+              <a:t> 12.09.2016 - 24.09.2016</a:t>
+            </a:r>
+          </a:p>
+          <a:p>
+            <a:pPr lvl="1"/>
+            <a:r>
+              <a:rPr lang="de-DE" dirty="0" err="1"/>
+              <a:t>Exam</a:t>
+            </a:r>
+            <a:r>
+              <a:rPr lang="de-DE" dirty="0"/>
+              <a:t> </a:t>
+            </a:r>
+            <a:r>
+              <a:rPr lang="de-DE" dirty="0" err="1"/>
+              <a:t>and</a:t>
+            </a:r>
+            <a:r>
+              <a:rPr lang="de-DE" dirty="0"/>
+              <a:t> </a:t>
+            </a:r>
+            <a:r>
+              <a:rPr lang="de-DE" dirty="0" err="1"/>
+              <a:t>preperation</a:t>
+            </a:r>
+            <a:r>
+              <a:rPr lang="de-DE" dirty="0"/>
+              <a:t> 23.06 - 30.07 </a:t>
+            </a:r>
+          </a:p>
+          <a:p>
+            <a:pPr lvl="1"/>
+            <a:r>
+              <a:rPr lang="de-DE" dirty="0"/>
+              <a:t>Sec. </a:t>
+            </a:r>
+            <a:r>
+              <a:rPr lang="de-DE" dirty="0" err="1"/>
+              <a:t>exam</a:t>
+            </a:r>
+            <a:r>
+              <a:rPr lang="de-DE" dirty="0"/>
+              <a:t> </a:t>
+            </a:r>
+            <a:r>
+              <a:rPr lang="de-DE" dirty="0" err="1"/>
+              <a:t>phase</a:t>
+            </a:r>
+            <a:r>
+              <a:rPr lang="de-DE" dirty="0"/>
+              <a:t> -&gt; individual </a:t>
+            </a:r>
+            <a:r>
+              <a:rPr lang="de-DE" dirty="0" err="1"/>
+              <a:t>schedule</a:t>
+            </a:r>
+            <a:endParaRPr lang="de-DE" dirty="0"/>
+          </a:p>
+          <a:p>
+            <a:endParaRPr lang="de-DE" dirty="0"/>
+          </a:p>
+          <a:p>
+            <a:pPr lvl="1"/>
+            <a:endParaRPr lang="de-DE" dirty="0"/>
+          </a:p>
+          <a:p>
+            <a:pPr lvl="1"/>
+            <a:endParaRPr lang="de-DE" sz="2200" dirty="0"/>
+          </a:p>
+          <a:p>
+            <a:endParaRPr lang="de-DE" sz="2400" dirty="0"/>
+          </a:p>
+          <a:p>
+            <a:endParaRPr lang="de-DE" sz="2400" dirty="0"/>
+          </a:p>
+          <a:p>
+            <a:endParaRPr lang="de-DE" dirty="0"/>
+          </a:p>
+        </p:txBody>
+      </p:sp>
+      <p:sp>
+        <p:nvSpPr>
+          <p:cNvPr id="4" name="Foliennummernplatzhalter 3"/>
+          <p:cNvSpPr>
+            <a:spLocks noGrp="1"/>
+          </p:cNvSpPr>
+          <p:nvPr>
+            <p:ph type="sldNum" sz="quarter" idx="12"/>
+          </p:nvPr>
+        </p:nvSpPr>
+        <p:spPr/>
+        <p:txBody>
+          <a:bodyPr/>
+          <a:lstStyle/>
+          <a:p>
+            <a:fld id="{6C6AE60A-B69C-4790-82F7-3882EDF23186}" type="slidenum">
+              <a:rPr lang="de-DE" smtClean="0"/>
+              <a:pPr/>
+              <a:t>19</a:t>
+            </a:fld>
+            <a:endParaRPr lang="de-DE"/>
+          </a:p>
+        </p:txBody>
+      </p:sp>
+    </p:spTree>
+  </p:cSld>
+  <p:clrMapOvr>
+    <a:masterClrMapping/>
+  </p:clrMapOvr>
+</p:sld>
+</file>
+
+<file path=ppt/slides/slide2.xml><?xml version="1.0" encoding="utf-8"?>
+<p:sld xmlns:a="http://schemas.openxmlformats.org/drawingml/2006/main" xmlns:r="http://schemas.openxmlformats.org/officeDocument/2006/relationships" xmlns:p="http://schemas.openxmlformats.org/presentationml/2006/main">
+  <p:cSld>
+    <p:spTree>
+      <p:nvGrpSpPr>
+        <p:cNvPr id="1" name=""/>
+        <p:cNvGrpSpPr/>
+        <p:nvPr/>
+      </p:nvGrpSpPr>
+      <p:grpSpPr>
+        <a:xfrm>
+          <a:off x="0" y="0"/>
+          <a:ext cx="0" cy="0"/>
+          <a:chOff x="0" y="0"/>
+          <a:chExt cx="0" cy="0"/>
+        </a:xfrm>
+      </p:grpSpPr>
+      <p:sp>
+        <p:nvSpPr>
+          <p:cNvPr id="2" name="Titel 1"/>
+          <p:cNvSpPr>
+            <a:spLocks noGrp="1"/>
+          </p:cNvSpPr>
+          <p:nvPr>
+            <p:ph type="title"/>
+          </p:nvPr>
+        </p:nvSpPr>
+        <p:spPr/>
+        <p:txBody>
+          <a:bodyPr>
+            <a:normAutofit/>
+          </a:bodyPr>
+          <a:lstStyle/>
+          <a:p>
+            <a:pPr algn="ctr"/>
+            <a:r>
+              <a:rPr lang="de-DE" dirty="0"/>
+              <a:t>Content</a:t>
+            </a:r>
+          </a:p>
+        </p:txBody>
+      </p:sp>
+      <p:sp>
+        <p:nvSpPr>
+          <p:cNvPr id="9" name="Inhaltsplatzhalter 8"/>
+          <p:cNvSpPr>
+            <a:spLocks noGrp="1"/>
+          </p:cNvSpPr>
+          <p:nvPr>
+            <p:ph idx="1"/>
+          </p:nvPr>
+        </p:nvSpPr>
+        <p:spPr>
+          <a:xfrm>
+            <a:off x="2915816" y="1633364"/>
+            <a:ext cx="4464496" cy="3657600"/>
+          </a:xfrm>
+        </p:spPr>
+        <p:txBody>
+          <a:bodyPr>
+            <a:normAutofit/>
+          </a:bodyPr>
+          <a:lstStyle/>
+          <a:p>
+            <a:r>
+              <a:rPr lang="de-DE" dirty="0" err="1"/>
+              <a:t>Summary</a:t>
+            </a:r>
+            <a:endParaRPr lang="de-DE" dirty="0"/>
+          </a:p>
+          <a:p>
+            <a:r>
+              <a:rPr lang="de-DE" dirty="0"/>
+              <a:t>Project </a:t>
+            </a:r>
+            <a:r>
+              <a:rPr lang="de-DE" dirty="0" err="1"/>
+              <a:t>presentation</a:t>
+            </a:r>
+            <a:r>
+              <a:rPr lang="de-DE" dirty="0"/>
+              <a:t> (pp)</a:t>
+            </a:r>
+          </a:p>
+          <a:p>
+            <a:r>
+              <a:rPr lang="de-DE" dirty="0"/>
+              <a:t>Project </a:t>
+            </a:r>
+            <a:r>
+              <a:rPr lang="de-DE" dirty="0" err="1"/>
+              <a:t>extension</a:t>
+            </a:r>
+            <a:endParaRPr lang="de-DE" dirty="0"/>
+          </a:p>
+          <a:p>
+            <a:r>
+              <a:rPr lang="de-DE" dirty="0" err="1"/>
+              <a:t>Responsibilities</a:t>
+            </a:r>
+            <a:endParaRPr lang="de-DE" dirty="0"/>
+          </a:p>
+          <a:p>
+            <a:r>
+              <a:rPr lang="de-DE" dirty="0" err="1"/>
+              <a:t>Milestones</a:t>
+            </a:r>
+            <a:endParaRPr lang="de-DE" dirty="0"/>
+          </a:p>
+          <a:p>
+            <a:r>
+              <a:rPr lang="de-DE" dirty="0" err="1"/>
+              <a:t>Risks</a:t>
+            </a:r>
+            <a:endParaRPr lang="de-DE" dirty="0"/>
+          </a:p>
+          <a:p>
+            <a:pPr>
+              <a:buNone/>
+            </a:pPr>
+            <a:endParaRPr lang="de-DE" dirty="0"/>
+          </a:p>
+          <a:p>
+            <a:endParaRPr lang="de-DE" dirty="0"/>
+          </a:p>
+        </p:txBody>
+      </p:sp>
+      <p:sp>
+        <p:nvSpPr>
+          <p:cNvPr id="11" name="Foliennummernplatzhalter 10"/>
+          <p:cNvSpPr>
+            <a:spLocks noGrp="1"/>
+          </p:cNvSpPr>
+          <p:nvPr>
+            <p:ph type="sldNum" sz="quarter" idx="12"/>
+          </p:nvPr>
+        </p:nvSpPr>
+        <p:spPr/>
+        <p:txBody>
+          <a:bodyPr/>
+          <a:lstStyle/>
+          <a:p>
+            <a:fld id="{6C6AE60A-B69C-4790-82F7-3882EDF23186}" type="slidenum">
+              <a:rPr lang="de-DE" smtClean="0"/>
+              <a:pPr/>
+              <a:t>2</a:t>
+            </a:fld>
+            <a:endParaRPr lang="de-DE"/>
+          </a:p>
+        </p:txBody>
+      </p:sp>
+    </p:spTree>
+  </p:cSld>
+  <p:clrMapOvr>
+    <a:masterClrMapping/>
+  </p:clrMapOvr>
+</p:sld>
+</file>
+
+<file path=ppt/slides/slide20.xml><?xml version="1.0" encoding="utf-8"?>
+<p:sld xmlns:a="http://schemas.openxmlformats.org/drawingml/2006/main" xmlns:r="http://schemas.openxmlformats.org/officeDocument/2006/relationships" xmlns:p="http://schemas.openxmlformats.org/presentationml/2006/main">
+  <p:cSld>
+    <p:spTree>
+      <p:nvGrpSpPr>
+        <p:cNvPr id="1" name=""/>
+        <p:cNvGrpSpPr/>
+        <p:nvPr/>
+      </p:nvGrpSpPr>
+      <p:grpSpPr>
+        <a:xfrm>
+          <a:off x="0" y="0"/>
+          <a:ext cx="0" cy="0"/>
+          <a:chOff x="0" y="0"/>
+          <a:chExt cx="0" cy="0"/>
+        </a:xfrm>
+      </p:grpSpPr>
+      <p:sp>
+        <p:nvSpPr>
+          <p:cNvPr id="2" name="Titel 1"/>
+          <p:cNvSpPr>
+            <a:spLocks noGrp="1"/>
+          </p:cNvSpPr>
+          <p:nvPr>
+            <p:ph type="title"/>
+          </p:nvPr>
+        </p:nvSpPr>
+        <p:spPr/>
+        <p:txBody>
+          <a:bodyPr>
+            <a:normAutofit/>
+          </a:bodyPr>
+          <a:lstStyle/>
+          <a:p>
+            <a:pPr algn="ctr"/>
+            <a:r>
+              <a:rPr lang="de-DE" dirty="0" err="1">
+                <a:solidFill>
+                  <a:srgbClr val="FF0000"/>
+                </a:solidFill>
+              </a:rPr>
+              <a:t>Milestone</a:t>
+            </a:r>
+            <a:r>
+              <a:rPr lang="de-DE" dirty="0">
+                <a:solidFill>
+                  <a:srgbClr val="FF0000"/>
+                </a:solidFill>
+              </a:rPr>
+              <a:t> 3</a:t>
+            </a:r>
+          </a:p>
+        </p:txBody>
+      </p:sp>
+      <p:sp>
+        <p:nvSpPr>
+          <p:cNvPr id="9" name="Inhaltsplatzhalter 8"/>
+          <p:cNvSpPr>
+            <a:spLocks noGrp="1"/>
+          </p:cNvSpPr>
+          <p:nvPr>
+            <p:ph idx="1"/>
+          </p:nvPr>
+        </p:nvSpPr>
+        <p:spPr/>
+        <p:txBody>
+          <a:bodyPr>
+            <a:normAutofit/>
+          </a:bodyPr>
+          <a:lstStyle/>
+          <a:p>
+            <a:endParaRPr lang="de-DE" dirty="0"/>
+          </a:p>
+          <a:p>
+            <a:pPr>
+              <a:buNone/>
+            </a:pPr>
+            <a:endParaRPr lang="de-DE" dirty="0"/>
+          </a:p>
+          <a:p>
+            <a:endParaRPr lang="de-DE" dirty="0"/>
+          </a:p>
+        </p:txBody>
+      </p:sp>
+      <p:sp>
+        <p:nvSpPr>
+          <p:cNvPr id="11" name="Foliennummernplatzhalter 10"/>
+          <p:cNvSpPr>
+            <a:spLocks noGrp="1"/>
+          </p:cNvSpPr>
+          <p:nvPr>
+            <p:ph type="sldNum" sz="quarter" idx="12"/>
+          </p:nvPr>
+        </p:nvSpPr>
+        <p:spPr/>
+        <p:txBody>
+          <a:bodyPr/>
+          <a:lstStyle/>
+          <a:p>
+            <a:fld id="{6C6AE60A-B69C-4790-82F7-3882EDF23186}" type="slidenum">
+              <a:rPr lang="de-DE" smtClean="0"/>
+              <a:pPr/>
+              <a:t>20</a:t>
             </a:fld>
             <a:endParaRPr lang="de-DE"/>
           </a:p>
@@ -8348,14 +9628,14 @@
                 <a:gridCol w="1584176">
                   <a:extLst>
                     <a:ext uri="{9D8B030D-6E8A-4147-A177-3AD203B41FA5}">
-                      <a16:colId xmlns:a16="http://schemas.microsoft.com/office/drawing/2014/main" xmlns="" val="20000"/>
+                      <a16:colId xmlns="" xmlns:a16="http://schemas.microsoft.com/office/drawing/2014/main" val="20000"/>
                     </a:ext>
                   </a:extLst>
                 </a:gridCol>
                 <a:gridCol w="6480721">
                   <a:extLst>
                     <a:ext uri="{9D8B030D-6E8A-4147-A177-3AD203B41FA5}">
-                      <a16:colId xmlns:a16="http://schemas.microsoft.com/office/drawing/2014/main" xmlns="" val="20001"/>
+                      <a16:colId xmlns="" xmlns:a16="http://schemas.microsoft.com/office/drawing/2014/main" val="20001"/>
                     </a:ext>
                   </a:extLst>
                 </a:gridCol>
@@ -8397,7 +9677,7 @@
                 </a:tc>
                 <a:extLst>
                   <a:ext uri="{0D108BD9-81ED-4DB2-BD59-A6C34878D82A}">
-                    <a16:rowId xmlns:a16="http://schemas.microsoft.com/office/drawing/2014/main" xmlns="" val="10000"/>
+                    <a16:rowId xmlns="" xmlns:a16="http://schemas.microsoft.com/office/drawing/2014/main" val="10000"/>
                   </a:ext>
                 </a:extLst>
               </a:tr>
@@ -8455,7 +9735,7 @@
                 </a:tc>
                 <a:extLst>
                   <a:ext uri="{0D108BD9-81ED-4DB2-BD59-A6C34878D82A}">
-                    <a16:rowId xmlns:a16="http://schemas.microsoft.com/office/drawing/2014/main" xmlns="" val="10001"/>
+                    <a16:rowId xmlns="" xmlns:a16="http://schemas.microsoft.com/office/drawing/2014/main" val="10001"/>
                   </a:ext>
                 </a:extLst>
               </a:tr>
@@ -8602,7 +9882,7 @@
                 </a:tc>
                 <a:extLst>
                   <a:ext uri="{0D108BD9-81ED-4DB2-BD59-A6C34878D82A}">
-                    <a16:rowId xmlns:a16="http://schemas.microsoft.com/office/drawing/2014/main" xmlns="" val="10002"/>
+                    <a16:rowId xmlns="" xmlns:a16="http://schemas.microsoft.com/office/drawing/2014/main" val="10002"/>
                   </a:ext>
                 </a:extLst>
               </a:tr>
@@ -8653,7 +9933,7 @@
                 </a:tc>
                 <a:extLst>
                   <a:ext uri="{0D108BD9-81ED-4DB2-BD59-A6C34878D82A}">
-                    <a16:rowId xmlns:a16="http://schemas.microsoft.com/office/drawing/2014/main" xmlns="" val="10003"/>
+                    <a16:rowId xmlns="" xmlns:a16="http://schemas.microsoft.com/office/drawing/2014/main" val="10003"/>
                   </a:ext>
                 </a:extLst>
               </a:tr>
@@ -8682,63 +9962,63 @@
                         <a:buChar char="•"/>
                       </a:pPr>
                       <a:r>
-                        <a:rPr lang="de-DE" sz="1800" dirty="0"/>
+                        <a:rPr lang="de-DE" sz="1800" dirty="0" smtClean="0"/>
                         <a:t> </a:t>
                       </a:r>
                       <a:r>
-                        <a:rPr lang="de-DE" sz="1800" dirty="0" err="1"/>
+                        <a:rPr lang="de-DE" sz="1800" dirty="0" err="1" smtClean="0"/>
                         <a:t>Buffer</a:t>
                       </a:r>
                       <a:r>
-                        <a:rPr lang="de-DE" sz="1800" baseline="0" dirty="0"/>
+                        <a:rPr lang="de-DE" sz="1800" baseline="0" dirty="0" smtClean="0"/>
                         <a:t> </a:t>
                       </a:r>
                       <a:r>
-                        <a:rPr lang="de-DE" sz="1800" baseline="0" dirty="0" err="1"/>
+                        <a:rPr lang="de-DE" sz="1800" baseline="0" dirty="0" err="1" smtClean="0"/>
                         <a:t>until</a:t>
                       </a:r>
                       <a:r>
-                        <a:rPr lang="de-DE" sz="1800" baseline="0" dirty="0"/>
+                        <a:rPr lang="de-DE" sz="1800" baseline="0" dirty="0" smtClean="0"/>
                         <a:t> </a:t>
                       </a:r>
                       <a:r>
-                        <a:rPr lang="de-DE" sz="1800" baseline="0" dirty="0" err="1"/>
+                        <a:rPr lang="de-DE" sz="1800" baseline="0" dirty="0" err="1" smtClean="0"/>
                         <a:t>project</a:t>
                       </a:r>
                       <a:r>
-                        <a:rPr lang="de-DE" sz="1800" baseline="0" dirty="0"/>
+                        <a:rPr lang="de-DE" sz="1800" baseline="0" dirty="0" smtClean="0"/>
                         <a:t> end (Fly </a:t>
                       </a:r>
                       <a:r>
-                        <a:rPr lang="de-DE" sz="1800" baseline="0" dirty="0" err="1"/>
+                        <a:rPr lang="de-DE" sz="1800" baseline="0" dirty="0" err="1" smtClean="0"/>
                         <a:t>physics</a:t>
                       </a:r>
                       <a:r>
-                        <a:rPr lang="de-DE" sz="1800" baseline="0" dirty="0"/>
+                        <a:rPr lang="de-DE" sz="1800" baseline="0" dirty="0" smtClean="0"/>
                         <a:t>, </a:t>
                       </a:r>
                       <a:r>
-                        <a:rPr lang="de-DE" sz="1800" baseline="0" dirty="0" err="1"/>
+                        <a:rPr lang="de-DE" sz="1800" baseline="0" dirty="0" err="1" smtClean="0"/>
                         <a:t>game</a:t>
                       </a:r>
                       <a:r>
-                        <a:rPr lang="de-DE" sz="1800" baseline="0" dirty="0"/>
+                        <a:rPr lang="de-DE" sz="1800" baseline="0" dirty="0" smtClean="0"/>
                         <a:t> </a:t>
                       </a:r>
                       <a:r>
-                        <a:rPr lang="de-DE" sz="1800" baseline="0" dirty="0" err="1"/>
-                        <a:t>locigs</a:t>
-                      </a:r>
-                      <a:r>
-                        <a:rPr lang="de-DE" sz="1800" baseline="0" dirty="0"/>
+                        <a:rPr lang="de-DE" sz="1800" baseline="0" dirty="0" err="1" smtClean="0"/>
+                        <a:t>logics</a:t>
+                      </a:r>
+                      <a:r>
+                        <a:rPr lang="de-DE" sz="1800" baseline="0" dirty="0" smtClean="0"/>
                         <a:t>, </a:t>
                       </a:r>
                       <a:r>
-                        <a:rPr lang="de-DE" sz="1800" baseline="0" dirty="0" err="1"/>
+                        <a:rPr lang="de-DE" sz="1800" baseline="0" dirty="0" err="1" smtClean="0"/>
                         <a:t>assistant</a:t>
                       </a:r>
                       <a:r>
-                        <a:rPr lang="de-DE" sz="1800" baseline="0" dirty="0"/>
+                        <a:rPr lang="de-DE" sz="1800" baseline="0" dirty="0" smtClean="0"/>
                         <a:t>)</a:t>
                       </a:r>
                       <a:endParaRPr lang="de-DE" sz="1800" dirty="0"/>
@@ -8748,7 +10028,7 @@
                 </a:tc>
                 <a:extLst>
                   <a:ext uri="{0D108BD9-81ED-4DB2-BD59-A6C34878D82A}">
-                    <a16:rowId xmlns:a16="http://schemas.microsoft.com/office/drawing/2014/main" xmlns="" val="10004"/>
+                    <a16:rowId xmlns="" xmlns:a16="http://schemas.microsoft.com/office/drawing/2014/main" val="10004"/>
                   </a:ext>
                 </a:extLst>
               </a:tr>
@@ -8764,7 +10044,7 @@
 </p:sld>
 </file>
 
-<file path=ppt/slides/slide19.xml><?xml version="1.0" encoding="utf-8"?>
+<file path=ppt/slides/slide21.xml><?xml version="1.0" encoding="utf-8"?>
 <p:sld xmlns:a="http://schemas.openxmlformats.org/drawingml/2006/main" xmlns:r="http://schemas.openxmlformats.org/officeDocument/2006/relationships" xmlns:p="http://schemas.openxmlformats.org/presentationml/2006/main">
   <p:cSld>
     <p:spTree>
@@ -8866,7 +10146,7 @@
             <a:fld id="{6C6AE60A-B69C-4790-82F7-3882EDF23186}" type="slidenum">
               <a:rPr lang="de-DE" smtClean="0"/>
               <a:pPr/>
-              <a:t>19</a:t>
+              <a:t>21</a:t>
             </a:fld>
             <a:endParaRPr lang="de-DE"/>
           </a:p>
@@ -8881,7 +10161,7 @@
           <p:nvPr>
             <p:extLst>
               <p:ext uri="{D42A27DB-BD31-4B8C-83A1-F6EECF244321}">
-                <p14:modId xmlns:p14="http://schemas.microsoft.com/office/powerpoint/2010/main" xmlns="" val="1031210796"/>
+                <p14:modId xmlns:p14="http://schemas.microsoft.com/office/powerpoint/2010/main" val="1031210796"/>
               </p:ext>
             </p:extLst>
           </p:nvPr>
@@ -8900,14 +10180,14 @@
                 <a:gridCol w="1584176">
                   <a:extLst>
                     <a:ext uri="{9D8B030D-6E8A-4147-A177-3AD203B41FA5}">
-                      <a16:colId xmlns:a16="http://schemas.microsoft.com/office/drawing/2014/main" xmlns="" val="20000"/>
+                      <a16:colId xmlns="" xmlns:a16="http://schemas.microsoft.com/office/drawing/2014/main" val="20000"/>
                     </a:ext>
                   </a:extLst>
                 </a:gridCol>
                 <a:gridCol w="6480721">
                   <a:extLst>
                     <a:ext uri="{9D8B030D-6E8A-4147-A177-3AD203B41FA5}">
-                      <a16:colId xmlns:a16="http://schemas.microsoft.com/office/drawing/2014/main" xmlns="" val="20001"/>
+                      <a16:colId xmlns="" xmlns:a16="http://schemas.microsoft.com/office/drawing/2014/main" val="20001"/>
                     </a:ext>
                   </a:extLst>
                 </a:gridCol>
@@ -8944,7 +10224,7 @@
                 </a:tc>
                 <a:extLst>
                   <a:ext uri="{0D108BD9-81ED-4DB2-BD59-A6C34878D82A}">
-                    <a16:rowId xmlns:a16="http://schemas.microsoft.com/office/drawing/2014/main" xmlns="" val="10000"/>
+                    <a16:rowId xmlns="" xmlns:a16="http://schemas.microsoft.com/office/drawing/2014/main" val="10000"/>
                   </a:ext>
                 </a:extLst>
               </a:tr>
@@ -8992,7 +10272,7 @@
                 </a:tc>
                 <a:extLst>
                   <a:ext uri="{0D108BD9-81ED-4DB2-BD59-A6C34878D82A}">
-                    <a16:rowId xmlns:a16="http://schemas.microsoft.com/office/drawing/2014/main" xmlns="" val="10001"/>
+                    <a16:rowId xmlns="" xmlns:a16="http://schemas.microsoft.com/office/drawing/2014/main" val="10001"/>
                   </a:ext>
                 </a:extLst>
               </a:tr>
@@ -9048,7 +10328,7 @@
                 </a:tc>
                 <a:extLst>
                   <a:ext uri="{0D108BD9-81ED-4DB2-BD59-A6C34878D82A}">
-                    <a16:rowId xmlns:a16="http://schemas.microsoft.com/office/drawing/2014/main" xmlns="" val="10002"/>
+                    <a16:rowId xmlns="" xmlns:a16="http://schemas.microsoft.com/office/drawing/2014/main" val="10002"/>
                   </a:ext>
                 </a:extLst>
               </a:tr>
@@ -9107,7 +10387,7 @@
                 </a:tc>
                 <a:extLst>
                   <a:ext uri="{0D108BD9-81ED-4DB2-BD59-A6C34878D82A}">
-                    <a16:rowId xmlns:a16="http://schemas.microsoft.com/office/drawing/2014/main" xmlns="" val="10003"/>
+                    <a16:rowId xmlns="" xmlns:a16="http://schemas.microsoft.com/office/drawing/2014/main" val="10003"/>
                   </a:ext>
                 </a:extLst>
               </a:tr>
@@ -9136,63 +10416,63 @@
                         <a:buChar char="•"/>
                       </a:pPr>
                       <a:r>
-                        <a:rPr lang="de-DE" sz="1800" dirty="0"/>
+                        <a:rPr lang="de-DE" sz="1800" dirty="0" smtClean="0"/>
                         <a:t> </a:t>
                       </a:r>
                       <a:r>
-                        <a:rPr lang="de-DE" sz="1800" dirty="0" err="1"/>
+                        <a:rPr lang="de-DE" sz="1800" dirty="0" err="1" smtClean="0"/>
                         <a:t>Buffer</a:t>
                       </a:r>
                       <a:r>
-                        <a:rPr lang="de-DE" sz="1800" baseline="0" dirty="0"/>
+                        <a:rPr lang="de-DE" sz="1800" baseline="0" dirty="0" smtClean="0"/>
                         <a:t> </a:t>
                       </a:r>
                       <a:r>
-                        <a:rPr lang="de-DE" sz="1800" baseline="0" dirty="0" err="1"/>
+                        <a:rPr lang="de-DE" sz="1800" baseline="0" dirty="0" err="1" smtClean="0"/>
                         <a:t>until</a:t>
                       </a:r>
                       <a:r>
-                        <a:rPr lang="de-DE" sz="1800" baseline="0" dirty="0"/>
+                        <a:rPr lang="de-DE" sz="1800" baseline="0" dirty="0" smtClean="0"/>
                         <a:t> </a:t>
                       </a:r>
                       <a:r>
-                        <a:rPr lang="de-DE" sz="1800" baseline="0" dirty="0" err="1"/>
+                        <a:rPr lang="de-DE" sz="1800" baseline="0" dirty="0" err="1" smtClean="0"/>
                         <a:t>project</a:t>
                       </a:r>
                       <a:r>
-                        <a:rPr lang="de-DE" sz="1800" baseline="0" dirty="0"/>
+                        <a:rPr lang="de-DE" sz="1800" baseline="0" dirty="0" smtClean="0"/>
                         <a:t> end (Fly </a:t>
                       </a:r>
                       <a:r>
-                        <a:rPr lang="de-DE" sz="1800" baseline="0" dirty="0" err="1"/>
+                        <a:rPr lang="de-DE" sz="1800" baseline="0" dirty="0" err="1" smtClean="0"/>
                         <a:t>physics</a:t>
                       </a:r>
                       <a:r>
-                        <a:rPr lang="de-DE" sz="1800" baseline="0" dirty="0"/>
+                        <a:rPr lang="de-DE" sz="1800" baseline="0" dirty="0" smtClean="0"/>
                         <a:t>, </a:t>
                       </a:r>
                       <a:r>
-                        <a:rPr lang="de-DE" sz="1800" baseline="0" dirty="0" err="1"/>
+                        <a:rPr lang="de-DE" sz="1800" baseline="0" dirty="0" err="1" smtClean="0"/>
                         <a:t>game</a:t>
                       </a:r>
                       <a:r>
-                        <a:rPr lang="de-DE" sz="1800" baseline="0" dirty="0"/>
+                        <a:rPr lang="de-DE" sz="1800" baseline="0" dirty="0" smtClean="0"/>
                         <a:t> </a:t>
                       </a:r>
                       <a:r>
-                        <a:rPr lang="de-DE" sz="1800" baseline="0" dirty="0" err="1"/>
-                        <a:t>locigs</a:t>
-                      </a:r>
-                      <a:r>
-                        <a:rPr lang="de-DE" sz="1800" baseline="0" dirty="0"/>
+                        <a:rPr lang="de-DE" sz="1800" baseline="0" dirty="0" err="1" smtClean="0"/>
+                        <a:t>logics</a:t>
+                      </a:r>
+                      <a:r>
+                        <a:rPr lang="de-DE" sz="1800" baseline="0" dirty="0" smtClean="0"/>
                         <a:t>, </a:t>
                       </a:r>
                       <a:r>
-                        <a:rPr lang="de-DE" sz="1800" baseline="0" dirty="0" err="1"/>
+                        <a:rPr lang="de-DE" sz="1800" baseline="0" dirty="0" err="1" smtClean="0"/>
                         <a:t>assistant</a:t>
                       </a:r>
                       <a:r>
-                        <a:rPr lang="de-DE" sz="1800" baseline="0" dirty="0"/>
+                        <a:rPr lang="de-DE" sz="1800" baseline="0" dirty="0" smtClean="0"/>
                         <a:t>)</a:t>
                       </a:r>
                       <a:endParaRPr lang="de-DE" sz="1800" dirty="0"/>
@@ -9202,7 +10482,7 @@
                 </a:tc>
                 <a:extLst>
                   <a:ext uri="{0D108BD9-81ED-4DB2-BD59-A6C34878D82A}">
-                    <a16:rowId xmlns:a16="http://schemas.microsoft.com/office/drawing/2014/main" xmlns="" val="10004"/>
+                    <a16:rowId xmlns="" xmlns:a16="http://schemas.microsoft.com/office/drawing/2014/main" val="10004"/>
                   </a:ext>
                 </a:extLst>
               </a:tr>
@@ -9213,7 +10493,7 @@
     </p:spTree>
     <p:extLst>
       <p:ext uri="{BB962C8B-B14F-4D97-AF65-F5344CB8AC3E}">
-        <p14:creationId xmlns:p14="http://schemas.microsoft.com/office/powerpoint/2010/main" xmlns="" val="3532623066"/>
+        <p14:creationId xmlns:p14="http://schemas.microsoft.com/office/powerpoint/2010/main" val="3532623066"/>
       </p:ext>
     </p:extLst>
   </p:cSld>
@@ -9223,7 +10503,7 @@
 </p:sld>
 </file>
 
-<file path=ppt/slides/slide2.xml><?xml version="1.0" encoding="utf-8"?>
+<file path=ppt/slides/slide22.xml><?xml version="1.0" encoding="utf-8"?>
 <p:sld xmlns:a="http://schemas.openxmlformats.org/drawingml/2006/main" xmlns:r="http://schemas.openxmlformats.org/officeDocument/2006/relationships" xmlns:p="http://schemas.openxmlformats.org/presentationml/2006/main">
   <p:cSld>
     <p:spTree>
@@ -9259,165 +10539,6 @@
           <a:p>
             <a:pPr algn="ctr"/>
             <a:r>
-              <a:rPr lang="de-DE" dirty="0"/>
-              <a:t>Content</a:t>
-            </a:r>
-          </a:p>
-        </p:txBody>
-      </p:sp>
-      <p:sp>
-        <p:nvSpPr>
-          <p:cNvPr id="9" name="Inhaltsplatzhalter 8"/>
-          <p:cNvSpPr>
-            <a:spLocks noGrp="1"/>
-          </p:cNvSpPr>
-          <p:nvPr>
-            <p:ph idx="1"/>
-          </p:nvPr>
-        </p:nvSpPr>
-        <p:spPr>
-          <a:xfrm>
-            <a:off x="2915816" y="1633364"/>
-            <a:ext cx="4464496" cy="3657600"/>
-          </a:xfrm>
-        </p:spPr>
-        <p:txBody>
-          <a:bodyPr>
-            <a:normAutofit/>
-          </a:bodyPr>
-          <a:lstStyle/>
-          <a:p>
-            <a:r>
-              <a:rPr lang="de-DE" dirty="0" err="1"/>
-              <a:t>Summary</a:t>
-            </a:r>
-            <a:endParaRPr lang="de-DE" dirty="0"/>
-          </a:p>
-          <a:p>
-            <a:r>
-              <a:rPr lang="de-DE" dirty="0"/>
-              <a:t>Project </a:t>
-            </a:r>
-            <a:r>
-              <a:rPr lang="de-DE" dirty="0" err="1"/>
-              <a:t>presentation</a:t>
-            </a:r>
-            <a:r>
-              <a:rPr lang="de-DE" dirty="0"/>
-              <a:t> (pp)</a:t>
-            </a:r>
-          </a:p>
-          <a:p>
-            <a:r>
-              <a:rPr lang="de-DE" dirty="0"/>
-              <a:t>Project </a:t>
-            </a:r>
-            <a:r>
-              <a:rPr lang="de-DE" dirty="0" err="1"/>
-              <a:t>extension</a:t>
-            </a:r>
-            <a:endParaRPr lang="de-DE" dirty="0"/>
-          </a:p>
-          <a:p>
-            <a:r>
-              <a:rPr lang="de-DE" dirty="0" err="1"/>
-              <a:t>Responsibilities</a:t>
-            </a:r>
-            <a:endParaRPr lang="de-DE" dirty="0"/>
-          </a:p>
-          <a:p>
-            <a:r>
-              <a:rPr lang="de-DE" dirty="0" err="1"/>
-              <a:t>Milestones</a:t>
-            </a:r>
-            <a:endParaRPr lang="de-DE" dirty="0"/>
-          </a:p>
-          <a:p>
-            <a:r>
-              <a:rPr lang="de-DE" dirty="0" err="1"/>
-              <a:t>Risks</a:t>
-            </a:r>
-            <a:endParaRPr lang="de-DE" dirty="0"/>
-          </a:p>
-          <a:p>
-            <a:pPr>
-              <a:buNone/>
-            </a:pPr>
-            <a:endParaRPr lang="de-DE" dirty="0"/>
-          </a:p>
-          <a:p>
-            <a:endParaRPr lang="de-DE" dirty="0"/>
-          </a:p>
-        </p:txBody>
-      </p:sp>
-      <p:sp>
-        <p:nvSpPr>
-          <p:cNvPr id="11" name="Foliennummernplatzhalter 10"/>
-          <p:cNvSpPr>
-            <a:spLocks noGrp="1"/>
-          </p:cNvSpPr>
-          <p:nvPr>
-            <p:ph type="sldNum" sz="quarter" idx="12"/>
-          </p:nvPr>
-        </p:nvSpPr>
-        <p:spPr/>
-        <p:txBody>
-          <a:bodyPr/>
-          <a:lstStyle/>
-          <a:p>
-            <a:fld id="{6C6AE60A-B69C-4790-82F7-3882EDF23186}" type="slidenum">
-              <a:rPr lang="de-DE" smtClean="0"/>
-              <a:pPr/>
-              <a:t>2</a:t>
-            </a:fld>
-            <a:endParaRPr lang="de-DE"/>
-          </a:p>
-        </p:txBody>
-      </p:sp>
-    </p:spTree>
-  </p:cSld>
-  <p:clrMapOvr>
-    <a:masterClrMapping/>
-  </p:clrMapOvr>
-</p:sld>
-</file>
-
-<file path=ppt/slides/slide20.xml><?xml version="1.0" encoding="utf-8"?>
-<p:sld xmlns:a="http://schemas.openxmlformats.org/drawingml/2006/main" xmlns:r="http://schemas.openxmlformats.org/officeDocument/2006/relationships" xmlns:p="http://schemas.openxmlformats.org/presentationml/2006/main">
-  <p:cSld>
-    <p:spTree>
-      <p:nvGrpSpPr>
-        <p:cNvPr id="1" name=""/>
-        <p:cNvGrpSpPr/>
-        <p:nvPr/>
-      </p:nvGrpSpPr>
-      <p:grpSpPr>
-        <a:xfrm>
-          <a:off x="0" y="0"/>
-          <a:ext cx="0" cy="0"/>
-          <a:chOff x="0" y="0"/>
-          <a:chExt cx="0" cy="0"/>
-        </a:xfrm>
-      </p:grpSpPr>
-      <p:sp>
-        <p:nvSpPr>
-          <p:cNvPr id="2" name="Titel 1"/>
-          <p:cNvSpPr>
-            <a:spLocks noGrp="1"/>
-          </p:cNvSpPr>
-          <p:nvPr>
-            <p:ph type="title"/>
-          </p:nvPr>
-        </p:nvSpPr>
-        <p:spPr/>
-        <p:txBody>
-          <a:bodyPr>
-            <a:normAutofit/>
-          </a:bodyPr>
-          <a:lstStyle/>
-          <a:p>
-            <a:pPr algn="ctr"/>
-            <a:r>
               <a:rPr lang="de-DE" dirty="0" err="1">
                 <a:solidFill>
                   <a:srgbClr val="FF0000"/>
@@ -9484,7 +10605,7 @@
             <a:fld id="{6C6AE60A-B69C-4790-82F7-3882EDF23186}" type="slidenum">
               <a:rPr lang="de-DE" smtClean="0"/>
               <a:pPr/>
-              <a:t>20</a:t>
+              <a:t>22</a:t>
             </a:fld>
             <a:endParaRPr lang="de-DE"/>
           </a:p>
@@ -9499,7 +10620,7 @@
           <p:nvPr>
             <p:extLst>
               <p:ext uri="{D42A27DB-BD31-4B8C-83A1-F6EECF244321}">
-                <p14:modId xmlns:p14="http://schemas.microsoft.com/office/powerpoint/2010/main" xmlns="" val="1031210796"/>
+                <p14:modId xmlns:p14="http://schemas.microsoft.com/office/powerpoint/2010/main" val="1031210796"/>
               </p:ext>
             </p:extLst>
           </p:nvPr>
@@ -9518,14 +10639,14 @@
                 <a:gridCol w="1584176">
                   <a:extLst>
                     <a:ext uri="{9D8B030D-6E8A-4147-A177-3AD203B41FA5}">
-                      <a16:colId xmlns:a16="http://schemas.microsoft.com/office/drawing/2014/main" xmlns="" val="20000"/>
+                      <a16:colId xmlns="" xmlns:a16="http://schemas.microsoft.com/office/drawing/2014/main" val="20000"/>
                     </a:ext>
                   </a:extLst>
                 </a:gridCol>
                 <a:gridCol w="6480721">
                   <a:extLst>
                     <a:ext uri="{9D8B030D-6E8A-4147-A177-3AD203B41FA5}">
-                      <a16:colId xmlns:a16="http://schemas.microsoft.com/office/drawing/2014/main" xmlns="" val="20001"/>
+                      <a16:colId xmlns="" xmlns:a16="http://schemas.microsoft.com/office/drawing/2014/main" val="20001"/>
                     </a:ext>
                   </a:extLst>
                 </a:gridCol>
@@ -9563,7 +10684,7 @@
                 </a:tc>
                 <a:extLst>
                   <a:ext uri="{0D108BD9-81ED-4DB2-BD59-A6C34878D82A}">
-                    <a16:rowId xmlns:a16="http://schemas.microsoft.com/office/drawing/2014/main" xmlns="" val="10000"/>
+                    <a16:rowId xmlns="" xmlns:a16="http://schemas.microsoft.com/office/drawing/2014/main" val="10000"/>
                   </a:ext>
                 </a:extLst>
               </a:tr>
@@ -9659,7 +10780,7 @@
                 </a:tc>
                 <a:extLst>
                   <a:ext uri="{0D108BD9-81ED-4DB2-BD59-A6C34878D82A}">
-                    <a16:rowId xmlns:a16="http://schemas.microsoft.com/office/drawing/2014/main" xmlns="" val="10001"/>
+                    <a16:rowId xmlns="" xmlns:a16="http://schemas.microsoft.com/office/drawing/2014/main" val="10001"/>
                   </a:ext>
                 </a:extLst>
               </a:tr>
@@ -9715,7 +10836,7 @@
                 </a:tc>
                 <a:extLst>
                   <a:ext uri="{0D108BD9-81ED-4DB2-BD59-A6C34878D82A}">
-                    <a16:rowId xmlns:a16="http://schemas.microsoft.com/office/drawing/2014/main" xmlns="" val="10002"/>
+                    <a16:rowId xmlns="" xmlns:a16="http://schemas.microsoft.com/office/drawing/2014/main" val="10002"/>
                   </a:ext>
                 </a:extLst>
               </a:tr>
@@ -9782,7 +10903,7 @@
                 </a:tc>
                 <a:extLst>
                   <a:ext uri="{0D108BD9-81ED-4DB2-BD59-A6C34878D82A}">
-                    <a16:rowId xmlns:a16="http://schemas.microsoft.com/office/drawing/2014/main" xmlns="" val="10003"/>
+                    <a16:rowId xmlns="" xmlns:a16="http://schemas.microsoft.com/office/drawing/2014/main" val="10003"/>
                   </a:ext>
                 </a:extLst>
               </a:tr>
@@ -9849,7 +10970,7 @@
                 </a:tc>
                 <a:extLst>
                   <a:ext uri="{0D108BD9-81ED-4DB2-BD59-A6C34878D82A}">
-                    <a16:rowId xmlns:a16="http://schemas.microsoft.com/office/drawing/2014/main" xmlns="" val="10004"/>
+                    <a16:rowId xmlns="" xmlns:a16="http://schemas.microsoft.com/office/drawing/2014/main" val="10004"/>
                   </a:ext>
                 </a:extLst>
               </a:tr>
@@ -9860,632 +10981,9 @@
     </p:spTree>
     <p:extLst>
       <p:ext uri="{BB962C8B-B14F-4D97-AF65-F5344CB8AC3E}">
-        <p14:creationId xmlns:p14="http://schemas.microsoft.com/office/powerpoint/2010/main" xmlns="" val="3532623066"/>
+        <p14:creationId xmlns:p14="http://schemas.microsoft.com/office/powerpoint/2010/main" val="3532623066"/>
       </p:ext>
     </p:extLst>
-  </p:cSld>
-  <p:clrMapOvr>
-    <a:masterClrMapping/>
-  </p:clrMapOvr>
-</p:sld>
-</file>
-
-<file path=ppt/slides/slide21.xml><?xml version="1.0" encoding="utf-8"?>
-<p:sld xmlns:a="http://schemas.openxmlformats.org/drawingml/2006/main" xmlns:r="http://schemas.openxmlformats.org/officeDocument/2006/relationships" xmlns:p="http://schemas.openxmlformats.org/presentationml/2006/main">
-  <p:cSld>
-    <p:spTree>
-      <p:nvGrpSpPr>
-        <p:cNvPr id="1" name=""/>
-        <p:cNvGrpSpPr/>
-        <p:nvPr/>
-      </p:nvGrpSpPr>
-      <p:grpSpPr>
-        <a:xfrm>
-          <a:off x="0" y="0"/>
-          <a:ext cx="0" cy="0"/>
-          <a:chOff x="0" y="0"/>
-          <a:chExt cx="0" cy="0"/>
-        </a:xfrm>
-      </p:grpSpPr>
-      <p:sp>
-        <p:nvSpPr>
-          <p:cNvPr id="2" name="Titel 1"/>
-          <p:cNvSpPr>
-            <a:spLocks noGrp="1"/>
-          </p:cNvSpPr>
-          <p:nvPr>
-            <p:ph type="title"/>
-          </p:nvPr>
-        </p:nvSpPr>
-        <p:spPr/>
-        <p:txBody>
-          <a:bodyPr>
-            <a:normAutofit/>
-          </a:bodyPr>
-          <a:lstStyle/>
-          <a:p>
-            <a:pPr algn="ctr"/>
-            <a:r>
-              <a:rPr lang="de-DE" dirty="0" err="1"/>
-              <a:t>Risks</a:t>
-            </a:r>
-            <a:endParaRPr lang="de-DE" dirty="0"/>
-          </a:p>
-        </p:txBody>
-      </p:sp>
-      <p:sp>
-        <p:nvSpPr>
-          <p:cNvPr id="9" name="Inhaltsplatzhalter 8"/>
-          <p:cNvSpPr>
-            <a:spLocks noGrp="1"/>
-          </p:cNvSpPr>
-          <p:nvPr>
-            <p:ph sz="half" idx="1"/>
-          </p:nvPr>
-        </p:nvSpPr>
-        <p:spPr/>
-        <p:txBody>
-          <a:bodyPr>
-            <a:normAutofit lnSpcReduction="10000"/>
-          </a:bodyPr>
-          <a:lstStyle/>
-          <a:p>
-            <a:r>
-              <a:rPr lang="de-DE" sz="2400" dirty="0"/>
-              <a:t>Fly </a:t>
-            </a:r>
-            <a:r>
-              <a:rPr lang="de-DE" sz="2400" dirty="0" err="1"/>
-              <a:t>physics</a:t>
-            </a:r>
-            <a:r>
-              <a:rPr lang="de-DE" sz="2400" dirty="0"/>
-              <a:t> - </a:t>
-            </a:r>
-            <a:r>
-              <a:rPr lang="de-DE" sz="2400" dirty="0" err="1"/>
-              <a:t>maths</a:t>
-            </a:r>
-            <a:r>
-              <a:rPr lang="de-DE" sz="2400" dirty="0"/>
-              <a:t> </a:t>
-            </a:r>
-            <a:r>
-              <a:rPr lang="de-DE" sz="2400" dirty="0" err="1"/>
-              <a:t>too</a:t>
-            </a:r>
-            <a:r>
-              <a:rPr lang="de-DE" sz="2400" dirty="0"/>
-              <a:t> </a:t>
-            </a:r>
-            <a:r>
-              <a:rPr lang="de-DE" sz="2400" dirty="0" err="1"/>
-              <a:t>complicated</a:t>
-            </a:r>
-            <a:r>
-              <a:rPr lang="de-DE" sz="2400" dirty="0"/>
-              <a:t>?</a:t>
-            </a:r>
-            <a:endParaRPr lang="de-DE" dirty="0"/>
-          </a:p>
-          <a:p>
-            <a:r>
-              <a:rPr lang="de-DE" sz="2400" dirty="0"/>
-              <a:t>Arm </a:t>
-            </a:r>
-            <a:r>
-              <a:rPr lang="de-DE" sz="2400" dirty="0" err="1"/>
-              <a:t>network</a:t>
-            </a:r>
-            <a:r>
-              <a:rPr lang="de-DE" sz="2400" dirty="0"/>
-              <a:t> </a:t>
-            </a:r>
-            <a:r>
-              <a:rPr lang="de-DE" sz="2400" dirty="0" err="1"/>
-              <a:t>transmission</a:t>
-            </a:r>
-            <a:endParaRPr lang="de-DE" sz="2400" dirty="0"/>
-          </a:p>
-          <a:p>
-            <a:r>
-              <a:rPr lang="de-DE" sz="2400" dirty="0"/>
-              <a:t>Post-</a:t>
-            </a:r>
-            <a:r>
-              <a:rPr lang="de-DE" sz="2400" dirty="0" err="1"/>
-              <a:t>effects</a:t>
-            </a:r>
-            <a:r>
-              <a:rPr lang="de-DE" sz="2400" dirty="0"/>
-              <a:t> (</a:t>
-            </a:r>
-            <a:r>
-              <a:rPr lang="de-DE" sz="2400" dirty="0" err="1"/>
-              <a:t>scattering</a:t>
-            </a:r>
-            <a:r>
-              <a:rPr lang="de-DE" sz="2400" dirty="0"/>
-              <a:t>, </a:t>
-            </a:r>
-            <a:r>
-              <a:rPr lang="de-DE" sz="2400" dirty="0" err="1"/>
-              <a:t>ambient</a:t>
-            </a:r>
-            <a:r>
-              <a:rPr lang="de-DE" sz="2400" dirty="0"/>
-              <a:t> </a:t>
-            </a:r>
-            <a:r>
-              <a:rPr lang="de-DE" sz="2400" dirty="0" err="1"/>
-              <a:t>occlusion</a:t>
-            </a:r>
-            <a:r>
-              <a:rPr lang="de-DE" sz="2400" dirty="0"/>
-              <a:t>)</a:t>
-            </a:r>
-          </a:p>
-          <a:p>
-            <a:r>
-              <a:rPr lang="de-DE" sz="2400" dirty="0"/>
-              <a:t>Realtime Performance </a:t>
-            </a:r>
-            <a:r>
-              <a:rPr lang="de-DE" sz="2400" dirty="0" err="1"/>
-              <a:t>Issues</a:t>
-            </a:r>
-            <a:r>
-              <a:rPr lang="de-DE" sz="2400" dirty="0"/>
-              <a:t> </a:t>
-            </a:r>
-            <a:r>
-              <a:rPr lang="de-DE" sz="2400" dirty="0" err="1"/>
-              <a:t>for</a:t>
-            </a:r>
-            <a:r>
-              <a:rPr lang="de-DE" sz="2400" dirty="0"/>
-              <a:t> </a:t>
-            </a:r>
-            <a:r>
-              <a:rPr lang="de-DE" sz="2400" dirty="0" err="1"/>
-              <a:t>slower</a:t>
-            </a:r>
-            <a:r>
-              <a:rPr lang="de-DE" sz="2400" dirty="0"/>
-              <a:t> PCs (Graphics Settings?)</a:t>
-            </a:r>
-          </a:p>
-          <a:p>
-            <a:r>
-              <a:rPr lang="de-DE" sz="2400" dirty="0"/>
-              <a:t>AR Performance Problems</a:t>
-            </a:r>
-            <a:endParaRPr lang="de-DE" dirty="0"/>
-          </a:p>
-          <a:p>
-            <a:pPr>
-              <a:buNone/>
-            </a:pPr>
-            <a:endParaRPr lang="de-DE" dirty="0"/>
-          </a:p>
-          <a:p>
-            <a:pPr>
-              <a:buNone/>
-            </a:pPr>
-            <a:endParaRPr lang="de-DE" dirty="0"/>
-          </a:p>
-          <a:p>
-            <a:pPr>
-              <a:buNone/>
-            </a:pPr>
-            <a:endParaRPr lang="de-DE" dirty="0"/>
-          </a:p>
-          <a:p>
-            <a:endParaRPr lang="de-DE" dirty="0"/>
-          </a:p>
-        </p:txBody>
-      </p:sp>
-      <p:sp>
-        <p:nvSpPr>
-          <p:cNvPr id="7" name="Inhaltsplatzhalter 6"/>
-          <p:cNvSpPr>
-            <a:spLocks noGrp="1"/>
-          </p:cNvSpPr>
-          <p:nvPr>
-            <p:ph sz="half" idx="2"/>
-          </p:nvPr>
-        </p:nvSpPr>
-        <p:spPr/>
-        <p:txBody>
-          <a:bodyPr>
-            <a:normAutofit lnSpcReduction="10000"/>
-          </a:bodyPr>
-          <a:lstStyle/>
-          <a:p>
-            <a:r>
-              <a:rPr lang="de-DE" sz="2400" dirty="0" err="1"/>
-              <a:t>Menues</a:t>
-            </a:r>
-            <a:r>
-              <a:rPr lang="de-DE" sz="2400" dirty="0"/>
-              <a:t> (</a:t>
-            </a:r>
-            <a:r>
-              <a:rPr lang="de-DE" sz="2400" dirty="0" err="1"/>
-              <a:t>Oculus</a:t>
-            </a:r>
-            <a:r>
-              <a:rPr lang="de-DE" sz="2400" dirty="0"/>
-              <a:t>)</a:t>
-            </a:r>
-          </a:p>
-          <a:p>
-            <a:r>
-              <a:rPr lang="de-DE" sz="2400" dirty="0" err="1"/>
-              <a:t>Guesture</a:t>
-            </a:r>
-            <a:r>
-              <a:rPr lang="de-DE" sz="2400" dirty="0"/>
-              <a:t> </a:t>
-            </a:r>
-            <a:r>
-              <a:rPr lang="de-DE" sz="2400" dirty="0" err="1"/>
-              <a:t>control</a:t>
-            </a:r>
-            <a:r>
-              <a:rPr lang="de-DE" sz="2400" dirty="0"/>
-              <a:t> </a:t>
-            </a:r>
-            <a:r>
-              <a:rPr lang="de-DE" sz="2400" dirty="0" err="1"/>
-              <a:t>problems</a:t>
-            </a:r>
-            <a:r>
-              <a:rPr lang="de-DE" sz="2400" dirty="0"/>
-              <a:t> (APIs </a:t>
-            </a:r>
-            <a:r>
-              <a:rPr lang="de-DE" sz="2400" dirty="0" err="1"/>
-              <a:t>for</a:t>
-            </a:r>
-            <a:r>
-              <a:rPr lang="de-DE" sz="2400" dirty="0"/>
-              <a:t> Vive not </a:t>
-            </a:r>
-            <a:r>
-              <a:rPr lang="de-DE" sz="2400" dirty="0" err="1"/>
-              <a:t>tested</a:t>
-            </a:r>
-            <a:r>
-              <a:rPr lang="de-DE" sz="2400" dirty="0"/>
-              <a:t> </a:t>
-            </a:r>
-            <a:r>
-              <a:rPr lang="de-DE" sz="2400" dirty="0" err="1"/>
-              <a:t>yet</a:t>
-            </a:r>
-            <a:r>
-              <a:rPr lang="de-DE" sz="2400" dirty="0"/>
-              <a:t>, </a:t>
-            </a:r>
-            <a:r>
-              <a:rPr lang="de-DE" sz="2400" dirty="0" err="1"/>
-              <a:t>currently</a:t>
-            </a:r>
-            <a:r>
-              <a:rPr lang="de-DE" sz="2400" dirty="0"/>
-              <a:t> </a:t>
-            </a:r>
-            <a:r>
-              <a:rPr lang="de-DE" sz="2400" dirty="0" err="1"/>
-              <a:t>unstable</a:t>
-            </a:r>
-            <a:r>
-              <a:rPr lang="de-DE" sz="2400" dirty="0"/>
-              <a:t> APIs </a:t>
-            </a:r>
-            <a:r>
-              <a:rPr lang="de-DE" sz="2400" dirty="0" err="1"/>
-              <a:t>for</a:t>
-            </a:r>
-            <a:r>
-              <a:rPr lang="de-DE" sz="2400" dirty="0"/>
-              <a:t> Kinect?)</a:t>
-            </a:r>
-          </a:p>
-          <a:p>
-            <a:r>
-              <a:rPr lang="de-DE" sz="2400" dirty="0" err="1"/>
-              <a:t>Suitable</a:t>
-            </a:r>
-            <a:r>
-              <a:rPr lang="de-DE" sz="2400" dirty="0"/>
-              <a:t> </a:t>
-            </a:r>
-            <a:r>
-              <a:rPr lang="de-DE" sz="2400" dirty="0" err="1"/>
-              <a:t>for</a:t>
-            </a:r>
-            <a:r>
-              <a:rPr lang="de-DE" sz="2400" dirty="0"/>
-              <a:t> HS-</a:t>
-            </a:r>
-            <a:r>
-              <a:rPr lang="de-DE" sz="2400" dirty="0" err="1"/>
-              <a:t>Lan</a:t>
-            </a:r>
-            <a:r>
-              <a:rPr lang="de-DE" sz="2400" dirty="0"/>
-              <a:t> </a:t>
-            </a:r>
-            <a:r>
-              <a:rPr lang="de-DE" sz="2400" dirty="0" err="1"/>
-              <a:t>and</a:t>
-            </a:r>
-            <a:r>
-              <a:rPr lang="de-DE" sz="2400" dirty="0"/>
-              <a:t> Open-Lab</a:t>
-            </a:r>
-          </a:p>
-          <a:p>
-            <a:r>
-              <a:rPr lang="de-DE" sz="2400" dirty="0" err="1"/>
-              <a:t>Ofc</a:t>
-            </a:r>
-            <a:r>
-              <a:rPr lang="de-DE" sz="2400" dirty="0"/>
-              <a:t>: </a:t>
-            </a:r>
-            <a:r>
-              <a:rPr lang="de-DE" sz="2400" dirty="0" err="1"/>
-              <a:t>Illness</a:t>
-            </a:r>
-            <a:r>
-              <a:rPr lang="de-DE" sz="2400" dirty="0"/>
-              <a:t> </a:t>
-            </a:r>
-            <a:r>
-              <a:rPr lang="de-DE" sz="2400" dirty="0" err="1"/>
-              <a:t>of</a:t>
-            </a:r>
-            <a:r>
-              <a:rPr lang="de-DE" sz="2400" dirty="0"/>
-              <a:t> Project Members (</a:t>
-            </a:r>
-            <a:r>
-              <a:rPr lang="de-DE" sz="2400" dirty="0" err="1"/>
-              <a:t>workload</a:t>
-            </a:r>
-            <a:r>
-              <a:rPr lang="de-DE" sz="2400" dirty="0"/>
-              <a:t> </a:t>
-            </a:r>
-            <a:r>
-              <a:rPr lang="de-DE" sz="2400" dirty="0" err="1"/>
-              <a:t>balancing</a:t>
-            </a:r>
-            <a:r>
-              <a:rPr lang="de-DE" sz="2400" dirty="0"/>
-              <a:t>)</a:t>
-            </a:r>
-          </a:p>
-          <a:p>
-            <a:pPr>
-              <a:buNone/>
-            </a:pPr>
-            <a:endParaRPr lang="de-DE" sz="2400" dirty="0"/>
-          </a:p>
-        </p:txBody>
-      </p:sp>
-      <p:sp>
-        <p:nvSpPr>
-          <p:cNvPr id="11" name="Foliennummernplatzhalter 10"/>
-          <p:cNvSpPr>
-            <a:spLocks noGrp="1"/>
-          </p:cNvSpPr>
-          <p:nvPr>
-            <p:ph type="sldNum" sz="quarter" idx="12"/>
-          </p:nvPr>
-        </p:nvSpPr>
-        <p:spPr/>
-        <p:txBody>
-          <a:bodyPr/>
-          <a:lstStyle/>
-          <a:p>
-            <a:fld id="{6C6AE60A-B69C-4790-82F7-3882EDF23186}" type="slidenum">
-              <a:rPr lang="de-DE" smtClean="0"/>
-              <a:pPr/>
-              <a:t>21</a:t>
-            </a:fld>
-            <a:endParaRPr lang="de-DE"/>
-          </a:p>
-        </p:txBody>
-      </p:sp>
-    </p:spTree>
-  </p:cSld>
-  <p:clrMapOvr>
-    <a:masterClrMapping/>
-  </p:clrMapOvr>
-</p:sld>
-</file>
-
-<file path=ppt/slides/slide22.xml><?xml version="1.0" encoding="utf-8"?>
-<p:sld xmlns:a="http://schemas.openxmlformats.org/drawingml/2006/main" xmlns:r="http://schemas.openxmlformats.org/officeDocument/2006/relationships" xmlns:p="http://schemas.openxmlformats.org/presentationml/2006/main">
-  <p:cSld>
-    <p:spTree>
-      <p:nvGrpSpPr>
-        <p:cNvPr id="1" name=""/>
-        <p:cNvGrpSpPr/>
-        <p:nvPr/>
-      </p:nvGrpSpPr>
-      <p:grpSpPr>
-        <a:xfrm>
-          <a:off x="0" y="0"/>
-          <a:ext cx="0" cy="0"/>
-          <a:chOff x="0" y="0"/>
-          <a:chExt cx="0" cy="0"/>
-        </a:xfrm>
-      </p:grpSpPr>
-      <p:sp>
-        <p:nvSpPr>
-          <p:cNvPr id="2" name="Titel 1"/>
-          <p:cNvSpPr>
-            <a:spLocks noGrp="1"/>
-          </p:cNvSpPr>
-          <p:nvPr>
-            <p:ph type="title"/>
-          </p:nvPr>
-        </p:nvSpPr>
-        <p:spPr/>
-        <p:txBody>
-          <a:bodyPr>
-            <a:normAutofit/>
-          </a:bodyPr>
-          <a:lstStyle/>
-          <a:p>
-            <a:pPr algn="ctr"/>
-            <a:r>
-              <a:rPr lang="de-DE" dirty="0" err="1"/>
-              <a:t>Github</a:t>
-            </a:r>
-            <a:r>
-              <a:rPr lang="de-DE" dirty="0"/>
-              <a:t> Version </a:t>
-            </a:r>
-            <a:r>
-              <a:rPr lang="de-DE" dirty="0" err="1"/>
-              <a:t>Control</a:t>
-            </a:r>
-            <a:endParaRPr lang="de-DE" dirty="0"/>
-          </a:p>
-        </p:txBody>
-      </p:sp>
-      <p:sp>
-        <p:nvSpPr>
-          <p:cNvPr id="9" name="Inhaltsplatzhalter 8"/>
-          <p:cNvSpPr>
-            <a:spLocks noGrp="1"/>
-          </p:cNvSpPr>
-          <p:nvPr>
-            <p:ph sz="half" idx="1"/>
-          </p:nvPr>
-        </p:nvSpPr>
-        <p:spPr>
-          <a:xfrm>
-            <a:off x="457200" y="1600071"/>
-            <a:ext cx="8219256" cy="3695700"/>
-          </a:xfrm>
-        </p:spPr>
-        <p:txBody>
-          <a:bodyPr>
-            <a:normAutofit/>
-          </a:bodyPr>
-          <a:lstStyle/>
-          <a:p>
-            <a:endParaRPr lang="de-DE" dirty="0">
-              <a:hlinkClick r:id="rId2"/>
-            </a:endParaRPr>
-          </a:p>
-          <a:p>
-            <a:r>
-              <a:rPr lang="de-DE" dirty="0"/>
-              <a:t>Old </a:t>
-            </a:r>
-            <a:r>
-              <a:rPr lang="de-DE" dirty="0" err="1"/>
-              <a:t>project</a:t>
-            </a:r>
-            <a:r>
-              <a:rPr lang="de-DE" dirty="0"/>
-              <a:t> </a:t>
-            </a:r>
-            <a:r>
-              <a:rPr lang="de-DE" dirty="0" err="1"/>
-              <a:t>source</a:t>
-            </a:r>
-            <a:endParaRPr lang="de-DE" dirty="0">
-              <a:hlinkClick r:id="rId2"/>
-            </a:endParaRPr>
-          </a:p>
-          <a:p>
-            <a:pPr algn="ctr">
-              <a:buNone/>
-            </a:pPr>
-            <a:r>
-              <a:rPr lang="de-DE" dirty="0">
-                <a:hlinkClick r:id="rId3"/>
-              </a:rPr>
-              <a:t>https://github.com/andreasdietze/Rift-Wingsuit.git</a:t>
-            </a:r>
-            <a:endParaRPr lang="de-DE" dirty="0"/>
-          </a:p>
-          <a:p>
-            <a:pPr algn="ctr">
-              <a:buNone/>
-            </a:pPr>
-            <a:endParaRPr lang="de-DE" dirty="0"/>
-          </a:p>
-          <a:p>
-            <a:r>
-              <a:rPr lang="de-DE" dirty="0"/>
-              <a:t>New </a:t>
-            </a:r>
-            <a:r>
-              <a:rPr lang="de-DE" dirty="0" err="1"/>
-              <a:t>project</a:t>
-            </a:r>
-            <a:r>
-              <a:rPr lang="de-DE" dirty="0"/>
-              <a:t> </a:t>
-            </a:r>
-            <a:r>
-              <a:rPr lang="de-DE" dirty="0" err="1"/>
-              <a:t>source</a:t>
-            </a:r>
-            <a:endParaRPr lang="de-DE" dirty="0"/>
-          </a:p>
-          <a:p>
-            <a:pPr algn="ctr">
-              <a:buNone/>
-            </a:pPr>
-            <a:r>
-              <a:rPr lang="de-DE" dirty="0">
-                <a:hlinkClick r:id="rId4"/>
-              </a:rPr>
-              <a:t>https://github.com/andreasdietze/Rift-WingsuitV2.git</a:t>
-            </a:r>
-            <a:endParaRPr lang="de-DE" dirty="0"/>
-          </a:p>
-          <a:p>
-            <a:endParaRPr lang="de-DE" dirty="0"/>
-          </a:p>
-        </p:txBody>
-      </p:sp>
-      <p:sp>
-        <p:nvSpPr>
-          <p:cNvPr id="11" name="Foliennummernplatzhalter 10"/>
-          <p:cNvSpPr>
-            <a:spLocks noGrp="1"/>
-          </p:cNvSpPr>
-          <p:nvPr>
-            <p:ph type="sldNum" sz="quarter" idx="12"/>
-          </p:nvPr>
-        </p:nvSpPr>
-        <p:spPr/>
-        <p:txBody>
-          <a:bodyPr/>
-          <a:lstStyle/>
-          <a:p>
-            <a:fld id="{6C6AE60A-B69C-4790-82F7-3882EDF23186}" type="slidenum">
-              <a:rPr lang="de-DE" smtClean="0"/>
-              <a:pPr/>
-              <a:t>22</a:t>
-            </a:fld>
-            <a:endParaRPr lang="de-DE"/>
-          </a:p>
-        </p:txBody>
-      </p:sp>
-    </p:spTree>
   </p:cSld>
   <p:clrMapOvr>
     <a:masterClrMapping/>
@@ -10512,6 +11010,1262 @@
       </p:grpSpPr>
       <p:sp>
         <p:nvSpPr>
+          <p:cNvPr id="2" name="Titel 1"/>
+          <p:cNvSpPr>
+            <a:spLocks noGrp="1"/>
+          </p:cNvSpPr>
+          <p:nvPr>
+            <p:ph type="title"/>
+          </p:nvPr>
+        </p:nvSpPr>
+        <p:spPr/>
+        <p:txBody>
+          <a:bodyPr>
+            <a:normAutofit/>
+          </a:bodyPr>
+          <a:lstStyle/>
+          <a:p>
+            <a:pPr algn="ctr"/>
+            <a:r>
+              <a:rPr lang="de-DE" dirty="0" err="1">
+                <a:solidFill>
+                  <a:srgbClr val="FF0000"/>
+                </a:solidFill>
+              </a:rPr>
+              <a:t>Milestone</a:t>
+            </a:r>
+            <a:r>
+              <a:rPr lang="de-DE" dirty="0">
+                <a:solidFill>
+                  <a:srgbClr val="FF0000"/>
+                </a:solidFill>
+              </a:rPr>
+              <a:t> 3</a:t>
+            </a:r>
+          </a:p>
+        </p:txBody>
+      </p:sp>
+      <p:sp>
+        <p:nvSpPr>
+          <p:cNvPr id="9" name="Inhaltsplatzhalter 8"/>
+          <p:cNvSpPr>
+            <a:spLocks noGrp="1"/>
+          </p:cNvSpPr>
+          <p:nvPr>
+            <p:ph idx="1"/>
+          </p:nvPr>
+        </p:nvSpPr>
+        <p:spPr/>
+        <p:txBody>
+          <a:bodyPr>
+            <a:normAutofit/>
+          </a:bodyPr>
+          <a:lstStyle/>
+          <a:p>
+            <a:endParaRPr lang="de-DE" dirty="0"/>
+          </a:p>
+          <a:p>
+            <a:pPr>
+              <a:buNone/>
+            </a:pPr>
+            <a:endParaRPr lang="de-DE" dirty="0"/>
+          </a:p>
+          <a:p>
+            <a:endParaRPr lang="de-DE" dirty="0"/>
+          </a:p>
+        </p:txBody>
+      </p:sp>
+      <p:sp>
+        <p:nvSpPr>
+          <p:cNvPr id="11" name="Foliennummernplatzhalter 10"/>
+          <p:cNvSpPr>
+            <a:spLocks noGrp="1"/>
+          </p:cNvSpPr>
+          <p:nvPr>
+            <p:ph type="sldNum" sz="quarter" idx="12"/>
+          </p:nvPr>
+        </p:nvSpPr>
+        <p:spPr/>
+        <p:txBody>
+          <a:bodyPr/>
+          <a:lstStyle/>
+          <a:p>
+            <a:fld id="{6C6AE60A-B69C-4790-82F7-3882EDF23186}" type="slidenum">
+              <a:rPr lang="de-DE" smtClean="0"/>
+              <a:pPr/>
+              <a:t>23</a:t>
+            </a:fld>
+            <a:endParaRPr lang="de-DE"/>
+          </a:p>
+        </p:txBody>
+      </p:sp>
+      <p:graphicFrame>
+        <p:nvGraphicFramePr>
+          <p:cNvPr id="8" name="Tabelle 7"/>
+          <p:cNvGraphicFramePr>
+            <a:graphicFrameLocks noGrp="1"/>
+          </p:cNvGraphicFramePr>
+          <p:nvPr>
+            <p:extLst>
+              <p:ext uri="{D42A27DB-BD31-4B8C-83A1-F6EECF244321}">
+                <p14:modId xmlns:p14="http://schemas.microsoft.com/office/powerpoint/2010/main" val="3016841426"/>
+              </p:ext>
+            </p:extLst>
+          </p:nvPr>
+        </p:nvGraphicFramePr>
+        <p:xfrm>
+          <a:off x="539552" y="1849388"/>
+          <a:ext cx="8064897" cy="2123440"/>
+        </p:xfrm>
+        <a:graphic>
+          <a:graphicData uri="http://schemas.openxmlformats.org/drawingml/2006/table">
+            <a:tbl>
+              <a:tblPr firstRow="1" bandRow="1">
+                <a:tableStyleId>{5C22544A-7EE6-4342-B048-85BDC9FD1C3A}</a:tableStyleId>
+              </a:tblPr>
+              <a:tblGrid>
+                <a:gridCol w="1584176">
+                  <a:extLst>
+                    <a:ext uri="{9D8B030D-6E8A-4147-A177-3AD203B41FA5}">
+                      <a16:colId xmlns="" xmlns:a16="http://schemas.microsoft.com/office/drawing/2014/main" val="20000"/>
+                    </a:ext>
+                  </a:extLst>
+                </a:gridCol>
+                <a:gridCol w="6480721">
+                  <a:extLst>
+                    <a:ext uri="{9D8B030D-6E8A-4147-A177-3AD203B41FA5}">
+                      <a16:colId xmlns="" xmlns:a16="http://schemas.microsoft.com/office/drawing/2014/main" val="20001"/>
+                    </a:ext>
+                  </a:extLst>
+                </a:gridCol>
+              </a:tblGrid>
+              <a:tr h="370840">
+                <a:tc>
+                  <a:txBody>
+                    <a:bodyPr/>
+                    <a:lstStyle/>
+                    <a:p>
+                      <a:pPr algn="ctr"/>
+                      <a:r>
+                        <a:rPr lang="de-DE" sz="1800" dirty="0" err="1"/>
+                        <a:t>Week</a:t>
+                      </a:r>
+                      <a:endParaRPr lang="de-DE" sz="1800" dirty="0"/>
+                    </a:p>
+                  </a:txBody>
+                  <a:tcPr/>
+                </a:tc>
+                <a:tc>
+                  <a:txBody>
+                    <a:bodyPr/>
+                    <a:lstStyle/>
+                    <a:p>
+                      <a:pPr algn="ctr"/>
+                      <a:r>
+                        <a:rPr lang="de-DE" sz="1800" dirty="0" smtClean="0"/>
+                        <a:t>Sebastian</a:t>
+                      </a:r>
+                      <a:r>
+                        <a:rPr lang="de-DE" sz="1800" baseline="0" dirty="0" smtClean="0"/>
+                        <a:t> Nickel</a:t>
+                      </a:r>
+                      <a:endParaRPr lang="de-DE" sz="1800" dirty="0"/>
+                    </a:p>
+                  </a:txBody>
+                  <a:tcPr/>
+                </a:tc>
+                <a:extLst>
+                  <a:ext uri="{0D108BD9-81ED-4DB2-BD59-A6C34878D82A}">
+                    <a16:rowId xmlns="" xmlns:a16="http://schemas.microsoft.com/office/drawing/2014/main" val="10000"/>
+                  </a:ext>
+                </a:extLst>
+              </a:tr>
+              <a:tr h="370840">
+                <a:tc>
+                  <a:txBody>
+                    <a:bodyPr/>
+                    <a:lstStyle/>
+                    <a:p>
+                      <a:pPr algn="l"/>
+                      <a:r>
+                        <a:rPr lang="de-DE" sz="1800" dirty="0"/>
+                        <a:t>08.01</a:t>
+                      </a:r>
+                      <a:r>
+                        <a:rPr lang="de-DE" sz="1800" baseline="0" dirty="0"/>
+                        <a:t> – 08.08</a:t>
+                      </a:r>
+                      <a:endParaRPr lang="de-DE" sz="1800" dirty="0"/>
+                    </a:p>
+                  </a:txBody>
+                  <a:tcPr/>
+                </a:tc>
+                <a:tc>
+                  <a:txBody>
+                    <a:bodyPr/>
+                    <a:lstStyle/>
+                    <a:p>
+                      <a:pPr marL="0" marR="0" lvl="0" indent="0" algn="l" defTabSz="914400" rtl="0" eaLnBrk="1" fontAlgn="auto" latinLnBrk="0" hangingPunct="1">
+                        <a:lnSpc>
+                          <a:spcPct val="100000"/>
+                        </a:lnSpc>
+                        <a:spcBef>
+                          <a:spcPts val="0"/>
+                        </a:spcBef>
+                        <a:spcAft>
+                          <a:spcPts val="0"/>
+                        </a:spcAft>
+                        <a:buClrTx/>
+                        <a:buSzTx/>
+                        <a:buFont typeface="Arial" pitchFamily="34" charset="0"/>
+                        <a:buChar char="•"/>
+                        <a:tabLst/>
+                        <a:defRPr/>
+                      </a:pPr>
+                      <a:r>
+                        <a:rPr lang="de-DE" sz="1800" dirty="0"/>
+                        <a:t> </a:t>
+                      </a:r>
+                      <a:r>
+                        <a:rPr lang="en-US" sz="1800" dirty="0" smtClean="0"/>
+                        <a:t>Evaluation</a:t>
+                      </a:r>
+                      <a:r>
+                        <a:rPr lang="en-US" sz="1800" baseline="0" dirty="0" smtClean="0"/>
+                        <a:t> of </a:t>
+                      </a:r>
+                      <a:r>
+                        <a:rPr lang="en-US" sz="1800" dirty="0" smtClean="0"/>
+                        <a:t>“Freenect2”,</a:t>
+                      </a:r>
+                      <a:r>
+                        <a:rPr lang="en-US" sz="1800" baseline="0" dirty="0" smtClean="0"/>
+                        <a:t> an open-source KinectV2 driver</a:t>
+                      </a:r>
+                      <a:endParaRPr lang="de-DE" sz="1800" dirty="0" smtClean="0"/>
+                    </a:p>
+                  </a:txBody>
+                  <a:tcPr/>
+                </a:tc>
+                <a:extLst>
+                  <a:ext uri="{0D108BD9-81ED-4DB2-BD59-A6C34878D82A}">
+                    <a16:rowId xmlns="" xmlns:a16="http://schemas.microsoft.com/office/drawing/2014/main" val="10001"/>
+                  </a:ext>
+                </a:extLst>
+              </a:tr>
+              <a:tr h="370840">
+                <a:tc>
+                  <a:txBody>
+                    <a:bodyPr/>
+                    <a:lstStyle/>
+                    <a:p>
+                      <a:pPr algn="l"/>
+                      <a:r>
+                        <a:rPr lang="de-DE" sz="1800" dirty="0"/>
+                        <a:t>08.08 – 08.16</a:t>
+                      </a:r>
+                    </a:p>
+                  </a:txBody>
+                  <a:tcPr/>
+                </a:tc>
+                <a:tc>
+                  <a:txBody>
+                    <a:bodyPr/>
+                    <a:lstStyle/>
+                    <a:p>
+                      <a:pPr marL="0" marR="0" lvl="1" indent="0" algn="l" defTabSz="914400" rtl="0" eaLnBrk="1" fontAlgn="auto" latinLnBrk="0" hangingPunct="1">
+                        <a:lnSpc>
+                          <a:spcPct val="100000"/>
+                        </a:lnSpc>
+                        <a:spcBef>
+                          <a:spcPts val="0"/>
+                        </a:spcBef>
+                        <a:spcAft>
+                          <a:spcPts val="0"/>
+                        </a:spcAft>
+                        <a:buClrTx/>
+                        <a:buSzTx/>
+                        <a:buFont typeface="Arial" pitchFamily="34" charset="0"/>
+                        <a:buChar char="•"/>
+                        <a:tabLst/>
+                        <a:defRPr/>
+                      </a:pPr>
+                      <a:r>
+                        <a:rPr lang="de-DE" sz="1800" baseline="0" dirty="0"/>
+                        <a:t> </a:t>
+                      </a:r>
+                      <a:r>
+                        <a:rPr lang="de-DE" sz="1800" baseline="0" dirty="0" err="1" smtClean="0"/>
+                        <a:t>Assisting</a:t>
+                      </a:r>
+                      <a:r>
+                        <a:rPr lang="de-DE" sz="1800" baseline="0" dirty="0" smtClean="0"/>
+                        <a:t> </a:t>
+                      </a:r>
+                      <a:r>
+                        <a:rPr lang="de-DE" sz="1800" baseline="0" dirty="0" err="1" smtClean="0"/>
+                        <a:t>with</a:t>
+                      </a:r>
+                      <a:r>
+                        <a:rPr lang="de-DE" sz="1800" baseline="0" dirty="0" smtClean="0"/>
+                        <a:t> </a:t>
+                      </a:r>
+                      <a:r>
+                        <a:rPr lang="de-DE" sz="1800" baseline="0" dirty="0" err="1" smtClean="0"/>
+                        <a:t>the</a:t>
+                      </a:r>
+                      <a:r>
+                        <a:rPr lang="de-DE" sz="1800" baseline="0" dirty="0" smtClean="0"/>
+                        <a:t> </a:t>
+                      </a:r>
+                      <a:r>
+                        <a:rPr lang="de-DE" sz="1800" baseline="0" dirty="0" err="1" smtClean="0"/>
+                        <a:t>menu</a:t>
+                      </a:r>
+                      <a:r>
+                        <a:rPr lang="de-DE" sz="1800" baseline="0" dirty="0" smtClean="0"/>
+                        <a:t> </a:t>
+                      </a:r>
+                      <a:r>
+                        <a:rPr lang="de-DE" sz="1800" baseline="0" dirty="0" err="1" smtClean="0"/>
+                        <a:t>structure-related</a:t>
+                      </a:r>
+                      <a:r>
+                        <a:rPr lang="de-DE" sz="1800" baseline="0" dirty="0" smtClean="0"/>
+                        <a:t> </a:t>
+                      </a:r>
+                      <a:r>
+                        <a:rPr lang="de-DE" sz="1800" baseline="0" dirty="0" err="1" smtClean="0"/>
+                        <a:t>work</a:t>
+                      </a:r>
+                      <a:endParaRPr lang="de-DE" sz="1800" baseline="0" dirty="0" smtClean="0"/>
+                    </a:p>
+                    <a:p>
+                      <a:pPr marL="457200" marR="0" lvl="2" indent="0" algn="l" defTabSz="914400" rtl="0" eaLnBrk="1" fontAlgn="auto" latinLnBrk="0" hangingPunct="1">
+                        <a:lnSpc>
+                          <a:spcPct val="100000"/>
+                        </a:lnSpc>
+                        <a:spcBef>
+                          <a:spcPts val="0"/>
+                        </a:spcBef>
+                        <a:spcAft>
+                          <a:spcPts val="0"/>
+                        </a:spcAft>
+                        <a:buClrTx/>
+                        <a:buSzTx/>
+                        <a:buFont typeface="Arial" pitchFamily="34" charset="0"/>
+                        <a:buChar char="•"/>
+                        <a:tabLst/>
+                        <a:defRPr/>
+                      </a:pPr>
+                      <a:r>
+                        <a:rPr lang="de-DE" sz="1800" baseline="0" dirty="0" smtClean="0"/>
+                        <a:t> e.g.: </a:t>
+                      </a:r>
+                      <a:r>
+                        <a:rPr lang="de-DE" sz="1800" baseline="0" dirty="0" err="1" smtClean="0"/>
+                        <a:t>possible</a:t>
+                      </a:r>
+                      <a:r>
+                        <a:rPr lang="de-DE" sz="1800" baseline="0" dirty="0" smtClean="0"/>
+                        <a:t> </a:t>
+                      </a:r>
+                      <a:r>
+                        <a:rPr lang="de-DE" sz="1800" baseline="0" dirty="0" err="1" smtClean="0"/>
+                        <a:t>improvements</a:t>
+                      </a:r>
+                      <a:r>
+                        <a:rPr lang="de-DE" sz="1800" baseline="0" dirty="0" smtClean="0"/>
+                        <a:t>, </a:t>
+                      </a:r>
+                      <a:r>
+                        <a:rPr lang="de-DE" sz="1800" baseline="0" dirty="0" err="1" smtClean="0"/>
+                        <a:t>testing</a:t>
+                      </a:r>
+                      <a:r>
+                        <a:rPr lang="de-DE" sz="1800" baseline="0" dirty="0" smtClean="0"/>
+                        <a:t>, …</a:t>
+                      </a:r>
+                      <a:endParaRPr lang="de-DE" sz="1800" baseline="0" dirty="0"/>
+                    </a:p>
+                  </a:txBody>
+                  <a:tcPr/>
+                </a:tc>
+                <a:extLst>
+                  <a:ext uri="{0D108BD9-81ED-4DB2-BD59-A6C34878D82A}">
+                    <a16:rowId xmlns="" xmlns:a16="http://schemas.microsoft.com/office/drawing/2014/main" val="10002"/>
+                  </a:ext>
+                </a:extLst>
+              </a:tr>
+              <a:tr h="370840">
+                <a:tc>
+                  <a:txBody>
+                    <a:bodyPr/>
+                    <a:lstStyle/>
+                    <a:p>
+                      <a:pPr algn="l"/>
+                      <a:r>
+                        <a:rPr lang="de-DE" sz="1800" dirty="0"/>
+                        <a:t>08.16 – 24.08</a:t>
+                      </a:r>
+                    </a:p>
+                  </a:txBody>
+                  <a:tcPr/>
+                </a:tc>
+                <a:tc>
+                  <a:txBody>
+                    <a:bodyPr/>
+                    <a:lstStyle/>
+                    <a:p>
+                      <a:pPr>
+                        <a:buFont typeface="Arial" pitchFamily="34" charset="0"/>
+                        <a:buChar char="•"/>
+                      </a:pPr>
+                      <a:r>
+                        <a:rPr lang="de-DE" sz="1800" baseline="0" dirty="0" smtClean="0"/>
+                        <a:t> </a:t>
+                      </a:r>
+                      <a:r>
+                        <a:rPr lang="de-DE" sz="1800" baseline="0" dirty="0" err="1" smtClean="0"/>
+                        <a:t>Buffer</a:t>
+                      </a:r>
+                      <a:r>
+                        <a:rPr lang="de-DE" sz="1800" baseline="0" dirty="0" smtClean="0"/>
+                        <a:t> </a:t>
+                      </a:r>
+                      <a:r>
+                        <a:rPr lang="de-DE" sz="1800" baseline="0" dirty="0" err="1" smtClean="0"/>
+                        <a:t>for</a:t>
+                      </a:r>
+                      <a:r>
+                        <a:rPr lang="de-DE" sz="1800" baseline="0" dirty="0" smtClean="0"/>
+                        <a:t> </a:t>
+                      </a:r>
+                      <a:r>
+                        <a:rPr lang="de-DE" sz="1800" baseline="0" dirty="0" err="1" smtClean="0"/>
+                        <a:t>related</a:t>
+                      </a:r>
+                      <a:r>
+                        <a:rPr lang="de-DE" sz="1800" baseline="0" dirty="0" smtClean="0"/>
+                        <a:t> </a:t>
+                      </a:r>
+                      <a:r>
+                        <a:rPr lang="de-DE" sz="1800" baseline="0" dirty="0" err="1" smtClean="0"/>
+                        <a:t>work</a:t>
+                      </a:r>
+                      <a:r>
+                        <a:rPr lang="de-DE" sz="1800" baseline="0" dirty="0" smtClean="0"/>
+                        <a:t>; Overall </a:t>
+                      </a:r>
+                      <a:r>
+                        <a:rPr lang="de-DE" sz="1800" baseline="0" dirty="0" err="1" smtClean="0"/>
+                        <a:t>testing</a:t>
+                      </a:r>
+                      <a:r>
+                        <a:rPr lang="de-DE" sz="1800" baseline="0" dirty="0" smtClean="0"/>
+                        <a:t> („Bug </a:t>
+                      </a:r>
+                      <a:r>
+                        <a:rPr lang="de-DE" sz="1800" baseline="0" dirty="0" err="1" smtClean="0"/>
+                        <a:t>hunting</a:t>
+                      </a:r>
+                      <a:r>
+                        <a:rPr lang="de-DE" sz="1800" baseline="0" dirty="0" smtClean="0"/>
+                        <a:t>“)</a:t>
+                      </a:r>
+                      <a:endParaRPr lang="de-DE" sz="1800" dirty="0"/>
+                    </a:p>
+                  </a:txBody>
+                  <a:tcPr/>
+                </a:tc>
+                <a:extLst>
+                  <a:ext uri="{0D108BD9-81ED-4DB2-BD59-A6C34878D82A}">
+                    <a16:rowId xmlns="" xmlns:a16="http://schemas.microsoft.com/office/drawing/2014/main" val="10003"/>
+                  </a:ext>
+                </a:extLst>
+              </a:tr>
+              <a:tr h="370840">
+                <a:tc>
+                  <a:txBody>
+                    <a:bodyPr/>
+                    <a:lstStyle/>
+                    <a:p>
+                      <a:pPr algn="l"/>
+                      <a:r>
+                        <a:rPr lang="de-DE" sz="1800" dirty="0"/>
+                        <a:t>08.24 – 09.14</a:t>
+                      </a:r>
+                    </a:p>
+                  </a:txBody>
+                  <a:tcPr/>
+                </a:tc>
+                <a:tc>
+                  <a:txBody>
+                    <a:bodyPr/>
+                    <a:lstStyle/>
+                    <a:p>
+                      <a:pPr>
+                        <a:buFont typeface="Arial" pitchFamily="34" charset="0"/>
+                        <a:buChar char="•"/>
+                      </a:pPr>
+                      <a:r>
+                        <a:rPr lang="de-DE" sz="1800" dirty="0"/>
+                        <a:t> </a:t>
+                      </a:r>
+                      <a:r>
+                        <a:rPr lang="de-DE" sz="1800" dirty="0" err="1"/>
+                        <a:t>Buffer</a:t>
+                      </a:r>
+                      <a:r>
+                        <a:rPr lang="de-DE" sz="1800" baseline="0" dirty="0"/>
+                        <a:t> </a:t>
+                      </a:r>
+                      <a:r>
+                        <a:rPr lang="de-DE" sz="1800" baseline="0" dirty="0" err="1"/>
+                        <a:t>until</a:t>
+                      </a:r>
+                      <a:r>
+                        <a:rPr lang="de-DE" sz="1800" baseline="0" dirty="0"/>
+                        <a:t> </a:t>
+                      </a:r>
+                      <a:r>
+                        <a:rPr lang="de-DE" sz="1800" baseline="0" dirty="0" err="1"/>
+                        <a:t>project</a:t>
+                      </a:r>
+                      <a:r>
+                        <a:rPr lang="de-DE" sz="1800" baseline="0" dirty="0"/>
+                        <a:t> end (Fly </a:t>
+                      </a:r>
+                      <a:r>
+                        <a:rPr lang="de-DE" sz="1800" baseline="0" dirty="0" err="1"/>
+                        <a:t>physics</a:t>
+                      </a:r>
+                      <a:r>
+                        <a:rPr lang="de-DE" sz="1800" baseline="0" dirty="0"/>
+                        <a:t>, </a:t>
+                      </a:r>
+                      <a:r>
+                        <a:rPr lang="de-DE" sz="1800" baseline="0" dirty="0" err="1"/>
+                        <a:t>game</a:t>
+                      </a:r>
+                      <a:r>
+                        <a:rPr lang="de-DE" sz="1800" baseline="0" dirty="0"/>
+                        <a:t> </a:t>
+                      </a:r>
+                      <a:r>
+                        <a:rPr lang="de-DE" sz="1800" baseline="0" dirty="0" err="1" smtClean="0"/>
+                        <a:t>logics</a:t>
+                      </a:r>
+                      <a:r>
+                        <a:rPr lang="de-DE" sz="1800" baseline="0" dirty="0"/>
+                        <a:t>, </a:t>
+                      </a:r>
+                      <a:r>
+                        <a:rPr lang="de-DE" sz="1800" baseline="0" dirty="0" err="1"/>
+                        <a:t>assistant</a:t>
+                      </a:r>
+                      <a:r>
+                        <a:rPr lang="de-DE" sz="1800" baseline="0" dirty="0"/>
+                        <a:t>)</a:t>
+                      </a:r>
+                      <a:endParaRPr lang="de-DE" sz="1800" dirty="0"/>
+                    </a:p>
+                  </a:txBody>
+                  <a:tcPr/>
+                </a:tc>
+                <a:extLst>
+                  <a:ext uri="{0D108BD9-81ED-4DB2-BD59-A6C34878D82A}">
+                    <a16:rowId xmlns="" xmlns:a16="http://schemas.microsoft.com/office/drawing/2014/main" val="10004"/>
+                  </a:ext>
+                </a:extLst>
+              </a:tr>
+            </a:tbl>
+          </a:graphicData>
+        </a:graphic>
+      </p:graphicFrame>
+    </p:spTree>
+    <p:extLst>
+      <p:ext uri="{BB962C8B-B14F-4D97-AF65-F5344CB8AC3E}">
+        <p14:creationId xmlns:p14="http://schemas.microsoft.com/office/powerpoint/2010/main" val="2422853760"/>
+      </p:ext>
+    </p:extLst>
+  </p:cSld>
+  <p:clrMapOvr>
+    <a:masterClrMapping/>
+  </p:clrMapOvr>
+</p:sld>
+</file>
+
+<file path=ppt/slides/slide24.xml><?xml version="1.0" encoding="utf-8"?>
+<p:sld xmlns:a="http://schemas.openxmlformats.org/drawingml/2006/main" xmlns:r="http://schemas.openxmlformats.org/officeDocument/2006/relationships" xmlns:p="http://schemas.openxmlformats.org/presentationml/2006/main">
+  <p:cSld>
+    <p:spTree>
+      <p:nvGrpSpPr>
+        <p:cNvPr id="1" name=""/>
+        <p:cNvGrpSpPr/>
+        <p:nvPr/>
+      </p:nvGrpSpPr>
+      <p:grpSpPr>
+        <a:xfrm>
+          <a:off x="0" y="0"/>
+          <a:ext cx="0" cy="0"/>
+          <a:chOff x="0" y="0"/>
+          <a:chExt cx="0" cy="0"/>
+        </a:xfrm>
+      </p:grpSpPr>
+      <p:sp>
+        <p:nvSpPr>
+          <p:cNvPr id="2" name="Titel 1"/>
+          <p:cNvSpPr>
+            <a:spLocks noGrp="1"/>
+          </p:cNvSpPr>
+          <p:nvPr>
+            <p:ph type="title"/>
+          </p:nvPr>
+        </p:nvSpPr>
+        <p:spPr/>
+        <p:txBody>
+          <a:bodyPr>
+            <a:normAutofit/>
+          </a:bodyPr>
+          <a:lstStyle/>
+          <a:p>
+            <a:pPr algn="ctr"/>
+            <a:r>
+              <a:rPr lang="de-DE" dirty="0" err="1"/>
+              <a:t>Risks</a:t>
+            </a:r>
+            <a:endParaRPr lang="de-DE" dirty="0"/>
+          </a:p>
+        </p:txBody>
+      </p:sp>
+      <p:sp>
+        <p:nvSpPr>
+          <p:cNvPr id="9" name="Inhaltsplatzhalter 8"/>
+          <p:cNvSpPr>
+            <a:spLocks noGrp="1"/>
+          </p:cNvSpPr>
+          <p:nvPr>
+            <p:ph sz="half" idx="1"/>
+          </p:nvPr>
+        </p:nvSpPr>
+        <p:spPr/>
+        <p:txBody>
+          <a:bodyPr>
+            <a:normAutofit fontScale="92500" lnSpcReduction="10000"/>
+          </a:bodyPr>
+          <a:lstStyle/>
+          <a:p>
+            <a:r>
+              <a:rPr lang="de-DE" sz="2400" dirty="0"/>
+              <a:t>Fly </a:t>
+            </a:r>
+            <a:r>
+              <a:rPr lang="de-DE" sz="2400" dirty="0" err="1"/>
+              <a:t>physics</a:t>
+            </a:r>
+            <a:r>
+              <a:rPr lang="de-DE" sz="2400" dirty="0"/>
+              <a:t> - </a:t>
+            </a:r>
+            <a:r>
+              <a:rPr lang="de-DE" sz="2400" dirty="0" err="1" smtClean="0"/>
+              <a:t>math</a:t>
+            </a:r>
+            <a:r>
+              <a:rPr lang="de-DE" sz="2400" dirty="0" smtClean="0"/>
+              <a:t> </a:t>
+            </a:r>
+            <a:r>
+              <a:rPr lang="de-DE" sz="2400" dirty="0" err="1"/>
+              <a:t>too</a:t>
+            </a:r>
+            <a:r>
+              <a:rPr lang="de-DE" sz="2400" dirty="0"/>
+              <a:t> </a:t>
+            </a:r>
+            <a:r>
+              <a:rPr lang="de-DE" sz="2400" dirty="0" err="1" smtClean="0"/>
+              <a:t>complex</a:t>
+            </a:r>
+            <a:r>
+              <a:rPr lang="de-DE" sz="2400" dirty="0" smtClean="0"/>
+              <a:t>/</a:t>
+            </a:r>
+            <a:r>
+              <a:rPr lang="de-DE" sz="2400" dirty="0" err="1" smtClean="0"/>
+              <a:t>complicated</a:t>
+            </a:r>
+            <a:endParaRPr lang="de-DE" dirty="0"/>
+          </a:p>
+          <a:p>
+            <a:r>
+              <a:rPr lang="de-DE" sz="2400" dirty="0"/>
+              <a:t>Arm </a:t>
+            </a:r>
+            <a:r>
+              <a:rPr lang="de-DE" sz="2400" dirty="0" err="1"/>
+              <a:t>network</a:t>
+            </a:r>
+            <a:r>
+              <a:rPr lang="de-DE" sz="2400" dirty="0"/>
+              <a:t> </a:t>
+            </a:r>
+            <a:r>
+              <a:rPr lang="de-DE" sz="2400" dirty="0" err="1"/>
+              <a:t>transmission</a:t>
+            </a:r>
+            <a:endParaRPr lang="de-DE" sz="2400" dirty="0"/>
+          </a:p>
+          <a:p>
+            <a:r>
+              <a:rPr lang="de-DE" sz="2400" dirty="0"/>
+              <a:t>Post-</a:t>
+            </a:r>
+            <a:r>
+              <a:rPr lang="de-DE" sz="2400" dirty="0" err="1"/>
+              <a:t>effects</a:t>
+            </a:r>
+            <a:r>
+              <a:rPr lang="de-DE" sz="2400" dirty="0"/>
+              <a:t> </a:t>
+            </a:r>
+            <a:r>
+              <a:rPr lang="de-DE" sz="2400" dirty="0" err="1" smtClean="0"/>
+              <a:t>too</a:t>
+            </a:r>
+            <a:r>
+              <a:rPr lang="de-DE" sz="2400" dirty="0" smtClean="0"/>
+              <a:t> performance- </a:t>
+            </a:r>
+            <a:r>
+              <a:rPr lang="de-DE" sz="2400" dirty="0" err="1" smtClean="0"/>
+              <a:t>consuming</a:t>
+            </a:r>
+            <a:r>
+              <a:rPr lang="de-DE" sz="2400" dirty="0" smtClean="0"/>
+              <a:t> (</a:t>
+            </a:r>
+            <a:r>
+              <a:rPr lang="de-DE" sz="2400" dirty="0" err="1" smtClean="0"/>
+              <a:t>scattering</a:t>
+            </a:r>
+            <a:r>
+              <a:rPr lang="de-DE" sz="2400" dirty="0"/>
+              <a:t>, </a:t>
+            </a:r>
+            <a:r>
+              <a:rPr lang="de-DE" sz="2400" dirty="0" err="1"/>
+              <a:t>ambient</a:t>
+            </a:r>
+            <a:r>
+              <a:rPr lang="de-DE" sz="2400" dirty="0"/>
+              <a:t> </a:t>
+            </a:r>
+            <a:r>
+              <a:rPr lang="de-DE" sz="2400" dirty="0" err="1"/>
+              <a:t>occlusion</a:t>
+            </a:r>
+            <a:r>
+              <a:rPr lang="de-DE" sz="2400" dirty="0"/>
+              <a:t>)</a:t>
+            </a:r>
+          </a:p>
+          <a:p>
+            <a:r>
+              <a:rPr lang="de-DE" sz="2400" dirty="0"/>
+              <a:t>Realtime Performance </a:t>
+            </a:r>
+            <a:r>
+              <a:rPr lang="de-DE" sz="2400" dirty="0" err="1"/>
+              <a:t>Issues</a:t>
+            </a:r>
+            <a:r>
+              <a:rPr lang="de-DE" sz="2400" dirty="0"/>
+              <a:t> </a:t>
+            </a:r>
+            <a:r>
+              <a:rPr lang="de-DE" sz="2400" dirty="0" err="1"/>
+              <a:t>for</a:t>
+            </a:r>
+            <a:r>
+              <a:rPr lang="de-DE" sz="2400" dirty="0"/>
+              <a:t> </a:t>
+            </a:r>
+            <a:r>
+              <a:rPr lang="de-DE" sz="2400" dirty="0" err="1"/>
+              <a:t>slower</a:t>
+            </a:r>
+            <a:r>
+              <a:rPr lang="de-DE" sz="2400" dirty="0"/>
+              <a:t> PCs (Graphics Settings?)</a:t>
+            </a:r>
+          </a:p>
+          <a:p>
+            <a:r>
+              <a:rPr lang="de-DE" sz="2400" dirty="0"/>
+              <a:t>AR Performance Problems</a:t>
+            </a:r>
+            <a:endParaRPr lang="de-DE" dirty="0"/>
+          </a:p>
+          <a:p>
+            <a:pPr>
+              <a:buNone/>
+            </a:pPr>
+            <a:endParaRPr lang="de-DE" dirty="0"/>
+          </a:p>
+          <a:p>
+            <a:pPr>
+              <a:buNone/>
+            </a:pPr>
+            <a:endParaRPr lang="de-DE" dirty="0"/>
+          </a:p>
+          <a:p>
+            <a:pPr>
+              <a:buNone/>
+            </a:pPr>
+            <a:endParaRPr lang="de-DE" dirty="0"/>
+          </a:p>
+          <a:p>
+            <a:endParaRPr lang="de-DE" dirty="0"/>
+          </a:p>
+        </p:txBody>
+      </p:sp>
+      <p:sp>
+        <p:nvSpPr>
+          <p:cNvPr id="7" name="Inhaltsplatzhalter 6"/>
+          <p:cNvSpPr>
+            <a:spLocks noGrp="1"/>
+          </p:cNvSpPr>
+          <p:nvPr>
+            <p:ph sz="half" idx="2"/>
+          </p:nvPr>
+        </p:nvSpPr>
+        <p:spPr/>
+        <p:txBody>
+          <a:bodyPr>
+            <a:normAutofit fontScale="92500" lnSpcReduction="10000"/>
+          </a:bodyPr>
+          <a:lstStyle/>
+          <a:p>
+            <a:r>
+              <a:rPr lang="de-DE" sz="2400" dirty="0" err="1" smtClean="0"/>
+              <a:t>Menue</a:t>
+            </a:r>
+            <a:r>
+              <a:rPr lang="de-DE" sz="2400" dirty="0" smtClean="0"/>
+              <a:t> </a:t>
+            </a:r>
+            <a:r>
+              <a:rPr lang="de-DE" sz="2400" dirty="0" err="1" smtClean="0"/>
+              <a:t>handling</a:t>
+            </a:r>
+            <a:r>
+              <a:rPr lang="de-DE" sz="2400" dirty="0" smtClean="0"/>
+              <a:t> (</a:t>
+            </a:r>
+            <a:r>
+              <a:rPr lang="de-DE" sz="2400" dirty="0" err="1" smtClean="0"/>
+              <a:t>Oculus</a:t>
+            </a:r>
+            <a:r>
+              <a:rPr lang="de-DE" sz="2400" dirty="0"/>
+              <a:t>)</a:t>
+            </a:r>
+          </a:p>
+          <a:p>
+            <a:r>
+              <a:rPr lang="de-DE" sz="2400" dirty="0" err="1" smtClean="0"/>
+              <a:t>Gesture</a:t>
+            </a:r>
+            <a:r>
+              <a:rPr lang="de-DE" sz="2400" dirty="0" smtClean="0"/>
+              <a:t> </a:t>
+            </a:r>
+            <a:r>
+              <a:rPr lang="de-DE" sz="2400" dirty="0" err="1"/>
+              <a:t>control</a:t>
+            </a:r>
+            <a:r>
+              <a:rPr lang="de-DE" sz="2400" dirty="0"/>
+              <a:t> </a:t>
+            </a:r>
+            <a:r>
+              <a:rPr lang="de-DE" sz="2400" dirty="0" err="1"/>
+              <a:t>problems</a:t>
+            </a:r>
+            <a:r>
+              <a:rPr lang="de-DE" sz="2400" dirty="0"/>
+              <a:t> (APIs </a:t>
+            </a:r>
+            <a:r>
+              <a:rPr lang="de-DE" sz="2400" dirty="0" err="1"/>
+              <a:t>for</a:t>
+            </a:r>
+            <a:r>
+              <a:rPr lang="de-DE" sz="2400" dirty="0"/>
+              <a:t> Vive not </a:t>
+            </a:r>
+            <a:r>
+              <a:rPr lang="de-DE" sz="2400" dirty="0" err="1"/>
+              <a:t>tested</a:t>
+            </a:r>
+            <a:r>
+              <a:rPr lang="de-DE" sz="2400" dirty="0"/>
+              <a:t> </a:t>
+            </a:r>
+            <a:r>
+              <a:rPr lang="de-DE" sz="2400" dirty="0" err="1"/>
+              <a:t>yet</a:t>
+            </a:r>
+            <a:r>
+              <a:rPr lang="de-DE" sz="2400" dirty="0"/>
+              <a:t>, </a:t>
+            </a:r>
+            <a:r>
+              <a:rPr lang="de-DE" sz="2400" dirty="0" err="1"/>
+              <a:t>currently</a:t>
+            </a:r>
+            <a:r>
+              <a:rPr lang="de-DE" sz="2400" dirty="0"/>
+              <a:t> </a:t>
+            </a:r>
+            <a:r>
+              <a:rPr lang="de-DE" sz="2400" dirty="0" err="1"/>
+              <a:t>unstable</a:t>
+            </a:r>
+            <a:r>
+              <a:rPr lang="de-DE" sz="2400" dirty="0"/>
+              <a:t> APIs </a:t>
+            </a:r>
+            <a:r>
+              <a:rPr lang="de-DE" sz="2400" dirty="0" err="1"/>
+              <a:t>for</a:t>
+            </a:r>
+            <a:r>
+              <a:rPr lang="de-DE" sz="2400" dirty="0"/>
+              <a:t> Kinect?)</a:t>
+            </a:r>
+          </a:p>
+          <a:p>
+            <a:r>
+              <a:rPr lang="de-DE" sz="2400" dirty="0" err="1"/>
+              <a:t>Suitable</a:t>
+            </a:r>
+            <a:r>
+              <a:rPr lang="de-DE" sz="2400" dirty="0"/>
+              <a:t> </a:t>
+            </a:r>
+            <a:r>
+              <a:rPr lang="de-DE" sz="2400" dirty="0" err="1"/>
+              <a:t>for</a:t>
+            </a:r>
+            <a:r>
+              <a:rPr lang="de-DE" sz="2400" dirty="0"/>
+              <a:t> HS-</a:t>
+            </a:r>
+            <a:r>
+              <a:rPr lang="de-DE" sz="2400" dirty="0" err="1"/>
+              <a:t>Lan</a:t>
+            </a:r>
+            <a:r>
+              <a:rPr lang="de-DE" sz="2400" dirty="0"/>
+              <a:t> </a:t>
+            </a:r>
+            <a:r>
+              <a:rPr lang="de-DE" sz="2400" dirty="0" err="1"/>
+              <a:t>and</a:t>
+            </a:r>
+            <a:r>
+              <a:rPr lang="de-DE" sz="2400" dirty="0"/>
+              <a:t> Open-Lab</a:t>
+            </a:r>
+          </a:p>
+          <a:p>
+            <a:r>
+              <a:rPr lang="de-DE" sz="2400" dirty="0" err="1"/>
+              <a:t>Ofc</a:t>
+            </a:r>
+            <a:r>
+              <a:rPr lang="de-DE" sz="2400" dirty="0"/>
+              <a:t>: </a:t>
+            </a:r>
+            <a:r>
+              <a:rPr lang="de-DE" sz="2400" dirty="0" err="1"/>
+              <a:t>Illness</a:t>
+            </a:r>
+            <a:r>
+              <a:rPr lang="de-DE" sz="2400" dirty="0"/>
+              <a:t> </a:t>
+            </a:r>
+            <a:r>
+              <a:rPr lang="de-DE" sz="2400" dirty="0" err="1"/>
+              <a:t>of</a:t>
+            </a:r>
+            <a:r>
+              <a:rPr lang="de-DE" sz="2400" dirty="0"/>
+              <a:t> Project Members (</a:t>
+            </a:r>
+            <a:r>
+              <a:rPr lang="de-DE" sz="2400" dirty="0" err="1"/>
+              <a:t>workload</a:t>
+            </a:r>
+            <a:r>
+              <a:rPr lang="de-DE" sz="2400" dirty="0"/>
+              <a:t> </a:t>
+            </a:r>
+            <a:r>
+              <a:rPr lang="de-DE" sz="2400" dirty="0" err="1"/>
+              <a:t>balancing</a:t>
+            </a:r>
+            <a:r>
+              <a:rPr lang="de-DE" sz="2400" dirty="0"/>
+              <a:t>)</a:t>
+            </a:r>
+          </a:p>
+          <a:p>
+            <a:pPr>
+              <a:buNone/>
+            </a:pPr>
+            <a:endParaRPr lang="de-DE" sz="2400" dirty="0"/>
+          </a:p>
+        </p:txBody>
+      </p:sp>
+      <p:sp>
+        <p:nvSpPr>
+          <p:cNvPr id="11" name="Foliennummernplatzhalter 10"/>
+          <p:cNvSpPr>
+            <a:spLocks noGrp="1"/>
+          </p:cNvSpPr>
+          <p:nvPr>
+            <p:ph type="sldNum" sz="quarter" idx="12"/>
+          </p:nvPr>
+        </p:nvSpPr>
+        <p:spPr/>
+        <p:txBody>
+          <a:bodyPr/>
+          <a:lstStyle/>
+          <a:p>
+            <a:fld id="{6C6AE60A-B69C-4790-82F7-3882EDF23186}" type="slidenum">
+              <a:rPr lang="de-DE" smtClean="0"/>
+              <a:pPr/>
+              <a:t>24</a:t>
+            </a:fld>
+            <a:endParaRPr lang="de-DE"/>
+          </a:p>
+        </p:txBody>
+      </p:sp>
+    </p:spTree>
+  </p:cSld>
+  <p:clrMapOvr>
+    <a:masterClrMapping/>
+  </p:clrMapOvr>
+</p:sld>
+</file>
+
+<file path=ppt/slides/slide25.xml><?xml version="1.0" encoding="utf-8"?>
+<p:sld xmlns:a="http://schemas.openxmlformats.org/drawingml/2006/main" xmlns:r="http://schemas.openxmlformats.org/officeDocument/2006/relationships" xmlns:p="http://schemas.openxmlformats.org/presentationml/2006/main">
+  <p:cSld>
+    <p:spTree>
+      <p:nvGrpSpPr>
+        <p:cNvPr id="1" name=""/>
+        <p:cNvGrpSpPr/>
+        <p:nvPr/>
+      </p:nvGrpSpPr>
+      <p:grpSpPr>
+        <a:xfrm>
+          <a:off x="0" y="0"/>
+          <a:ext cx="0" cy="0"/>
+          <a:chOff x="0" y="0"/>
+          <a:chExt cx="0" cy="0"/>
+        </a:xfrm>
+      </p:grpSpPr>
+      <p:sp>
+        <p:nvSpPr>
+          <p:cNvPr id="2" name="Titel 1"/>
+          <p:cNvSpPr>
+            <a:spLocks noGrp="1"/>
+          </p:cNvSpPr>
+          <p:nvPr>
+            <p:ph type="title"/>
+          </p:nvPr>
+        </p:nvSpPr>
+        <p:spPr/>
+        <p:txBody>
+          <a:bodyPr>
+            <a:normAutofit/>
+          </a:bodyPr>
+          <a:lstStyle/>
+          <a:p>
+            <a:pPr algn="ctr"/>
+            <a:r>
+              <a:rPr lang="de-DE" dirty="0" err="1"/>
+              <a:t>Github</a:t>
+            </a:r>
+            <a:r>
+              <a:rPr lang="de-DE" dirty="0"/>
+              <a:t> Version </a:t>
+            </a:r>
+            <a:r>
+              <a:rPr lang="de-DE" dirty="0" err="1"/>
+              <a:t>Control</a:t>
+            </a:r>
+            <a:endParaRPr lang="de-DE" dirty="0"/>
+          </a:p>
+        </p:txBody>
+      </p:sp>
+      <p:sp>
+        <p:nvSpPr>
+          <p:cNvPr id="9" name="Inhaltsplatzhalter 8"/>
+          <p:cNvSpPr>
+            <a:spLocks noGrp="1"/>
+          </p:cNvSpPr>
+          <p:nvPr>
+            <p:ph sz="half" idx="1"/>
+          </p:nvPr>
+        </p:nvSpPr>
+        <p:spPr>
+          <a:xfrm>
+            <a:off x="457200" y="1600071"/>
+            <a:ext cx="8219256" cy="3695700"/>
+          </a:xfrm>
+        </p:spPr>
+        <p:txBody>
+          <a:bodyPr>
+            <a:normAutofit/>
+          </a:bodyPr>
+          <a:lstStyle/>
+          <a:p>
+            <a:endParaRPr lang="de-DE" dirty="0">
+              <a:hlinkClick r:id="rId2"/>
+            </a:endParaRPr>
+          </a:p>
+          <a:p>
+            <a:r>
+              <a:rPr lang="de-DE" dirty="0"/>
+              <a:t>Old </a:t>
+            </a:r>
+            <a:r>
+              <a:rPr lang="de-DE" dirty="0" err="1"/>
+              <a:t>project</a:t>
+            </a:r>
+            <a:r>
+              <a:rPr lang="de-DE" dirty="0"/>
+              <a:t> </a:t>
+            </a:r>
+            <a:r>
+              <a:rPr lang="de-DE" dirty="0" err="1"/>
+              <a:t>source</a:t>
+            </a:r>
+            <a:endParaRPr lang="de-DE" dirty="0">
+              <a:hlinkClick r:id="rId2"/>
+            </a:endParaRPr>
+          </a:p>
+          <a:p>
+            <a:pPr algn="ctr">
+              <a:buNone/>
+            </a:pPr>
+            <a:r>
+              <a:rPr lang="de-DE" dirty="0">
+                <a:hlinkClick r:id="rId3"/>
+              </a:rPr>
+              <a:t>https://github.com/andreasdietze/Rift-Wingsuit.git</a:t>
+            </a:r>
+            <a:endParaRPr lang="de-DE" dirty="0"/>
+          </a:p>
+          <a:p>
+            <a:pPr algn="ctr">
+              <a:buNone/>
+            </a:pPr>
+            <a:endParaRPr lang="de-DE" dirty="0"/>
+          </a:p>
+          <a:p>
+            <a:r>
+              <a:rPr lang="de-DE" dirty="0"/>
+              <a:t>New </a:t>
+            </a:r>
+            <a:r>
+              <a:rPr lang="de-DE" dirty="0" err="1"/>
+              <a:t>project</a:t>
+            </a:r>
+            <a:r>
+              <a:rPr lang="de-DE" dirty="0"/>
+              <a:t> </a:t>
+            </a:r>
+            <a:r>
+              <a:rPr lang="de-DE" dirty="0" err="1"/>
+              <a:t>source</a:t>
+            </a:r>
+            <a:endParaRPr lang="de-DE" dirty="0"/>
+          </a:p>
+          <a:p>
+            <a:pPr algn="ctr">
+              <a:buNone/>
+            </a:pPr>
+            <a:r>
+              <a:rPr lang="de-DE" dirty="0">
+                <a:hlinkClick r:id="rId4"/>
+              </a:rPr>
+              <a:t>https://github.com/andreasdietze/Rift-WingsuitV2.git</a:t>
+            </a:r>
+            <a:endParaRPr lang="de-DE" dirty="0"/>
+          </a:p>
+          <a:p>
+            <a:endParaRPr lang="de-DE" dirty="0"/>
+          </a:p>
+        </p:txBody>
+      </p:sp>
+      <p:sp>
+        <p:nvSpPr>
+          <p:cNvPr id="11" name="Foliennummernplatzhalter 10"/>
+          <p:cNvSpPr>
+            <a:spLocks noGrp="1"/>
+          </p:cNvSpPr>
+          <p:nvPr>
+            <p:ph type="sldNum" sz="quarter" idx="12"/>
+          </p:nvPr>
+        </p:nvSpPr>
+        <p:spPr/>
+        <p:txBody>
+          <a:bodyPr/>
+          <a:lstStyle/>
+          <a:p>
+            <a:fld id="{6C6AE60A-B69C-4790-82F7-3882EDF23186}" type="slidenum">
+              <a:rPr lang="de-DE" smtClean="0"/>
+              <a:pPr/>
+              <a:t>25</a:t>
+            </a:fld>
+            <a:endParaRPr lang="de-DE"/>
+          </a:p>
+        </p:txBody>
+      </p:sp>
+    </p:spTree>
+  </p:cSld>
+  <p:clrMapOvr>
+    <a:masterClrMapping/>
+  </p:clrMapOvr>
+</p:sld>
+</file>
+
+<file path=ppt/slides/slide26.xml><?xml version="1.0" encoding="utf-8"?>
+<p:sld xmlns:a="http://schemas.openxmlformats.org/drawingml/2006/main" xmlns:r="http://schemas.openxmlformats.org/officeDocument/2006/relationships" xmlns:p="http://schemas.openxmlformats.org/presentationml/2006/main">
+  <p:cSld>
+    <p:spTree>
+      <p:nvGrpSpPr>
+        <p:cNvPr id="1" name=""/>
+        <p:cNvGrpSpPr/>
+        <p:nvPr/>
+      </p:nvGrpSpPr>
+      <p:grpSpPr>
+        <a:xfrm>
+          <a:off x="0" y="0"/>
+          <a:ext cx="0" cy="0"/>
+          <a:chOff x="0" y="0"/>
+          <a:chExt cx="0" cy="0"/>
+        </a:xfrm>
+      </p:grpSpPr>
+      <p:sp>
+        <p:nvSpPr>
           <p:cNvPr id="6" name="Titel 5"/>
           <p:cNvSpPr>
             <a:spLocks noGrp="1"/>
@@ -10593,7 +12347,7 @@
             <a:fld id="{6C6AE60A-B69C-4790-82F7-3882EDF23186}" type="slidenum">
               <a:rPr lang="de-DE" smtClean="0"/>
               <a:pPr/>
-              <a:t>23</a:t>
+              <a:t>26</a:t>
             </a:fld>
             <a:endParaRPr lang="de-DE"/>
           </a:p>
@@ -11212,7 +12966,7 @@
           <a:blip r:embed="rId2" cstate="print">
             <a:extLst>
               <a:ext uri="{28A0092B-C50C-407E-A947-70E740481C1C}">
-                <a14:useLocalDpi xmlns:a14="http://schemas.microsoft.com/office/drawing/2010/main" xmlns="" val="0"/>
+                <a14:useLocalDpi xmlns:a14="http://schemas.microsoft.com/office/drawing/2010/main" val="0"/>
               </a:ext>
             </a:extLst>
           </a:blip>
@@ -11230,7 +12984,7 @@
     </p:spTree>
     <p:extLst>
       <p:ext uri="{BB962C8B-B14F-4D97-AF65-F5344CB8AC3E}">
-        <p14:creationId xmlns:p14="http://schemas.microsoft.com/office/powerpoint/2010/main" xmlns="" val="3486165658"/>
+        <p14:creationId xmlns:p14="http://schemas.microsoft.com/office/powerpoint/2010/main" val="3486165658"/>
       </p:ext>
     </p:extLst>
   </p:cSld>

</xml_diff>

<commit_message>
Update project proposal presentation
</commit_message>
<xml_diff>
--- a/Präsentationen/Projektpräsentation/Project proposal Rift Wingsuit V2.pptx
+++ b/Präsentationen/Projektpräsentation/Project proposal Rift Wingsuit V2.pptx
@@ -137,7 +137,7 @@
   </p:defaultTextStyle>
   <p:extLst>
     <p:ext uri="{EFAFB233-063F-42B5-8137-9DF3F51BA10A}">
-      <p15:sldGuideLst xmlns:p15="http://schemas.microsoft.com/office/powerpoint/2012/main">
+      <p15:sldGuideLst xmlns:p15="http://schemas.microsoft.com/office/powerpoint/2012/main" xmlns="">
         <p15:guide id="1" orient="horz" pos="1800">
           <p15:clr>
             <a:srgbClr val="A4A3A4"/>
@@ -407,7 +407,7 @@
     </p:spTree>
     <p:extLst>
       <p:ext uri="{BB962C8B-B14F-4D97-AF65-F5344CB8AC3E}">
-        <p14:creationId xmlns:p14="http://schemas.microsoft.com/office/powerpoint/2010/main" val="1727503161"/>
+        <p14:creationId xmlns:p14="http://schemas.microsoft.com/office/powerpoint/2010/main" xmlns="" val="1727503161"/>
       </p:ext>
     </p:extLst>
   </p:cSld>
@@ -592,7 +592,7 @@
     </p:spTree>
     <p:extLst>
       <p:ext uri="{BB962C8B-B14F-4D97-AF65-F5344CB8AC3E}">
-        <p14:creationId xmlns:p14="http://schemas.microsoft.com/office/powerpoint/2010/main" val="592270510"/>
+        <p14:creationId xmlns:p14="http://schemas.microsoft.com/office/powerpoint/2010/main" xmlns="" val="592270510"/>
       </p:ext>
     </p:extLst>
   </p:cSld>
@@ -677,7 +677,7 @@
     </p:spTree>
     <p:extLst>
       <p:ext uri="{BB962C8B-B14F-4D97-AF65-F5344CB8AC3E}">
-        <p14:creationId xmlns:p14="http://schemas.microsoft.com/office/powerpoint/2010/main" val="2156963838"/>
+        <p14:creationId xmlns:p14="http://schemas.microsoft.com/office/powerpoint/2010/main" xmlns="" val="2156963838"/>
       </p:ext>
     </p:extLst>
   </p:cSld>
@@ -4968,10 +4968,9 @@
               <a:t>Ibach</a:t>
             </a:r>
             <a:r>
-              <a:rPr lang="de-DE"/>
+              <a:rPr lang="de-DE" dirty="0"/>
               <a:t>)</a:t>
             </a:r>
-            <a:endParaRPr lang="de-DE" dirty="0"/>
           </a:p>
           <a:p>
             <a:r>
@@ -5014,8 +5013,13 @@
             <a:pPr lvl="1"/>
             <a:r>
               <a:rPr lang="de-DE" dirty="0"/>
-              <a:t>Manuel Schmitt (J.K., S.N)</a:t>
-            </a:r>
+              <a:t>Manuel Schmitt (J.K., </a:t>
+            </a:r>
+            <a:r>
+              <a:rPr lang="de-DE" dirty="0" smtClean="0"/>
+              <a:t>S.N.)</a:t>
+            </a:r>
+            <a:endParaRPr lang="de-DE" dirty="0"/>
           </a:p>
           <a:p>
             <a:pPr>
@@ -5088,8 +5092,13 @@
             <a:pPr lvl="1"/>
             <a:r>
               <a:rPr lang="de-DE" dirty="0"/>
-              <a:t>Manuel Schmitt (S. Nickel)</a:t>
-            </a:r>
+              <a:t>Manuel Schmitt (</a:t>
+            </a:r>
+            <a:r>
+              <a:rPr lang="de-DE" dirty="0" smtClean="0"/>
+              <a:t>S.N., S.I.)</a:t>
+            </a:r>
+            <a:endParaRPr lang="de-DE" dirty="0"/>
           </a:p>
           <a:p>
             <a:r>
@@ -5135,8 +5144,13 @@
             <a:pPr lvl="1"/>
             <a:r>
               <a:rPr lang="de-DE" dirty="0"/>
-              <a:t>Andreas Dietze (M. Schmitt)</a:t>
-            </a:r>
+              <a:t>Andreas Dietze (</a:t>
+            </a:r>
+            <a:r>
+              <a:rPr lang="de-DE" dirty="0" smtClean="0"/>
+              <a:t>M.S., S.I.)</a:t>
+            </a:r>
+            <a:endParaRPr lang="de-DE" dirty="0"/>
           </a:p>
           <a:p>
             <a:r>
@@ -5165,8 +5179,13 @@
             </a:r>
             <a:r>
               <a:rPr lang="de-DE" dirty="0"/>
-              <a:t> (wer?)</a:t>
-            </a:r>
+              <a:t> </a:t>
+            </a:r>
+            <a:r>
+              <a:rPr lang="de-DE" dirty="0" smtClean="0"/>
+              <a:t>(A. Dietze)</a:t>
+            </a:r>
+            <a:endParaRPr lang="de-DE" dirty="0"/>
           </a:p>
           <a:p>
             <a:pPr lvl="1"/>
@@ -5339,14 +5358,14 @@
                 <a:gridCol w="1584176">
                   <a:extLst>
                     <a:ext uri="{9D8B030D-6E8A-4147-A177-3AD203B41FA5}">
-                      <a16:colId xmlns:a16="http://schemas.microsoft.com/office/drawing/2014/main" val="20000"/>
+                      <a16:colId xmlns:a16="http://schemas.microsoft.com/office/drawing/2014/main" xmlns="" val="20000"/>
                     </a:ext>
                   </a:extLst>
                 </a:gridCol>
                 <a:gridCol w="6480721">
                   <a:extLst>
                     <a:ext uri="{9D8B030D-6E8A-4147-A177-3AD203B41FA5}">
-                      <a16:colId xmlns:a16="http://schemas.microsoft.com/office/drawing/2014/main" val="20001"/>
+                      <a16:colId xmlns:a16="http://schemas.microsoft.com/office/drawing/2014/main" xmlns="" val="20001"/>
                     </a:ext>
                   </a:extLst>
                 </a:gridCol>
@@ -5388,7 +5407,7 @@
                 </a:tc>
                 <a:extLst>
                   <a:ext uri="{0D108BD9-81ED-4DB2-BD59-A6C34878D82A}">
-                    <a16:rowId xmlns:a16="http://schemas.microsoft.com/office/drawing/2014/main" val="10000"/>
+                    <a16:rowId xmlns:a16="http://schemas.microsoft.com/office/drawing/2014/main" xmlns="" val="10000"/>
                   </a:ext>
                 </a:extLst>
               </a:tr>
@@ -5568,7 +5587,7 @@
                 </a:tc>
                 <a:extLst>
                   <a:ext uri="{0D108BD9-81ED-4DB2-BD59-A6C34878D82A}">
-                    <a16:rowId xmlns:a16="http://schemas.microsoft.com/office/drawing/2014/main" val="10001"/>
+                    <a16:rowId xmlns:a16="http://schemas.microsoft.com/office/drawing/2014/main" xmlns="" val="10001"/>
                   </a:ext>
                 </a:extLst>
               </a:tr>
@@ -5708,7 +5727,7 @@
                 </a:tc>
                 <a:extLst>
                   <a:ext uri="{0D108BD9-81ED-4DB2-BD59-A6C34878D82A}">
-                    <a16:rowId xmlns:a16="http://schemas.microsoft.com/office/drawing/2014/main" val="10002"/>
+                    <a16:rowId xmlns:a16="http://schemas.microsoft.com/office/drawing/2014/main" xmlns="" val="10002"/>
                   </a:ext>
                 </a:extLst>
               </a:tr>
@@ -5828,7 +5847,7 @@
                 </a:tc>
                 <a:extLst>
                   <a:ext uri="{0D108BD9-81ED-4DB2-BD59-A6C34878D82A}">
-                    <a16:rowId xmlns:a16="http://schemas.microsoft.com/office/drawing/2014/main" val="10003"/>
+                    <a16:rowId xmlns:a16="http://schemas.microsoft.com/office/drawing/2014/main" xmlns="" val="10003"/>
                   </a:ext>
                 </a:extLst>
               </a:tr>
@@ -5961,7 +5980,7 @@
           <p:nvPr>
             <p:extLst>
               <p:ext uri="{D42A27DB-BD31-4B8C-83A1-F6EECF244321}">
-                <p14:modId xmlns:p14="http://schemas.microsoft.com/office/powerpoint/2010/main" val="62862726"/>
+                <p14:modId xmlns:p14="http://schemas.microsoft.com/office/powerpoint/2010/main" xmlns="" val="62862726"/>
               </p:ext>
             </p:extLst>
           </p:nvPr>
@@ -5980,14 +5999,14 @@
                 <a:gridCol w="1584176">
                   <a:extLst>
                     <a:ext uri="{9D8B030D-6E8A-4147-A177-3AD203B41FA5}">
-                      <a16:colId xmlns:a16="http://schemas.microsoft.com/office/drawing/2014/main" val="20000"/>
+                      <a16:colId xmlns:a16="http://schemas.microsoft.com/office/drawing/2014/main" xmlns="" val="20000"/>
                     </a:ext>
                   </a:extLst>
                 </a:gridCol>
                 <a:gridCol w="6480721">
                   <a:extLst>
                     <a:ext uri="{9D8B030D-6E8A-4147-A177-3AD203B41FA5}">
-                      <a16:colId xmlns:a16="http://schemas.microsoft.com/office/drawing/2014/main" val="20001"/>
+                      <a16:colId xmlns:a16="http://schemas.microsoft.com/office/drawing/2014/main" xmlns="" val="20001"/>
                     </a:ext>
                   </a:extLst>
                 </a:gridCol>
@@ -6024,7 +6043,7 @@
                 </a:tc>
                 <a:extLst>
                   <a:ext uri="{0D108BD9-81ED-4DB2-BD59-A6C34878D82A}">
-                    <a16:rowId xmlns:a16="http://schemas.microsoft.com/office/drawing/2014/main" val="10000"/>
+                    <a16:rowId xmlns:a16="http://schemas.microsoft.com/office/drawing/2014/main" xmlns="" val="10000"/>
                   </a:ext>
                 </a:extLst>
               </a:tr>
@@ -6077,7 +6096,7 @@
                 </a:tc>
                 <a:extLst>
                   <a:ext uri="{0D108BD9-81ED-4DB2-BD59-A6C34878D82A}">
-                    <a16:rowId xmlns:a16="http://schemas.microsoft.com/office/drawing/2014/main" val="10001"/>
+                    <a16:rowId xmlns:a16="http://schemas.microsoft.com/office/drawing/2014/main" xmlns="" val="10001"/>
                   </a:ext>
                 </a:extLst>
               </a:tr>
@@ -6154,7 +6173,7 @@
                 </a:tc>
                 <a:extLst>
                   <a:ext uri="{0D108BD9-81ED-4DB2-BD59-A6C34878D82A}">
-                    <a16:rowId xmlns:a16="http://schemas.microsoft.com/office/drawing/2014/main" val="10002"/>
+                    <a16:rowId xmlns:a16="http://schemas.microsoft.com/office/drawing/2014/main" xmlns="" val="10002"/>
                   </a:ext>
                 </a:extLst>
               </a:tr>
@@ -6197,7 +6216,7 @@
                 </a:tc>
                 <a:extLst>
                   <a:ext uri="{0D108BD9-81ED-4DB2-BD59-A6C34878D82A}">
-                    <a16:rowId xmlns:a16="http://schemas.microsoft.com/office/drawing/2014/main" val="10003"/>
+                    <a16:rowId xmlns:a16="http://schemas.microsoft.com/office/drawing/2014/main" xmlns="" val="10003"/>
                   </a:ext>
                 </a:extLst>
               </a:tr>
@@ -6208,7 +6227,7 @@
     </p:spTree>
     <p:extLst>
       <p:ext uri="{BB962C8B-B14F-4D97-AF65-F5344CB8AC3E}">
-        <p14:creationId xmlns:p14="http://schemas.microsoft.com/office/powerpoint/2010/main" val="401768939"/>
+        <p14:creationId xmlns:p14="http://schemas.microsoft.com/office/powerpoint/2010/main" xmlns="" val="401768939"/>
       </p:ext>
     </p:extLst>
   </p:cSld>
@@ -6335,7 +6354,7 @@
           <p:nvPr>
             <p:extLst>
               <p:ext uri="{D42A27DB-BD31-4B8C-83A1-F6EECF244321}">
-                <p14:modId xmlns:p14="http://schemas.microsoft.com/office/powerpoint/2010/main" val="62862726"/>
+                <p14:modId xmlns:p14="http://schemas.microsoft.com/office/powerpoint/2010/main" xmlns="" val="62862726"/>
               </p:ext>
             </p:extLst>
           </p:nvPr>
@@ -6354,14 +6373,14 @@
                 <a:gridCol w="1584176">
                   <a:extLst>
                     <a:ext uri="{9D8B030D-6E8A-4147-A177-3AD203B41FA5}">
-                      <a16:colId xmlns:a16="http://schemas.microsoft.com/office/drawing/2014/main" val="20000"/>
+                      <a16:colId xmlns:a16="http://schemas.microsoft.com/office/drawing/2014/main" xmlns="" val="20000"/>
                     </a:ext>
                   </a:extLst>
                 </a:gridCol>
                 <a:gridCol w="6480721">
                   <a:extLst>
                     <a:ext uri="{9D8B030D-6E8A-4147-A177-3AD203B41FA5}">
-                      <a16:colId xmlns:a16="http://schemas.microsoft.com/office/drawing/2014/main" val="20001"/>
+                      <a16:colId xmlns:a16="http://schemas.microsoft.com/office/drawing/2014/main" xmlns="" val="20001"/>
                     </a:ext>
                   </a:extLst>
                 </a:gridCol>
@@ -6398,7 +6417,7 @@
                 </a:tc>
                 <a:extLst>
                   <a:ext uri="{0D108BD9-81ED-4DB2-BD59-A6C34878D82A}">
-                    <a16:rowId xmlns:a16="http://schemas.microsoft.com/office/drawing/2014/main" val="10000"/>
+                    <a16:rowId xmlns:a16="http://schemas.microsoft.com/office/drawing/2014/main" xmlns="" val="10000"/>
                   </a:ext>
                 </a:extLst>
               </a:tr>
@@ -6440,7 +6459,7 @@
                 </a:tc>
                 <a:extLst>
                   <a:ext uri="{0D108BD9-81ED-4DB2-BD59-A6C34878D82A}">
-                    <a16:rowId xmlns:a16="http://schemas.microsoft.com/office/drawing/2014/main" val="10001"/>
+                    <a16:rowId xmlns:a16="http://schemas.microsoft.com/office/drawing/2014/main" xmlns="" val="10001"/>
                   </a:ext>
                 </a:extLst>
               </a:tr>
@@ -6539,7 +6558,7 @@
                 </a:tc>
                 <a:extLst>
                   <a:ext uri="{0D108BD9-81ED-4DB2-BD59-A6C34878D82A}">
-                    <a16:rowId xmlns:a16="http://schemas.microsoft.com/office/drawing/2014/main" val="10002"/>
+                    <a16:rowId xmlns:a16="http://schemas.microsoft.com/office/drawing/2014/main" xmlns="" val="10002"/>
                   </a:ext>
                 </a:extLst>
               </a:tr>
@@ -6586,7 +6605,7 @@
                 </a:tc>
                 <a:extLst>
                   <a:ext uri="{0D108BD9-81ED-4DB2-BD59-A6C34878D82A}">
-                    <a16:rowId xmlns:a16="http://schemas.microsoft.com/office/drawing/2014/main" val="10003"/>
+                    <a16:rowId xmlns:a16="http://schemas.microsoft.com/office/drawing/2014/main" xmlns="" val="10003"/>
                   </a:ext>
                 </a:extLst>
               </a:tr>
@@ -6597,7 +6616,7 @@
     </p:spTree>
     <p:extLst>
       <p:ext uri="{BB962C8B-B14F-4D97-AF65-F5344CB8AC3E}">
-        <p14:creationId xmlns:p14="http://schemas.microsoft.com/office/powerpoint/2010/main" val="401768939"/>
+        <p14:creationId xmlns:p14="http://schemas.microsoft.com/office/powerpoint/2010/main" xmlns="" val="401768939"/>
       </p:ext>
     </p:extLst>
   </p:cSld>
@@ -6724,7 +6743,7 @@
           <p:nvPr>
             <p:extLst>
               <p:ext uri="{D42A27DB-BD31-4B8C-83A1-F6EECF244321}">
-                <p14:modId xmlns:p14="http://schemas.microsoft.com/office/powerpoint/2010/main" val="2500517179"/>
+                <p14:modId xmlns:p14="http://schemas.microsoft.com/office/powerpoint/2010/main" xmlns="" val="2500517179"/>
               </p:ext>
             </p:extLst>
           </p:nvPr>
@@ -6743,14 +6762,14 @@
                 <a:gridCol w="1584176">
                   <a:extLst>
                     <a:ext uri="{9D8B030D-6E8A-4147-A177-3AD203B41FA5}">
-                      <a16:colId xmlns:a16="http://schemas.microsoft.com/office/drawing/2014/main" val="20000"/>
+                      <a16:colId xmlns:a16="http://schemas.microsoft.com/office/drawing/2014/main" xmlns="" val="20000"/>
                     </a:ext>
                   </a:extLst>
                 </a:gridCol>
                 <a:gridCol w="6480721">
                   <a:extLst>
                     <a:ext uri="{9D8B030D-6E8A-4147-A177-3AD203B41FA5}">
-                      <a16:colId xmlns:a16="http://schemas.microsoft.com/office/drawing/2014/main" val="20001"/>
+                      <a16:colId xmlns:a16="http://schemas.microsoft.com/office/drawing/2014/main" xmlns="" val="20001"/>
                     </a:ext>
                   </a:extLst>
                 </a:gridCol>
@@ -6787,7 +6806,7 @@
                 </a:tc>
                 <a:extLst>
                   <a:ext uri="{0D108BD9-81ED-4DB2-BD59-A6C34878D82A}">
-                    <a16:rowId xmlns:a16="http://schemas.microsoft.com/office/drawing/2014/main" val="10000"/>
+                    <a16:rowId xmlns:a16="http://schemas.microsoft.com/office/drawing/2014/main" xmlns="" val="10000"/>
                   </a:ext>
                 </a:extLst>
               </a:tr>
@@ -6878,7 +6897,7 @@
                 </a:tc>
                 <a:extLst>
                   <a:ext uri="{0D108BD9-81ED-4DB2-BD59-A6C34878D82A}">
-                    <a16:rowId xmlns:a16="http://schemas.microsoft.com/office/drawing/2014/main" val="10001"/>
+                    <a16:rowId xmlns:a16="http://schemas.microsoft.com/office/drawing/2014/main" xmlns="" val="10001"/>
                   </a:ext>
                 </a:extLst>
               </a:tr>
@@ -6969,7 +6988,7 @@
                 </a:tc>
                 <a:extLst>
                   <a:ext uri="{0D108BD9-81ED-4DB2-BD59-A6C34878D82A}">
-                    <a16:rowId xmlns:a16="http://schemas.microsoft.com/office/drawing/2014/main" val="10002"/>
+                    <a16:rowId xmlns:a16="http://schemas.microsoft.com/office/drawing/2014/main" xmlns="" val="10002"/>
                   </a:ext>
                 </a:extLst>
               </a:tr>
@@ -7036,7 +7055,7 @@
                 </a:tc>
                 <a:extLst>
                   <a:ext uri="{0D108BD9-81ED-4DB2-BD59-A6C34878D82A}">
-                    <a16:rowId xmlns:a16="http://schemas.microsoft.com/office/drawing/2014/main" val="10003"/>
+                    <a16:rowId xmlns:a16="http://schemas.microsoft.com/office/drawing/2014/main" xmlns="" val="10003"/>
                   </a:ext>
                 </a:extLst>
               </a:tr>
@@ -7047,7 +7066,7 @@
     </p:spTree>
     <p:extLst>
       <p:ext uri="{BB962C8B-B14F-4D97-AF65-F5344CB8AC3E}">
-        <p14:creationId xmlns:p14="http://schemas.microsoft.com/office/powerpoint/2010/main" val="2898537935"/>
+        <p14:creationId xmlns:p14="http://schemas.microsoft.com/office/powerpoint/2010/main" xmlns="" val="2898537935"/>
       </p:ext>
     </p:extLst>
   </p:cSld>
@@ -7174,7 +7193,7 @@
           <p:nvPr>
             <p:extLst>
               <p:ext uri="{D42A27DB-BD31-4B8C-83A1-F6EECF244321}">
-                <p14:modId xmlns:p14="http://schemas.microsoft.com/office/powerpoint/2010/main" val="4095723094"/>
+                <p14:modId xmlns:p14="http://schemas.microsoft.com/office/powerpoint/2010/main" xmlns="" val="4095723094"/>
               </p:ext>
             </p:extLst>
           </p:nvPr>
@@ -7193,14 +7212,14 @@
                 <a:gridCol w="1584176">
                   <a:extLst>
                     <a:ext uri="{9D8B030D-6E8A-4147-A177-3AD203B41FA5}">
-                      <a16:colId xmlns:a16="http://schemas.microsoft.com/office/drawing/2014/main" val="20000"/>
+                      <a16:colId xmlns:a16="http://schemas.microsoft.com/office/drawing/2014/main" xmlns="" val="20000"/>
                     </a:ext>
                   </a:extLst>
                 </a:gridCol>
                 <a:gridCol w="6480721">
                   <a:extLst>
                     <a:ext uri="{9D8B030D-6E8A-4147-A177-3AD203B41FA5}">
-                      <a16:colId xmlns:a16="http://schemas.microsoft.com/office/drawing/2014/main" val="20001"/>
+                      <a16:colId xmlns:a16="http://schemas.microsoft.com/office/drawing/2014/main" xmlns="" val="20001"/>
                     </a:ext>
                   </a:extLst>
                 </a:gridCol>
@@ -7242,7 +7261,7 @@
                 </a:tc>
                 <a:extLst>
                   <a:ext uri="{0D108BD9-81ED-4DB2-BD59-A6C34878D82A}">
-                    <a16:rowId xmlns:a16="http://schemas.microsoft.com/office/drawing/2014/main" val="10000"/>
+                    <a16:rowId xmlns:a16="http://schemas.microsoft.com/office/drawing/2014/main" xmlns="" val="10000"/>
                   </a:ext>
                 </a:extLst>
               </a:tr>
@@ -7284,7 +7303,7 @@
                 </a:tc>
                 <a:extLst>
                   <a:ext uri="{0D108BD9-81ED-4DB2-BD59-A6C34878D82A}">
-                    <a16:rowId xmlns:a16="http://schemas.microsoft.com/office/drawing/2014/main" val="10001"/>
+                    <a16:rowId xmlns:a16="http://schemas.microsoft.com/office/drawing/2014/main" xmlns="" val="10001"/>
                   </a:ext>
                 </a:extLst>
               </a:tr>
@@ -7359,7 +7378,7 @@
                 </a:tc>
                 <a:extLst>
                   <a:ext uri="{0D108BD9-81ED-4DB2-BD59-A6C34878D82A}">
-                    <a16:rowId xmlns:a16="http://schemas.microsoft.com/office/drawing/2014/main" val="10002"/>
+                    <a16:rowId xmlns:a16="http://schemas.microsoft.com/office/drawing/2014/main" xmlns="" val="10002"/>
                   </a:ext>
                 </a:extLst>
               </a:tr>
@@ -7414,7 +7433,7 @@
                 </a:tc>
                 <a:extLst>
                   <a:ext uri="{0D108BD9-81ED-4DB2-BD59-A6C34878D82A}">
-                    <a16:rowId xmlns:a16="http://schemas.microsoft.com/office/drawing/2014/main" val="10003"/>
+                    <a16:rowId xmlns:a16="http://schemas.microsoft.com/office/drawing/2014/main" xmlns="" val="10003"/>
                   </a:ext>
                 </a:extLst>
               </a:tr>
@@ -7425,7 +7444,7 @@
     </p:spTree>
     <p:extLst>
       <p:ext uri="{BB962C8B-B14F-4D97-AF65-F5344CB8AC3E}">
-        <p14:creationId xmlns:p14="http://schemas.microsoft.com/office/powerpoint/2010/main" val="3248075059"/>
+        <p14:creationId xmlns:p14="http://schemas.microsoft.com/office/powerpoint/2010/main" xmlns="" val="3248075059"/>
       </p:ext>
     </p:extLst>
   </p:cSld>
@@ -7565,14 +7584,14 @@
                 <a:gridCol w="1584176">
                   <a:extLst>
                     <a:ext uri="{9D8B030D-6E8A-4147-A177-3AD203B41FA5}">
-                      <a16:colId xmlns:a16="http://schemas.microsoft.com/office/drawing/2014/main" val="20000"/>
+                      <a16:colId xmlns:a16="http://schemas.microsoft.com/office/drawing/2014/main" xmlns="" val="20000"/>
                     </a:ext>
                   </a:extLst>
                 </a:gridCol>
                 <a:gridCol w="6480721">
                   <a:extLst>
                     <a:ext uri="{9D8B030D-6E8A-4147-A177-3AD203B41FA5}">
-                      <a16:colId xmlns:a16="http://schemas.microsoft.com/office/drawing/2014/main" val="20001"/>
+                      <a16:colId xmlns:a16="http://schemas.microsoft.com/office/drawing/2014/main" xmlns="" val="20001"/>
                     </a:ext>
                   </a:extLst>
                 </a:gridCol>
@@ -7614,7 +7633,7 @@
                 </a:tc>
                 <a:extLst>
                   <a:ext uri="{0D108BD9-81ED-4DB2-BD59-A6C34878D82A}">
-                    <a16:rowId xmlns:a16="http://schemas.microsoft.com/office/drawing/2014/main" val="10000"/>
+                    <a16:rowId xmlns:a16="http://schemas.microsoft.com/office/drawing/2014/main" xmlns="" val="10000"/>
                   </a:ext>
                 </a:extLst>
               </a:tr>
@@ -7786,7 +7805,7 @@
                 </a:tc>
                 <a:extLst>
                   <a:ext uri="{0D108BD9-81ED-4DB2-BD59-A6C34878D82A}">
-                    <a16:rowId xmlns:a16="http://schemas.microsoft.com/office/drawing/2014/main" val="10001"/>
+                    <a16:rowId xmlns:a16="http://schemas.microsoft.com/office/drawing/2014/main" xmlns="" val="10001"/>
                   </a:ext>
                 </a:extLst>
               </a:tr>
@@ -7907,7 +7926,7 @@
                 </a:tc>
                 <a:extLst>
                   <a:ext uri="{0D108BD9-81ED-4DB2-BD59-A6C34878D82A}">
-                    <a16:rowId xmlns:a16="http://schemas.microsoft.com/office/drawing/2014/main" val="10002"/>
+                    <a16:rowId xmlns:a16="http://schemas.microsoft.com/office/drawing/2014/main" xmlns="" val="10002"/>
                   </a:ext>
                 </a:extLst>
               </a:tr>
@@ -7996,7 +8015,7 @@
                 </a:tc>
                 <a:extLst>
                   <a:ext uri="{0D108BD9-81ED-4DB2-BD59-A6C34878D82A}">
-                    <a16:rowId xmlns:a16="http://schemas.microsoft.com/office/drawing/2014/main" val="10003"/>
+                    <a16:rowId xmlns:a16="http://schemas.microsoft.com/office/drawing/2014/main" xmlns="" val="10003"/>
                   </a:ext>
                 </a:extLst>
               </a:tr>
@@ -8129,7 +8148,7 @@
           <p:nvPr>
             <p:extLst>
               <p:ext uri="{D42A27DB-BD31-4B8C-83A1-F6EECF244321}">
-                <p14:modId xmlns:p14="http://schemas.microsoft.com/office/powerpoint/2010/main" val="3528518649"/>
+                <p14:modId xmlns:p14="http://schemas.microsoft.com/office/powerpoint/2010/main" xmlns="" val="3528518649"/>
               </p:ext>
             </p:extLst>
           </p:nvPr>
@@ -8148,14 +8167,14 @@
                 <a:gridCol w="1584176">
                   <a:extLst>
                     <a:ext uri="{9D8B030D-6E8A-4147-A177-3AD203B41FA5}">
-                      <a16:colId xmlns:a16="http://schemas.microsoft.com/office/drawing/2014/main" val="20000"/>
+                      <a16:colId xmlns:a16="http://schemas.microsoft.com/office/drawing/2014/main" xmlns="" val="20000"/>
                     </a:ext>
                   </a:extLst>
                 </a:gridCol>
                 <a:gridCol w="6480721">
                   <a:extLst>
                     <a:ext uri="{9D8B030D-6E8A-4147-A177-3AD203B41FA5}">
-                      <a16:colId xmlns:a16="http://schemas.microsoft.com/office/drawing/2014/main" val="20001"/>
+                      <a16:colId xmlns:a16="http://schemas.microsoft.com/office/drawing/2014/main" xmlns="" val="20001"/>
                     </a:ext>
                   </a:extLst>
                 </a:gridCol>
@@ -8192,7 +8211,7 @@
                 </a:tc>
                 <a:extLst>
                   <a:ext uri="{0D108BD9-81ED-4DB2-BD59-A6C34878D82A}">
-                    <a16:rowId xmlns:a16="http://schemas.microsoft.com/office/drawing/2014/main" val="10000"/>
+                    <a16:rowId xmlns:a16="http://schemas.microsoft.com/office/drawing/2014/main" xmlns="" val="10000"/>
                   </a:ext>
                 </a:extLst>
               </a:tr>
@@ -8272,7 +8291,7 @@
                 </a:tc>
                 <a:extLst>
                   <a:ext uri="{0D108BD9-81ED-4DB2-BD59-A6C34878D82A}">
-                    <a16:rowId xmlns:a16="http://schemas.microsoft.com/office/drawing/2014/main" val="10001"/>
+                    <a16:rowId xmlns:a16="http://schemas.microsoft.com/office/drawing/2014/main" xmlns="" val="10001"/>
                   </a:ext>
                 </a:extLst>
               </a:tr>
@@ -8387,7 +8406,7 @@
                 </a:tc>
                 <a:extLst>
                   <a:ext uri="{0D108BD9-81ED-4DB2-BD59-A6C34878D82A}">
-                    <a16:rowId xmlns:a16="http://schemas.microsoft.com/office/drawing/2014/main" val="10002"/>
+                    <a16:rowId xmlns:a16="http://schemas.microsoft.com/office/drawing/2014/main" xmlns="" val="10002"/>
                   </a:ext>
                 </a:extLst>
               </a:tr>
@@ -8451,7 +8470,7 @@
                 </a:tc>
                 <a:extLst>
                   <a:ext uri="{0D108BD9-81ED-4DB2-BD59-A6C34878D82A}">
-                    <a16:rowId xmlns:a16="http://schemas.microsoft.com/office/drawing/2014/main" val="10003"/>
+                    <a16:rowId xmlns:a16="http://schemas.microsoft.com/office/drawing/2014/main" xmlns="" val="10003"/>
                   </a:ext>
                 </a:extLst>
               </a:tr>
@@ -8462,7 +8481,7 @@
     </p:spTree>
     <p:extLst>
       <p:ext uri="{BB962C8B-B14F-4D97-AF65-F5344CB8AC3E}">
-        <p14:creationId xmlns:p14="http://schemas.microsoft.com/office/powerpoint/2010/main" val="4058254611"/>
+        <p14:creationId xmlns:p14="http://schemas.microsoft.com/office/powerpoint/2010/main" xmlns="" val="4058254611"/>
       </p:ext>
     </p:extLst>
   </p:cSld>
@@ -8589,7 +8608,7 @@
           <p:nvPr>
             <p:extLst>
               <p:ext uri="{D42A27DB-BD31-4B8C-83A1-F6EECF244321}">
-                <p14:modId xmlns:p14="http://schemas.microsoft.com/office/powerpoint/2010/main" val="3528518649"/>
+                <p14:modId xmlns:p14="http://schemas.microsoft.com/office/powerpoint/2010/main" xmlns="" val="3528518649"/>
               </p:ext>
             </p:extLst>
           </p:nvPr>
@@ -8608,14 +8627,14 @@
                 <a:gridCol w="1584176">
                   <a:extLst>
                     <a:ext uri="{9D8B030D-6E8A-4147-A177-3AD203B41FA5}">
-                      <a16:colId xmlns:a16="http://schemas.microsoft.com/office/drawing/2014/main" val="20000"/>
+                      <a16:colId xmlns:a16="http://schemas.microsoft.com/office/drawing/2014/main" xmlns="" val="20000"/>
                     </a:ext>
                   </a:extLst>
                 </a:gridCol>
                 <a:gridCol w="6480721">
                   <a:extLst>
                     <a:ext uri="{9D8B030D-6E8A-4147-A177-3AD203B41FA5}">
-                      <a16:colId xmlns:a16="http://schemas.microsoft.com/office/drawing/2014/main" val="20001"/>
+                      <a16:colId xmlns:a16="http://schemas.microsoft.com/office/drawing/2014/main" xmlns="" val="20001"/>
                     </a:ext>
                   </a:extLst>
                 </a:gridCol>
@@ -8652,7 +8671,7 @@
                 </a:tc>
                 <a:extLst>
                   <a:ext uri="{0D108BD9-81ED-4DB2-BD59-A6C34878D82A}">
-                    <a16:rowId xmlns:a16="http://schemas.microsoft.com/office/drawing/2014/main" val="10000"/>
+                    <a16:rowId xmlns:a16="http://schemas.microsoft.com/office/drawing/2014/main" xmlns="" val="10000"/>
                   </a:ext>
                 </a:extLst>
               </a:tr>
@@ -8806,7 +8825,7 @@
                 </a:tc>
                 <a:extLst>
                   <a:ext uri="{0D108BD9-81ED-4DB2-BD59-A6C34878D82A}">
-                    <a16:rowId xmlns:a16="http://schemas.microsoft.com/office/drawing/2014/main" val="10001"/>
+                    <a16:rowId xmlns:a16="http://schemas.microsoft.com/office/drawing/2014/main" xmlns="" val="10001"/>
                   </a:ext>
                 </a:extLst>
               </a:tr>
@@ -8881,7 +8900,7 @@
                 </a:tc>
                 <a:extLst>
                   <a:ext uri="{0D108BD9-81ED-4DB2-BD59-A6C34878D82A}">
-                    <a16:rowId xmlns:a16="http://schemas.microsoft.com/office/drawing/2014/main" val="10002"/>
+                    <a16:rowId xmlns:a16="http://schemas.microsoft.com/office/drawing/2014/main" xmlns="" val="10002"/>
                   </a:ext>
                 </a:extLst>
               </a:tr>
@@ -8949,7 +8968,7 @@
                 </a:tc>
                 <a:extLst>
                   <a:ext uri="{0D108BD9-81ED-4DB2-BD59-A6C34878D82A}">
-                    <a16:rowId xmlns:a16="http://schemas.microsoft.com/office/drawing/2014/main" val="10003"/>
+                    <a16:rowId xmlns:a16="http://schemas.microsoft.com/office/drawing/2014/main" xmlns="" val="10003"/>
                   </a:ext>
                 </a:extLst>
               </a:tr>
@@ -8960,7 +8979,7 @@
     </p:spTree>
     <p:extLst>
       <p:ext uri="{BB962C8B-B14F-4D97-AF65-F5344CB8AC3E}">
-        <p14:creationId xmlns:p14="http://schemas.microsoft.com/office/powerpoint/2010/main" val="4058254611"/>
+        <p14:creationId xmlns:p14="http://schemas.microsoft.com/office/powerpoint/2010/main" xmlns="" val="4058254611"/>
       </p:ext>
     </p:extLst>
   </p:cSld>
@@ -9087,7 +9106,7 @@
           <p:nvPr>
             <p:extLst>
               <p:ext uri="{D42A27DB-BD31-4B8C-83A1-F6EECF244321}">
-                <p14:modId xmlns:p14="http://schemas.microsoft.com/office/powerpoint/2010/main" val="3728952247"/>
+                <p14:modId xmlns:p14="http://schemas.microsoft.com/office/powerpoint/2010/main" xmlns="" val="3728952247"/>
               </p:ext>
             </p:extLst>
           </p:nvPr>
@@ -9106,14 +9125,14 @@
                 <a:gridCol w="1584176">
                   <a:extLst>
                     <a:ext uri="{9D8B030D-6E8A-4147-A177-3AD203B41FA5}">
-                      <a16:colId xmlns:a16="http://schemas.microsoft.com/office/drawing/2014/main" val="20000"/>
+                      <a16:colId xmlns:a16="http://schemas.microsoft.com/office/drawing/2014/main" xmlns="" val="20000"/>
                     </a:ext>
                   </a:extLst>
                 </a:gridCol>
                 <a:gridCol w="6480721">
                   <a:extLst>
                     <a:ext uri="{9D8B030D-6E8A-4147-A177-3AD203B41FA5}">
-                      <a16:colId xmlns:a16="http://schemas.microsoft.com/office/drawing/2014/main" val="20001"/>
+                      <a16:colId xmlns:a16="http://schemas.microsoft.com/office/drawing/2014/main" xmlns="" val="20001"/>
                     </a:ext>
                   </a:extLst>
                 </a:gridCol>
@@ -9150,7 +9169,7 @@
                 </a:tc>
                 <a:extLst>
                   <a:ext uri="{0D108BD9-81ED-4DB2-BD59-A6C34878D82A}">
-                    <a16:rowId xmlns:a16="http://schemas.microsoft.com/office/drawing/2014/main" val="10000"/>
+                    <a16:rowId xmlns:a16="http://schemas.microsoft.com/office/drawing/2014/main" xmlns="" val="10000"/>
                   </a:ext>
                 </a:extLst>
               </a:tr>
@@ -9262,7 +9281,7 @@
                 </a:tc>
                 <a:extLst>
                   <a:ext uri="{0D108BD9-81ED-4DB2-BD59-A6C34878D82A}">
-                    <a16:rowId xmlns:a16="http://schemas.microsoft.com/office/drawing/2014/main" val="10001"/>
+                    <a16:rowId xmlns:a16="http://schemas.microsoft.com/office/drawing/2014/main" xmlns="" val="10001"/>
                   </a:ext>
                 </a:extLst>
               </a:tr>
@@ -9435,7 +9454,7 @@
                 </a:tc>
                 <a:extLst>
                   <a:ext uri="{0D108BD9-81ED-4DB2-BD59-A6C34878D82A}">
-                    <a16:rowId xmlns:a16="http://schemas.microsoft.com/office/drawing/2014/main" val="10002"/>
+                    <a16:rowId xmlns:a16="http://schemas.microsoft.com/office/drawing/2014/main" xmlns="" val="10002"/>
                   </a:ext>
                 </a:extLst>
               </a:tr>
@@ -9502,7 +9521,7 @@
                 </a:tc>
                 <a:extLst>
                   <a:ext uri="{0D108BD9-81ED-4DB2-BD59-A6C34878D82A}">
-                    <a16:rowId xmlns:a16="http://schemas.microsoft.com/office/drawing/2014/main" val="10003"/>
+                    <a16:rowId xmlns:a16="http://schemas.microsoft.com/office/drawing/2014/main" xmlns="" val="10003"/>
                   </a:ext>
                 </a:extLst>
               </a:tr>
@@ -9513,7 +9532,7 @@
     </p:spTree>
     <p:extLst>
       <p:ext uri="{BB962C8B-B14F-4D97-AF65-F5344CB8AC3E}">
-        <p14:creationId xmlns:p14="http://schemas.microsoft.com/office/powerpoint/2010/main" val="2726051080"/>
+        <p14:creationId xmlns:p14="http://schemas.microsoft.com/office/powerpoint/2010/main" xmlns="" val="2726051080"/>
       </p:ext>
     </p:extLst>
   </p:cSld>
@@ -9799,7 +9818,7 @@
           <p:nvPr>
             <p:extLst>
               <p:ext uri="{D42A27DB-BD31-4B8C-83A1-F6EECF244321}">
-                <p14:modId xmlns:p14="http://schemas.microsoft.com/office/powerpoint/2010/main" val="2739947338"/>
+                <p14:modId xmlns:p14="http://schemas.microsoft.com/office/powerpoint/2010/main" xmlns="" val="2739947338"/>
               </p:ext>
             </p:extLst>
           </p:nvPr>
@@ -9818,14 +9837,14 @@
                 <a:gridCol w="1584176">
                   <a:extLst>
                     <a:ext uri="{9D8B030D-6E8A-4147-A177-3AD203B41FA5}">
-                      <a16:colId xmlns:a16="http://schemas.microsoft.com/office/drawing/2014/main" val="20000"/>
+                      <a16:colId xmlns:a16="http://schemas.microsoft.com/office/drawing/2014/main" xmlns="" val="20000"/>
                     </a:ext>
                   </a:extLst>
                 </a:gridCol>
                 <a:gridCol w="6480721">
                   <a:extLst>
                     <a:ext uri="{9D8B030D-6E8A-4147-A177-3AD203B41FA5}">
-                      <a16:colId xmlns:a16="http://schemas.microsoft.com/office/drawing/2014/main" val="20001"/>
+                      <a16:colId xmlns:a16="http://schemas.microsoft.com/office/drawing/2014/main" xmlns="" val="20001"/>
                     </a:ext>
                   </a:extLst>
                 </a:gridCol>
@@ -9867,7 +9886,7 @@
                 </a:tc>
                 <a:extLst>
                   <a:ext uri="{0D108BD9-81ED-4DB2-BD59-A6C34878D82A}">
-                    <a16:rowId xmlns:a16="http://schemas.microsoft.com/office/drawing/2014/main" val="10000"/>
+                    <a16:rowId xmlns:a16="http://schemas.microsoft.com/office/drawing/2014/main" xmlns="" val="10000"/>
                   </a:ext>
                 </a:extLst>
               </a:tr>
@@ -9950,7 +9969,7 @@
                 </a:tc>
                 <a:extLst>
                   <a:ext uri="{0D108BD9-81ED-4DB2-BD59-A6C34878D82A}">
-                    <a16:rowId xmlns:a16="http://schemas.microsoft.com/office/drawing/2014/main" val="10001"/>
+                    <a16:rowId xmlns:a16="http://schemas.microsoft.com/office/drawing/2014/main" xmlns="" val="10001"/>
                   </a:ext>
                 </a:extLst>
               </a:tr>
@@ -10028,7 +10047,7 @@
                 </a:tc>
                 <a:extLst>
                   <a:ext uri="{0D108BD9-81ED-4DB2-BD59-A6C34878D82A}">
-                    <a16:rowId xmlns:a16="http://schemas.microsoft.com/office/drawing/2014/main" val="10002"/>
+                    <a16:rowId xmlns:a16="http://schemas.microsoft.com/office/drawing/2014/main" xmlns="" val="10002"/>
                   </a:ext>
                 </a:extLst>
               </a:tr>
@@ -10118,7 +10137,7 @@
                 </a:tc>
                 <a:extLst>
                   <a:ext uri="{0D108BD9-81ED-4DB2-BD59-A6C34878D82A}">
-                    <a16:rowId xmlns:a16="http://schemas.microsoft.com/office/drawing/2014/main" val="10003"/>
+                    <a16:rowId xmlns:a16="http://schemas.microsoft.com/office/drawing/2014/main" xmlns="" val="10003"/>
                   </a:ext>
                 </a:extLst>
               </a:tr>
@@ -10129,7 +10148,7 @@
     </p:spTree>
     <p:extLst>
       <p:ext uri="{BB962C8B-B14F-4D97-AF65-F5344CB8AC3E}">
-        <p14:creationId xmlns:p14="http://schemas.microsoft.com/office/powerpoint/2010/main" val="1493014693"/>
+        <p14:creationId xmlns:p14="http://schemas.microsoft.com/office/powerpoint/2010/main" xmlns="" val="1493014693"/>
       </p:ext>
     </p:extLst>
   </p:cSld>
@@ -10453,14 +10472,14 @@
                 <a:gridCol w="1584176">
                   <a:extLst>
                     <a:ext uri="{9D8B030D-6E8A-4147-A177-3AD203B41FA5}">
-                      <a16:colId xmlns:a16="http://schemas.microsoft.com/office/drawing/2014/main" val="20000"/>
+                      <a16:colId xmlns:a16="http://schemas.microsoft.com/office/drawing/2014/main" xmlns="" val="20000"/>
                     </a:ext>
                   </a:extLst>
                 </a:gridCol>
                 <a:gridCol w="6480721">
                   <a:extLst>
                     <a:ext uri="{9D8B030D-6E8A-4147-A177-3AD203B41FA5}">
-                      <a16:colId xmlns:a16="http://schemas.microsoft.com/office/drawing/2014/main" val="20001"/>
+                      <a16:colId xmlns:a16="http://schemas.microsoft.com/office/drawing/2014/main" xmlns="" val="20001"/>
                     </a:ext>
                   </a:extLst>
                 </a:gridCol>
@@ -10502,7 +10521,7 @@
                 </a:tc>
                 <a:extLst>
                   <a:ext uri="{0D108BD9-81ED-4DB2-BD59-A6C34878D82A}">
-                    <a16:rowId xmlns:a16="http://schemas.microsoft.com/office/drawing/2014/main" val="10000"/>
+                    <a16:rowId xmlns:a16="http://schemas.microsoft.com/office/drawing/2014/main" xmlns="" val="10000"/>
                   </a:ext>
                 </a:extLst>
               </a:tr>
@@ -10560,7 +10579,7 @@
                 </a:tc>
                 <a:extLst>
                   <a:ext uri="{0D108BD9-81ED-4DB2-BD59-A6C34878D82A}">
-                    <a16:rowId xmlns:a16="http://schemas.microsoft.com/office/drawing/2014/main" val="10001"/>
+                    <a16:rowId xmlns:a16="http://schemas.microsoft.com/office/drawing/2014/main" xmlns="" val="10001"/>
                   </a:ext>
                 </a:extLst>
               </a:tr>
@@ -10707,7 +10726,7 @@
                 </a:tc>
                 <a:extLst>
                   <a:ext uri="{0D108BD9-81ED-4DB2-BD59-A6C34878D82A}">
-                    <a16:rowId xmlns:a16="http://schemas.microsoft.com/office/drawing/2014/main" val="10002"/>
+                    <a16:rowId xmlns:a16="http://schemas.microsoft.com/office/drawing/2014/main" xmlns="" val="10002"/>
                   </a:ext>
                 </a:extLst>
               </a:tr>
@@ -10758,7 +10777,7 @@
                 </a:tc>
                 <a:extLst>
                   <a:ext uri="{0D108BD9-81ED-4DB2-BD59-A6C34878D82A}">
-                    <a16:rowId xmlns:a16="http://schemas.microsoft.com/office/drawing/2014/main" val="10003"/>
+                    <a16:rowId xmlns:a16="http://schemas.microsoft.com/office/drawing/2014/main" xmlns="" val="10003"/>
                   </a:ext>
                 </a:extLst>
               </a:tr>
@@ -10853,7 +10872,7 @@
                 </a:tc>
                 <a:extLst>
                   <a:ext uri="{0D108BD9-81ED-4DB2-BD59-A6C34878D82A}">
-                    <a16:rowId xmlns:a16="http://schemas.microsoft.com/office/drawing/2014/main" val="10004"/>
+                    <a16:rowId xmlns:a16="http://schemas.microsoft.com/office/drawing/2014/main" xmlns="" val="10004"/>
                   </a:ext>
                 </a:extLst>
               </a:tr>
@@ -10986,7 +11005,7 @@
           <p:nvPr>
             <p:extLst>
               <p:ext uri="{D42A27DB-BD31-4B8C-83A1-F6EECF244321}">
-                <p14:modId xmlns:p14="http://schemas.microsoft.com/office/powerpoint/2010/main" val="1031210796"/>
+                <p14:modId xmlns:p14="http://schemas.microsoft.com/office/powerpoint/2010/main" xmlns="" val="1031210796"/>
               </p:ext>
             </p:extLst>
           </p:nvPr>
@@ -11005,14 +11024,14 @@
                 <a:gridCol w="1584176">
                   <a:extLst>
                     <a:ext uri="{9D8B030D-6E8A-4147-A177-3AD203B41FA5}">
-                      <a16:colId xmlns:a16="http://schemas.microsoft.com/office/drawing/2014/main" val="20000"/>
+                      <a16:colId xmlns:a16="http://schemas.microsoft.com/office/drawing/2014/main" xmlns="" val="20000"/>
                     </a:ext>
                   </a:extLst>
                 </a:gridCol>
                 <a:gridCol w="6480721">
                   <a:extLst>
                     <a:ext uri="{9D8B030D-6E8A-4147-A177-3AD203B41FA5}">
-                      <a16:colId xmlns:a16="http://schemas.microsoft.com/office/drawing/2014/main" val="20001"/>
+                      <a16:colId xmlns:a16="http://schemas.microsoft.com/office/drawing/2014/main" xmlns="" val="20001"/>
                     </a:ext>
                   </a:extLst>
                 </a:gridCol>
@@ -11049,7 +11068,7 @@
                 </a:tc>
                 <a:extLst>
                   <a:ext uri="{0D108BD9-81ED-4DB2-BD59-A6C34878D82A}">
-                    <a16:rowId xmlns:a16="http://schemas.microsoft.com/office/drawing/2014/main" val="10000"/>
+                    <a16:rowId xmlns:a16="http://schemas.microsoft.com/office/drawing/2014/main" xmlns="" val="10000"/>
                   </a:ext>
                 </a:extLst>
               </a:tr>
@@ -11097,7 +11116,7 @@
                 </a:tc>
                 <a:extLst>
                   <a:ext uri="{0D108BD9-81ED-4DB2-BD59-A6C34878D82A}">
-                    <a16:rowId xmlns:a16="http://schemas.microsoft.com/office/drawing/2014/main" val="10001"/>
+                    <a16:rowId xmlns:a16="http://schemas.microsoft.com/office/drawing/2014/main" xmlns="" val="10001"/>
                   </a:ext>
                 </a:extLst>
               </a:tr>
@@ -11153,7 +11172,7 @@
                 </a:tc>
                 <a:extLst>
                   <a:ext uri="{0D108BD9-81ED-4DB2-BD59-A6C34878D82A}">
-                    <a16:rowId xmlns:a16="http://schemas.microsoft.com/office/drawing/2014/main" val="10002"/>
+                    <a16:rowId xmlns:a16="http://schemas.microsoft.com/office/drawing/2014/main" xmlns="" val="10002"/>
                   </a:ext>
                 </a:extLst>
               </a:tr>
@@ -11212,7 +11231,7 @@
                 </a:tc>
                 <a:extLst>
                   <a:ext uri="{0D108BD9-81ED-4DB2-BD59-A6C34878D82A}">
-                    <a16:rowId xmlns:a16="http://schemas.microsoft.com/office/drawing/2014/main" val="10003"/>
+                    <a16:rowId xmlns:a16="http://schemas.microsoft.com/office/drawing/2014/main" xmlns="" val="10003"/>
                   </a:ext>
                 </a:extLst>
               </a:tr>
@@ -11307,7 +11326,7 @@
                 </a:tc>
                 <a:extLst>
                   <a:ext uri="{0D108BD9-81ED-4DB2-BD59-A6C34878D82A}">
-                    <a16:rowId xmlns:a16="http://schemas.microsoft.com/office/drawing/2014/main" val="10004"/>
+                    <a16:rowId xmlns:a16="http://schemas.microsoft.com/office/drawing/2014/main" xmlns="" val="10004"/>
                   </a:ext>
                 </a:extLst>
               </a:tr>
@@ -11318,7 +11337,7 @@
     </p:spTree>
     <p:extLst>
       <p:ext uri="{BB962C8B-B14F-4D97-AF65-F5344CB8AC3E}">
-        <p14:creationId xmlns:p14="http://schemas.microsoft.com/office/powerpoint/2010/main" val="3532623066"/>
+        <p14:creationId xmlns:p14="http://schemas.microsoft.com/office/powerpoint/2010/main" xmlns="" val="3532623066"/>
       </p:ext>
     </p:extLst>
   </p:cSld>
@@ -11445,7 +11464,7 @@
           <p:nvPr>
             <p:extLst>
               <p:ext uri="{D42A27DB-BD31-4B8C-83A1-F6EECF244321}">
-                <p14:modId xmlns:p14="http://schemas.microsoft.com/office/powerpoint/2010/main" val="1031210796"/>
+                <p14:modId xmlns:p14="http://schemas.microsoft.com/office/powerpoint/2010/main" xmlns="" val="1031210796"/>
               </p:ext>
             </p:extLst>
           </p:nvPr>
@@ -11464,14 +11483,14 @@
                 <a:gridCol w="1584176">
                   <a:extLst>
                     <a:ext uri="{9D8B030D-6E8A-4147-A177-3AD203B41FA5}">
-                      <a16:colId xmlns:a16="http://schemas.microsoft.com/office/drawing/2014/main" val="20000"/>
+                      <a16:colId xmlns:a16="http://schemas.microsoft.com/office/drawing/2014/main" xmlns="" val="20000"/>
                     </a:ext>
                   </a:extLst>
                 </a:gridCol>
                 <a:gridCol w="6480721">
                   <a:extLst>
                     <a:ext uri="{9D8B030D-6E8A-4147-A177-3AD203B41FA5}">
-                      <a16:colId xmlns:a16="http://schemas.microsoft.com/office/drawing/2014/main" val="20001"/>
+                      <a16:colId xmlns:a16="http://schemas.microsoft.com/office/drawing/2014/main" xmlns="" val="20001"/>
                     </a:ext>
                   </a:extLst>
                 </a:gridCol>
@@ -11508,7 +11527,7 @@
                 </a:tc>
                 <a:extLst>
                   <a:ext uri="{0D108BD9-81ED-4DB2-BD59-A6C34878D82A}">
-                    <a16:rowId xmlns:a16="http://schemas.microsoft.com/office/drawing/2014/main" val="10000"/>
+                    <a16:rowId xmlns:a16="http://schemas.microsoft.com/office/drawing/2014/main" xmlns="" val="10000"/>
                   </a:ext>
                 </a:extLst>
               </a:tr>
@@ -11604,7 +11623,7 @@
                 </a:tc>
                 <a:extLst>
                   <a:ext uri="{0D108BD9-81ED-4DB2-BD59-A6C34878D82A}">
-                    <a16:rowId xmlns:a16="http://schemas.microsoft.com/office/drawing/2014/main" val="10001"/>
+                    <a16:rowId xmlns:a16="http://schemas.microsoft.com/office/drawing/2014/main" xmlns="" val="10001"/>
                   </a:ext>
                 </a:extLst>
               </a:tr>
@@ -11660,7 +11679,7 @@
                 </a:tc>
                 <a:extLst>
                   <a:ext uri="{0D108BD9-81ED-4DB2-BD59-A6C34878D82A}">
-                    <a16:rowId xmlns:a16="http://schemas.microsoft.com/office/drawing/2014/main" val="10002"/>
+                    <a16:rowId xmlns:a16="http://schemas.microsoft.com/office/drawing/2014/main" xmlns="" val="10002"/>
                   </a:ext>
                 </a:extLst>
               </a:tr>
@@ -11727,7 +11746,7 @@
                 </a:tc>
                 <a:extLst>
                   <a:ext uri="{0D108BD9-81ED-4DB2-BD59-A6C34878D82A}">
-                    <a16:rowId xmlns:a16="http://schemas.microsoft.com/office/drawing/2014/main" val="10003"/>
+                    <a16:rowId xmlns:a16="http://schemas.microsoft.com/office/drawing/2014/main" xmlns="" val="10003"/>
                   </a:ext>
                 </a:extLst>
               </a:tr>
@@ -11794,7 +11813,7 @@
                 </a:tc>
                 <a:extLst>
                   <a:ext uri="{0D108BD9-81ED-4DB2-BD59-A6C34878D82A}">
-                    <a16:rowId xmlns:a16="http://schemas.microsoft.com/office/drawing/2014/main" val="10004"/>
+                    <a16:rowId xmlns:a16="http://schemas.microsoft.com/office/drawing/2014/main" xmlns="" val="10004"/>
                   </a:ext>
                 </a:extLst>
               </a:tr>
@@ -11805,7 +11824,7 @@
     </p:spTree>
     <p:extLst>
       <p:ext uri="{BB962C8B-B14F-4D97-AF65-F5344CB8AC3E}">
-        <p14:creationId xmlns:p14="http://schemas.microsoft.com/office/powerpoint/2010/main" val="3532623066"/>
+        <p14:creationId xmlns:p14="http://schemas.microsoft.com/office/powerpoint/2010/main" xmlns="" val="3532623066"/>
       </p:ext>
     </p:extLst>
   </p:cSld>
@@ -11932,7 +11951,7 @@
           <p:nvPr>
             <p:extLst>
               <p:ext uri="{D42A27DB-BD31-4B8C-83A1-F6EECF244321}">
-                <p14:modId xmlns:p14="http://schemas.microsoft.com/office/powerpoint/2010/main" val="3016841426"/>
+                <p14:modId xmlns:p14="http://schemas.microsoft.com/office/powerpoint/2010/main" xmlns="" val="3016841426"/>
               </p:ext>
             </p:extLst>
           </p:nvPr>
@@ -11951,14 +11970,14 @@
                 <a:gridCol w="1584176">
                   <a:extLst>
                     <a:ext uri="{9D8B030D-6E8A-4147-A177-3AD203B41FA5}">
-                      <a16:colId xmlns:a16="http://schemas.microsoft.com/office/drawing/2014/main" val="20000"/>
+                      <a16:colId xmlns:a16="http://schemas.microsoft.com/office/drawing/2014/main" xmlns="" val="20000"/>
                     </a:ext>
                   </a:extLst>
                 </a:gridCol>
                 <a:gridCol w="6480721">
                   <a:extLst>
                     <a:ext uri="{9D8B030D-6E8A-4147-A177-3AD203B41FA5}">
-                      <a16:colId xmlns:a16="http://schemas.microsoft.com/office/drawing/2014/main" val="20001"/>
+                      <a16:colId xmlns:a16="http://schemas.microsoft.com/office/drawing/2014/main" xmlns="" val="20001"/>
                     </a:ext>
                   </a:extLst>
                 </a:gridCol>
@@ -12000,7 +12019,7 @@
                 </a:tc>
                 <a:extLst>
                   <a:ext uri="{0D108BD9-81ED-4DB2-BD59-A6C34878D82A}">
-                    <a16:rowId xmlns:a16="http://schemas.microsoft.com/office/drawing/2014/main" val="10000"/>
+                    <a16:rowId xmlns:a16="http://schemas.microsoft.com/office/drawing/2014/main" xmlns="" val="10000"/>
                   </a:ext>
                 </a:extLst>
               </a:tr>
@@ -12073,7 +12092,7 @@
                 </a:tc>
                 <a:extLst>
                   <a:ext uri="{0D108BD9-81ED-4DB2-BD59-A6C34878D82A}">
-                    <a16:rowId xmlns:a16="http://schemas.microsoft.com/office/drawing/2014/main" val="10001"/>
+                    <a16:rowId xmlns:a16="http://schemas.microsoft.com/office/drawing/2014/main" xmlns="" val="10001"/>
                   </a:ext>
                 </a:extLst>
               </a:tr>
@@ -12216,7 +12235,7 @@
                 </a:tc>
                 <a:extLst>
                   <a:ext uri="{0D108BD9-81ED-4DB2-BD59-A6C34878D82A}">
-                    <a16:rowId xmlns:a16="http://schemas.microsoft.com/office/drawing/2014/main" val="10002"/>
+                    <a16:rowId xmlns:a16="http://schemas.microsoft.com/office/drawing/2014/main" xmlns="" val="10002"/>
                   </a:ext>
                 </a:extLst>
               </a:tr>
@@ -12303,7 +12322,7 @@
                 </a:tc>
                 <a:extLst>
                   <a:ext uri="{0D108BD9-81ED-4DB2-BD59-A6C34878D82A}">
-                    <a16:rowId xmlns:a16="http://schemas.microsoft.com/office/drawing/2014/main" val="10003"/>
+                    <a16:rowId xmlns:a16="http://schemas.microsoft.com/office/drawing/2014/main" xmlns="" val="10003"/>
                   </a:ext>
                 </a:extLst>
               </a:tr>
@@ -12398,7 +12417,7 @@
                 </a:tc>
                 <a:extLst>
                   <a:ext uri="{0D108BD9-81ED-4DB2-BD59-A6C34878D82A}">
-                    <a16:rowId xmlns:a16="http://schemas.microsoft.com/office/drawing/2014/main" val="10004"/>
+                    <a16:rowId xmlns:a16="http://schemas.microsoft.com/office/drawing/2014/main" xmlns="" val="10004"/>
                   </a:ext>
                 </a:extLst>
               </a:tr>
@@ -12409,7 +12428,7 @@
     </p:spTree>
     <p:extLst>
       <p:ext uri="{BB962C8B-B14F-4D97-AF65-F5344CB8AC3E}">
-        <p14:creationId xmlns:p14="http://schemas.microsoft.com/office/powerpoint/2010/main" val="2422853760"/>
+        <p14:creationId xmlns:p14="http://schemas.microsoft.com/office/powerpoint/2010/main" xmlns="" val="2422853760"/>
       </p:ext>
     </p:extLst>
   </p:cSld>
@@ -12536,7 +12555,7 @@
           <p:nvPr>
             <p:extLst>
               <p:ext uri="{D42A27DB-BD31-4B8C-83A1-F6EECF244321}">
-                <p14:modId xmlns:p14="http://schemas.microsoft.com/office/powerpoint/2010/main" val="2547152848"/>
+                <p14:modId xmlns:p14="http://schemas.microsoft.com/office/powerpoint/2010/main" xmlns="" val="2547152848"/>
               </p:ext>
             </p:extLst>
           </p:nvPr>
@@ -12555,14 +12574,14 @@
                 <a:gridCol w="1584176">
                   <a:extLst>
                     <a:ext uri="{9D8B030D-6E8A-4147-A177-3AD203B41FA5}">
-                      <a16:colId xmlns:a16="http://schemas.microsoft.com/office/drawing/2014/main" val="20000"/>
+                      <a16:colId xmlns:a16="http://schemas.microsoft.com/office/drawing/2014/main" xmlns="" val="20000"/>
                     </a:ext>
                   </a:extLst>
                 </a:gridCol>
                 <a:gridCol w="6480721">
                   <a:extLst>
                     <a:ext uri="{9D8B030D-6E8A-4147-A177-3AD203B41FA5}">
-                      <a16:colId xmlns:a16="http://schemas.microsoft.com/office/drawing/2014/main" val="20001"/>
+                      <a16:colId xmlns:a16="http://schemas.microsoft.com/office/drawing/2014/main" xmlns="" val="20001"/>
                     </a:ext>
                   </a:extLst>
                 </a:gridCol>
@@ -12604,7 +12623,7 @@
                 </a:tc>
                 <a:extLst>
                   <a:ext uri="{0D108BD9-81ED-4DB2-BD59-A6C34878D82A}">
-                    <a16:rowId xmlns:a16="http://schemas.microsoft.com/office/drawing/2014/main" val="10000"/>
+                    <a16:rowId xmlns:a16="http://schemas.microsoft.com/office/drawing/2014/main" xmlns="" val="10000"/>
                   </a:ext>
                 </a:extLst>
               </a:tr>
@@ -12690,8 +12709,12 @@
                         <a:t> </a:t>
                       </a:r>
                       <a:r>
-                        <a:rPr lang="de-DE" sz="1800" baseline="0" dirty="0" err="1"/>
+                        <a:rPr lang="de-DE" sz="1800" baseline="0" dirty="0" err="1" smtClean="0"/>
                         <a:t>project</a:t>
+                      </a:r>
+                      <a:r>
+                        <a:rPr lang="de-DE" sz="1800" baseline="0" dirty="0" smtClean="0"/>
+                        <a:t> (Client)</a:t>
                       </a:r>
                       <a:endParaRPr lang="de-DE" sz="1800" dirty="0"/>
                     </a:p>
@@ -12700,7 +12723,7 @@
                 </a:tc>
                 <a:extLst>
                   <a:ext uri="{0D108BD9-81ED-4DB2-BD59-A6C34878D82A}">
-                    <a16:rowId xmlns:a16="http://schemas.microsoft.com/office/drawing/2014/main" val="10001"/>
+                    <a16:rowId xmlns:a16="http://schemas.microsoft.com/office/drawing/2014/main" xmlns="" val="10001"/>
                   </a:ext>
                 </a:extLst>
               </a:tr>
@@ -12747,7 +12770,11 @@
                       </a:r>
                       <a:r>
                         <a:rPr lang="en-US" sz="1800" dirty="0"/>
-                        <a:t>Creation of a project documentation</a:t>
+                        <a:t>Creation of a project </a:t>
+                      </a:r>
+                      <a:r>
+                        <a:rPr lang="en-US" sz="1800" dirty="0" smtClean="0"/>
+                        <a:t>documentation (Client)</a:t>
                       </a:r>
                       <a:endParaRPr lang="de-DE" sz="1800" baseline="0" dirty="0"/>
                     </a:p>
@@ -12756,7 +12783,7 @@
                 </a:tc>
                 <a:extLst>
                   <a:ext uri="{0D108BD9-81ED-4DB2-BD59-A6C34878D82A}">
-                    <a16:rowId xmlns:a16="http://schemas.microsoft.com/office/drawing/2014/main" val="10002"/>
+                    <a16:rowId xmlns:a16="http://schemas.microsoft.com/office/drawing/2014/main" xmlns="" val="10002"/>
                   </a:ext>
                 </a:extLst>
               </a:tr>
@@ -12823,7 +12850,7 @@
                 </a:tc>
                 <a:extLst>
                   <a:ext uri="{0D108BD9-81ED-4DB2-BD59-A6C34878D82A}">
-                    <a16:rowId xmlns:a16="http://schemas.microsoft.com/office/drawing/2014/main" val="10003"/>
+                    <a16:rowId xmlns:a16="http://schemas.microsoft.com/office/drawing/2014/main" xmlns="" val="10003"/>
                   </a:ext>
                 </a:extLst>
               </a:tr>
@@ -12876,11 +12903,11 @@
                         <a:t>related</a:t>
                       </a:r>
                       <a:r>
-                        <a:rPr lang="de-DE" sz="1800" baseline="0"/>
-                        <a:t> </a:t>
-                      </a:r>
-                      <a:r>
-                        <a:rPr lang="de-DE" sz="1800"/>
+                        <a:rPr lang="de-DE" sz="1800" baseline="0" dirty="0"/>
+                        <a:t> </a:t>
+                      </a:r>
+                      <a:r>
+                        <a:rPr lang="de-DE" sz="1800" dirty="0" err="1"/>
                         <a:t>work</a:t>
                       </a:r>
                       <a:endParaRPr lang="de-DE" sz="1800" dirty="0"/>
@@ -12890,7 +12917,7 @@
                 </a:tc>
                 <a:extLst>
                   <a:ext uri="{0D108BD9-81ED-4DB2-BD59-A6C34878D82A}">
-                    <a16:rowId xmlns:a16="http://schemas.microsoft.com/office/drawing/2014/main" val="10004"/>
+                    <a16:rowId xmlns:a16="http://schemas.microsoft.com/office/drawing/2014/main" xmlns="" val="10004"/>
                   </a:ext>
                 </a:extLst>
               </a:tr>
@@ -12901,7 +12928,7 @@
     </p:spTree>
     <p:extLst>
       <p:ext uri="{BB962C8B-B14F-4D97-AF65-F5344CB8AC3E}">
-        <p14:creationId xmlns:p14="http://schemas.microsoft.com/office/powerpoint/2010/main" val="453573633"/>
+        <p14:creationId xmlns:p14="http://schemas.microsoft.com/office/powerpoint/2010/main" xmlns="" val="453573633"/>
       </p:ext>
     </p:extLst>
   </p:cSld>
@@ -14281,7 +14308,7 @@
           <a:blip r:embed="rId2" cstate="print">
             <a:extLst>
               <a:ext uri="{28A0092B-C50C-407E-A947-70E740481C1C}">
-                <a14:useLocalDpi xmlns:a14="http://schemas.microsoft.com/office/drawing/2010/main" val="0"/>
+                <a14:useLocalDpi xmlns:a14="http://schemas.microsoft.com/office/drawing/2010/main" xmlns="" val="0"/>
               </a:ext>
             </a:extLst>
           </a:blip>
@@ -14299,7 +14326,7 @@
     </p:spTree>
     <p:extLst>
       <p:ext uri="{BB962C8B-B14F-4D97-AF65-F5344CB8AC3E}">
-        <p14:creationId xmlns:p14="http://schemas.microsoft.com/office/powerpoint/2010/main" val="3486165658"/>
+        <p14:creationId xmlns:p14="http://schemas.microsoft.com/office/powerpoint/2010/main" xmlns="" val="3486165658"/>
       </p:ext>
     </p:extLst>
   </p:cSld>

</xml_diff>